<commit_message>
Update UserGuide.adoc with Managing Slots and diagrams
</commit_message>
<xml_diff>
--- a/docs/diagrams/ArchitectureDiagram.pptx
+++ b/docs/diagrams/ArchitectureDiagram.pptx
@@ -1,6 +1,6 @@
 
 <file path=ppt/presentation.xml><?xml version="1.0" encoding="utf-8"?>
-<p:presentation xmlns:a="http://schemas.openxmlformats.org/drawingml/2006/main" xmlns:r="http://schemas.openxmlformats.org/officeDocument/2006/relationships" xmlns:p="http://schemas.openxmlformats.org/presentationml/2006/main" removePersonalInfoOnSave="1" saveSubsetFonts="1">
+<p:presentation xmlns:a="http://schemas.openxmlformats.org/drawingml/2006/main" xmlns:r="http://schemas.openxmlformats.org/officeDocument/2006/relationships" xmlns:p="http://schemas.openxmlformats.org/presentationml/2006/main" saveSubsetFonts="1">
   <p:sldMasterIdLst>
     <p:sldMasterId id="2147483648" r:id="rId1"/>
   </p:sldMasterIdLst>
@@ -8,7 +8,7 @@
     <p:notesMasterId r:id="rId3"/>
   </p:notesMasterIdLst>
   <p:sldIdLst>
-    <p:sldId id="259" r:id="rId2"/>
+    <p:sldId id="257" r:id="rId2"/>
   </p:sldIdLst>
   <p:sldSz cx="9144000" cy="6858000" type="screen4x3"/>
   <p:notesSz cx="6858000" cy="9144000"/>
@@ -110,7 +110,7 @@
   <p:extLst>
     <p:ext uri="{EFAFB233-063F-42B5-8137-9DF3F51BA10A}">
       <p15:sldGuideLst xmlns:p15="http://schemas.microsoft.com/office/powerpoint/2012/main">
-        <p15:guide id="1" orient="horz" pos="1488">
+        <p15:guide id="1" orient="horz" pos="2160">
           <p15:clr>
             <a:srgbClr val="A4A3A4"/>
           </p15:clr>
@@ -208,7 +208,7 @@
           <a:p>
             <a:fld id="{F5CC4B3F-88C1-4FFA-B1B6-F41C21DC6924}" type="datetimeFigureOut">
               <a:rPr lang="en-US" smtClean="0"/>
-              <a:t>12/15/2018</a:t>
+              <a:t>3/25/2019</a:t>
             </a:fld>
             <a:endParaRPr lang="en-US"/>
           </a:p>
@@ -475,6 +475,90 @@
 </p:notesMaster>
 </file>
 
+<file path=ppt/notesSlides/notesSlide1.xml><?xml version="1.0" encoding="utf-8"?>
+<p:notes xmlns:a="http://schemas.openxmlformats.org/drawingml/2006/main" xmlns:r="http://schemas.openxmlformats.org/officeDocument/2006/relationships" xmlns:p="http://schemas.openxmlformats.org/presentationml/2006/main">
+  <p:cSld>
+    <p:spTree>
+      <p:nvGrpSpPr>
+        <p:cNvPr id="1" name=""/>
+        <p:cNvGrpSpPr/>
+        <p:nvPr/>
+      </p:nvGrpSpPr>
+      <p:grpSpPr>
+        <a:xfrm>
+          <a:off x="0" y="0"/>
+          <a:ext cx="0" cy="0"/>
+          <a:chOff x="0" y="0"/>
+          <a:chExt cx="0" cy="0"/>
+        </a:xfrm>
+      </p:grpSpPr>
+      <p:sp>
+        <p:nvSpPr>
+          <p:cNvPr id="2" name="Slide Image Placeholder 1"/>
+          <p:cNvSpPr>
+            <a:spLocks noGrp="1" noRot="1" noChangeAspect="1"/>
+          </p:cNvSpPr>
+          <p:nvPr>
+            <p:ph type="sldImg"/>
+          </p:nvPr>
+        </p:nvSpPr>
+        <p:spPr/>
+      </p:sp>
+      <p:sp>
+        <p:nvSpPr>
+          <p:cNvPr id="3" name="Notes Placeholder 2"/>
+          <p:cNvSpPr>
+            <a:spLocks noGrp="1"/>
+          </p:cNvSpPr>
+          <p:nvPr>
+            <p:ph type="body" idx="1"/>
+          </p:nvPr>
+        </p:nvSpPr>
+        <p:spPr/>
+        <p:txBody>
+          <a:bodyPr/>
+          <a:lstStyle/>
+          <a:p>
+            <a:endParaRPr lang="en-US" dirty="0"/>
+          </a:p>
+        </p:txBody>
+      </p:sp>
+      <p:sp>
+        <p:nvSpPr>
+          <p:cNvPr id="4" name="Slide Number Placeholder 3"/>
+          <p:cNvSpPr>
+            <a:spLocks noGrp="1"/>
+          </p:cNvSpPr>
+          <p:nvPr>
+            <p:ph type="sldNum" sz="quarter" idx="10"/>
+          </p:nvPr>
+        </p:nvSpPr>
+        <p:spPr/>
+        <p:txBody>
+          <a:bodyPr/>
+          <a:lstStyle/>
+          <a:p>
+            <a:fld id="{5A7AB025-77E3-4BD1-A2FD-B3183DBA47A3}" type="slidenum">
+              <a:rPr lang="en-US" smtClean="0"/>
+              <a:t>1</a:t>
+            </a:fld>
+            <a:endParaRPr lang="en-US"/>
+          </a:p>
+        </p:txBody>
+      </p:sp>
+    </p:spTree>
+    <p:extLst>
+      <p:ext uri="{BB962C8B-B14F-4D97-AF65-F5344CB8AC3E}">
+        <p14:creationId xmlns:p14="http://schemas.microsoft.com/office/powerpoint/2010/main" val="3075080205"/>
+      </p:ext>
+    </p:extLst>
+  </p:cSld>
+  <p:clrMapOvr>
+    <a:masterClrMapping/>
+  </p:clrMapOvr>
+</p:notes>
+</file>
+
 <file path=ppt/slideLayouts/slideLayout1.xml><?xml version="1.0" encoding="utf-8"?>
 <p:sldLayout xmlns:a="http://schemas.openxmlformats.org/drawingml/2006/main" xmlns:r="http://schemas.openxmlformats.org/officeDocument/2006/relationships" xmlns:p="http://schemas.openxmlformats.org/presentationml/2006/main" type="title" preserve="1">
   <p:cSld name="Title Slide">
@@ -654,7 +738,7 @@
           <a:p>
             <a:fld id="{78C97017-6FC3-485B-9764-EAC9E56C1D49}" type="datetimeFigureOut">
               <a:rPr lang="en-US" smtClean="0"/>
-              <a:t>12/15/2018</a:t>
+              <a:t>3/25/2019</a:t>
             </a:fld>
             <a:endParaRPr lang="en-US"/>
           </a:p>
@@ -822,7 +906,7 @@
           <a:p>
             <a:fld id="{78C97017-6FC3-485B-9764-EAC9E56C1D49}" type="datetimeFigureOut">
               <a:rPr lang="en-US" smtClean="0"/>
-              <a:t>12/15/2018</a:t>
+              <a:t>3/25/2019</a:t>
             </a:fld>
             <a:endParaRPr lang="en-US"/>
           </a:p>
@@ -1000,7 +1084,7 @@
           <a:p>
             <a:fld id="{78C97017-6FC3-485B-9764-EAC9E56C1D49}" type="datetimeFigureOut">
               <a:rPr lang="en-US" smtClean="0"/>
-              <a:t>12/15/2018</a:t>
+              <a:t>3/25/2019</a:t>
             </a:fld>
             <a:endParaRPr lang="en-US"/>
           </a:p>
@@ -1168,7 +1252,7 @@
           <a:p>
             <a:fld id="{78C97017-6FC3-485B-9764-EAC9E56C1D49}" type="datetimeFigureOut">
               <a:rPr lang="en-US" smtClean="0"/>
-              <a:t>12/15/2018</a:t>
+              <a:t>3/25/2019</a:t>
             </a:fld>
             <a:endParaRPr lang="en-US"/>
           </a:p>
@@ -1413,7 +1497,7 @@
           <a:p>
             <a:fld id="{78C97017-6FC3-485B-9764-EAC9E56C1D49}" type="datetimeFigureOut">
               <a:rPr lang="en-US" smtClean="0"/>
-              <a:t>12/15/2018</a:t>
+              <a:t>3/25/2019</a:t>
             </a:fld>
             <a:endParaRPr lang="en-US"/>
           </a:p>
@@ -1698,7 +1782,7 @@
           <a:p>
             <a:fld id="{78C97017-6FC3-485B-9764-EAC9E56C1D49}" type="datetimeFigureOut">
               <a:rPr lang="en-US" smtClean="0"/>
-              <a:t>12/15/2018</a:t>
+              <a:t>3/25/2019</a:t>
             </a:fld>
             <a:endParaRPr lang="en-US"/>
           </a:p>
@@ -2117,7 +2201,7 @@
           <a:p>
             <a:fld id="{78C97017-6FC3-485B-9764-EAC9E56C1D49}" type="datetimeFigureOut">
               <a:rPr lang="en-US" smtClean="0"/>
-              <a:t>12/15/2018</a:t>
+              <a:t>3/25/2019</a:t>
             </a:fld>
             <a:endParaRPr lang="en-US"/>
           </a:p>
@@ -2234,7 +2318,7 @@
           <a:p>
             <a:fld id="{78C97017-6FC3-485B-9764-EAC9E56C1D49}" type="datetimeFigureOut">
               <a:rPr lang="en-US" smtClean="0"/>
-              <a:t>12/15/2018</a:t>
+              <a:t>3/25/2019</a:t>
             </a:fld>
             <a:endParaRPr lang="en-US"/>
           </a:p>
@@ -2329,7 +2413,7 @@
           <a:p>
             <a:fld id="{78C97017-6FC3-485B-9764-EAC9E56C1D49}" type="datetimeFigureOut">
               <a:rPr lang="en-US" smtClean="0"/>
-              <a:t>12/15/2018</a:t>
+              <a:t>3/25/2019</a:t>
             </a:fld>
             <a:endParaRPr lang="en-US"/>
           </a:p>
@@ -2604,7 +2688,7 @@
           <a:p>
             <a:fld id="{78C97017-6FC3-485B-9764-EAC9E56C1D49}" type="datetimeFigureOut">
               <a:rPr lang="en-US" smtClean="0"/>
-              <a:t>12/15/2018</a:t>
+              <a:t>3/25/2019</a:t>
             </a:fld>
             <a:endParaRPr lang="en-US"/>
           </a:p>
@@ -2856,7 +2940,7 @@
           <a:p>
             <a:fld id="{78C97017-6FC3-485B-9764-EAC9E56C1D49}" type="datetimeFigureOut">
               <a:rPr lang="en-US" smtClean="0"/>
-              <a:t>12/15/2018</a:t>
+              <a:t>3/25/2019</a:t>
             </a:fld>
             <a:endParaRPr lang="en-US"/>
           </a:p>
@@ -3067,7 +3151,7 @@
           <a:p>
             <a:fld id="{78C97017-6FC3-485B-9764-EAC9E56C1D49}" type="datetimeFigureOut">
               <a:rPr lang="en-US" smtClean="0"/>
-              <a:t>12/15/2018</a:t>
+              <a:t>3/25/2019</a:t>
             </a:fld>
             <a:endParaRPr lang="en-US"/>
           </a:p>
@@ -3444,47 +3528,210 @@
       </p:grpSpPr>
       <p:sp>
         <p:nvSpPr>
-          <p:cNvPr id="15" name="Rounded Rectangle 14"/>
+          <p:cNvPr id="9" name="Rectangle 8"/>
           <p:cNvSpPr/>
           <p:nvPr/>
         </p:nvSpPr>
         <p:spPr>
           <a:xfrm>
-            <a:off x="1636188" y="2057400"/>
-            <a:ext cx="5700181" cy="2667000"/>
-          </a:xfrm>
-          <a:prstGeom prst="roundRect">
-            <a:avLst>
-              <a:gd name="adj" fmla="val 5768"/>
-            </a:avLst>
+            <a:off x="411820" y="3920440"/>
+            <a:ext cx="400979" cy="346760"/>
+          </a:xfrm>
+          <a:prstGeom prst="rect">
+            <a:avLst/>
           </a:prstGeom>
           <a:solidFill>
-            <a:schemeClr val="bg1">
-              <a:lumMod val="95000"/>
-            </a:schemeClr>
+            <a:srgbClr val="C00000"/>
           </a:solidFill>
+          <a:ln w="19050">
+            <a:solidFill>
+              <a:srgbClr val="C00000"/>
+            </a:solidFill>
+          </a:ln>
+          <a:effectLst/>
+        </p:spPr>
+        <p:style>
+          <a:lnRef idx="1">
+            <a:schemeClr val="accent2"/>
+          </a:lnRef>
+          <a:fillRef idx="2">
+            <a:schemeClr val="accent2"/>
+          </a:fillRef>
+          <a:effectRef idx="1">
+            <a:schemeClr val="accent2"/>
+          </a:effectRef>
+          <a:fontRef idx="minor">
+            <a:schemeClr val="dk1"/>
+          </a:fontRef>
+        </p:style>
+        <p:txBody>
+          <a:bodyPr rtlCol="0" anchor="ctr"/>
+          <a:lstStyle/>
+          <a:p>
+            <a:pPr algn="ctr"/>
+            <a:r>
+              <a:rPr lang="en-US" sz="1050" dirty="0" err="1">
+                <a:solidFill>
+                  <a:schemeClr val="bg1"/>
+                </a:solidFill>
+              </a:rPr>
+              <a:t>Gui</a:t>
+            </a:r>
+            <a:endParaRPr lang="en-SG" sz="1050" dirty="0">
+              <a:solidFill>
+                <a:schemeClr val="bg1"/>
+              </a:solidFill>
+            </a:endParaRPr>
+          </a:p>
+        </p:txBody>
+      </p:sp>
+      <p:sp>
+        <p:nvSpPr>
+          <p:cNvPr id="12" name="Rectangle 11"/>
+          <p:cNvSpPr/>
+          <p:nvPr/>
+        </p:nvSpPr>
+        <p:spPr>
+          <a:xfrm>
+            <a:off x="1143973" y="3913809"/>
+            <a:ext cx="581331" cy="346760"/>
+          </a:xfrm>
+          <a:prstGeom prst="rect">
+            <a:avLst/>
+          </a:prstGeom>
+          <a:solidFill>
+            <a:srgbClr val="C00000"/>
+          </a:solidFill>
+          <a:ln w="19050">
+            <a:solidFill>
+              <a:srgbClr val="C00000"/>
+            </a:solidFill>
+          </a:ln>
+          <a:effectLst/>
+        </p:spPr>
+        <p:style>
+          <a:lnRef idx="1">
+            <a:schemeClr val="accent2"/>
+          </a:lnRef>
+          <a:fillRef idx="2">
+            <a:schemeClr val="accent2"/>
+          </a:fillRef>
+          <a:effectRef idx="1">
+            <a:schemeClr val="accent2"/>
+          </a:effectRef>
+          <a:fontRef idx="minor">
+            <a:schemeClr val="dk1"/>
+          </a:fontRef>
+        </p:style>
+        <p:txBody>
+          <a:bodyPr rtlCol="0" anchor="ctr"/>
+          <a:lstStyle/>
+          <a:p>
+            <a:pPr algn="ctr"/>
+            <a:r>
+              <a:rPr lang="en-US" sz="1050" dirty="0">
+                <a:solidFill>
+                  <a:schemeClr val="bg1"/>
+                </a:solidFill>
+              </a:rPr>
+              <a:t>Main</a:t>
+            </a:r>
+            <a:endParaRPr lang="en-SG" sz="1050" dirty="0">
+              <a:solidFill>
+                <a:schemeClr val="bg1"/>
+              </a:solidFill>
+            </a:endParaRPr>
+          </a:p>
+        </p:txBody>
+      </p:sp>
+      <p:sp>
+        <p:nvSpPr>
+          <p:cNvPr id="13" name="Rectangle 12"/>
+          <p:cNvSpPr/>
+          <p:nvPr/>
+        </p:nvSpPr>
+        <p:spPr>
+          <a:xfrm>
+            <a:off x="3483098" y="3747060"/>
+            <a:ext cx="929296" cy="346760"/>
+          </a:xfrm>
+          <a:prstGeom prst="rect">
+            <a:avLst/>
+          </a:prstGeom>
+          <a:solidFill>
+            <a:schemeClr val="accent6"/>
+          </a:solidFill>
+          <a:ln w="19050"/>
+          <a:effectLst/>
+        </p:spPr>
+        <p:style>
+          <a:lnRef idx="1">
+            <a:schemeClr val="accent6"/>
+          </a:lnRef>
+          <a:fillRef idx="2">
+            <a:schemeClr val="accent6"/>
+          </a:fillRef>
+          <a:effectRef idx="1">
+            <a:schemeClr val="accent6"/>
+          </a:effectRef>
+          <a:fontRef idx="minor">
+            <a:schemeClr val="dk1"/>
+          </a:fontRef>
+        </p:style>
+        <p:txBody>
+          <a:bodyPr rtlCol="0" anchor="ctr"/>
+          <a:lstStyle/>
+          <a:p>
+            <a:pPr algn="ctr"/>
+            <a:r>
+              <a:rPr lang="en-US" sz="1050" dirty="0">
+                <a:solidFill>
+                  <a:schemeClr val="bg1"/>
+                </a:solidFill>
+              </a:rPr>
+              <a:t>Planner</a:t>
+            </a:r>
+            <a:endParaRPr lang="en-SG" sz="1050" dirty="0">
+              <a:solidFill>
+                <a:schemeClr val="bg1"/>
+              </a:solidFill>
+            </a:endParaRPr>
+          </a:p>
+        </p:txBody>
+      </p:sp>
+      <p:sp>
+        <p:nvSpPr>
+          <p:cNvPr id="14" name="Rectangle 13"/>
+          <p:cNvSpPr/>
+          <p:nvPr/>
+        </p:nvSpPr>
+        <p:spPr>
+          <a:xfrm>
+            <a:off x="2743200" y="3006040"/>
+            <a:ext cx="634723" cy="346760"/>
+          </a:xfrm>
+          <a:prstGeom prst="rect">
+            <a:avLst/>
+          </a:prstGeom>
           <a:ln>
             <a:solidFill>
-              <a:schemeClr val="bg1">
-                <a:lumMod val="85000"/>
-              </a:schemeClr>
+              <a:srgbClr val="0070C0"/>
             </a:solidFill>
           </a:ln>
+          <a:effectLst/>
         </p:spPr>
         <p:style>
-          <a:lnRef idx="2">
-            <a:schemeClr val="accent1">
-              <a:shade val="50000"/>
-            </a:schemeClr>
+          <a:lnRef idx="1">
+            <a:schemeClr val="accent1"/>
           </a:lnRef>
-          <a:fillRef idx="1">
+          <a:fillRef idx="2">
             <a:schemeClr val="accent1"/>
           </a:fillRef>
-          <a:effectRef idx="0">
+          <a:effectRef idx="1">
             <a:schemeClr val="accent1"/>
           </a:effectRef>
           <a:fontRef idx="minor">
-            <a:schemeClr val="lt1"/>
+            <a:schemeClr val="dk1"/>
           </a:fontRef>
         </p:style>
         <p:txBody>
@@ -3492,22 +3739,129 @@
           <a:lstStyle/>
           <a:p>
             <a:pPr algn="ctr"/>
-            <a:endParaRPr lang="en-US" dirty="0"/>
-          </a:p>
-        </p:txBody>
-      </p:sp>
-      <p:sp>
-        <p:nvSpPr>
-          <p:cNvPr id="2" name="Rectangle 62"/>
+            <a:r>
+              <a:rPr lang="en-US" sz="1050" dirty="0"/>
+              <a:t>Parser</a:t>
+            </a:r>
+            <a:endParaRPr lang="en-SG" sz="1050" dirty="0"/>
+          </a:p>
+        </p:txBody>
+      </p:sp>
+      <p:sp>
+        <p:nvSpPr>
+          <p:cNvPr id="16" name="Rectangle 15"/>
           <p:cNvSpPr/>
           <p:nvPr/>
         </p:nvSpPr>
         <p:spPr>
-          <a:xfrm flipH="1">
-            <a:off x="1964269" y="2191178"/>
-            <a:ext cx="609602" cy="1294917"/>
-          </a:xfrm>
-          <a:prstGeom prst="roundRect">
+          <a:xfrm>
+            <a:off x="5072919" y="4352685"/>
+            <a:ext cx="929296" cy="346760"/>
+          </a:xfrm>
+          <a:prstGeom prst="rect">
+            <a:avLst/>
+          </a:prstGeom>
+          <a:ln w="19050"/>
+          <a:effectLst/>
+        </p:spPr>
+        <p:style>
+          <a:lnRef idx="1">
+            <a:schemeClr val="accent6"/>
+          </a:lnRef>
+          <a:fillRef idx="2">
+            <a:schemeClr val="accent6"/>
+          </a:fillRef>
+          <a:effectRef idx="1">
+            <a:schemeClr val="accent6"/>
+          </a:effectRef>
+          <a:fontRef idx="minor">
+            <a:schemeClr val="dk1"/>
+          </a:fontRef>
+        </p:style>
+        <p:txBody>
+          <a:bodyPr rtlCol="0" anchor="ctr"/>
+          <a:lstStyle/>
+          <a:p>
+            <a:pPr algn="ctr"/>
+            <a:r>
+              <a:rPr lang="en-US" sz="1050" dirty="0"/>
+              <a:t>Semester</a:t>
+            </a:r>
+            <a:endParaRPr lang="en-SG" sz="1050" dirty="0"/>
+          </a:p>
+        </p:txBody>
+      </p:sp>
+      <p:sp>
+        <p:nvSpPr>
+          <p:cNvPr id="19" name="Rectangle 18"/>
+          <p:cNvSpPr/>
+          <p:nvPr/>
+        </p:nvSpPr>
+        <p:spPr>
+          <a:xfrm>
+            <a:off x="6637708" y="4352685"/>
+            <a:ext cx="929296" cy="346760"/>
+          </a:xfrm>
+          <a:prstGeom prst="rect">
+            <a:avLst/>
+          </a:prstGeom>
+          <a:solidFill>
+            <a:srgbClr val="7030A0"/>
+          </a:solidFill>
+          <a:ln w="19050">
+            <a:solidFill>
+              <a:srgbClr val="7030A0"/>
+            </a:solidFill>
+          </a:ln>
+          <a:effectLst/>
+        </p:spPr>
+        <p:style>
+          <a:lnRef idx="1">
+            <a:schemeClr val="accent6"/>
+          </a:lnRef>
+          <a:fillRef idx="2">
+            <a:schemeClr val="accent6"/>
+          </a:fillRef>
+          <a:effectRef idx="1">
+            <a:schemeClr val="accent6"/>
+          </a:effectRef>
+          <a:fontRef idx="minor">
+            <a:schemeClr val="dk1"/>
+          </a:fontRef>
+        </p:style>
+        <p:txBody>
+          <a:bodyPr rtlCol="0" anchor="ctr"/>
+          <a:lstStyle/>
+          <a:p>
+            <a:pPr algn="ctr"/>
+            <a:r>
+              <a:rPr lang="en-US" sz="1050" dirty="0">
+                <a:solidFill>
+                  <a:schemeClr val="bg1"/>
+                </a:solidFill>
+              </a:rPr>
+              <a:t>Slot</a:t>
+            </a:r>
+            <a:endParaRPr lang="en-SG" sz="1050" dirty="0">
+              <a:solidFill>
+                <a:schemeClr val="bg1"/>
+              </a:solidFill>
+            </a:endParaRPr>
+          </a:p>
+        </p:txBody>
+      </p:sp>
+      <p:sp>
+        <p:nvSpPr>
+          <p:cNvPr id="23" name="Rectangle 22"/>
+          <p:cNvSpPr/>
+          <p:nvPr/>
+        </p:nvSpPr>
+        <p:spPr>
+          <a:xfrm>
+            <a:off x="2410207" y="4460471"/>
+            <a:ext cx="790193" cy="346760"/>
+          </a:xfrm>
+          <a:prstGeom prst="rect">
             <a:avLst/>
           </a:prstGeom>
           <a:solidFill>
@@ -3540,14 +3894,14 @@
           <a:p>
             <a:pPr algn="ctr"/>
             <a:r>
-              <a:rPr lang="en-US" sz="1600" dirty="0">
+              <a:rPr lang="en-US" sz="1050" dirty="0" err="1">
                 <a:solidFill>
                   <a:schemeClr val="bg1"/>
                 </a:solidFill>
               </a:rPr>
-              <a:t>UI</a:t>
-            </a:r>
-            <a:endParaRPr lang="en-SG" sz="1600" dirty="0">
+              <a:t>StorageFile</a:t>
+            </a:r>
+            <a:endParaRPr lang="en-SG" sz="1050" dirty="0">
               <a:solidFill>
                 <a:schemeClr val="bg1"/>
               </a:solidFill>
@@ -3555,26 +3909,493 @@
           </a:p>
         </p:txBody>
       </p:sp>
-      <p:sp>
-        <p:nvSpPr>
-          <p:cNvPr id="3" name="Rectangle 45"/>
+      <p:cxnSp>
+        <p:nvCxnSpPr>
+          <p:cNvPr id="35" name="Elbow Connector 34"/>
+          <p:cNvCxnSpPr>
+            <a:stCxn id="12" idx="1"/>
+            <a:endCxn id="9" idx="3"/>
+          </p:cNvCxnSpPr>
+          <p:nvPr/>
+        </p:nvCxnSpPr>
+        <p:spPr>
+          <a:xfrm rot="10800000" flipV="1">
+            <a:off x="812799" y="4087188"/>
+            <a:ext cx="331174" cy="6631"/>
+          </a:xfrm>
+          <a:prstGeom prst="bentConnector3">
+            <a:avLst>
+              <a:gd name="adj1" fmla="val 50000"/>
+            </a:avLst>
+          </a:prstGeom>
+          <a:ln w="19050">
+            <a:solidFill>
+              <a:srgbClr val="C00000"/>
+            </a:solidFill>
+            <a:headEnd type="none" w="med" len="med"/>
+            <a:tailEnd type="arrow" w="med" len="med"/>
+          </a:ln>
+          <a:effectLst/>
+        </p:spPr>
+        <p:style>
+          <a:lnRef idx="1">
+            <a:schemeClr val="accent2"/>
+          </a:lnRef>
+          <a:fillRef idx="2">
+            <a:schemeClr val="accent2"/>
+          </a:fillRef>
+          <a:effectRef idx="1">
+            <a:schemeClr val="accent2"/>
+          </a:effectRef>
+          <a:fontRef idx="minor">
+            <a:schemeClr val="dk1"/>
+          </a:fontRef>
+        </p:style>
+      </p:cxnSp>
+      <p:cxnSp>
+        <p:nvCxnSpPr>
+          <p:cNvPr id="38" name="Elbow Connector 37"/>
+          <p:cNvCxnSpPr/>
+          <p:nvPr/>
+        </p:nvCxnSpPr>
+        <p:spPr>
+          <a:xfrm rot="5400000" flipH="1" flipV="1">
+            <a:off x="2793471" y="3541515"/>
+            <a:ext cx="342611" cy="12700"/>
+          </a:xfrm>
+          <a:prstGeom prst="bentConnector3">
+            <a:avLst>
+              <a:gd name="adj1" fmla="val 50000"/>
+            </a:avLst>
+          </a:prstGeom>
+          <a:ln w="19050">
+            <a:solidFill>
+              <a:srgbClr val="0070C0"/>
+            </a:solidFill>
+            <a:prstDash val="dash"/>
+            <a:headEnd type="none" w="med" len="med"/>
+            <a:tailEnd type="arrow" w="med" len="med"/>
+          </a:ln>
+          <a:effectLst/>
+        </p:spPr>
+        <p:style>
+          <a:lnRef idx="1">
+            <a:schemeClr val="accent2"/>
+          </a:lnRef>
+          <a:fillRef idx="2">
+            <a:schemeClr val="accent2"/>
+          </a:fillRef>
+          <a:effectRef idx="1">
+            <a:schemeClr val="accent2"/>
+          </a:effectRef>
+          <a:fontRef idx="minor">
+            <a:schemeClr val="dk1"/>
+          </a:fontRef>
+        </p:style>
+      </p:cxnSp>
+      <p:cxnSp>
+        <p:nvCxnSpPr>
+          <p:cNvPr id="41" name="Elbow Connector 40"/>
+          <p:cNvCxnSpPr>
+            <a:stCxn id="66" idx="2"/>
+            <a:endCxn id="23" idx="0"/>
+          </p:cNvCxnSpPr>
+          <p:nvPr/>
+        </p:nvCxnSpPr>
+        <p:spPr>
+          <a:xfrm rot="5400000">
+            <a:off x="2646817" y="4301983"/>
+            <a:ext cx="316975" cy="12700"/>
+          </a:xfrm>
+          <a:prstGeom prst="bentConnector3">
+            <a:avLst>
+              <a:gd name="adj1" fmla="val 50000"/>
+            </a:avLst>
+          </a:prstGeom>
+          <a:ln w="19050">
+            <a:solidFill>
+              <a:srgbClr val="0070C0"/>
+            </a:solidFill>
+            <a:headEnd type="none" w="med" len="med"/>
+            <a:tailEnd type="arrow" w="med" len="med"/>
+          </a:ln>
+          <a:effectLst/>
+        </p:spPr>
+        <p:style>
+          <a:lnRef idx="1">
+            <a:schemeClr val="accent2"/>
+          </a:lnRef>
+          <a:fillRef idx="2">
+            <a:schemeClr val="accent2"/>
+          </a:fillRef>
+          <a:effectRef idx="1">
+            <a:schemeClr val="accent2"/>
+          </a:effectRef>
+          <a:fontRef idx="minor">
+            <a:schemeClr val="dk1"/>
+          </a:fontRef>
+        </p:style>
+      </p:cxnSp>
+      <p:cxnSp>
+        <p:nvCxnSpPr>
+          <p:cNvPr id="51" name="Elbow Connector 50"/>
+          <p:cNvCxnSpPr>
+            <a:stCxn id="106" idx="3"/>
+            <a:endCxn id="16" idx="1"/>
+          </p:cNvCxnSpPr>
+          <p:nvPr/>
+        </p:nvCxnSpPr>
+        <p:spPr>
+          <a:xfrm>
+            <a:off x="4648442" y="3918486"/>
+            <a:ext cx="424477" cy="607579"/>
+          </a:xfrm>
+          <a:prstGeom prst="bentConnector3">
+            <a:avLst>
+              <a:gd name="adj1" fmla="val 52660"/>
+            </a:avLst>
+          </a:prstGeom>
+          <a:ln w="19050">
+            <a:headEnd type="none" w="med" len="med"/>
+            <a:tailEnd type="arrow" w="med" len="med"/>
+          </a:ln>
+          <a:effectLst/>
+        </p:spPr>
+        <p:style>
+          <a:lnRef idx="1">
+            <a:schemeClr val="accent6"/>
+          </a:lnRef>
+          <a:fillRef idx="2">
+            <a:schemeClr val="accent6"/>
+          </a:fillRef>
+          <a:effectRef idx="1">
+            <a:schemeClr val="accent6"/>
+          </a:effectRef>
+          <a:fontRef idx="minor">
+            <a:schemeClr val="dk1"/>
+          </a:fontRef>
+        </p:style>
+      </p:cxnSp>
+      <p:sp>
+        <p:nvSpPr>
+          <p:cNvPr id="100" name="Flowchart: Decision 99"/>
           <p:cNvSpPr/>
           <p:nvPr/>
         </p:nvSpPr>
         <p:spPr>
           <a:xfrm>
-            <a:off x="3412069" y="2191178"/>
-            <a:ext cx="1295400" cy="552022"/>
-          </a:xfrm>
-          <a:prstGeom prst="roundRect">
+            <a:off x="6012352" y="4439375"/>
+            <a:ext cx="236048" cy="173380"/>
+          </a:xfrm>
+          <a:prstGeom prst="flowChartDecision">
             <a:avLst/>
           </a:prstGeom>
+          <a:noFill/>
+          <a:ln w="19050"/>
+          <a:effectLst/>
+        </p:spPr>
+        <p:style>
+          <a:lnRef idx="1">
+            <a:schemeClr val="accent6"/>
+          </a:lnRef>
+          <a:fillRef idx="2">
+            <a:schemeClr val="accent6"/>
+          </a:fillRef>
+          <a:effectRef idx="1">
+            <a:schemeClr val="accent6"/>
+          </a:effectRef>
+          <a:fontRef idx="minor">
+            <a:schemeClr val="dk1"/>
+          </a:fontRef>
+        </p:style>
+        <p:txBody>
+          <a:bodyPr rtlCol="0" anchor="ctr"/>
+          <a:lstStyle/>
+          <a:p>
+            <a:pPr algn="ctr"/>
+            <a:endParaRPr lang="en-US" sz="1050"/>
+          </a:p>
+        </p:txBody>
+      </p:sp>
+      <p:sp>
+        <p:nvSpPr>
+          <p:cNvPr id="106" name="Flowchart: Decision 105"/>
+          <p:cNvSpPr/>
+          <p:nvPr/>
+        </p:nvSpPr>
+        <p:spPr>
+          <a:xfrm>
+            <a:off x="4412394" y="3831796"/>
+            <a:ext cx="236048" cy="173380"/>
+          </a:xfrm>
+          <a:prstGeom prst="flowChartDecision">
+            <a:avLst/>
+          </a:prstGeom>
           <a:solidFill>
-            <a:srgbClr val="0070C0"/>
+            <a:schemeClr val="accent6"/>
+          </a:solidFill>
+          <a:ln w="19050"/>
+          <a:effectLst/>
+        </p:spPr>
+        <p:style>
+          <a:lnRef idx="1">
+            <a:schemeClr val="accent6"/>
+          </a:lnRef>
+          <a:fillRef idx="2">
+            <a:schemeClr val="accent6"/>
+          </a:fillRef>
+          <a:effectRef idx="1">
+            <a:schemeClr val="accent6"/>
+          </a:effectRef>
+          <a:fontRef idx="minor">
+            <a:schemeClr val="dk1"/>
+          </a:fontRef>
+        </p:style>
+        <p:txBody>
+          <a:bodyPr rtlCol="0" anchor="ctr"/>
+          <a:lstStyle/>
+          <a:p>
+            <a:pPr algn="ctr"/>
+            <a:endParaRPr lang="en-US" sz="1050"/>
+          </a:p>
+        </p:txBody>
+      </p:sp>
+      <p:cxnSp>
+        <p:nvCxnSpPr>
+          <p:cNvPr id="115" name="Straight Arrow Connector 114"/>
+          <p:cNvCxnSpPr>
+            <a:stCxn id="100" idx="3"/>
+            <a:endCxn id="19" idx="1"/>
+          </p:cNvCxnSpPr>
+          <p:nvPr/>
+        </p:nvCxnSpPr>
+        <p:spPr>
+          <a:xfrm>
+            <a:off x="6248400" y="4526065"/>
+            <a:ext cx="389308" cy="0"/>
+          </a:xfrm>
+          <a:prstGeom prst="straightConnector1">
+            <a:avLst/>
+          </a:prstGeom>
+          <a:ln w="19050">
+            <a:headEnd type="none" w="med" len="med"/>
+            <a:tailEnd type="arrow" w="med" len="med"/>
+          </a:ln>
+          <a:effectLst/>
+        </p:spPr>
+        <p:style>
+          <a:lnRef idx="1">
+            <a:schemeClr val="accent6"/>
+          </a:lnRef>
+          <a:fillRef idx="2">
+            <a:schemeClr val="accent6"/>
+          </a:fillRef>
+          <a:effectRef idx="1">
+            <a:schemeClr val="accent6"/>
+          </a:effectRef>
+          <a:fontRef idx="minor">
+            <a:schemeClr val="dk1"/>
+          </a:fontRef>
+        </p:style>
+      </p:cxnSp>
+      <p:sp>
+        <p:nvSpPr>
+          <p:cNvPr id="129" name="Rectangle 128"/>
+          <p:cNvSpPr/>
+          <p:nvPr/>
+        </p:nvSpPr>
+        <p:spPr>
+          <a:xfrm>
+            <a:off x="6363802" y="5140408"/>
+            <a:ext cx="1408598" cy="346760"/>
+          </a:xfrm>
+          <a:prstGeom prst="rect">
+            <a:avLst/>
+          </a:prstGeom>
+          <a:ln w="19050"/>
+          <a:effectLst/>
+        </p:spPr>
+        <p:style>
+          <a:lnRef idx="1">
+            <a:schemeClr val="accent4"/>
+          </a:lnRef>
+          <a:fillRef idx="2">
+            <a:schemeClr val="accent4"/>
+          </a:fillRef>
+          <a:effectRef idx="1">
+            <a:schemeClr val="accent4"/>
+          </a:effectRef>
+          <a:fontRef idx="minor">
+            <a:schemeClr val="dk1"/>
+          </a:fontRef>
+        </p:style>
+        <p:txBody>
+          <a:bodyPr rtlCol="0" anchor="ctr"/>
+          <a:lstStyle/>
+          <a:p>
+            <a:pPr algn="ctr"/>
+            <a:r>
+              <a:rPr lang="en-US" sz="1050" dirty="0"/>
+              <a:t>&lt;&lt;interface&gt;&gt;</a:t>
+            </a:r>
+          </a:p>
+          <a:p>
+            <a:pPr algn="ctr"/>
+            <a:r>
+              <a:rPr lang="en-US" sz="1050" dirty="0" err="1"/>
+              <a:t>ReadOnlySlot</a:t>
+            </a:r>
+            <a:endParaRPr lang="en-SG" sz="1050" dirty="0"/>
+          </a:p>
+        </p:txBody>
+      </p:sp>
+      <p:cxnSp>
+        <p:nvCxnSpPr>
+          <p:cNvPr id="132" name="Elbow Connector 131"/>
+          <p:cNvCxnSpPr>
+            <a:endCxn id="129" idx="1"/>
+          </p:cNvCxnSpPr>
+          <p:nvPr/>
+        </p:nvCxnSpPr>
+        <p:spPr>
+          <a:xfrm>
+            <a:off x="304800" y="3006041"/>
+            <a:ext cx="6059002" cy="2307747"/>
+          </a:xfrm>
+          <a:prstGeom prst="bentConnector3">
+            <a:avLst>
+              <a:gd name="adj1" fmla="val 0"/>
+            </a:avLst>
+          </a:prstGeom>
+          <a:ln w="19050">
+            <a:solidFill>
+              <a:srgbClr val="C00000"/>
+            </a:solidFill>
+            <a:prstDash val="dash"/>
+            <a:headEnd type="none" w="med" len="med"/>
+            <a:tailEnd type="arrow" w="med" len="med"/>
+          </a:ln>
+          <a:effectLst/>
+        </p:spPr>
+        <p:style>
+          <a:lnRef idx="1">
+            <a:schemeClr val="accent2"/>
+          </a:lnRef>
+          <a:fillRef idx="2">
+            <a:schemeClr val="accent2"/>
+          </a:fillRef>
+          <a:effectRef idx="1">
+            <a:schemeClr val="accent2"/>
+          </a:effectRef>
+          <a:fontRef idx="minor">
+            <a:schemeClr val="dk1"/>
+          </a:fontRef>
+        </p:style>
+      </p:cxnSp>
+      <p:sp>
+        <p:nvSpPr>
+          <p:cNvPr id="135" name="Isosceles Triangle 134"/>
+          <p:cNvSpPr/>
+          <p:nvPr/>
+        </p:nvSpPr>
+        <p:spPr>
+          <a:xfrm rot="10800000">
+            <a:off x="6964221" y="4953000"/>
+            <a:ext cx="270504" cy="175523"/>
+          </a:xfrm>
+          <a:prstGeom prst="triangle">
+            <a:avLst/>
+          </a:prstGeom>
+          <a:ln w="19050"/>
+          <a:effectLst/>
+        </p:spPr>
+        <p:style>
+          <a:lnRef idx="1">
+            <a:schemeClr val="accent4"/>
+          </a:lnRef>
+          <a:fillRef idx="2">
+            <a:schemeClr val="accent4"/>
+          </a:fillRef>
+          <a:effectRef idx="1">
+            <a:schemeClr val="accent4"/>
+          </a:effectRef>
+          <a:fontRef idx="minor">
+            <a:schemeClr val="dk1"/>
+          </a:fontRef>
+        </p:style>
+        <p:txBody>
+          <a:bodyPr rtlCol="0" anchor="ctr"/>
+          <a:lstStyle/>
+          <a:p>
+            <a:pPr algn="ctr"/>
+            <a:endParaRPr lang="en-SG" sz="1050"/>
+          </a:p>
+        </p:txBody>
+      </p:sp>
+      <p:cxnSp>
+        <p:nvCxnSpPr>
+          <p:cNvPr id="136" name="Elbow Connector 135"/>
+          <p:cNvCxnSpPr>
+            <a:stCxn id="19" idx="2"/>
+            <a:endCxn id="135" idx="3"/>
+          </p:cNvCxnSpPr>
+          <p:nvPr/>
+        </p:nvCxnSpPr>
+        <p:spPr>
+          <a:xfrm rot="5400000">
+            <a:off x="6974138" y="4824781"/>
+            <a:ext cx="253555" cy="2883"/>
+          </a:xfrm>
+          <a:prstGeom prst="bentConnector3">
+            <a:avLst>
+              <a:gd name="adj1" fmla="val 50000"/>
+            </a:avLst>
+          </a:prstGeom>
+          <a:ln w="19050">
+            <a:solidFill>
+              <a:srgbClr val="7030A0"/>
+            </a:solidFill>
+            <a:prstDash val="dash"/>
+            <a:headEnd type="none" w="med" len="med"/>
+            <a:tailEnd type="none" w="med" len="med"/>
+          </a:ln>
+          <a:effectLst/>
+        </p:spPr>
+        <p:style>
+          <a:lnRef idx="1">
+            <a:schemeClr val="accent6"/>
+          </a:lnRef>
+          <a:fillRef idx="2">
+            <a:schemeClr val="accent6"/>
+          </a:fillRef>
+          <a:effectRef idx="1">
+            <a:schemeClr val="accent6"/>
+          </a:effectRef>
+          <a:fontRef idx="minor">
+            <a:schemeClr val="dk1"/>
+          </a:fontRef>
+        </p:style>
+      </p:cxnSp>
+      <p:sp>
+        <p:nvSpPr>
+          <p:cNvPr id="46" name="Rectangle 45"/>
+          <p:cNvSpPr/>
+          <p:nvPr/>
+        </p:nvSpPr>
+        <p:spPr>
+          <a:xfrm>
+            <a:off x="3985078" y="1356188"/>
+            <a:ext cx="1611867" cy="444640"/>
+          </a:xfrm>
+          <a:prstGeom prst="rect">
+            <a:avLst/>
+          </a:prstGeom>
+          <a:solidFill>
+            <a:schemeClr val="accent5"/>
           </a:solidFill>
           <a:ln w="19050">
             <a:solidFill>
-              <a:srgbClr val="0070C0"/>
+              <a:schemeClr val="accent5"/>
             </a:solidFill>
           </a:ln>
           <a:effectLst/>
@@ -3599,14 +4420,29 @@
           <a:p>
             <a:pPr algn="ctr"/>
             <a:r>
-              <a:rPr lang="en-US" sz="1600" dirty="0">
+              <a:rPr lang="en-US" sz="1050" dirty="0">
                 <a:solidFill>
                   <a:schemeClr val="bg1"/>
                 </a:solidFill>
               </a:rPr>
-              <a:t>Logic</a:t>
-            </a:r>
-            <a:endParaRPr lang="en-SG" sz="1600" dirty="0">
+              <a:t>{abstract}</a:t>
+            </a:r>
+            <a:br>
+              <a:rPr lang="en-US" sz="1050" dirty="0">
+                <a:solidFill>
+                  <a:schemeClr val="bg1"/>
+                </a:solidFill>
+              </a:rPr>
+            </a:br>
+            <a:r>
+              <a:rPr lang="en-US" sz="1050" dirty="0">
+                <a:solidFill>
+                  <a:schemeClr val="bg1"/>
+                </a:solidFill>
+              </a:rPr>
+              <a:t>Command</a:t>
+            </a:r>
+            <a:endParaRPr lang="en-SG" sz="1050" dirty="0">
               <a:solidFill>
                 <a:schemeClr val="bg1"/>
               </a:solidFill>
@@ -3616,30 +4452,19 @@
       </p:sp>
       <p:sp>
         <p:nvSpPr>
-          <p:cNvPr id="4" name="Rectangle 45"/>
+          <p:cNvPr id="50" name="Rectangle 49"/>
           <p:cNvSpPr/>
           <p:nvPr/>
         </p:nvSpPr>
         <p:spPr>
-          <a:xfrm>
-            <a:off x="5164669" y="2191179"/>
-            <a:ext cx="1447800" cy="552022"/>
-          </a:xfrm>
-          <a:prstGeom prst="roundRect">
+          <a:xfrm flipH="1">
+            <a:off x="6142650" y="1059080"/>
+            <a:ext cx="1404109" cy="346760"/>
+          </a:xfrm>
+          <a:prstGeom prst="rect">
             <a:avLst/>
           </a:prstGeom>
-          <a:solidFill>
-            <a:schemeClr val="accent6">
-              <a:lumMod val="75000"/>
-            </a:schemeClr>
-          </a:solidFill>
-          <a:ln w="19050">
-            <a:solidFill>
-              <a:schemeClr val="accent6">
-                <a:lumMod val="75000"/>
-              </a:schemeClr>
-            </a:solidFill>
-          </a:ln>
+          <a:ln w="19050"/>
           <a:effectLst/>
         </p:spPr>
         <p:style>
@@ -3662,43 +4487,28 @@
           <a:p>
             <a:pPr algn="ctr"/>
             <a:r>
-              <a:rPr lang="en-US" sz="1600" dirty="0">
-                <a:solidFill>
-                  <a:schemeClr val="bg1"/>
-                </a:solidFill>
-              </a:rPr>
-              <a:t>Storage</a:t>
-            </a:r>
-            <a:endParaRPr lang="en-SG" sz="1600" dirty="0">
-              <a:solidFill>
-                <a:schemeClr val="bg1"/>
-              </a:solidFill>
-            </a:endParaRPr>
-          </a:p>
-        </p:txBody>
-      </p:sp>
-      <p:sp>
-        <p:nvSpPr>
-          <p:cNvPr id="5" name="Rectangle 45"/>
+              <a:rPr lang="en-US" sz="1050" dirty="0" err="1"/>
+              <a:t>DeleteCommand</a:t>
+            </a:r>
+            <a:endParaRPr lang="en-SG" sz="1050" dirty="0"/>
+          </a:p>
+        </p:txBody>
+      </p:sp>
+      <p:sp>
+        <p:nvSpPr>
+          <p:cNvPr id="52" name="Rectangle 51"/>
           <p:cNvSpPr/>
           <p:nvPr/>
         </p:nvSpPr>
         <p:spPr>
-          <a:xfrm>
-            <a:off x="3412069" y="3124200"/>
-            <a:ext cx="1295400" cy="723791"/>
-          </a:xfrm>
-          <a:prstGeom prst="roundRect">
+          <a:xfrm flipH="1">
+            <a:off x="6142650" y="1454067"/>
+            <a:ext cx="1404109" cy="346760"/>
+          </a:xfrm>
+          <a:prstGeom prst="rect">
             <a:avLst/>
           </a:prstGeom>
-          <a:solidFill>
-            <a:srgbClr val="7030A0"/>
-          </a:solidFill>
-          <a:ln w="19050">
-            <a:solidFill>
-              <a:srgbClr val="7030A0"/>
-            </a:solidFill>
-          </a:ln>
+          <a:ln w="19050"/>
           <a:effectLst/>
         </p:spPr>
         <p:style>
@@ -3721,47 +4531,28 @@
           <a:p>
             <a:pPr algn="ctr"/>
             <a:r>
-              <a:rPr lang="en-US" sz="1600" dirty="0">
-                <a:solidFill>
-                  <a:schemeClr val="bg1"/>
-                </a:solidFill>
-              </a:rPr>
-              <a:t>Model</a:t>
-            </a:r>
-            <a:endParaRPr lang="en-SG" sz="1600" dirty="0">
-              <a:solidFill>
-                <a:schemeClr val="bg1"/>
-              </a:solidFill>
-            </a:endParaRPr>
-          </a:p>
-        </p:txBody>
-      </p:sp>
-      <p:sp>
-        <p:nvSpPr>
-          <p:cNvPr id="8" name="Rectangle 45"/>
+              <a:rPr lang="en-US" sz="1050" dirty="0" err="1"/>
+              <a:t>ClearCommand</a:t>
+            </a:r>
+            <a:endParaRPr lang="en-SG" sz="1050" dirty="0"/>
+          </a:p>
+        </p:txBody>
+      </p:sp>
+      <p:sp>
+        <p:nvSpPr>
+          <p:cNvPr id="53" name="Rectangle 52"/>
           <p:cNvSpPr/>
           <p:nvPr/>
         </p:nvSpPr>
         <p:spPr>
-          <a:xfrm>
-            <a:off x="3217846" y="4131994"/>
-            <a:ext cx="2658531" cy="444640"/>
-          </a:xfrm>
-          <a:prstGeom prst="roundRect">
+          <a:xfrm flipH="1">
+            <a:off x="6149690" y="3029424"/>
+            <a:ext cx="1404109" cy="346760"/>
+          </a:xfrm>
+          <a:prstGeom prst="rect">
             <a:avLst/>
           </a:prstGeom>
-          <a:solidFill>
-            <a:schemeClr val="accent5">
-              <a:lumMod val="75000"/>
-            </a:schemeClr>
-          </a:solidFill>
-          <a:ln w="19050">
-            <a:solidFill>
-              <a:schemeClr val="accent5">
-                <a:lumMod val="75000"/>
-              </a:schemeClr>
-            </a:solidFill>
-          </a:ln>
+          <a:ln w="19050"/>
           <a:effectLst/>
         </p:spPr>
         <p:style>
@@ -3784,800 +4575,28 @@
           <a:p>
             <a:pPr algn="ctr"/>
             <a:r>
-              <a:rPr lang="en-US" sz="1400" dirty="0">
-                <a:solidFill>
-                  <a:schemeClr val="bg1"/>
-                </a:solidFill>
-              </a:rPr>
-              <a:t>Commons</a:t>
-            </a:r>
-            <a:endParaRPr lang="en-SG" sz="1400" dirty="0">
-              <a:solidFill>
-                <a:schemeClr val="bg1"/>
-              </a:solidFill>
-            </a:endParaRPr>
-          </a:p>
-        </p:txBody>
-      </p:sp>
-      <p:cxnSp>
-        <p:nvCxnSpPr>
-          <p:cNvPr id="10" name="Straight Arrow Connector 9"/>
-          <p:cNvCxnSpPr>
-            <a:endCxn id="3" idx="1"/>
-          </p:cNvCxnSpPr>
-          <p:nvPr/>
-        </p:nvCxnSpPr>
-        <p:spPr>
-          <a:xfrm>
-            <a:off x="2573871" y="2467189"/>
-            <a:ext cx="838198" cy="0"/>
-          </a:xfrm>
-          <a:prstGeom prst="straightConnector1">
-            <a:avLst/>
-          </a:prstGeom>
-          <a:ln w="28575">
-            <a:solidFill>
-              <a:srgbClr val="00B050"/>
-            </a:solidFill>
-            <a:tailEnd type="arrow"/>
-          </a:ln>
-        </p:spPr>
-        <p:style>
-          <a:lnRef idx="1">
-            <a:schemeClr val="accent1"/>
-          </a:lnRef>
-          <a:fillRef idx="0">
-            <a:schemeClr val="accent1"/>
-          </a:fillRef>
-          <a:effectRef idx="0">
-            <a:schemeClr val="accent1"/>
-          </a:effectRef>
-          <a:fontRef idx="minor">
-            <a:schemeClr val="tx1"/>
-          </a:fontRef>
-        </p:style>
-      </p:cxnSp>
-      <p:cxnSp>
-        <p:nvCxnSpPr>
-          <p:cNvPr id="12" name="Straight Arrow Connector 11"/>
-          <p:cNvCxnSpPr/>
-          <p:nvPr/>
-        </p:nvCxnSpPr>
-        <p:spPr>
-          <a:xfrm>
-            <a:off x="2569639" y="3276600"/>
-            <a:ext cx="838198" cy="0"/>
-          </a:xfrm>
-          <a:prstGeom prst="straightConnector1">
-            <a:avLst/>
-          </a:prstGeom>
-          <a:ln w="28575">
-            <a:solidFill>
-              <a:srgbClr val="00B050"/>
-            </a:solidFill>
-            <a:tailEnd type="arrow"/>
-          </a:ln>
-        </p:spPr>
-        <p:style>
-          <a:lnRef idx="1">
-            <a:schemeClr val="accent1"/>
-          </a:lnRef>
-          <a:fillRef idx="0">
-            <a:schemeClr val="accent1"/>
-          </a:fillRef>
-          <a:effectRef idx="0">
-            <a:schemeClr val="accent1"/>
-          </a:effectRef>
-          <a:fontRef idx="minor">
-            <a:schemeClr val="tx1"/>
-          </a:fontRef>
-        </p:style>
-      </p:cxnSp>
-      <p:cxnSp>
-        <p:nvCxnSpPr>
-          <p:cNvPr id="13" name="Straight Arrow Connector 12"/>
-          <p:cNvCxnSpPr>
-            <a:stCxn id="3" idx="2"/>
-            <a:endCxn id="5" idx="0"/>
-          </p:cNvCxnSpPr>
-          <p:nvPr/>
-        </p:nvCxnSpPr>
-        <p:spPr>
-          <a:xfrm>
-            <a:off x="4059769" y="2743200"/>
-            <a:ext cx="0" cy="381000"/>
-          </a:xfrm>
-          <a:prstGeom prst="straightConnector1">
-            <a:avLst/>
-          </a:prstGeom>
-          <a:ln w="28575">
-            <a:solidFill>
-              <a:srgbClr val="0070C0"/>
-            </a:solidFill>
-            <a:tailEnd type="arrow"/>
-          </a:ln>
-        </p:spPr>
-        <p:style>
-          <a:lnRef idx="1">
-            <a:schemeClr val="accent1"/>
-          </a:lnRef>
-          <a:fillRef idx="0">
-            <a:schemeClr val="accent1"/>
-          </a:fillRef>
-          <a:effectRef idx="0">
-            <a:schemeClr val="accent1"/>
-          </a:effectRef>
-          <a:fontRef idx="minor">
-            <a:schemeClr val="tx1"/>
-          </a:fontRef>
-        </p:style>
-      </p:cxnSp>
-      <p:cxnSp>
-        <p:nvCxnSpPr>
-          <p:cNvPr id="16" name="Straight Arrow Connector 15"/>
-          <p:cNvCxnSpPr/>
-          <p:nvPr/>
-        </p:nvCxnSpPr>
-        <p:spPr>
-          <a:xfrm>
-            <a:off x="4707469" y="2467189"/>
-            <a:ext cx="457200" cy="0"/>
-          </a:xfrm>
-          <a:prstGeom prst="straightConnector1">
-            <a:avLst/>
-          </a:prstGeom>
-          <a:ln w="28575">
-            <a:solidFill>
-              <a:srgbClr val="0070C0"/>
-            </a:solidFill>
-            <a:tailEnd type="arrow"/>
-          </a:ln>
-        </p:spPr>
-        <p:style>
-          <a:lnRef idx="1">
-            <a:schemeClr val="accent1"/>
-          </a:lnRef>
-          <a:fillRef idx="0">
-            <a:schemeClr val="accent1"/>
-          </a:fillRef>
-          <a:effectRef idx="0">
-            <a:schemeClr val="accent1"/>
-          </a:effectRef>
-          <a:fontRef idx="minor">
-            <a:schemeClr val="tx1"/>
-          </a:fontRef>
-        </p:style>
-      </p:cxnSp>
-      <p:sp>
-        <p:nvSpPr>
-          <p:cNvPr id="29" name="Smiley Face 28"/>
+              <a:rPr lang="en-US" sz="1050" dirty="0" err="1"/>
+              <a:t>IncorrectCommand</a:t>
+            </a:r>
+            <a:endParaRPr lang="en-SG" sz="1050" dirty="0"/>
+          </a:p>
+        </p:txBody>
+      </p:sp>
+      <p:sp>
+        <p:nvSpPr>
+          <p:cNvPr id="54" name="Isosceles Triangle 53"/>
           <p:cNvSpPr/>
           <p:nvPr/>
         </p:nvSpPr>
         <p:spPr>
-          <a:xfrm>
-            <a:off x="1202269" y="2743200"/>
-            <a:ext cx="381000" cy="381000"/>
-          </a:xfrm>
-          <a:prstGeom prst="smileyFace">
+          <a:xfrm rot="16200000">
+            <a:off x="5549453" y="1571491"/>
+            <a:ext cx="270504" cy="175523"/>
+          </a:xfrm>
+          <a:prstGeom prst="triangle">
             <a:avLst/>
           </a:prstGeom>
-          <a:solidFill>
-            <a:schemeClr val="bg1"/>
-          </a:solidFill>
-          <a:ln>
-            <a:solidFill>
-              <a:schemeClr val="tx1"/>
-            </a:solidFill>
-          </a:ln>
-        </p:spPr>
-        <p:style>
-          <a:lnRef idx="2">
-            <a:schemeClr val="accent1">
-              <a:shade val="50000"/>
-            </a:schemeClr>
-          </a:lnRef>
-          <a:fillRef idx="1">
-            <a:schemeClr val="accent1"/>
-          </a:fillRef>
-          <a:effectRef idx="0">
-            <a:schemeClr val="accent1"/>
-          </a:effectRef>
-          <a:fontRef idx="minor">
-            <a:schemeClr val="lt1"/>
-          </a:fontRef>
-        </p:style>
-        <p:txBody>
-          <a:bodyPr rtlCol="0" anchor="ctr"/>
-          <a:lstStyle/>
-          <a:p>
-            <a:pPr algn="ctr"/>
-            <a:endParaRPr lang="en-US"/>
-          </a:p>
-        </p:txBody>
-      </p:sp>
-      <p:cxnSp>
-        <p:nvCxnSpPr>
-          <p:cNvPr id="32" name="Straight Arrow Connector 31"/>
-          <p:cNvCxnSpPr/>
-          <p:nvPr/>
-        </p:nvCxnSpPr>
-        <p:spPr>
-          <a:xfrm flipV="1">
-            <a:off x="1636188" y="2939996"/>
-            <a:ext cx="273050" cy="1"/>
-          </a:xfrm>
-          <a:prstGeom prst="straightConnector1">
-            <a:avLst/>
-          </a:prstGeom>
-          <a:ln w="28575">
-            <a:solidFill>
-              <a:schemeClr val="tx1"/>
-            </a:solidFill>
-            <a:prstDash val="sysDot"/>
-            <a:tailEnd type="arrow"/>
-          </a:ln>
-        </p:spPr>
-        <p:style>
-          <a:lnRef idx="1">
-            <a:schemeClr val="accent1"/>
-          </a:lnRef>
-          <a:fillRef idx="0">
-            <a:schemeClr val="accent1"/>
-          </a:fillRef>
-          <a:effectRef idx="0">
-            <a:schemeClr val="accent1"/>
-          </a:effectRef>
-          <a:fontRef idx="minor">
-            <a:schemeClr val="tx1"/>
-          </a:fontRef>
-        </p:style>
-      </p:cxnSp>
-      <p:cxnSp>
-        <p:nvCxnSpPr>
-          <p:cNvPr id="34" name="Straight Arrow Connector 33"/>
-          <p:cNvCxnSpPr/>
-          <p:nvPr/>
-        </p:nvCxnSpPr>
-        <p:spPr>
-          <a:xfrm flipV="1">
-            <a:off x="6680199" y="2467190"/>
-            <a:ext cx="939801" cy="1"/>
-          </a:xfrm>
-          <a:prstGeom prst="straightConnector1">
-            <a:avLst/>
-          </a:prstGeom>
-          <a:ln w="28575">
-            <a:solidFill>
-              <a:schemeClr val="accent6">
-                <a:lumMod val="75000"/>
-              </a:schemeClr>
-            </a:solidFill>
-            <a:prstDash val="sysDot"/>
-            <a:tailEnd type="arrow"/>
-          </a:ln>
-        </p:spPr>
-        <p:style>
-          <a:lnRef idx="1">
-            <a:schemeClr val="accent1"/>
-          </a:lnRef>
-          <a:fillRef idx="0">
-            <a:schemeClr val="accent1"/>
-          </a:fillRef>
-          <a:effectRef idx="0">
-            <a:schemeClr val="accent1"/>
-          </a:effectRef>
-          <a:fontRef idx="minor">
-            <a:schemeClr val="tx1"/>
-          </a:fontRef>
-        </p:style>
-      </p:cxnSp>
-      <p:sp>
-        <p:nvSpPr>
-          <p:cNvPr id="35" name="Folded Corner 34"/>
-          <p:cNvSpPr/>
-          <p:nvPr/>
-        </p:nvSpPr>
-        <p:spPr>
-          <a:xfrm>
-            <a:off x="7679269" y="2286000"/>
-            <a:ext cx="381000" cy="381000"/>
-          </a:xfrm>
-          <a:prstGeom prst="foldedCorner">
-            <a:avLst/>
-          </a:prstGeom>
-          <a:solidFill>
-            <a:schemeClr val="bg1"/>
-          </a:solidFill>
-          <a:ln>
-            <a:solidFill>
-              <a:schemeClr val="tx1"/>
-            </a:solidFill>
-          </a:ln>
-        </p:spPr>
-        <p:style>
-          <a:lnRef idx="2">
-            <a:schemeClr val="accent1">
-              <a:shade val="50000"/>
-            </a:schemeClr>
-          </a:lnRef>
-          <a:fillRef idx="1">
-            <a:schemeClr val="accent1"/>
-          </a:fillRef>
-          <a:effectRef idx="0">
-            <a:schemeClr val="accent1"/>
-          </a:effectRef>
-          <a:fontRef idx="minor">
-            <a:schemeClr val="lt1"/>
-          </a:fontRef>
-        </p:style>
-        <p:txBody>
-          <a:bodyPr rtlCol="0" anchor="ctr"/>
-          <a:lstStyle/>
-          <a:p>
-            <a:pPr algn="ctr"/>
-            <a:endParaRPr lang="en-US"/>
-          </a:p>
-        </p:txBody>
-      </p:sp>
-      <p:sp>
-        <p:nvSpPr>
-          <p:cNvPr id="36" name="Folded Corner 35"/>
-          <p:cNvSpPr/>
-          <p:nvPr/>
-        </p:nvSpPr>
-        <p:spPr>
-          <a:xfrm>
-            <a:off x="7772400" y="2362200"/>
-            <a:ext cx="381000" cy="381000"/>
-          </a:xfrm>
-          <a:prstGeom prst="foldedCorner">
-            <a:avLst/>
-          </a:prstGeom>
-          <a:solidFill>
-            <a:schemeClr val="bg1"/>
-          </a:solidFill>
-          <a:ln>
-            <a:solidFill>
-              <a:schemeClr val="tx1"/>
-            </a:solidFill>
-          </a:ln>
-        </p:spPr>
-        <p:style>
-          <a:lnRef idx="2">
-            <a:schemeClr val="accent1">
-              <a:shade val="50000"/>
-            </a:schemeClr>
-          </a:lnRef>
-          <a:fillRef idx="1">
-            <a:schemeClr val="accent1"/>
-          </a:fillRef>
-          <a:effectRef idx="0">
-            <a:schemeClr val="accent1"/>
-          </a:effectRef>
-          <a:fontRef idx="minor">
-            <a:schemeClr val="lt1"/>
-          </a:fontRef>
-        </p:style>
-        <p:txBody>
-          <a:bodyPr rtlCol="0" anchor="ctr"/>
-          <a:lstStyle/>
-          <a:p>
-            <a:pPr algn="ctr"/>
-            <a:endParaRPr lang="en-US"/>
-          </a:p>
-        </p:txBody>
-      </p:sp>
-      <p:sp>
-        <p:nvSpPr>
-          <p:cNvPr id="51" name="Cloud 50"/>
-          <p:cNvSpPr/>
-          <p:nvPr/>
-        </p:nvSpPr>
-        <p:spPr>
-          <a:xfrm>
-            <a:off x="2650069" y="1447800"/>
-            <a:ext cx="914400" cy="533400"/>
-          </a:xfrm>
-          <a:prstGeom prst="cloud">
-            <a:avLst/>
-          </a:prstGeom>
-          <a:solidFill>
-            <a:schemeClr val="bg1"/>
-          </a:solidFill>
-          <a:ln>
-            <a:solidFill>
-              <a:schemeClr val="tx1"/>
-            </a:solidFill>
-          </a:ln>
-        </p:spPr>
-        <p:style>
-          <a:lnRef idx="2">
-            <a:schemeClr val="accent1">
-              <a:shade val="50000"/>
-            </a:schemeClr>
-          </a:lnRef>
-          <a:fillRef idx="1">
-            <a:schemeClr val="accent1"/>
-          </a:fillRef>
-          <a:effectRef idx="0">
-            <a:schemeClr val="accent1"/>
-          </a:effectRef>
-          <a:fontRef idx="minor">
-            <a:schemeClr val="lt1"/>
-          </a:fontRef>
-        </p:style>
-        <p:txBody>
-          <a:bodyPr rtlCol="0" anchor="ctr"/>
-          <a:lstStyle/>
-          <a:p>
-            <a:pPr algn="ctr"/>
-            <a:r>
-              <a:rPr lang="en-US" sz="1400" dirty="0">
-                <a:solidFill>
-                  <a:schemeClr val="tx1"/>
-                </a:solidFill>
-              </a:rPr>
-              <a:t>Web</a:t>
-            </a:r>
-          </a:p>
-        </p:txBody>
-      </p:sp>
-      <p:cxnSp>
-        <p:nvCxnSpPr>
-          <p:cNvPr id="52" name="Elbow Connector 51"/>
-          <p:cNvCxnSpPr>
-            <a:stCxn id="2" idx="0"/>
-            <a:endCxn id="51" idx="2"/>
-          </p:cNvCxnSpPr>
-          <p:nvPr/>
-        </p:nvCxnSpPr>
-        <p:spPr>
-          <a:xfrm rot="5400000" flipH="1" flipV="1">
-            <a:off x="2222648" y="1760922"/>
-            <a:ext cx="476678" cy="383835"/>
-          </a:xfrm>
-          <a:prstGeom prst="bentConnector2">
-            <a:avLst/>
-          </a:prstGeom>
-          <a:ln w="28575">
-            <a:solidFill>
-              <a:srgbClr val="00B050"/>
-            </a:solidFill>
-            <a:prstDash val="sysDot"/>
-            <a:tailEnd type="arrow"/>
-          </a:ln>
-        </p:spPr>
-        <p:style>
-          <a:lnRef idx="1">
-            <a:schemeClr val="accent1"/>
-          </a:lnRef>
-          <a:fillRef idx="0">
-            <a:schemeClr val="accent1"/>
-          </a:fillRef>
-          <a:effectRef idx="0">
-            <a:schemeClr val="accent1"/>
-          </a:effectRef>
-          <a:fontRef idx="minor">
-            <a:schemeClr val="tx1"/>
-          </a:fontRef>
-        </p:style>
-      </p:cxnSp>
-      <p:sp>
-        <p:nvSpPr>
-          <p:cNvPr id="23" name="Rectangle 62"/>
-          <p:cNvSpPr/>
-          <p:nvPr/>
-        </p:nvSpPr>
-        <p:spPr>
-          <a:xfrm flipH="1">
-            <a:off x="1964269" y="3959459"/>
-            <a:ext cx="778931" cy="570908"/>
-          </a:xfrm>
-          <a:prstGeom prst="roundRect">
-            <a:avLst/>
-          </a:prstGeom>
-          <a:solidFill>
-            <a:srgbClr val="C00000"/>
-          </a:solidFill>
-          <a:ln w="19050">
-            <a:solidFill>
-              <a:srgbClr val="C00000"/>
-            </a:solidFill>
-          </a:ln>
-          <a:effectLst/>
-        </p:spPr>
-        <p:style>
-          <a:lnRef idx="1">
-            <a:schemeClr val="accent2"/>
-          </a:lnRef>
-          <a:fillRef idx="2">
-            <a:schemeClr val="accent2"/>
-          </a:fillRef>
-          <a:effectRef idx="1">
-            <a:schemeClr val="accent2"/>
-          </a:effectRef>
-          <a:fontRef idx="minor">
-            <a:schemeClr val="dk1"/>
-          </a:fontRef>
-        </p:style>
-        <p:txBody>
-          <a:bodyPr rtlCol="0" anchor="ctr"/>
-          <a:lstStyle/>
-          <a:p>
-            <a:pPr algn="ctr"/>
-            <a:r>
-              <a:rPr lang="en-US" sz="1600" dirty="0">
-                <a:solidFill>
-                  <a:schemeClr val="bg1"/>
-                </a:solidFill>
-              </a:rPr>
-              <a:t>Main</a:t>
-            </a:r>
-            <a:endParaRPr lang="en-SG" sz="1600" dirty="0">
-              <a:solidFill>
-                <a:schemeClr val="bg1"/>
-              </a:solidFill>
-            </a:endParaRPr>
-          </a:p>
-        </p:txBody>
-      </p:sp>
-      <p:cxnSp>
-        <p:nvCxnSpPr>
-          <p:cNvPr id="30" name="Straight Arrow Connector 29"/>
-          <p:cNvCxnSpPr/>
-          <p:nvPr/>
-        </p:nvCxnSpPr>
-        <p:spPr>
-          <a:xfrm>
-            <a:off x="4945047" y="3750994"/>
-            <a:ext cx="0" cy="381000"/>
-          </a:xfrm>
-          <a:prstGeom prst="straightConnector1">
-            <a:avLst/>
-          </a:prstGeom>
-          <a:ln w="28575">
-            <a:solidFill>
-              <a:schemeClr val="accent5">
-                <a:lumMod val="75000"/>
-              </a:schemeClr>
-            </a:solidFill>
-            <a:prstDash val="sysDot"/>
-            <a:tailEnd type="arrow"/>
-          </a:ln>
-        </p:spPr>
-        <p:style>
-          <a:lnRef idx="1">
-            <a:schemeClr val="accent1"/>
-          </a:lnRef>
-          <a:fillRef idx="0">
-            <a:schemeClr val="accent1"/>
-          </a:fillRef>
-          <a:effectRef idx="0">
-            <a:schemeClr val="accent1"/>
-          </a:effectRef>
-          <a:fontRef idx="minor">
-            <a:schemeClr val="tx1"/>
-          </a:fontRef>
-        </p:style>
-      </p:cxnSp>
-      <p:cxnSp>
-        <p:nvCxnSpPr>
-          <p:cNvPr id="31" name="Straight Arrow Connector 30"/>
-          <p:cNvCxnSpPr/>
-          <p:nvPr/>
-        </p:nvCxnSpPr>
-        <p:spPr>
-          <a:xfrm>
-            <a:off x="5097447" y="3761908"/>
-            <a:ext cx="0" cy="381000"/>
-          </a:xfrm>
-          <a:prstGeom prst="straightConnector1">
-            <a:avLst/>
-          </a:prstGeom>
-          <a:ln w="28575">
-            <a:solidFill>
-              <a:schemeClr val="accent5">
-                <a:lumMod val="75000"/>
-              </a:schemeClr>
-            </a:solidFill>
-            <a:prstDash val="sysDot"/>
-            <a:tailEnd type="arrow"/>
-          </a:ln>
-        </p:spPr>
-        <p:style>
-          <a:lnRef idx="1">
-            <a:schemeClr val="accent1"/>
-          </a:lnRef>
-          <a:fillRef idx="0">
-            <a:schemeClr val="accent1"/>
-          </a:fillRef>
-          <a:effectRef idx="0">
-            <a:schemeClr val="accent1"/>
-          </a:effectRef>
-          <a:fontRef idx="minor">
-            <a:schemeClr val="tx1"/>
-          </a:fontRef>
-        </p:style>
-      </p:cxnSp>
-      <p:cxnSp>
-        <p:nvCxnSpPr>
-          <p:cNvPr id="33" name="Straight Arrow Connector 32"/>
-          <p:cNvCxnSpPr/>
-          <p:nvPr/>
-        </p:nvCxnSpPr>
-        <p:spPr>
-          <a:xfrm>
-            <a:off x="5249847" y="3750994"/>
-            <a:ext cx="0" cy="381000"/>
-          </a:xfrm>
-          <a:prstGeom prst="straightConnector1">
-            <a:avLst/>
-          </a:prstGeom>
-          <a:ln w="28575">
-            <a:solidFill>
-              <a:schemeClr val="accent5">
-                <a:lumMod val="75000"/>
-              </a:schemeClr>
-            </a:solidFill>
-            <a:prstDash val="sysDot"/>
-            <a:tailEnd type="arrow"/>
-          </a:ln>
-        </p:spPr>
-        <p:style>
-          <a:lnRef idx="1">
-            <a:schemeClr val="accent1"/>
-          </a:lnRef>
-          <a:fillRef idx="0">
-            <a:schemeClr val="accent1"/>
-          </a:fillRef>
-          <a:effectRef idx="0">
-            <a:schemeClr val="accent1"/>
-          </a:effectRef>
-          <a:fontRef idx="minor">
-            <a:schemeClr val="tx1"/>
-          </a:fontRef>
-        </p:style>
-      </p:cxnSp>
-      <p:cxnSp>
-        <p:nvCxnSpPr>
-          <p:cNvPr id="37" name="Straight Arrow Connector 36"/>
-          <p:cNvCxnSpPr>
-            <a:stCxn id="23" idx="1"/>
-          </p:cNvCxnSpPr>
-          <p:nvPr/>
-        </p:nvCxnSpPr>
-        <p:spPr>
-          <a:xfrm>
-            <a:off x="2743200" y="4244913"/>
-            <a:ext cx="249770" cy="0"/>
-          </a:xfrm>
-          <a:prstGeom prst="straightConnector1">
-            <a:avLst/>
-          </a:prstGeom>
-          <a:ln w="28575">
-            <a:solidFill>
-              <a:srgbClr val="C00000"/>
-            </a:solidFill>
-            <a:prstDash val="solid"/>
-            <a:tailEnd type="arrow"/>
-          </a:ln>
-        </p:spPr>
-        <p:style>
-          <a:lnRef idx="1">
-            <a:schemeClr val="accent1"/>
-          </a:lnRef>
-          <a:fillRef idx="0">
-            <a:schemeClr val="accent1"/>
-          </a:fillRef>
-          <a:effectRef idx="0">
-            <a:schemeClr val="accent1"/>
-          </a:effectRef>
-          <a:fontRef idx="minor">
-            <a:schemeClr val="tx1"/>
-          </a:fontRef>
-        </p:style>
-      </p:cxnSp>
-      <p:cxnSp>
-        <p:nvCxnSpPr>
-          <p:cNvPr id="38" name="Straight Arrow Connector 37"/>
-          <p:cNvCxnSpPr/>
-          <p:nvPr/>
-        </p:nvCxnSpPr>
-        <p:spPr>
-          <a:xfrm rot="13867188">
-            <a:off x="2743200" y="3755022"/>
-            <a:ext cx="0" cy="381000"/>
-          </a:xfrm>
-          <a:prstGeom prst="straightConnector1">
-            <a:avLst/>
-          </a:prstGeom>
-          <a:ln w="28575">
-            <a:solidFill>
-              <a:srgbClr val="C00000"/>
-            </a:solidFill>
-            <a:prstDash val="solid"/>
-            <a:tailEnd type="arrow"/>
-          </a:ln>
-        </p:spPr>
-        <p:style>
-          <a:lnRef idx="1">
-            <a:schemeClr val="accent1"/>
-          </a:lnRef>
-          <a:fillRef idx="0">
-            <a:schemeClr val="accent1"/>
-          </a:fillRef>
-          <a:effectRef idx="0">
-            <a:schemeClr val="accent1"/>
-          </a:effectRef>
-          <a:fontRef idx="minor">
-            <a:schemeClr val="tx1"/>
-          </a:fontRef>
-        </p:style>
-      </p:cxnSp>
-      <p:cxnSp>
-        <p:nvCxnSpPr>
-          <p:cNvPr id="39" name="Straight Arrow Connector 38"/>
-          <p:cNvCxnSpPr/>
-          <p:nvPr/>
-        </p:nvCxnSpPr>
-        <p:spPr>
-          <a:xfrm flipV="1">
-            <a:off x="2353734" y="3697061"/>
-            <a:ext cx="0" cy="301859"/>
-          </a:xfrm>
-          <a:prstGeom prst="straightConnector1">
-            <a:avLst/>
-          </a:prstGeom>
-          <a:ln w="28575">
-            <a:solidFill>
-              <a:srgbClr val="C00000"/>
-            </a:solidFill>
-            <a:prstDash val="solid"/>
-            <a:tailEnd type="arrow"/>
-          </a:ln>
-        </p:spPr>
-        <p:style>
-          <a:lnRef idx="1">
-            <a:schemeClr val="accent1"/>
-          </a:lnRef>
-          <a:fillRef idx="0">
-            <a:schemeClr val="accent1"/>
-          </a:fillRef>
-          <a:effectRef idx="0">
-            <a:schemeClr val="accent1"/>
-          </a:effectRef>
-          <a:fontRef idx="minor">
-            <a:schemeClr val="tx1"/>
-          </a:fontRef>
-        </p:style>
-      </p:cxnSp>
-      <p:sp>
-        <p:nvSpPr>
-          <p:cNvPr id="26" name="Oval 25"/>
-          <p:cNvSpPr/>
-          <p:nvPr/>
-        </p:nvSpPr>
-        <p:spPr>
-          <a:xfrm>
-            <a:off x="5888569" y="3515641"/>
-            <a:ext cx="1219201" cy="533400"/>
-          </a:xfrm>
-          <a:prstGeom prst="ellipse">
-            <a:avLst/>
-          </a:prstGeom>
-          <a:solidFill>
-            <a:schemeClr val="accent5">
-              <a:lumMod val="75000"/>
-            </a:schemeClr>
-          </a:solidFill>
-          <a:ln w="19050">
-            <a:solidFill>
-              <a:schemeClr val="accent5">
-                <a:lumMod val="75000"/>
-              </a:schemeClr>
-            </a:solidFill>
-          </a:ln>
+          <a:ln w="19050"/>
           <a:effectLst/>
         </p:spPr>
         <p:style>
@@ -4599,76 +4618,1914 @@
           <a:lstStyle/>
           <a:p>
             <a:pPr algn="ctr"/>
-            <a:r>
-              <a:rPr lang="en-US" sz="1600" dirty="0">
+            <a:endParaRPr lang="en-SG" sz="1050"/>
+          </a:p>
+        </p:txBody>
+      </p:sp>
+      <p:cxnSp>
+        <p:nvCxnSpPr>
+          <p:cNvPr id="55" name="Elbow Connector 54"/>
+          <p:cNvCxnSpPr>
+            <a:stCxn id="54" idx="3"/>
+            <a:endCxn id="52" idx="3"/>
+          </p:cNvCxnSpPr>
+          <p:nvPr/>
+        </p:nvCxnSpPr>
+        <p:spPr>
+          <a:xfrm flipV="1">
+            <a:off x="5772467" y="1627447"/>
+            <a:ext cx="370183" cy="31806"/>
+          </a:xfrm>
+          <a:prstGeom prst="bentConnector3">
+            <a:avLst>
+              <a:gd name="adj1" fmla="val 50000"/>
+            </a:avLst>
+          </a:prstGeom>
+          <a:noFill/>
+          <a:ln w="19050"/>
+          <a:effectLst/>
+        </p:spPr>
+        <p:style>
+          <a:lnRef idx="1">
+            <a:schemeClr val="accent5"/>
+          </a:lnRef>
+          <a:fillRef idx="2">
+            <a:schemeClr val="accent5"/>
+          </a:fillRef>
+          <a:effectRef idx="1">
+            <a:schemeClr val="accent5"/>
+          </a:effectRef>
+          <a:fontRef idx="minor">
+            <a:schemeClr val="dk1"/>
+          </a:fontRef>
+        </p:style>
+      </p:cxnSp>
+      <p:cxnSp>
+        <p:nvCxnSpPr>
+          <p:cNvPr id="56" name="Elbow Connector 55"/>
+          <p:cNvCxnSpPr>
+            <a:stCxn id="54" idx="3"/>
+            <a:endCxn id="50" idx="3"/>
+          </p:cNvCxnSpPr>
+          <p:nvPr/>
+        </p:nvCxnSpPr>
+        <p:spPr>
+          <a:xfrm flipV="1">
+            <a:off x="5772467" y="1232460"/>
+            <a:ext cx="370183" cy="426793"/>
+          </a:xfrm>
+          <a:prstGeom prst="bentConnector3">
+            <a:avLst>
+              <a:gd name="adj1" fmla="val 50000"/>
+            </a:avLst>
+          </a:prstGeom>
+          <a:noFill/>
+          <a:ln w="19050"/>
+          <a:effectLst/>
+        </p:spPr>
+        <p:style>
+          <a:lnRef idx="1">
+            <a:schemeClr val="accent5"/>
+          </a:lnRef>
+          <a:fillRef idx="2">
+            <a:schemeClr val="accent5"/>
+          </a:fillRef>
+          <a:effectRef idx="1">
+            <a:schemeClr val="accent5"/>
+          </a:effectRef>
+          <a:fontRef idx="minor">
+            <a:schemeClr val="dk1"/>
+          </a:fontRef>
+        </p:style>
+      </p:cxnSp>
+      <p:cxnSp>
+        <p:nvCxnSpPr>
+          <p:cNvPr id="57" name="Elbow Connector 56"/>
+          <p:cNvCxnSpPr>
+            <a:stCxn id="54" idx="3"/>
+            <a:endCxn id="53" idx="3"/>
+          </p:cNvCxnSpPr>
+          <p:nvPr/>
+        </p:nvCxnSpPr>
+        <p:spPr>
+          <a:xfrm>
+            <a:off x="5772467" y="1659253"/>
+            <a:ext cx="377223" cy="1543551"/>
+          </a:xfrm>
+          <a:prstGeom prst="bentConnector3">
+            <a:avLst>
+              <a:gd name="adj1" fmla="val 50000"/>
+            </a:avLst>
+          </a:prstGeom>
+          <a:noFill/>
+          <a:ln w="19050"/>
+          <a:effectLst/>
+        </p:spPr>
+        <p:style>
+          <a:lnRef idx="1">
+            <a:schemeClr val="accent5"/>
+          </a:lnRef>
+          <a:fillRef idx="2">
+            <a:schemeClr val="accent5"/>
+          </a:fillRef>
+          <a:effectRef idx="1">
+            <a:schemeClr val="accent5"/>
+          </a:effectRef>
+          <a:fontRef idx="minor">
+            <a:schemeClr val="dk1"/>
+          </a:fontRef>
+        </p:style>
+      </p:cxnSp>
+      <p:cxnSp>
+        <p:nvCxnSpPr>
+          <p:cNvPr id="60" name="Elbow Connector 59"/>
+          <p:cNvCxnSpPr>
+            <a:cxnSpLocks/>
+            <a:stCxn id="54" idx="3"/>
+            <a:endCxn id="78" idx="3"/>
+          </p:cNvCxnSpPr>
+          <p:nvPr/>
+        </p:nvCxnSpPr>
+        <p:spPr>
+          <a:xfrm>
+            <a:off x="5772467" y="1659253"/>
+            <a:ext cx="370182" cy="358247"/>
+          </a:xfrm>
+          <a:prstGeom prst="bentConnector3">
+            <a:avLst>
+              <a:gd name="adj1" fmla="val 50000"/>
+            </a:avLst>
+          </a:prstGeom>
+          <a:noFill/>
+          <a:ln w="19050"/>
+          <a:effectLst/>
+        </p:spPr>
+        <p:style>
+          <a:lnRef idx="1">
+            <a:schemeClr val="accent5"/>
+          </a:lnRef>
+          <a:fillRef idx="2">
+            <a:schemeClr val="accent5"/>
+          </a:fillRef>
+          <a:effectRef idx="1">
+            <a:schemeClr val="accent5"/>
+          </a:effectRef>
+          <a:fontRef idx="minor">
+            <a:schemeClr val="dk1"/>
+          </a:fontRef>
+        </p:style>
+      </p:cxnSp>
+      <p:cxnSp>
+        <p:nvCxnSpPr>
+          <p:cNvPr id="67" name="Elbow Connector 66"/>
+          <p:cNvCxnSpPr>
+            <a:endCxn id="46" idx="1"/>
+          </p:cNvCxnSpPr>
+          <p:nvPr/>
+        </p:nvCxnSpPr>
+        <p:spPr>
+          <a:xfrm rot="5400000" flipH="1" flipV="1">
+            <a:off x="2764336" y="1785299"/>
+            <a:ext cx="1427532" cy="1013951"/>
+          </a:xfrm>
+          <a:prstGeom prst="bentConnector2">
+            <a:avLst/>
+          </a:prstGeom>
+          <a:ln w="19050">
+            <a:solidFill>
+              <a:srgbClr val="0070C0"/>
+            </a:solidFill>
+            <a:prstDash val="dash"/>
+            <a:headEnd type="none" w="med" len="med"/>
+            <a:tailEnd type="arrow" w="med" len="med"/>
+          </a:ln>
+          <a:effectLst/>
+        </p:spPr>
+        <p:style>
+          <a:lnRef idx="1">
+            <a:schemeClr val="accent2"/>
+          </a:lnRef>
+          <a:fillRef idx="2">
+            <a:schemeClr val="accent2"/>
+          </a:fillRef>
+          <a:effectRef idx="1">
+            <a:schemeClr val="accent2"/>
+          </a:effectRef>
+          <a:fontRef idx="minor">
+            <a:schemeClr val="dk1"/>
+          </a:fontRef>
+        </p:style>
+      </p:cxnSp>
+      <p:cxnSp>
+        <p:nvCxnSpPr>
+          <p:cNvPr id="70" name="Elbow Connector 69"/>
+          <p:cNvCxnSpPr/>
+          <p:nvPr/>
+        </p:nvCxnSpPr>
+        <p:spPr>
+          <a:xfrm rot="5400000" flipH="1" flipV="1">
+            <a:off x="2182965" y="1908384"/>
+            <a:ext cx="2256600" cy="1347626"/>
+          </a:xfrm>
+          <a:prstGeom prst="bentConnector3">
+            <a:avLst>
+              <a:gd name="adj1" fmla="val 99901"/>
+            </a:avLst>
+          </a:prstGeom>
+          <a:ln w="19050">
+            <a:solidFill>
+              <a:srgbClr val="0070C0"/>
+            </a:solidFill>
+            <a:prstDash val="dash"/>
+            <a:headEnd type="none" w="med" len="med"/>
+            <a:tailEnd type="arrow" w="med" len="med"/>
+          </a:ln>
+          <a:effectLst/>
+        </p:spPr>
+        <p:style>
+          <a:lnRef idx="1">
+            <a:schemeClr val="accent2"/>
+          </a:lnRef>
+          <a:fillRef idx="2">
+            <a:schemeClr val="accent2"/>
+          </a:fillRef>
+          <a:effectRef idx="1">
+            <a:schemeClr val="accent2"/>
+          </a:effectRef>
+          <a:fontRef idx="minor">
+            <a:schemeClr val="dk1"/>
+          </a:fontRef>
+        </p:style>
+      </p:cxnSp>
+      <p:cxnSp>
+        <p:nvCxnSpPr>
+          <p:cNvPr id="73" name="Elbow Connector 72"/>
+          <p:cNvCxnSpPr/>
+          <p:nvPr/>
+        </p:nvCxnSpPr>
+        <p:spPr>
+          <a:xfrm rot="5400000">
+            <a:off x="3213414" y="2790743"/>
+            <a:ext cx="1889726" cy="6348"/>
+          </a:xfrm>
+          <a:prstGeom prst="bentConnector3">
+            <a:avLst>
+              <a:gd name="adj1" fmla="val 50000"/>
+            </a:avLst>
+          </a:prstGeom>
+          <a:ln w="19050">
+            <a:solidFill>
+              <a:schemeClr val="accent5"/>
+            </a:solidFill>
+            <a:prstDash val="dash"/>
+            <a:headEnd type="none" w="med" len="med"/>
+            <a:tailEnd type="arrow" w="med" len="med"/>
+          </a:ln>
+          <a:effectLst/>
+        </p:spPr>
+        <p:style>
+          <a:lnRef idx="1">
+            <a:schemeClr val="accent2"/>
+          </a:lnRef>
+          <a:fillRef idx="2">
+            <a:schemeClr val="accent2"/>
+          </a:fillRef>
+          <a:effectRef idx="1">
+            <a:schemeClr val="accent2"/>
+          </a:effectRef>
+          <a:fontRef idx="minor">
+            <a:schemeClr val="dk1"/>
+          </a:fontRef>
+        </p:style>
+      </p:cxnSp>
+      <p:sp>
+        <p:nvSpPr>
+          <p:cNvPr id="81" name="Rectangle 80"/>
+          <p:cNvSpPr/>
+          <p:nvPr/>
+        </p:nvSpPr>
+        <p:spPr>
+          <a:xfrm flipH="1">
+            <a:off x="2637450" y="720040"/>
+            <a:ext cx="1404109" cy="346760"/>
+          </a:xfrm>
+          <a:prstGeom prst="rect">
+            <a:avLst/>
+          </a:prstGeom>
+          <a:ln w="19050"/>
+          <a:effectLst/>
+        </p:spPr>
+        <p:style>
+          <a:lnRef idx="1">
+            <a:schemeClr val="accent5"/>
+          </a:lnRef>
+          <a:fillRef idx="2">
+            <a:schemeClr val="accent5"/>
+          </a:fillRef>
+          <a:effectRef idx="1">
+            <a:schemeClr val="accent5"/>
+          </a:effectRef>
+          <a:fontRef idx="minor">
+            <a:schemeClr val="dk1"/>
+          </a:fontRef>
+        </p:style>
+        <p:txBody>
+          <a:bodyPr rtlCol="0" anchor="ctr"/>
+          <a:lstStyle/>
+          <a:p>
+            <a:pPr algn="ctr"/>
+            <a:r>
+              <a:rPr lang="en-US" sz="1050" dirty="0" err="1"/>
+              <a:t>CommandResult</a:t>
+            </a:r>
+            <a:endParaRPr lang="en-SG" sz="1050" dirty="0"/>
+          </a:p>
+        </p:txBody>
+      </p:sp>
+      <p:cxnSp>
+        <p:nvCxnSpPr>
+          <p:cNvPr id="82" name="Elbow Connector 81"/>
+          <p:cNvCxnSpPr>
+            <a:stCxn id="46" idx="0"/>
+            <a:endCxn id="81" idx="1"/>
+          </p:cNvCxnSpPr>
+          <p:nvPr/>
+        </p:nvCxnSpPr>
+        <p:spPr>
+          <a:xfrm rot="16200000" flipV="1">
+            <a:off x="4184902" y="750077"/>
+            <a:ext cx="462768" cy="749453"/>
+          </a:xfrm>
+          <a:prstGeom prst="bentConnector2">
+            <a:avLst/>
+          </a:prstGeom>
+          <a:ln w="19050">
+            <a:solidFill>
+              <a:schemeClr val="accent5"/>
+            </a:solidFill>
+            <a:prstDash val="dash"/>
+            <a:headEnd type="none" w="med" len="med"/>
+            <a:tailEnd type="arrow" w="med" len="med"/>
+          </a:ln>
+          <a:effectLst/>
+        </p:spPr>
+        <p:style>
+          <a:lnRef idx="1">
+            <a:schemeClr val="accent2"/>
+          </a:lnRef>
+          <a:fillRef idx="2">
+            <a:schemeClr val="accent2"/>
+          </a:fillRef>
+          <a:effectRef idx="1">
+            <a:schemeClr val="accent2"/>
+          </a:effectRef>
+          <a:fontRef idx="minor">
+            <a:schemeClr val="dk1"/>
+          </a:fontRef>
+        </p:style>
+      </p:cxnSp>
+      <p:cxnSp>
+        <p:nvCxnSpPr>
+          <p:cNvPr id="84" name="Elbow Connector 83"/>
+          <p:cNvCxnSpPr>
+            <a:endCxn id="81" idx="3"/>
+          </p:cNvCxnSpPr>
+          <p:nvPr/>
+        </p:nvCxnSpPr>
+        <p:spPr>
+          <a:xfrm flipV="1">
+            <a:off x="304800" y="893420"/>
+            <a:ext cx="2332650" cy="1763378"/>
+          </a:xfrm>
+          <a:prstGeom prst="bentConnector3">
+            <a:avLst>
+              <a:gd name="adj1" fmla="val 109"/>
+            </a:avLst>
+          </a:prstGeom>
+          <a:ln w="19050">
+            <a:solidFill>
+              <a:srgbClr val="C00000"/>
+            </a:solidFill>
+            <a:prstDash val="dash"/>
+            <a:headEnd type="none" w="med" len="med"/>
+            <a:tailEnd type="arrow" w="med" len="med"/>
+          </a:ln>
+          <a:effectLst/>
+        </p:spPr>
+        <p:style>
+          <a:lnRef idx="1">
+            <a:schemeClr val="accent2"/>
+          </a:lnRef>
+          <a:fillRef idx="2">
+            <a:schemeClr val="accent2"/>
+          </a:fillRef>
+          <a:effectRef idx="1">
+            <a:schemeClr val="accent2"/>
+          </a:effectRef>
+          <a:fontRef idx="minor">
+            <a:schemeClr val="dk1"/>
+          </a:fontRef>
+        </p:style>
+      </p:cxnSp>
+      <p:sp>
+        <p:nvSpPr>
+          <p:cNvPr id="96" name="Rectangle 95"/>
+          <p:cNvSpPr/>
+          <p:nvPr/>
+        </p:nvSpPr>
+        <p:spPr>
+          <a:xfrm>
+            <a:off x="7803052" y="874142"/>
+            <a:ext cx="929296" cy="346760"/>
+          </a:xfrm>
+          <a:prstGeom prst="rect">
+            <a:avLst/>
+          </a:prstGeom>
+          <a:solidFill>
+            <a:schemeClr val="bg1"/>
+          </a:solidFill>
+          <a:ln w="19050">
+            <a:solidFill>
+              <a:schemeClr val="bg1">
+                <a:lumMod val="65000"/>
+              </a:schemeClr>
+            </a:solidFill>
+          </a:ln>
+          <a:effectLst/>
+        </p:spPr>
+        <p:style>
+          <a:lnRef idx="1">
+            <a:schemeClr val="accent3"/>
+          </a:lnRef>
+          <a:fillRef idx="2">
+            <a:schemeClr val="accent3"/>
+          </a:fillRef>
+          <a:effectRef idx="1">
+            <a:schemeClr val="accent3"/>
+          </a:effectRef>
+          <a:fontRef idx="minor">
+            <a:schemeClr val="dk1"/>
+          </a:fontRef>
+        </p:style>
+        <p:txBody>
+          <a:bodyPr rtlCol="0" anchor="ctr"/>
+          <a:lstStyle/>
+          <a:p>
+            <a:pPr algn="ctr"/>
+            <a:r>
+              <a:rPr lang="en-US" sz="1050" dirty="0">
+                <a:solidFill>
+                  <a:schemeClr val="bg1">
+                    <a:lumMod val="50000"/>
+                  </a:schemeClr>
+                </a:solidFill>
+              </a:rPr>
+              <a:t>Messages</a:t>
+            </a:r>
+            <a:endParaRPr lang="en-SG" sz="1050" dirty="0">
+              <a:solidFill>
+                <a:schemeClr val="bg1">
+                  <a:lumMod val="50000"/>
+                </a:schemeClr>
+              </a:solidFill>
+            </a:endParaRPr>
+          </a:p>
+        </p:txBody>
+      </p:sp>
+      <p:sp>
+        <p:nvSpPr>
+          <p:cNvPr id="98" name="Rectangle 97"/>
+          <p:cNvSpPr/>
+          <p:nvPr/>
+        </p:nvSpPr>
+        <p:spPr>
+          <a:xfrm>
+            <a:off x="7803052" y="1794505"/>
+            <a:ext cx="929296" cy="346760"/>
+          </a:xfrm>
+          <a:prstGeom prst="rect">
+            <a:avLst/>
+          </a:prstGeom>
+          <a:solidFill>
+            <a:schemeClr val="bg1"/>
+          </a:solidFill>
+          <a:ln w="19050">
+            <a:solidFill>
+              <a:schemeClr val="bg1">
+                <a:lumMod val="65000"/>
+              </a:schemeClr>
+            </a:solidFill>
+          </a:ln>
+          <a:effectLst/>
+        </p:spPr>
+        <p:style>
+          <a:lnRef idx="1">
+            <a:schemeClr val="accent3"/>
+          </a:lnRef>
+          <a:fillRef idx="2">
+            <a:schemeClr val="accent3"/>
+          </a:fillRef>
+          <a:effectRef idx="1">
+            <a:schemeClr val="accent3"/>
+          </a:effectRef>
+          <a:fontRef idx="minor">
+            <a:schemeClr val="dk1"/>
+          </a:fontRef>
+        </p:style>
+        <p:txBody>
+          <a:bodyPr rtlCol="0" anchor="ctr"/>
+          <a:lstStyle/>
+          <a:p>
+            <a:pPr algn="ctr"/>
+            <a:r>
+              <a:rPr lang="en-US" sz="1050" dirty="0" err="1">
+                <a:solidFill>
+                  <a:schemeClr val="bg1">
+                    <a:lumMod val="50000"/>
+                  </a:schemeClr>
+                </a:solidFill>
+              </a:rPr>
+              <a:t>Utils</a:t>
+            </a:r>
+            <a:endParaRPr lang="en-SG" sz="1050" dirty="0">
+              <a:solidFill>
+                <a:schemeClr val="bg1">
+                  <a:lumMod val="50000"/>
+                </a:schemeClr>
+              </a:solidFill>
+            </a:endParaRPr>
+          </a:p>
+        </p:txBody>
+      </p:sp>
+      <p:sp>
+        <p:nvSpPr>
+          <p:cNvPr id="99" name="Rectangle 98"/>
+          <p:cNvSpPr/>
+          <p:nvPr/>
+        </p:nvSpPr>
+        <p:spPr>
+          <a:xfrm>
+            <a:off x="5085126" y="3710497"/>
+            <a:ext cx="929296" cy="346760"/>
+          </a:xfrm>
+          <a:prstGeom prst="rect">
+            <a:avLst/>
+          </a:prstGeom>
+          <a:ln w="19050"/>
+          <a:effectLst/>
+        </p:spPr>
+        <p:style>
+          <a:lnRef idx="1">
+            <a:schemeClr val="accent6"/>
+          </a:lnRef>
+          <a:fillRef idx="2">
+            <a:schemeClr val="accent6"/>
+          </a:fillRef>
+          <a:effectRef idx="1">
+            <a:schemeClr val="accent6"/>
+          </a:effectRef>
+          <a:fontRef idx="minor">
+            <a:schemeClr val="dk1"/>
+          </a:fontRef>
+        </p:style>
+        <p:txBody>
+          <a:bodyPr rtlCol="0" anchor="ctr"/>
+          <a:lstStyle/>
+          <a:p>
+            <a:pPr algn="ctr"/>
+            <a:r>
+              <a:rPr lang="en-US" sz="1050" dirty="0"/>
+              <a:t>…Exception</a:t>
+            </a:r>
+            <a:endParaRPr lang="en-SG" sz="1050" dirty="0"/>
+          </a:p>
+        </p:txBody>
+      </p:sp>
+      <p:sp>
+        <p:nvSpPr>
+          <p:cNvPr id="101" name="Rectangle 100"/>
+          <p:cNvSpPr/>
+          <p:nvPr/>
+        </p:nvSpPr>
+        <p:spPr>
+          <a:xfrm>
+            <a:off x="3775013" y="4455640"/>
+            <a:ext cx="929296" cy="346760"/>
+          </a:xfrm>
+          <a:prstGeom prst="rect">
+            <a:avLst/>
+          </a:prstGeom>
+          <a:ln>
+            <a:solidFill>
+              <a:srgbClr val="00B050"/>
+            </a:solidFill>
+          </a:ln>
+          <a:effectLst/>
+        </p:spPr>
+        <p:style>
+          <a:lnRef idx="1">
+            <a:schemeClr val="accent3"/>
+          </a:lnRef>
+          <a:fillRef idx="2">
+            <a:schemeClr val="accent3"/>
+          </a:fillRef>
+          <a:effectRef idx="1">
+            <a:schemeClr val="accent3"/>
+          </a:effectRef>
+          <a:fontRef idx="minor">
+            <a:schemeClr val="dk1"/>
+          </a:fontRef>
+        </p:style>
+        <p:txBody>
+          <a:bodyPr rtlCol="0" anchor="ctr"/>
+          <a:lstStyle/>
+          <a:p>
+            <a:pPr algn="ctr"/>
+            <a:r>
+              <a:rPr lang="en-US" sz="1050" dirty="0"/>
+              <a:t>Adapted…</a:t>
+            </a:r>
+            <a:endParaRPr lang="en-SG" sz="1050" dirty="0"/>
+          </a:p>
+        </p:txBody>
+      </p:sp>
+      <p:cxnSp>
+        <p:nvCxnSpPr>
+          <p:cNvPr id="102" name="Elbow Connector 101"/>
+          <p:cNvCxnSpPr>
+            <a:stCxn id="23" idx="3"/>
+            <a:endCxn id="101" idx="1"/>
+          </p:cNvCxnSpPr>
+          <p:nvPr/>
+        </p:nvCxnSpPr>
+        <p:spPr>
+          <a:xfrm flipV="1">
+            <a:off x="3200400" y="4629020"/>
+            <a:ext cx="574613" cy="4831"/>
+          </a:xfrm>
+          <a:prstGeom prst="bentConnector3">
+            <a:avLst>
+              <a:gd name="adj1" fmla="val 50000"/>
+            </a:avLst>
+          </a:prstGeom>
+          <a:ln w="19050">
+            <a:solidFill>
+              <a:srgbClr val="00B050"/>
+            </a:solidFill>
+            <a:prstDash val="dash"/>
+            <a:headEnd type="none" w="med" len="med"/>
+            <a:tailEnd type="arrow" w="med" len="med"/>
+          </a:ln>
+          <a:effectLst/>
+        </p:spPr>
+        <p:style>
+          <a:lnRef idx="1">
+            <a:schemeClr val="accent2"/>
+          </a:lnRef>
+          <a:fillRef idx="2">
+            <a:schemeClr val="accent2"/>
+          </a:fillRef>
+          <a:effectRef idx="1">
+            <a:schemeClr val="accent2"/>
+          </a:effectRef>
+          <a:fontRef idx="minor">
+            <a:schemeClr val="dk1"/>
+          </a:fontRef>
+        </p:style>
+      </p:cxnSp>
+      <p:cxnSp>
+        <p:nvCxnSpPr>
+          <p:cNvPr id="87" name="Straight Arrow Connector 86"/>
+          <p:cNvCxnSpPr/>
+          <p:nvPr/>
+        </p:nvCxnSpPr>
+        <p:spPr>
+          <a:xfrm flipV="1">
+            <a:off x="8107853" y="1199445"/>
+            <a:ext cx="0" cy="304800"/>
+          </a:xfrm>
+          <a:prstGeom prst="straightConnector1">
+            <a:avLst/>
+          </a:prstGeom>
+          <a:ln w="19050">
+            <a:solidFill>
+              <a:schemeClr val="bg1">
+                <a:lumMod val="65000"/>
+              </a:schemeClr>
+            </a:solidFill>
+            <a:prstDash val="dash"/>
+            <a:headEnd type="none" w="med" len="med"/>
+            <a:tailEnd type="arrow" w="med" len="med"/>
+          </a:ln>
+          <a:effectLst/>
+        </p:spPr>
+        <p:style>
+          <a:lnRef idx="1">
+            <a:schemeClr val="accent2"/>
+          </a:lnRef>
+          <a:fillRef idx="2">
+            <a:schemeClr val="accent2"/>
+          </a:fillRef>
+          <a:effectRef idx="1">
+            <a:schemeClr val="accent2"/>
+          </a:effectRef>
+          <a:fontRef idx="minor">
+            <a:schemeClr val="dk1"/>
+          </a:fontRef>
+        </p:style>
+      </p:cxnSp>
+      <p:cxnSp>
+        <p:nvCxnSpPr>
+          <p:cNvPr id="107" name="Straight Arrow Connector 106"/>
+          <p:cNvCxnSpPr/>
+          <p:nvPr/>
+        </p:nvCxnSpPr>
+        <p:spPr>
+          <a:xfrm flipV="1">
+            <a:off x="8260253" y="1199445"/>
+            <a:ext cx="0" cy="304800"/>
+          </a:xfrm>
+          <a:prstGeom prst="straightConnector1">
+            <a:avLst/>
+          </a:prstGeom>
+          <a:ln w="19050">
+            <a:solidFill>
+              <a:schemeClr val="bg1">
+                <a:lumMod val="65000"/>
+              </a:schemeClr>
+            </a:solidFill>
+            <a:prstDash val="dash"/>
+            <a:headEnd type="none" w="med" len="med"/>
+            <a:tailEnd type="arrow" w="med" len="med"/>
+          </a:ln>
+          <a:effectLst/>
+        </p:spPr>
+        <p:style>
+          <a:lnRef idx="1">
+            <a:schemeClr val="accent2"/>
+          </a:lnRef>
+          <a:fillRef idx="2">
+            <a:schemeClr val="accent2"/>
+          </a:fillRef>
+          <a:effectRef idx="1">
+            <a:schemeClr val="accent2"/>
+          </a:effectRef>
+          <a:fontRef idx="minor">
+            <a:schemeClr val="dk1"/>
+          </a:fontRef>
+        </p:style>
+      </p:cxnSp>
+      <p:cxnSp>
+        <p:nvCxnSpPr>
+          <p:cNvPr id="108" name="Straight Arrow Connector 107"/>
+          <p:cNvCxnSpPr/>
+          <p:nvPr/>
+        </p:nvCxnSpPr>
+        <p:spPr>
+          <a:xfrm flipV="1">
+            <a:off x="8412653" y="1199445"/>
+            <a:ext cx="0" cy="304800"/>
+          </a:xfrm>
+          <a:prstGeom prst="straightConnector1">
+            <a:avLst/>
+          </a:prstGeom>
+          <a:ln w="19050">
+            <a:solidFill>
+              <a:schemeClr val="bg1">
+                <a:lumMod val="65000"/>
+              </a:schemeClr>
+            </a:solidFill>
+            <a:prstDash val="dash"/>
+            <a:headEnd type="none" w="med" len="med"/>
+            <a:tailEnd type="arrow" w="med" len="med"/>
+          </a:ln>
+          <a:effectLst/>
+        </p:spPr>
+        <p:style>
+          <a:lnRef idx="1">
+            <a:schemeClr val="accent2"/>
+          </a:lnRef>
+          <a:fillRef idx="2">
+            <a:schemeClr val="accent2"/>
+          </a:fillRef>
+          <a:effectRef idx="1">
+            <a:schemeClr val="accent2"/>
+          </a:effectRef>
+          <a:fontRef idx="minor">
+            <a:schemeClr val="dk1"/>
+          </a:fontRef>
+        </p:style>
+      </p:cxnSp>
+      <p:cxnSp>
+        <p:nvCxnSpPr>
+          <p:cNvPr id="109" name="Straight Arrow Connector 108"/>
+          <p:cNvCxnSpPr/>
+          <p:nvPr/>
+        </p:nvCxnSpPr>
+        <p:spPr>
+          <a:xfrm flipV="1">
+            <a:off x="8074978" y="2119808"/>
+            <a:ext cx="0" cy="304800"/>
+          </a:xfrm>
+          <a:prstGeom prst="straightConnector1">
+            <a:avLst/>
+          </a:prstGeom>
+          <a:ln w="19050">
+            <a:solidFill>
+              <a:schemeClr val="bg1">
+                <a:lumMod val="65000"/>
+              </a:schemeClr>
+            </a:solidFill>
+            <a:prstDash val="dash"/>
+            <a:headEnd type="none" w="med" len="med"/>
+            <a:tailEnd type="arrow" w="med" len="med"/>
+          </a:ln>
+          <a:effectLst/>
+        </p:spPr>
+        <p:style>
+          <a:lnRef idx="1">
+            <a:schemeClr val="accent2"/>
+          </a:lnRef>
+          <a:fillRef idx="2">
+            <a:schemeClr val="accent2"/>
+          </a:fillRef>
+          <a:effectRef idx="1">
+            <a:schemeClr val="accent2"/>
+          </a:effectRef>
+          <a:fontRef idx="minor">
+            <a:schemeClr val="dk1"/>
+          </a:fontRef>
+        </p:style>
+      </p:cxnSp>
+      <p:cxnSp>
+        <p:nvCxnSpPr>
+          <p:cNvPr id="110" name="Straight Arrow Connector 109"/>
+          <p:cNvCxnSpPr/>
+          <p:nvPr/>
+        </p:nvCxnSpPr>
+        <p:spPr>
+          <a:xfrm flipV="1">
+            <a:off x="8227378" y="2119808"/>
+            <a:ext cx="0" cy="304800"/>
+          </a:xfrm>
+          <a:prstGeom prst="straightConnector1">
+            <a:avLst/>
+          </a:prstGeom>
+          <a:ln w="19050">
+            <a:solidFill>
+              <a:schemeClr val="bg1">
+                <a:lumMod val="65000"/>
+              </a:schemeClr>
+            </a:solidFill>
+            <a:prstDash val="dash"/>
+            <a:headEnd type="none" w="med" len="med"/>
+            <a:tailEnd type="arrow" w="med" len="med"/>
+          </a:ln>
+          <a:effectLst/>
+        </p:spPr>
+        <p:style>
+          <a:lnRef idx="1">
+            <a:schemeClr val="accent2"/>
+          </a:lnRef>
+          <a:fillRef idx="2">
+            <a:schemeClr val="accent2"/>
+          </a:fillRef>
+          <a:effectRef idx="1">
+            <a:schemeClr val="accent2"/>
+          </a:effectRef>
+          <a:fontRef idx="minor">
+            <a:schemeClr val="dk1"/>
+          </a:fontRef>
+        </p:style>
+      </p:cxnSp>
+      <p:cxnSp>
+        <p:nvCxnSpPr>
+          <p:cNvPr id="111" name="Straight Arrow Connector 110"/>
+          <p:cNvCxnSpPr/>
+          <p:nvPr/>
+        </p:nvCxnSpPr>
+        <p:spPr>
+          <a:xfrm flipV="1">
+            <a:off x="8379778" y="2119808"/>
+            <a:ext cx="0" cy="304800"/>
+          </a:xfrm>
+          <a:prstGeom prst="straightConnector1">
+            <a:avLst/>
+          </a:prstGeom>
+          <a:ln w="19050">
+            <a:solidFill>
+              <a:schemeClr val="bg1">
+                <a:lumMod val="65000"/>
+              </a:schemeClr>
+            </a:solidFill>
+            <a:prstDash val="dash"/>
+            <a:headEnd type="none" w="med" len="med"/>
+            <a:tailEnd type="arrow" w="med" len="med"/>
+          </a:ln>
+          <a:effectLst/>
+        </p:spPr>
+        <p:style>
+          <a:lnRef idx="1">
+            <a:schemeClr val="accent2"/>
+          </a:lnRef>
+          <a:fillRef idx="2">
+            <a:schemeClr val="accent2"/>
+          </a:fillRef>
+          <a:effectRef idx="1">
+            <a:schemeClr val="accent2"/>
+          </a:effectRef>
+          <a:fontRef idx="minor">
+            <a:schemeClr val="dk1"/>
+          </a:fontRef>
+        </p:style>
+      </p:cxnSp>
+      <p:sp>
+        <p:nvSpPr>
+          <p:cNvPr id="63" name="Rectangle 62"/>
+          <p:cNvSpPr/>
+          <p:nvPr/>
+        </p:nvSpPr>
+        <p:spPr>
+          <a:xfrm>
+            <a:off x="228600" y="2656798"/>
+            <a:ext cx="1746186" cy="346760"/>
+          </a:xfrm>
+          <a:prstGeom prst="rect">
+            <a:avLst/>
+          </a:prstGeom>
+          <a:solidFill>
+            <a:srgbClr val="C00000"/>
+          </a:solidFill>
+          <a:ln w="19050">
+            <a:solidFill>
+              <a:srgbClr val="C00000"/>
+            </a:solidFill>
+          </a:ln>
+          <a:effectLst/>
+        </p:spPr>
+        <p:style>
+          <a:lnRef idx="1">
+            <a:schemeClr val="accent2"/>
+          </a:lnRef>
+          <a:fillRef idx="2">
+            <a:schemeClr val="accent2"/>
+          </a:fillRef>
+          <a:effectRef idx="1">
+            <a:schemeClr val="accent2"/>
+          </a:effectRef>
+          <a:fontRef idx="minor">
+            <a:schemeClr val="dk1"/>
+          </a:fontRef>
+        </p:style>
+        <p:txBody>
+          <a:bodyPr rtlCol="0" anchor="ctr"/>
+          <a:lstStyle/>
+          <a:p>
+            <a:pPr algn="ctr"/>
+            <a:r>
+              <a:rPr lang="en-US" sz="1050" dirty="0" err="1">
                 <a:solidFill>
                   <a:schemeClr val="bg1"/>
                 </a:solidFill>
               </a:rPr>
-              <a:t>Logs</a:t>
-            </a:r>
-            <a:br>
-              <a:rPr lang="en-US" sz="1600" dirty="0">
+              <a:t>MainWindow</a:t>
+            </a:r>
+            <a:endParaRPr lang="en-SG" sz="1050" dirty="0">
+              <a:solidFill>
+                <a:schemeClr val="bg1"/>
+              </a:solidFill>
+            </a:endParaRPr>
+          </a:p>
+        </p:txBody>
+      </p:sp>
+      <p:cxnSp>
+        <p:nvCxnSpPr>
+          <p:cNvPr id="64" name="Elbow Connector 63"/>
+          <p:cNvCxnSpPr>
+            <a:stCxn id="9" idx="0"/>
+          </p:cNvCxnSpPr>
+          <p:nvPr/>
+        </p:nvCxnSpPr>
+        <p:spPr>
+          <a:xfrm rot="5400000" flipH="1" flipV="1">
+            <a:off x="161393" y="3469523"/>
+            <a:ext cx="901834" cy="1"/>
+          </a:xfrm>
+          <a:prstGeom prst="bentConnector3">
+            <a:avLst>
+              <a:gd name="adj1" fmla="val 50000"/>
+            </a:avLst>
+          </a:prstGeom>
+          <a:ln w="19050">
+            <a:solidFill>
+              <a:srgbClr val="C00000"/>
+            </a:solidFill>
+            <a:headEnd type="none" w="med" len="med"/>
+            <a:tailEnd type="arrow" w="med" len="med"/>
+          </a:ln>
+          <a:effectLst/>
+        </p:spPr>
+        <p:style>
+          <a:lnRef idx="1">
+            <a:schemeClr val="accent2"/>
+          </a:lnRef>
+          <a:fillRef idx="2">
+            <a:schemeClr val="accent2"/>
+          </a:fillRef>
+          <a:effectRef idx="1">
+            <a:schemeClr val="accent2"/>
+          </a:effectRef>
+          <a:fontRef idx="minor">
+            <a:schemeClr val="dk1"/>
+          </a:fontRef>
+        </p:style>
+      </p:cxnSp>
+      <p:sp>
+        <p:nvSpPr>
+          <p:cNvPr id="66" name="Rectangle 65"/>
+          <p:cNvSpPr/>
+          <p:nvPr/>
+        </p:nvSpPr>
+        <p:spPr>
+          <a:xfrm>
+            <a:off x="2410208" y="3700884"/>
+            <a:ext cx="790192" cy="442612"/>
+          </a:xfrm>
+          <a:prstGeom prst="rect">
+            <a:avLst/>
+          </a:prstGeom>
+          <a:solidFill>
+            <a:srgbClr val="0070C0"/>
+          </a:solidFill>
+          <a:ln w="19050">
+            <a:solidFill>
+              <a:srgbClr val="0070C0"/>
+            </a:solidFill>
+          </a:ln>
+          <a:effectLst/>
+        </p:spPr>
+        <p:style>
+          <a:lnRef idx="1">
+            <a:schemeClr val="accent2"/>
+          </a:lnRef>
+          <a:fillRef idx="2">
+            <a:schemeClr val="accent2"/>
+          </a:fillRef>
+          <a:effectRef idx="1">
+            <a:schemeClr val="accent2"/>
+          </a:effectRef>
+          <a:fontRef idx="minor">
+            <a:schemeClr val="dk1"/>
+          </a:fontRef>
+        </p:style>
+        <p:txBody>
+          <a:bodyPr rtlCol="0" anchor="ctr"/>
+          <a:lstStyle/>
+          <a:p>
+            <a:pPr algn="ctr"/>
+            <a:r>
+              <a:rPr lang="en-US" sz="1050" dirty="0">
                 <a:solidFill>
                   <a:schemeClr val="bg1"/>
                 </a:solidFill>
               </a:rPr>
-            </a:br>
-            <a:r>
-              <a:rPr lang="en-US" sz="1600" dirty="0">
-                <a:solidFill>
-                  <a:schemeClr val="bg1"/>
-                </a:solidFill>
-              </a:rPr>
-              <a:t>Center</a:t>
-            </a:r>
+              <a:t>Logic</a:t>
+            </a:r>
+            <a:endParaRPr lang="en-SG" sz="1050" dirty="0">
+              <a:solidFill>
+                <a:schemeClr val="bg1"/>
+              </a:solidFill>
+            </a:endParaRPr>
           </a:p>
         </p:txBody>
       </p:sp>
       <p:cxnSp>
         <p:nvCxnSpPr>
-          <p:cNvPr id="40" name="Elbow Connector 39"/>
+          <p:cNvPr id="76" name="Straight Arrow Connector 75"/>
           <p:cNvCxnSpPr>
-            <a:stCxn id="26" idx="4"/>
-            <a:endCxn id="8" idx="3"/>
+            <a:stCxn id="66" idx="3"/>
+            <a:endCxn id="13" idx="1"/>
           </p:cNvCxnSpPr>
           <p:nvPr/>
         </p:nvCxnSpPr>
         <p:spPr>
-          <a:xfrm rot="5400000">
-            <a:off x="6034638" y="3890781"/>
-            <a:ext cx="305273" cy="621793"/>
-          </a:xfrm>
-          <a:prstGeom prst="bentConnector2">
+          <a:xfrm flipV="1">
+            <a:off x="3200400" y="3920440"/>
+            <a:ext cx="282698" cy="1750"/>
+          </a:xfrm>
+          <a:prstGeom prst="straightConnector1">
             <a:avLst/>
           </a:prstGeom>
-          <a:ln w="28575">
+          <a:ln w="19050">
             <a:solidFill>
-              <a:schemeClr val="accent5">
-                <a:lumMod val="75000"/>
-              </a:schemeClr>
+              <a:srgbClr val="0070C0"/>
             </a:solidFill>
+            <a:headEnd type="none" w="med" len="med"/>
+            <a:tailEnd type="arrow" w="med" len="med"/>
           </a:ln>
+          <a:effectLst/>
         </p:spPr>
         <p:style>
           <a:lnRef idx="1">
-            <a:schemeClr val="accent1"/>
+            <a:schemeClr val="accent2"/>
           </a:lnRef>
-          <a:fillRef idx="0">
-            <a:schemeClr val="accent1"/>
+          <a:fillRef idx="2">
+            <a:schemeClr val="accent2"/>
           </a:fillRef>
-          <a:effectRef idx="0">
-            <a:schemeClr val="accent1"/>
+          <a:effectRef idx="1">
+            <a:schemeClr val="accent2"/>
           </a:effectRef>
           <a:fontRef idx="minor">
-            <a:schemeClr val="tx1"/>
+            <a:schemeClr val="dk1"/>
+          </a:fontRef>
+        </p:style>
+      </p:cxnSp>
+      <p:sp>
+        <p:nvSpPr>
+          <p:cNvPr id="85" name="Rectangle 84"/>
+          <p:cNvSpPr/>
+          <p:nvPr/>
+        </p:nvSpPr>
+        <p:spPr>
+          <a:xfrm>
+            <a:off x="986679" y="1995549"/>
+            <a:ext cx="756639" cy="346760"/>
+          </a:xfrm>
+          <a:prstGeom prst="rect">
+            <a:avLst/>
+          </a:prstGeom>
+          <a:ln w="19050"/>
+          <a:effectLst/>
+        </p:spPr>
+        <p:style>
+          <a:lnRef idx="1">
+            <a:schemeClr val="accent2"/>
+          </a:lnRef>
+          <a:fillRef idx="2">
+            <a:schemeClr val="accent2"/>
+          </a:fillRef>
+          <a:effectRef idx="1">
+            <a:schemeClr val="accent2"/>
+          </a:effectRef>
+          <a:fontRef idx="minor">
+            <a:schemeClr val="dk1"/>
+          </a:fontRef>
+        </p:style>
+        <p:txBody>
+          <a:bodyPr rtlCol="0" anchor="ctr"/>
+          <a:lstStyle/>
+          <a:p>
+            <a:pPr algn="ctr"/>
+            <a:r>
+              <a:rPr lang="en-US" sz="1050" dirty="0"/>
+              <a:t>Formatter</a:t>
+            </a:r>
+            <a:endParaRPr lang="en-SG" sz="1050" dirty="0"/>
+          </a:p>
+        </p:txBody>
+      </p:sp>
+      <p:cxnSp>
+        <p:nvCxnSpPr>
+          <p:cNvPr id="86" name="Elbow Connector 85"/>
+          <p:cNvCxnSpPr>
+            <a:endCxn id="85" idx="2"/>
+          </p:cNvCxnSpPr>
+          <p:nvPr/>
+        </p:nvCxnSpPr>
+        <p:spPr>
+          <a:xfrm rot="16200000" flipV="1">
+            <a:off x="1201266" y="2506042"/>
+            <a:ext cx="336300" cy="8834"/>
+          </a:xfrm>
+          <a:prstGeom prst="bentConnector3">
+            <a:avLst>
+              <a:gd name="adj1" fmla="val 50000"/>
+            </a:avLst>
+          </a:prstGeom>
+          <a:ln w="19050">
+            <a:solidFill>
+              <a:srgbClr val="C00000"/>
+            </a:solidFill>
+            <a:prstDash val="dash"/>
+            <a:headEnd type="none" w="med" len="med"/>
+            <a:tailEnd type="arrow" w="med" len="med"/>
+          </a:ln>
+          <a:effectLst/>
+        </p:spPr>
+        <p:style>
+          <a:lnRef idx="1">
+            <a:schemeClr val="accent2"/>
+          </a:lnRef>
+          <a:fillRef idx="2">
+            <a:schemeClr val="accent2"/>
+          </a:fillRef>
+          <a:effectRef idx="1">
+            <a:schemeClr val="accent2"/>
+          </a:effectRef>
+          <a:fontRef idx="minor">
+            <a:schemeClr val="dk1"/>
+          </a:fontRef>
+        </p:style>
+      </p:cxnSp>
+      <p:sp>
+        <p:nvSpPr>
+          <p:cNvPr id="89" name="Rectangle 88"/>
+          <p:cNvSpPr/>
+          <p:nvPr/>
+        </p:nvSpPr>
+        <p:spPr>
+          <a:xfrm>
+            <a:off x="838200" y="3214749"/>
+            <a:ext cx="1071262" cy="346760"/>
+          </a:xfrm>
+          <a:prstGeom prst="rect">
+            <a:avLst/>
+          </a:prstGeom>
+          <a:ln w="19050"/>
+          <a:effectLst/>
+        </p:spPr>
+        <p:style>
+          <a:lnRef idx="1">
+            <a:schemeClr val="accent2"/>
+          </a:lnRef>
+          <a:fillRef idx="2">
+            <a:schemeClr val="accent2"/>
+          </a:fillRef>
+          <a:effectRef idx="1">
+            <a:schemeClr val="accent2"/>
+          </a:effectRef>
+          <a:fontRef idx="minor">
+            <a:schemeClr val="dk1"/>
+          </a:fontRef>
+        </p:style>
+        <p:txBody>
+          <a:bodyPr rtlCol="0" anchor="ctr"/>
+          <a:lstStyle/>
+          <a:p>
+            <a:pPr algn="ctr"/>
+            <a:r>
+              <a:rPr lang="en-US" sz="1050" dirty="0"/>
+              <a:t>&lt;&lt;interface&gt;&gt;</a:t>
+            </a:r>
+          </a:p>
+          <a:p>
+            <a:pPr algn="ctr"/>
+            <a:r>
+              <a:rPr lang="en-US" sz="1050" dirty="0"/>
+              <a:t>Stoppable</a:t>
+            </a:r>
+            <a:endParaRPr lang="en-SG" sz="1050" dirty="0"/>
+          </a:p>
+        </p:txBody>
+      </p:sp>
+      <p:cxnSp>
+        <p:nvCxnSpPr>
+          <p:cNvPr id="91" name="Elbow Connector 90"/>
+          <p:cNvCxnSpPr>
+            <a:stCxn id="89" idx="0"/>
+          </p:cNvCxnSpPr>
+          <p:nvPr/>
+        </p:nvCxnSpPr>
+        <p:spPr>
+          <a:xfrm rot="5400000" flipH="1" flipV="1">
+            <a:off x="1281047" y="3114967"/>
+            <a:ext cx="192567" cy="6999"/>
+          </a:xfrm>
+          <a:prstGeom prst="bentConnector3">
+            <a:avLst>
+              <a:gd name="adj1" fmla="val 50000"/>
+            </a:avLst>
+          </a:prstGeom>
+          <a:ln w="19050">
+            <a:solidFill>
+              <a:srgbClr val="C00000"/>
+            </a:solidFill>
+            <a:prstDash val="solid"/>
+            <a:headEnd type="arrow" w="med" len="med"/>
+            <a:tailEnd type="none" w="med" len="med"/>
+          </a:ln>
+          <a:effectLst/>
+        </p:spPr>
+        <p:style>
+          <a:lnRef idx="1">
+            <a:schemeClr val="accent2"/>
+          </a:lnRef>
+          <a:fillRef idx="2">
+            <a:schemeClr val="accent2"/>
+          </a:fillRef>
+          <a:effectRef idx="1">
+            <a:schemeClr val="accent2"/>
+          </a:effectRef>
+          <a:fontRef idx="minor">
+            <a:schemeClr val="dk1"/>
+          </a:fontRef>
+        </p:style>
+      </p:cxnSp>
+      <p:sp>
+        <p:nvSpPr>
+          <p:cNvPr id="103" name="Isosceles Triangle 102"/>
+          <p:cNvSpPr/>
+          <p:nvPr/>
+        </p:nvSpPr>
+        <p:spPr>
+          <a:xfrm rot="10800000" flipV="1">
+            <a:off x="1296380" y="3561884"/>
+            <a:ext cx="270504" cy="175523"/>
+          </a:xfrm>
+          <a:prstGeom prst="triangle">
+            <a:avLst/>
+          </a:prstGeom>
+          <a:ln w="19050"/>
+          <a:effectLst/>
+        </p:spPr>
+        <p:style>
+          <a:lnRef idx="1">
+            <a:schemeClr val="accent2"/>
+          </a:lnRef>
+          <a:fillRef idx="2">
+            <a:schemeClr val="accent2"/>
+          </a:fillRef>
+          <a:effectRef idx="1">
+            <a:schemeClr val="accent2"/>
+          </a:effectRef>
+          <a:fontRef idx="minor">
+            <a:schemeClr val="dk1"/>
+          </a:fontRef>
+        </p:style>
+        <p:txBody>
+          <a:bodyPr rtlCol="0" anchor="ctr"/>
+          <a:lstStyle/>
+          <a:p>
+            <a:pPr algn="ctr"/>
+            <a:endParaRPr lang="en-SG" sz="1050"/>
+          </a:p>
+        </p:txBody>
+      </p:sp>
+      <p:cxnSp>
+        <p:nvCxnSpPr>
+          <p:cNvPr id="104" name="Elbow Connector 103"/>
+          <p:cNvCxnSpPr>
+            <a:stCxn id="103" idx="3"/>
+            <a:endCxn id="12" idx="0"/>
+          </p:cNvCxnSpPr>
+          <p:nvPr/>
+        </p:nvCxnSpPr>
+        <p:spPr>
+          <a:xfrm rot="16200000" flipH="1">
+            <a:off x="1344934" y="3824104"/>
+            <a:ext cx="176402" cy="3007"/>
+          </a:xfrm>
+          <a:prstGeom prst="bentConnector3">
+            <a:avLst>
+              <a:gd name="adj1" fmla="val 50000"/>
+            </a:avLst>
+          </a:prstGeom>
+          <a:ln w="19050">
+            <a:solidFill>
+              <a:srgbClr val="C00000"/>
+            </a:solidFill>
+            <a:prstDash val="dash"/>
+            <a:headEnd type="none" w="med" len="med"/>
+            <a:tailEnd type="none" w="med" len="med"/>
+          </a:ln>
+          <a:effectLst/>
+        </p:spPr>
+        <p:style>
+          <a:lnRef idx="1">
+            <a:schemeClr val="accent2"/>
+          </a:lnRef>
+          <a:fillRef idx="2">
+            <a:schemeClr val="accent2"/>
+          </a:fillRef>
+          <a:effectRef idx="1">
+            <a:schemeClr val="accent2"/>
+          </a:effectRef>
+          <a:fontRef idx="minor">
+            <a:schemeClr val="dk1"/>
+          </a:fontRef>
+        </p:style>
+      </p:cxnSp>
+      <p:cxnSp>
+        <p:nvCxnSpPr>
+          <p:cNvPr id="113" name="Elbow Connector 112"/>
+          <p:cNvCxnSpPr>
+            <a:stCxn id="63" idx="3"/>
+            <a:endCxn id="66" idx="1"/>
+          </p:cNvCxnSpPr>
+          <p:nvPr/>
+        </p:nvCxnSpPr>
+        <p:spPr>
+          <a:xfrm>
+            <a:off x="1974786" y="2830178"/>
+            <a:ext cx="435422" cy="1092012"/>
+          </a:xfrm>
+          <a:prstGeom prst="bentConnector3">
+            <a:avLst>
+              <a:gd name="adj1" fmla="val 50000"/>
+            </a:avLst>
+          </a:prstGeom>
+          <a:ln w="19050">
+            <a:solidFill>
+              <a:srgbClr val="C00000"/>
+            </a:solidFill>
+            <a:prstDash val="solid"/>
+            <a:headEnd type="none" w="med" len="med"/>
+            <a:tailEnd type="arrow" w="med" len="med"/>
+          </a:ln>
+          <a:effectLst/>
+        </p:spPr>
+        <p:style>
+          <a:lnRef idx="1">
+            <a:schemeClr val="accent2"/>
+          </a:lnRef>
+          <a:fillRef idx="2">
+            <a:schemeClr val="accent2"/>
+          </a:fillRef>
+          <a:effectRef idx="1">
+            <a:schemeClr val="accent2"/>
+          </a:effectRef>
+          <a:fontRef idx="minor">
+            <a:schemeClr val="dk1"/>
+          </a:fontRef>
+        </p:style>
+      </p:cxnSp>
+      <p:cxnSp>
+        <p:nvCxnSpPr>
+          <p:cNvPr id="123" name="Elbow Connector 122"/>
+          <p:cNvCxnSpPr>
+            <a:stCxn id="12" idx="3"/>
+          </p:cNvCxnSpPr>
+          <p:nvPr/>
+        </p:nvCxnSpPr>
+        <p:spPr>
+          <a:xfrm flipV="1">
+            <a:off x="1725304" y="4087188"/>
+            <a:ext cx="684904" cy="1"/>
+          </a:xfrm>
+          <a:prstGeom prst="bentConnector3">
+            <a:avLst>
+              <a:gd name="adj1" fmla="val 50000"/>
+            </a:avLst>
+          </a:prstGeom>
+          <a:ln w="19050">
+            <a:solidFill>
+              <a:srgbClr val="C00000"/>
+            </a:solidFill>
+            <a:prstDash val="dash"/>
+            <a:headEnd type="none" w="med" len="med"/>
+            <a:tailEnd type="arrow" w="med" len="med"/>
+          </a:ln>
+          <a:effectLst/>
+        </p:spPr>
+        <p:style>
+          <a:lnRef idx="1">
+            <a:schemeClr val="accent2"/>
+          </a:lnRef>
+          <a:fillRef idx="2">
+            <a:schemeClr val="accent2"/>
+          </a:fillRef>
+          <a:effectRef idx="1">
+            <a:schemeClr val="accent2"/>
+          </a:effectRef>
+          <a:fontRef idx="minor">
+            <a:schemeClr val="dk1"/>
+          </a:fontRef>
+        </p:style>
+      </p:cxnSp>
+      <p:sp>
+        <p:nvSpPr>
+          <p:cNvPr id="74" name="Rectangle 73">
+            <a:extLst>
+              <a:ext uri="{FF2B5EF4-FFF2-40B4-BE49-F238E27FC236}">
+                <a16:creationId xmlns:a16="http://schemas.microsoft.com/office/drawing/2014/main" id="{CE3FE38F-2A17-4540-BA33-EB5C057E66B3}"/>
+              </a:ext>
+            </a:extLst>
+          </p:cNvPr>
+          <p:cNvSpPr/>
+          <p:nvPr/>
+        </p:nvSpPr>
+        <p:spPr>
+          <a:xfrm flipH="1">
+            <a:off x="6142650" y="678080"/>
+            <a:ext cx="1404109" cy="346760"/>
+          </a:xfrm>
+          <a:prstGeom prst="rect">
+            <a:avLst/>
+          </a:prstGeom>
+          <a:ln w="19050"/>
+          <a:effectLst/>
+        </p:spPr>
+        <p:style>
+          <a:lnRef idx="1">
+            <a:schemeClr val="accent5"/>
+          </a:lnRef>
+          <a:fillRef idx="2">
+            <a:schemeClr val="accent5"/>
+          </a:fillRef>
+          <a:effectRef idx="1">
+            <a:schemeClr val="accent5"/>
+          </a:effectRef>
+          <a:fontRef idx="minor">
+            <a:schemeClr val="dk1"/>
+          </a:fontRef>
+        </p:style>
+        <p:txBody>
+          <a:bodyPr rtlCol="0" anchor="ctr"/>
+          <a:lstStyle/>
+          <a:p>
+            <a:pPr algn="ctr"/>
+            <a:r>
+              <a:rPr lang="en-US" sz="1050" dirty="0" err="1"/>
+              <a:t>EditCommand</a:t>
+            </a:r>
+            <a:endParaRPr lang="en-SG" sz="1050" dirty="0"/>
+          </a:p>
+        </p:txBody>
+      </p:sp>
+      <p:sp>
+        <p:nvSpPr>
+          <p:cNvPr id="75" name="Rectangle 74">
+            <a:extLst>
+              <a:ext uri="{FF2B5EF4-FFF2-40B4-BE49-F238E27FC236}">
+                <a16:creationId xmlns:a16="http://schemas.microsoft.com/office/drawing/2014/main" id="{3CC3EEA1-60E3-4356-BC6F-9C6CCD4D78E9}"/>
+              </a:ext>
+            </a:extLst>
+          </p:cNvPr>
+          <p:cNvSpPr/>
+          <p:nvPr/>
+        </p:nvSpPr>
+        <p:spPr>
+          <a:xfrm flipH="1">
+            <a:off x="6142650" y="282993"/>
+            <a:ext cx="1404109" cy="346760"/>
+          </a:xfrm>
+          <a:prstGeom prst="rect">
+            <a:avLst/>
+          </a:prstGeom>
+          <a:ln w="19050"/>
+          <a:effectLst/>
+        </p:spPr>
+        <p:style>
+          <a:lnRef idx="1">
+            <a:schemeClr val="accent5"/>
+          </a:lnRef>
+          <a:fillRef idx="2">
+            <a:schemeClr val="accent5"/>
+          </a:fillRef>
+          <a:effectRef idx="1">
+            <a:schemeClr val="accent5"/>
+          </a:effectRef>
+          <a:fontRef idx="minor">
+            <a:schemeClr val="dk1"/>
+          </a:fontRef>
+        </p:style>
+        <p:txBody>
+          <a:bodyPr rtlCol="0" anchor="ctr"/>
+          <a:lstStyle/>
+          <a:p>
+            <a:pPr algn="ctr"/>
+            <a:r>
+              <a:rPr lang="en-US" sz="1050" dirty="0" err="1"/>
+              <a:t>AddCommand</a:t>
+            </a:r>
+            <a:endParaRPr lang="en-SG" sz="1050" dirty="0"/>
+          </a:p>
+        </p:txBody>
+      </p:sp>
+      <p:sp>
+        <p:nvSpPr>
+          <p:cNvPr id="78" name="Rectangle 77">
+            <a:extLst>
+              <a:ext uri="{FF2B5EF4-FFF2-40B4-BE49-F238E27FC236}">
+                <a16:creationId xmlns:a16="http://schemas.microsoft.com/office/drawing/2014/main" id="{55EEA352-89B5-4B62-BE3B-0B6CB5B782EF}"/>
+              </a:ext>
+            </a:extLst>
+          </p:cNvPr>
+          <p:cNvSpPr/>
+          <p:nvPr/>
+        </p:nvSpPr>
+        <p:spPr>
+          <a:xfrm flipH="1">
+            <a:off x="6142649" y="1844120"/>
+            <a:ext cx="1404109" cy="346760"/>
+          </a:xfrm>
+          <a:prstGeom prst="rect">
+            <a:avLst/>
+          </a:prstGeom>
+          <a:ln w="19050"/>
+          <a:effectLst/>
+        </p:spPr>
+        <p:style>
+          <a:lnRef idx="1">
+            <a:schemeClr val="accent5"/>
+          </a:lnRef>
+          <a:fillRef idx="2">
+            <a:schemeClr val="accent5"/>
+          </a:fillRef>
+          <a:effectRef idx="1">
+            <a:schemeClr val="accent5"/>
+          </a:effectRef>
+          <a:fontRef idx="minor">
+            <a:schemeClr val="dk1"/>
+          </a:fontRef>
+        </p:style>
+        <p:txBody>
+          <a:bodyPr rtlCol="0" anchor="ctr"/>
+          <a:lstStyle/>
+          <a:p>
+            <a:pPr algn="ctr"/>
+            <a:r>
+              <a:rPr lang="en-US" sz="1050" dirty="0" err="1"/>
+              <a:t>ListCommand</a:t>
+            </a:r>
+            <a:endParaRPr lang="en-SG" sz="1050" dirty="0"/>
+          </a:p>
+        </p:txBody>
+      </p:sp>
+      <p:cxnSp>
+        <p:nvCxnSpPr>
+          <p:cNvPr id="79" name="Elbow Connector 55">
+            <a:extLst>
+              <a:ext uri="{FF2B5EF4-FFF2-40B4-BE49-F238E27FC236}">
+                <a16:creationId xmlns:a16="http://schemas.microsoft.com/office/drawing/2014/main" id="{30568C57-82E6-4BEE-98F8-A5A1CB257F62}"/>
+              </a:ext>
+            </a:extLst>
+          </p:cNvPr>
+          <p:cNvCxnSpPr>
+            <a:cxnSpLocks/>
+            <a:stCxn id="54" idx="3"/>
+            <a:endCxn id="74" idx="3"/>
+          </p:cNvCxnSpPr>
+          <p:nvPr/>
+        </p:nvCxnSpPr>
+        <p:spPr>
+          <a:xfrm flipV="1">
+            <a:off x="5772467" y="851460"/>
+            <a:ext cx="370183" cy="807793"/>
+          </a:xfrm>
+          <a:prstGeom prst="bentConnector3">
+            <a:avLst>
+              <a:gd name="adj1" fmla="val 50000"/>
+            </a:avLst>
+          </a:prstGeom>
+          <a:noFill/>
+          <a:ln w="19050"/>
+          <a:effectLst/>
+        </p:spPr>
+        <p:style>
+          <a:lnRef idx="1">
+            <a:schemeClr val="accent5"/>
+          </a:lnRef>
+          <a:fillRef idx="2">
+            <a:schemeClr val="accent5"/>
+          </a:fillRef>
+          <a:effectRef idx="1">
+            <a:schemeClr val="accent5"/>
+          </a:effectRef>
+          <a:fontRef idx="minor">
+            <a:schemeClr val="dk1"/>
+          </a:fontRef>
+        </p:style>
+      </p:cxnSp>
+      <p:cxnSp>
+        <p:nvCxnSpPr>
+          <p:cNvPr id="80" name="Elbow Connector 55">
+            <a:extLst>
+              <a:ext uri="{FF2B5EF4-FFF2-40B4-BE49-F238E27FC236}">
+                <a16:creationId xmlns:a16="http://schemas.microsoft.com/office/drawing/2014/main" id="{4A33D4FB-72AD-42FA-8F0B-43FE958785BB}"/>
+              </a:ext>
+            </a:extLst>
+          </p:cNvPr>
+          <p:cNvCxnSpPr>
+            <a:cxnSpLocks/>
+            <a:stCxn id="54" idx="3"/>
+            <a:endCxn id="75" idx="3"/>
+          </p:cNvCxnSpPr>
+          <p:nvPr/>
+        </p:nvCxnSpPr>
+        <p:spPr>
+          <a:xfrm flipV="1">
+            <a:off x="5772467" y="456373"/>
+            <a:ext cx="370183" cy="1202880"/>
+          </a:xfrm>
+          <a:prstGeom prst="bentConnector3">
+            <a:avLst>
+              <a:gd name="adj1" fmla="val 50000"/>
+            </a:avLst>
+          </a:prstGeom>
+          <a:noFill/>
+          <a:ln w="19050"/>
+          <a:effectLst/>
+        </p:spPr>
+        <p:style>
+          <a:lnRef idx="1">
+            <a:schemeClr val="accent5"/>
+          </a:lnRef>
+          <a:fillRef idx="2">
+            <a:schemeClr val="accent5"/>
+          </a:fillRef>
+          <a:effectRef idx="1">
+            <a:schemeClr val="accent5"/>
+          </a:effectRef>
+          <a:fontRef idx="minor">
+            <a:schemeClr val="dk1"/>
+          </a:fontRef>
+        </p:style>
+      </p:cxnSp>
+      <p:sp>
+        <p:nvSpPr>
+          <p:cNvPr id="83" name="Rectangle 82">
+            <a:extLst>
+              <a:ext uri="{FF2B5EF4-FFF2-40B4-BE49-F238E27FC236}">
+                <a16:creationId xmlns:a16="http://schemas.microsoft.com/office/drawing/2014/main" id="{6AC9AF50-9AEE-41A3-AF4F-7F806874369B}"/>
+              </a:ext>
+            </a:extLst>
+          </p:cNvPr>
+          <p:cNvSpPr/>
+          <p:nvPr/>
+        </p:nvSpPr>
+        <p:spPr>
+          <a:xfrm flipH="1">
+            <a:off x="6143337" y="2237981"/>
+            <a:ext cx="1404109" cy="346760"/>
+          </a:xfrm>
+          <a:prstGeom prst="rect">
+            <a:avLst/>
+          </a:prstGeom>
+          <a:ln w="19050"/>
+          <a:effectLst/>
+        </p:spPr>
+        <p:style>
+          <a:lnRef idx="1">
+            <a:schemeClr val="accent5"/>
+          </a:lnRef>
+          <a:fillRef idx="2">
+            <a:schemeClr val="accent5"/>
+          </a:fillRef>
+          <a:effectRef idx="1">
+            <a:schemeClr val="accent5"/>
+          </a:effectRef>
+          <a:fontRef idx="minor">
+            <a:schemeClr val="dk1"/>
+          </a:fontRef>
+        </p:style>
+        <p:txBody>
+          <a:bodyPr rtlCol="0" anchor="ctr"/>
+          <a:lstStyle/>
+          <a:p>
+            <a:pPr algn="ctr"/>
+            <a:r>
+              <a:rPr lang="en-US" sz="1050" dirty="0" err="1"/>
+              <a:t>FindCommand</a:t>
+            </a:r>
+            <a:endParaRPr lang="en-SG" sz="1050" dirty="0"/>
+          </a:p>
+        </p:txBody>
+      </p:sp>
+      <p:cxnSp>
+        <p:nvCxnSpPr>
+          <p:cNvPr id="88" name="Elbow Connector 59">
+            <a:extLst>
+              <a:ext uri="{FF2B5EF4-FFF2-40B4-BE49-F238E27FC236}">
+                <a16:creationId xmlns:a16="http://schemas.microsoft.com/office/drawing/2014/main" id="{F406DF39-D11B-4E09-AE50-7CDB04CEC5BE}"/>
+              </a:ext>
+            </a:extLst>
+          </p:cNvPr>
+          <p:cNvCxnSpPr>
+            <a:cxnSpLocks/>
+            <a:stCxn id="54" idx="3"/>
+            <a:endCxn id="83" idx="3"/>
+          </p:cNvCxnSpPr>
+          <p:nvPr/>
+        </p:nvCxnSpPr>
+        <p:spPr>
+          <a:xfrm>
+            <a:off x="5772467" y="1659253"/>
+            <a:ext cx="370870" cy="752108"/>
+          </a:xfrm>
+          <a:prstGeom prst="bentConnector3">
+            <a:avLst>
+              <a:gd name="adj1" fmla="val 50000"/>
+            </a:avLst>
+          </a:prstGeom>
+          <a:noFill/>
+          <a:ln w="19050"/>
+          <a:effectLst/>
+        </p:spPr>
+        <p:style>
+          <a:lnRef idx="1">
+            <a:schemeClr val="accent5"/>
+          </a:lnRef>
+          <a:fillRef idx="2">
+            <a:schemeClr val="accent5"/>
+          </a:fillRef>
+          <a:effectRef idx="1">
+            <a:schemeClr val="accent5"/>
+          </a:effectRef>
+          <a:fontRef idx="minor">
+            <a:schemeClr val="dk1"/>
+          </a:fontRef>
+        </p:style>
+      </p:cxnSp>
+      <p:sp>
+        <p:nvSpPr>
+          <p:cNvPr id="94" name="Rectangle 93">
+            <a:extLst>
+              <a:ext uri="{FF2B5EF4-FFF2-40B4-BE49-F238E27FC236}">
+                <a16:creationId xmlns:a16="http://schemas.microsoft.com/office/drawing/2014/main" id="{0E99FF09-3C47-4229-B339-B02A69C3EB2A}"/>
+              </a:ext>
+            </a:extLst>
+          </p:cNvPr>
+          <p:cNvSpPr/>
+          <p:nvPr/>
+        </p:nvSpPr>
+        <p:spPr>
+          <a:xfrm flipH="1">
+            <a:off x="6147597" y="2638851"/>
+            <a:ext cx="1404109" cy="346760"/>
+          </a:xfrm>
+          <a:prstGeom prst="rect">
+            <a:avLst/>
+          </a:prstGeom>
+          <a:ln w="19050"/>
+          <a:effectLst/>
+        </p:spPr>
+        <p:style>
+          <a:lnRef idx="1">
+            <a:schemeClr val="accent5"/>
+          </a:lnRef>
+          <a:fillRef idx="2">
+            <a:schemeClr val="accent5"/>
+          </a:fillRef>
+          <a:effectRef idx="1">
+            <a:schemeClr val="accent5"/>
+          </a:effectRef>
+          <a:fontRef idx="minor">
+            <a:schemeClr val="dk1"/>
+          </a:fontRef>
+        </p:style>
+        <p:txBody>
+          <a:bodyPr rtlCol="0" anchor="ctr"/>
+          <a:lstStyle/>
+          <a:p>
+            <a:pPr algn="ctr"/>
+            <a:r>
+              <a:rPr lang="en-US" sz="1050" dirty="0" err="1"/>
+              <a:t>ViewCommand</a:t>
+            </a:r>
+            <a:endParaRPr lang="en-SG" sz="1050" dirty="0"/>
+          </a:p>
+        </p:txBody>
+      </p:sp>
+      <p:cxnSp>
+        <p:nvCxnSpPr>
+          <p:cNvPr id="95" name="Elbow Connector 59">
+            <a:extLst>
+              <a:ext uri="{FF2B5EF4-FFF2-40B4-BE49-F238E27FC236}">
+                <a16:creationId xmlns:a16="http://schemas.microsoft.com/office/drawing/2014/main" id="{90564F19-9038-492F-AA85-CF7DF92E69C9}"/>
+              </a:ext>
+            </a:extLst>
+          </p:cNvPr>
+          <p:cNvCxnSpPr>
+            <a:cxnSpLocks/>
+            <a:stCxn id="54" idx="3"/>
+            <a:endCxn id="94" idx="3"/>
+          </p:cNvCxnSpPr>
+          <p:nvPr/>
+        </p:nvCxnSpPr>
+        <p:spPr>
+          <a:xfrm>
+            <a:off x="5772467" y="1659253"/>
+            <a:ext cx="375130" cy="1152978"/>
+          </a:xfrm>
+          <a:prstGeom prst="bentConnector3">
+            <a:avLst>
+              <a:gd name="adj1" fmla="val 50000"/>
+            </a:avLst>
+          </a:prstGeom>
+          <a:noFill/>
+          <a:ln w="19050"/>
+          <a:effectLst/>
+        </p:spPr>
+        <p:style>
+          <a:lnRef idx="1">
+            <a:schemeClr val="accent5"/>
+          </a:lnRef>
+          <a:fillRef idx="2">
+            <a:schemeClr val="accent5"/>
+          </a:fillRef>
+          <a:effectRef idx="1">
+            <a:schemeClr val="accent5"/>
+          </a:effectRef>
+          <a:fontRef idx="minor">
+            <a:schemeClr val="dk1"/>
           </a:fontRef>
         </p:style>
       </p:cxnSp>
     </p:spTree>
     <p:extLst>
       <p:ext uri="{BB962C8B-B14F-4D97-AF65-F5344CB8AC3E}">
-        <p14:creationId xmlns:p14="http://schemas.microsoft.com/office/powerpoint/2010/main" val="1981432603"/>
+        <p14:creationId xmlns:p14="http://schemas.microsoft.com/office/powerpoint/2010/main" val="3376861716"/>
       </p:ext>
     </p:extLst>
   </p:cSld>

</xml_diff>

<commit_message>
Update DeveloperGuide.adoc with tips from TA
</commit_message>
<xml_diff>
--- a/docs/diagrams/ArchitectureDiagram.pptx
+++ b/docs/diagrams/ArchitectureDiagram.pptx
@@ -8,7 +8,7 @@
     <p:notesMasterId r:id="rId3"/>
   </p:notesMasterIdLst>
   <p:sldIdLst>
-    <p:sldId id="257" r:id="rId2"/>
+    <p:sldId id="259" r:id="rId2"/>
   </p:sldIdLst>
   <p:sldSz cx="9144000" cy="6858000" type="screen4x3"/>
   <p:notesSz cx="6858000" cy="9144000"/>
@@ -110,7 +110,7 @@
   <p:extLst>
     <p:ext uri="{EFAFB233-063F-42B5-8137-9DF3F51BA10A}">
       <p15:sldGuideLst xmlns:p15="http://schemas.microsoft.com/office/powerpoint/2012/main">
-        <p15:guide id="1" orient="horz" pos="2160">
+        <p15:guide id="1" orient="horz" pos="1488">
           <p15:clr>
             <a:srgbClr val="A4A3A4"/>
           </p15:clr>
@@ -208,7 +208,7 @@
           <a:p>
             <a:fld id="{F5CC4B3F-88C1-4FFA-B1B6-F41C21DC6924}" type="datetimeFigureOut">
               <a:rPr lang="en-US" smtClean="0"/>
-              <a:t>3/25/2019</a:t>
+              <a:t>4/10/2019</a:t>
             </a:fld>
             <a:endParaRPr lang="en-US"/>
           </a:p>
@@ -475,90 +475,6 @@
 </p:notesMaster>
 </file>
 
-<file path=ppt/notesSlides/notesSlide1.xml><?xml version="1.0" encoding="utf-8"?>
-<p:notes xmlns:a="http://schemas.openxmlformats.org/drawingml/2006/main" xmlns:r="http://schemas.openxmlformats.org/officeDocument/2006/relationships" xmlns:p="http://schemas.openxmlformats.org/presentationml/2006/main">
-  <p:cSld>
-    <p:spTree>
-      <p:nvGrpSpPr>
-        <p:cNvPr id="1" name=""/>
-        <p:cNvGrpSpPr/>
-        <p:nvPr/>
-      </p:nvGrpSpPr>
-      <p:grpSpPr>
-        <a:xfrm>
-          <a:off x="0" y="0"/>
-          <a:ext cx="0" cy="0"/>
-          <a:chOff x="0" y="0"/>
-          <a:chExt cx="0" cy="0"/>
-        </a:xfrm>
-      </p:grpSpPr>
-      <p:sp>
-        <p:nvSpPr>
-          <p:cNvPr id="2" name="Slide Image Placeholder 1"/>
-          <p:cNvSpPr>
-            <a:spLocks noGrp="1" noRot="1" noChangeAspect="1"/>
-          </p:cNvSpPr>
-          <p:nvPr>
-            <p:ph type="sldImg"/>
-          </p:nvPr>
-        </p:nvSpPr>
-        <p:spPr/>
-      </p:sp>
-      <p:sp>
-        <p:nvSpPr>
-          <p:cNvPr id="3" name="Notes Placeholder 2"/>
-          <p:cNvSpPr>
-            <a:spLocks noGrp="1"/>
-          </p:cNvSpPr>
-          <p:nvPr>
-            <p:ph type="body" idx="1"/>
-          </p:nvPr>
-        </p:nvSpPr>
-        <p:spPr/>
-        <p:txBody>
-          <a:bodyPr/>
-          <a:lstStyle/>
-          <a:p>
-            <a:endParaRPr lang="en-US" dirty="0"/>
-          </a:p>
-        </p:txBody>
-      </p:sp>
-      <p:sp>
-        <p:nvSpPr>
-          <p:cNvPr id="4" name="Slide Number Placeholder 3"/>
-          <p:cNvSpPr>
-            <a:spLocks noGrp="1"/>
-          </p:cNvSpPr>
-          <p:nvPr>
-            <p:ph type="sldNum" sz="quarter" idx="10"/>
-          </p:nvPr>
-        </p:nvSpPr>
-        <p:spPr/>
-        <p:txBody>
-          <a:bodyPr/>
-          <a:lstStyle/>
-          <a:p>
-            <a:fld id="{5A7AB025-77E3-4BD1-A2FD-B3183DBA47A3}" type="slidenum">
-              <a:rPr lang="en-US" smtClean="0"/>
-              <a:t>1</a:t>
-            </a:fld>
-            <a:endParaRPr lang="en-US"/>
-          </a:p>
-        </p:txBody>
-      </p:sp>
-    </p:spTree>
-    <p:extLst>
-      <p:ext uri="{BB962C8B-B14F-4D97-AF65-F5344CB8AC3E}">
-        <p14:creationId xmlns:p14="http://schemas.microsoft.com/office/powerpoint/2010/main" val="3075080205"/>
-      </p:ext>
-    </p:extLst>
-  </p:cSld>
-  <p:clrMapOvr>
-    <a:masterClrMapping/>
-  </p:clrMapOvr>
-</p:notes>
-</file>
-
 <file path=ppt/slideLayouts/slideLayout1.xml><?xml version="1.0" encoding="utf-8"?>
 <p:sldLayout xmlns:a="http://schemas.openxmlformats.org/drawingml/2006/main" xmlns:r="http://schemas.openxmlformats.org/officeDocument/2006/relationships" xmlns:p="http://schemas.openxmlformats.org/presentationml/2006/main" type="title" preserve="1">
   <p:cSld name="Title Slide">
@@ -738,7 +654,7 @@
           <a:p>
             <a:fld id="{78C97017-6FC3-485B-9764-EAC9E56C1D49}" type="datetimeFigureOut">
               <a:rPr lang="en-US" smtClean="0"/>
-              <a:t>3/25/2019</a:t>
+              <a:t>4/10/2019</a:t>
             </a:fld>
             <a:endParaRPr lang="en-US"/>
           </a:p>
@@ -906,7 +822,7 @@
           <a:p>
             <a:fld id="{78C97017-6FC3-485B-9764-EAC9E56C1D49}" type="datetimeFigureOut">
               <a:rPr lang="en-US" smtClean="0"/>
-              <a:t>3/25/2019</a:t>
+              <a:t>4/10/2019</a:t>
             </a:fld>
             <a:endParaRPr lang="en-US"/>
           </a:p>
@@ -1084,7 +1000,7 @@
           <a:p>
             <a:fld id="{78C97017-6FC3-485B-9764-EAC9E56C1D49}" type="datetimeFigureOut">
               <a:rPr lang="en-US" smtClean="0"/>
-              <a:t>3/25/2019</a:t>
+              <a:t>4/10/2019</a:t>
             </a:fld>
             <a:endParaRPr lang="en-US"/>
           </a:p>
@@ -1252,7 +1168,7 @@
           <a:p>
             <a:fld id="{78C97017-6FC3-485B-9764-EAC9E56C1D49}" type="datetimeFigureOut">
               <a:rPr lang="en-US" smtClean="0"/>
-              <a:t>3/25/2019</a:t>
+              <a:t>4/10/2019</a:t>
             </a:fld>
             <a:endParaRPr lang="en-US"/>
           </a:p>
@@ -1497,7 +1413,7 @@
           <a:p>
             <a:fld id="{78C97017-6FC3-485B-9764-EAC9E56C1D49}" type="datetimeFigureOut">
               <a:rPr lang="en-US" smtClean="0"/>
-              <a:t>3/25/2019</a:t>
+              <a:t>4/10/2019</a:t>
             </a:fld>
             <a:endParaRPr lang="en-US"/>
           </a:p>
@@ -1782,7 +1698,7 @@
           <a:p>
             <a:fld id="{78C97017-6FC3-485B-9764-EAC9E56C1D49}" type="datetimeFigureOut">
               <a:rPr lang="en-US" smtClean="0"/>
-              <a:t>3/25/2019</a:t>
+              <a:t>4/10/2019</a:t>
             </a:fld>
             <a:endParaRPr lang="en-US"/>
           </a:p>
@@ -2201,7 +2117,7 @@
           <a:p>
             <a:fld id="{78C97017-6FC3-485B-9764-EAC9E56C1D49}" type="datetimeFigureOut">
               <a:rPr lang="en-US" smtClean="0"/>
-              <a:t>3/25/2019</a:t>
+              <a:t>4/10/2019</a:t>
             </a:fld>
             <a:endParaRPr lang="en-US"/>
           </a:p>
@@ -2318,7 +2234,7 @@
           <a:p>
             <a:fld id="{78C97017-6FC3-485B-9764-EAC9E56C1D49}" type="datetimeFigureOut">
               <a:rPr lang="en-US" smtClean="0"/>
-              <a:t>3/25/2019</a:t>
+              <a:t>4/10/2019</a:t>
             </a:fld>
             <a:endParaRPr lang="en-US"/>
           </a:p>
@@ -2413,7 +2329,7 @@
           <a:p>
             <a:fld id="{78C97017-6FC3-485B-9764-EAC9E56C1D49}" type="datetimeFigureOut">
               <a:rPr lang="en-US" smtClean="0"/>
-              <a:t>3/25/2019</a:t>
+              <a:t>4/10/2019</a:t>
             </a:fld>
             <a:endParaRPr lang="en-US"/>
           </a:p>
@@ -2688,7 +2604,7 @@
           <a:p>
             <a:fld id="{78C97017-6FC3-485B-9764-EAC9E56C1D49}" type="datetimeFigureOut">
               <a:rPr lang="en-US" smtClean="0"/>
-              <a:t>3/25/2019</a:t>
+              <a:t>4/10/2019</a:t>
             </a:fld>
             <a:endParaRPr lang="en-US"/>
           </a:p>
@@ -2940,7 +2856,7 @@
           <a:p>
             <a:fld id="{78C97017-6FC3-485B-9764-EAC9E56C1D49}" type="datetimeFigureOut">
               <a:rPr lang="en-US" smtClean="0"/>
-              <a:t>3/25/2019</a:t>
+              <a:t>4/10/2019</a:t>
             </a:fld>
             <a:endParaRPr lang="en-US"/>
           </a:p>
@@ -3151,7 +3067,7 @@
           <a:p>
             <a:fld id="{78C97017-6FC3-485B-9764-EAC9E56C1D49}" type="datetimeFigureOut">
               <a:rPr lang="en-US" smtClean="0"/>
-              <a:t>3/25/2019</a:t>
+              <a:t>4/10/2019</a:t>
             </a:fld>
             <a:endParaRPr lang="en-US"/>
           </a:p>
@@ -3528,16 +3444,742 @@
       </p:grpSpPr>
       <p:sp>
         <p:nvSpPr>
-          <p:cNvPr id="9" name="Rectangle 8"/>
+          <p:cNvPr id="15" name="Rounded Rectangle 14"/>
           <p:cNvSpPr/>
           <p:nvPr/>
         </p:nvSpPr>
         <p:spPr>
           <a:xfrm>
-            <a:off x="411820" y="3920440"/>
-            <a:ext cx="400979" cy="346760"/>
+            <a:off x="1636188" y="2057400"/>
+            <a:ext cx="5700181" cy="2667000"/>
           </a:xfrm>
-          <a:prstGeom prst="rect">
+          <a:prstGeom prst="roundRect">
+            <a:avLst>
+              <a:gd name="adj" fmla="val 5768"/>
+            </a:avLst>
+          </a:prstGeom>
+          <a:solidFill>
+            <a:schemeClr val="bg1">
+              <a:lumMod val="95000"/>
+            </a:schemeClr>
+          </a:solidFill>
+          <a:ln>
+            <a:solidFill>
+              <a:schemeClr val="bg1">
+                <a:lumMod val="85000"/>
+              </a:schemeClr>
+            </a:solidFill>
+          </a:ln>
+        </p:spPr>
+        <p:style>
+          <a:lnRef idx="2">
+            <a:schemeClr val="accent1">
+              <a:shade val="50000"/>
+            </a:schemeClr>
+          </a:lnRef>
+          <a:fillRef idx="1">
+            <a:schemeClr val="accent1"/>
+          </a:fillRef>
+          <a:effectRef idx="0">
+            <a:schemeClr val="accent1"/>
+          </a:effectRef>
+          <a:fontRef idx="minor">
+            <a:schemeClr val="lt1"/>
+          </a:fontRef>
+        </p:style>
+        <p:txBody>
+          <a:bodyPr rtlCol="0" anchor="ctr"/>
+          <a:lstStyle/>
+          <a:p>
+            <a:pPr algn="ctr"/>
+            <a:endParaRPr lang="en-US"/>
+          </a:p>
+        </p:txBody>
+      </p:sp>
+      <p:sp>
+        <p:nvSpPr>
+          <p:cNvPr id="2" name="Rectangle 62"/>
+          <p:cNvSpPr/>
+          <p:nvPr/>
+        </p:nvSpPr>
+        <p:spPr>
+          <a:xfrm flipH="1">
+            <a:off x="1964269" y="2191178"/>
+            <a:ext cx="609602" cy="1294917"/>
+          </a:xfrm>
+          <a:prstGeom prst="roundRect">
+            <a:avLst/>
+          </a:prstGeom>
+          <a:solidFill>
+            <a:srgbClr val="00B050"/>
+          </a:solidFill>
+          <a:ln w="19050">
+            <a:solidFill>
+              <a:srgbClr val="00B050"/>
+            </a:solidFill>
+          </a:ln>
+          <a:effectLst/>
+        </p:spPr>
+        <p:style>
+          <a:lnRef idx="1">
+            <a:schemeClr val="accent2"/>
+          </a:lnRef>
+          <a:fillRef idx="2">
+            <a:schemeClr val="accent2"/>
+          </a:fillRef>
+          <a:effectRef idx="1">
+            <a:schemeClr val="accent2"/>
+          </a:effectRef>
+          <a:fontRef idx="minor">
+            <a:schemeClr val="dk1"/>
+          </a:fontRef>
+        </p:style>
+        <p:txBody>
+          <a:bodyPr rtlCol="0" anchor="ctr"/>
+          <a:lstStyle/>
+          <a:p>
+            <a:pPr algn="ctr"/>
+            <a:r>
+              <a:rPr lang="en-US" sz="1600" dirty="0">
+                <a:solidFill>
+                  <a:schemeClr val="bg1"/>
+                </a:solidFill>
+              </a:rPr>
+              <a:t>UI</a:t>
+            </a:r>
+            <a:endParaRPr lang="en-SG" sz="1600" dirty="0">
+              <a:solidFill>
+                <a:schemeClr val="bg1"/>
+              </a:solidFill>
+            </a:endParaRPr>
+          </a:p>
+        </p:txBody>
+      </p:sp>
+      <p:sp>
+        <p:nvSpPr>
+          <p:cNvPr id="3" name="Rectangle 45"/>
+          <p:cNvSpPr/>
+          <p:nvPr/>
+        </p:nvSpPr>
+        <p:spPr>
+          <a:xfrm>
+            <a:off x="3412069" y="2191178"/>
+            <a:ext cx="1295400" cy="552022"/>
+          </a:xfrm>
+          <a:prstGeom prst="roundRect">
+            <a:avLst/>
+          </a:prstGeom>
+          <a:solidFill>
+            <a:srgbClr val="0070C0"/>
+          </a:solidFill>
+          <a:ln w="19050">
+            <a:solidFill>
+              <a:srgbClr val="0070C0"/>
+            </a:solidFill>
+          </a:ln>
+          <a:effectLst/>
+        </p:spPr>
+        <p:style>
+          <a:lnRef idx="1">
+            <a:schemeClr val="accent5"/>
+          </a:lnRef>
+          <a:fillRef idx="2">
+            <a:schemeClr val="accent5"/>
+          </a:fillRef>
+          <a:effectRef idx="1">
+            <a:schemeClr val="accent5"/>
+          </a:effectRef>
+          <a:fontRef idx="minor">
+            <a:schemeClr val="dk1"/>
+          </a:fontRef>
+        </p:style>
+        <p:txBody>
+          <a:bodyPr rtlCol="0" anchor="ctr"/>
+          <a:lstStyle/>
+          <a:p>
+            <a:pPr algn="ctr"/>
+            <a:r>
+              <a:rPr lang="en-US" sz="1600" dirty="0">
+                <a:solidFill>
+                  <a:schemeClr val="bg1"/>
+                </a:solidFill>
+              </a:rPr>
+              <a:t>Logic</a:t>
+            </a:r>
+            <a:endParaRPr lang="en-SG" sz="1600" dirty="0">
+              <a:solidFill>
+                <a:schemeClr val="bg1"/>
+              </a:solidFill>
+            </a:endParaRPr>
+          </a:p>
+        </p:txBody>
+      </p:sp>
+      <p:sp>
+        <p:nvSpPr>
+          <p:cNvPr id="4" name="Rectangle 45"/>
+          <p:cNvSpPr/>
+          <p:nvPr/>
+        </p:nvSpPr>
+        <p:spPr>
+          <a:xfrm>
+            <a:off x="5164669" y="2191179"/>
+            <a:ext cx="1447800" cy="552022"/>
+          </a:xfrm>
+          <a:prstGeom prst="roundRect">
+            <a:avLst/>
+          </a:prstGeom>
+          <a:solidFill>
+            <a:schemeClr val="accent6">
+              <a:lumMod val="75000"/>
+            </a:schemeClr>
+          </a:solidFill>
+          <a:ln w="19050">
+            <a:solidFill>
+              <a:schemeClr val="accent6">
+                <a:lumMod val="75000"/>
+              </a:schemeClr>
+            </a:solidFill>
+          </a:ln>
+          <a:effectLst/>
+        </p:spPr>
+        <p:style>
+          <a:lnRef idx="1">
+            <a:schemeClr val="accent5"/>
+          </a:lnRef>
+          <a:fillRef idx="2">
+            <a:schemeClr val="accent5"/>
+          </a:fillRef>
+          <a:effectRef idx="1">
+            <a:schemeClr val="accent5"/>
+          </a:effectRef>
+          <a:fontRef idx="minor">
+            <a:schemeClr val="dk1"/>
+          </a:fontRef>
+        </p:style>
+        <p:txBody>
+          <a:bodyPr rtlCol="0" anchor="ctr"/>
+          <a:lstStyle/>
+          <a:p>
+            <a:pPr algn="ctr"/>
+            <a:r>
+              <a:rPr lang="en-US" sz="1600" dirty="0">
+                <a:solidFill>
+                  <a:schemeClr val="bg1"/>
+                </a:solidFill>
+              </a:rPr>
+              <a:t>Storage</a:t>
+            </a:r>
+            <a:endParaRPr lang="en-SG" sz="1600" dirty="0">
+              <a:solidFill>
+                <a:schemeClr val="bg1"/>
+              </a:solidFill>
+            </a:endParaRPr>
+          </a:p>
+        </p:txBody>
+      </p:sp>
+      <p:sp>
+        <p:nvSpPr>
+          <p:cNvPr id="5" name="Rectangle 45"/>
+          <p:cNvSpPr/>
+          <p:nvPr/>
+        </p:nvSpPr>
+        <p:spPr>
+          <a:xfrm>
+            <a:off x="3412069" y="3124200"/>
+            <a:ext cx="1295400" cy="723791"/>
+          </a:xfrm>
+          <a:prstGeom prst="roundRect">
+            <a:avLst/>
+          </a:prstGeom>
+          <a:solidFill>
+            <a:srgbClr val="7030A0"/>
+          </a:solidFill>
+          <a:ln w="19050">
+            <a:solidFill>
+              <a:srgbClr val="7030A0"/>
+            </a:solidFill>
+          </a:ln>
+          <a:effectLst/>
+        </p:spPr>
+        <p:style>
+          <a:lnRef idx="1">
+            <a:schemeClr val="accent5"/>
+          </a:lnRef>
+          <a:fillRef idx="2">
+            <a:schemeClr val="accent5"/>
+          </a:fillRef>
+          <a:effectRef idx="1">
+            <a:schemeClr val="accent5"/>
+          </a:effectRef>
+          <a:fontRef idx="minor">
+            <a:schemeClr val="dk1"/>
+          </a:fontRef>
+        </p:style>
+        <p:txBody>
+          <a:bodyPr rtlCol="0" anchor="ctr"/>
+          <a:lstStyle/>
+          <a:p>
+            <a:pPr algn="ctr"/>
+            <a:r>
+              <a:rPr lang="en-US" sz="1600" dirty="0">
+                <a:solidFill>
+                  <a:schemeClr val="bg1"/>
+                </a:solidFill>
+              </a:rPr>
+              <a:t>Model</a:t>
+            </a:r>
+            <a:endParaRPr lang="en-SG" sz="1600" dirty="0">
+              <a:solidFill>
+                <a:schemeClr val="bg1"/>
+              </a:solidFill>
+            </a:endParaRPr>
+          </a:p>
+        </p:txBody>
+      </p:sp>
+      <p:sp>
+        <p:nvSpPr>
+          <p:cNvPr id="8" name="Rectangle 45"/>
+          <p:cNvSpPr/>
+          <p:nvPr/>
+        </p:nvSpPr>
+        <p:spPr>
+          <a:xfrm>
+            <a:off x="3217846" y="4131994"/>
+            <a:ext cx="2658531" cy="444640"/>
+          </a:xfrm>
+          <a:prstGeom prst="roundRect">
+            <a:avLst/>
+          </a:prstGeom>
+          <a:solidFill>
+            <a:schemeClr val="accent5">
+              <a:lumMod val="75000"/>
+            </a:schemeClr>
+          </a:solidFill>
+          <a:ln w="19050">
+            <a:solidFill>
+              <a:schemeClr val="accent5">
+                <a:lumMod val="75000"/>
+              </a:schemeClr>
+            </a:solidFill>
+          </a:ln>
+          <a:effectLst/>
+        </p:spPr>
+        <p:style>
+          <a:lnRef idx="1">
+            <a:schemeClr val="accent5"/>
+          </a:lnRef>
+          <a:fillRef idx="2">
+            <a:schemeClr val="accent5"/>
+          </a:fillRef>
+          <a:effectRef idx="1">
+            <a:schemeClr val="accent5"/>
+          </a:effectRef>
+          <a:fontRef idx="minor">
+            <a:schemeClr val="dk1"/>
+          </a:fontRef>
+        </p:style>
+        <p:txBody>
+          <a:bodyPr rtlCol="0" anchor="ctr"/>
+          <a:lstStyle/>
+          <a:p>
+            <a:pPr algn="ctr"/>
+            <a:r>
+              <a:rPr lang="en-US" sz="1400" dirty="0">
+                <a:solidFill>
+                  <a:schemeClr val="bg1"/>
+                </a:solidFill>
+              </a:rPr>
+              <a:t>Commons</a:t>
+            </a:r>
+            <a:endParaRPr lang="en-SG" sz="1400" dirty="0">
+              <a:solidFill>
+                <a:schemeClr val="bg1"/>
+              </a:solidFill>
+            </a:endParaRPr>
+          </a:p>
+        </p:txBody>
+      </p:sp>
+      <p:cxnSp>
+        <p:nvCxnSpPr>
+          <p:cNvPr id="10" name="Straight Arrow Connector 9"/>
+          <p:cNvCxnSpPr>
+            <a:endCxn id="3" idx="1"/>
+          </p:cNvCxnSpPr>
+          <p:nvPr/>
+        </p:nvCxnSpPr>
+        <p:spPr>
+          <a:xfrm>
+            <a:off x="2573871" y="2467189"/>
+            <a:ext cx="838198" cy="0"/>
+          </a:xfrm>
+          <a:prstGeom prst="straightConnector1">
+            <a:avLst/>
+          </a:prstGeom>
+          <a:ln w="28575">
+            <a:solidFill>
+              <a:srgbClr val="00B050"/>
+            </a:solidFill>
+            <a:tailEnd type="arrow"/>
+          </a:ln>
+        </p:spPr>
+        <p:style>
+          <a:lnRef idx="1">
+            <a:schemeClr val="accent1"/>
+          </a:lnRef>
+          <a:fillRef idx="0">
+            <a:schemeClr val="accent1"/>
+          </a:fillRef>
+          <a:effectRef idx="0">
+            <a:schemeClr val="accent1"/>
+          </a:effectRef>
+          <a:fontRef idx="minor">
+            <a:schemeClr val="tx1"/>
+          </a:fontRef>
+        </p:style>
+      </p:cxnSp>
+      <p:cxnSp>
+        <p:nvCxnSpPr>
+          <p:cNvPr id="12" name="Straight Arrow Connector 11"/>
+          <p:cNvCxnSpPr/>
+          <p:nvPr/>
+        </p:nvCxnSpPr>
+        <p:spPr>
+          <a:xfrm>
+            <a:off x="2569639" y="3276600"/>
+            <a:ext cx="838198" cy="0"/>
+          </a:xfrm>
+          <a:prstGeom prst="straightConnector1">
+            <a:avLst/>
+          </a:prstGeom>
+          <a:ln w="28575">
+            <a:solidFill>
+              <a:srgbClr val="00B050"/>
+            </a:solidFill>
+            <a:tailEnd type="arrow"/>
+          </a:ln>
+        </p:spPr>
+        <p:style>
+          <a:lnRef idx="1">
+            <a:schemeClr val="accent1"/>
+          </a:lnRef>
+          <a:fillRef idx="0">
+            <a:schemeClr val="accent1"/>
+          </a:fillRef>
+          <a:effectRef idx="0">
+            <a:schemeClr val="accent1"/>
+          </a:effectRef>
+          <a:fontRef idx="minor">
+            <a:schemeClr val="tx1"/>
+          </a:fontRef>
+        </p:style>
+      </p:cxnSp>
+      <p:cxnSp>
+        <p:nvCxnSpPr>
+          <p:cNvPr id="13" name="Straight Arrow Connector 12"/>
+          <p:cNvCxnSpPr>
+            <a:stCxn id="3" idx="2"/>
+            <a:endCxn id="5" idx="0"/>
+          </p:cNvCxnSpPr>
+          <p:nvPr/>
+        </p:nvCxnSpPr>
+        <p:spPr>
+          <a:xfrm>
+            <a:off x="4059769" y="2743200"/>
+            <a:ext cx="0" cy="381000"/>
+          </a:xfrm>
+          <a:prstGeom prst="straightConnector1">
+            <a:avLst/>
+          </a:prstGeom>
+          <a:ln w="28575">
+            <a:solidFill>
+              <a:srgbClr val="0070C0"/>
+            </a:solidFill>
+            <a:tailEnd type="arrow"/>
+          </a:ln>
+        </p:spPr>
+        <p:style>
+          <a:lnRef idx="1">
+            <a:schemeClr val="accent1"/>
+          </a:lnRef>
+          <a:fillRef idx="0">
+            <a:schemeClr val="accent1"/>
+          </a:fillRef>
+          <a:effectRef idx="0">
+            <a:schemeClr val="accent1"/>
+          </a:effectRef>
+          <a:fontRef idx="minor">
+            <a:schemeClr val="tx1"/>
+          </a:fontRef>
+        </p:style>
+      </p:cxnSp>
+      <p:cxnSp>
+        <p:nvCxnSpPr>
+          <p:cNvPr id="16" name="Straight Arrow Connector 15"/>
+          <p:cNvCxnSpPr/>
+          <p:nvPr/>
+        </p:nvCxnSpPr>
+        <p:spPr>
+          <a:xfrm>
+            <a:off x="4707469" y="2467189"/>
+            <a:ext cx="457200" cy="0"/>
+          </a:xfrm>
+          <a:prstGeom prst="straightConnector1">
+            <a:avLst/>
+          </a:prstGeom>
+          <a:ln w="28575">
+            <a:solidFill>
+              <a:srgbClr val="0070C0"/>
+            </a:solidFill>
+            <a:tailEnd type="arrow"/>
+          </a:ln>
+        </p:spPr>
+        <p:style>
+          <a:lnRef idx="1">
+            <a:schemeClr val="accent1"/>
+          </a:lnRef>
+          <a:fillRef idx="0">
+            <a:schemeClr val="accent1"/>
+          </a:fillRef>
+          <a:effectRef idx="0">
+            <a:schemeClr val="accent1"/>
+          </a:effectRef>
+          <a:fontRef idx="minor">
+            <a:schemeClr val="tx1"/>
+          </a:fontRef>
+        </p:style>
+      </p:cxnSp>
+      <p:sp>
+        <p:nvSpPr>
+          <p:cNvPr id="29" name="Smiley Face 28"/>
+          <p:cNvSpPr/>
+          <p:nvPr/>
+        </p:nvSpPr>
+        <p:spPr>
+          <a:xfrm>
+            <a:off x="1202269" y="2743200"/>
+            <a:ext cx="381000" cy="381000"/>
+          </a:xfrm>
+          <a:prstGeom prst="smileyFace">
+            <a:avLst/>
+          </a:prstGeom>
+          <a:solidFill>
+            <a:schemeClr val="bg1"/>
+          </a:solidFill>
+          <a:ln>
+            <a:solidFill>
+              <a:schemeClr val="tx1"/>
+            </a:solidFill>
+          </a:ln>
+        </p:spPr>
+        <p:style>
+          <a:lnRef idx="2">
+            <a:schemeClr val="accent1">
+              <a:shade val="50000"/>
+            </a:schemeClr>
+          </a:lnRef>
+          <a:fillRef idx="1">
+            <a:schemeClr val="accent1"/>
+          </a:fillRef>
+          <a:effectRef idx="0">
+            <a:schemeClr val="accent1"/>
+          </a:effectRef>
+          <a:fontRef idx="minor">
+            <a:schemeClr val="lt1"/>
+          </a:fontRef>
+        </p:style>
+        <p:txBody>
+          <a:bodyPr rtlCol="0" anchor="ctr"/>
+          <a:lstStyle/>
+          <a:p>
+            <a:pPr algn="ctr"/>
+            <a:endParaRPr lang="en-US"/>
+          </a:p>
+        </p:txBody>
+      </p:sp>
+      <p:cxnSp>
+        <p:nvCxnSpPr>
+          <p:cNvPr id="32" name="Straight Arrow Connector 31"/>
+          <p:cNvCxnSpPr/>
+          <p:nvPr/>
+        </p:nvCxnSpPr>
+        <p:spPr>
+          <a:xfrm flipV="1">
+            <a:off x="1636188" y="2939996"/>
+            <a:ext cx="273050" cy="1"/>
+          </a:xfrm>
+          <a:prstGeom prst="straightConnector1">
+            <a:avLst/>
+          </a:prstGeom>
+          <a:ln w="28575">
+            <a:solidFill>
+              <a:schemeClr val="tx1"/>
+            </a:solidFill>
+            <a:prstDash val="sysDot"/>
+            <a:tailEnd type="arrow"/>
+          </a:ln>
+        </p:spPr>
+        <p:style>
+          <a:lnRef idx="1">
+            <a:schemeClr val="accent1"/>
+          </a:lnRef>
+          <a:fillRef idx="0">
+            <a:schemeClr val="accent1"/>
+          </a:fillRef>
+          <a:effectRef idx="0">
+            <a:schemeClr val="accent1"/>
+          </a:effectRef>
+          <a:fontRef idx="minor">
+            <a:schemeClr val="tx1"/>
+          </a:fontRef>
+        </p:style>
+      </p:cxnSp>
+      <p:cxnSp>
+        <p:nvCxnSpPr>
+          <p:cNvPr id="34" name="Straight Arrow Connector 33"/>
+          <p:cNvCxnSpPr/>
+          <p:nvPr/>
+        </p:nvCxnSpPr>
+        <p:spPr>
+          <a:xfrm flipV="1">
+            <a:off x="6680199" y="2467190"/>
+            <a:ext cx="939801" cy="1"/>
+          </a:xfrm>
+          <a:prstGeom prst="straightConnector1">
+            <a:avLst/>
+          </a:prstGeom>
+          <a:ln w="28575">
+            <a:solidFill>
+              <a:schemeClr val="accent6">
+                <a:lumMod val="75000"/>
+              </a:schemeClr>
+            </a:solidFill>
+            <a:prstDash val="sysDot"/>
+            <a:tailEnd type="arrow"/>
+          </a:ln>
+        </p:spPr>
+        <p:style>
+          <a:lnRef idx="1">
+            <a:schemeClr val="accent1"/>
+          </a:lnRef>
+          <a:fillRef idx="0">
+            <a:schemeClr val="accent1"/>
+          </a:fillRef>
+          <a:effectRef idx="0">
+            <a:schemeClr val="accent1"/>
+          </a:effectRef>
+          <a:fontRef idx="minor">
+            <a:schemeClr val="tx1"/>
+          </a:fontRef>
+        </p:style>
+      </p:cxnSp>
+      <p:sp>
+        <p:nvSpPr>
+          <p:cNvPr id="35" name="Folded Corner 34"/>
+          <p:cNvSpPr/>
+          <p:nvPr/>
+        </p:nvSpPr>
+        <p:spPr>
+          <a:xfrm>
+            <a:off x="7679269" y="2286000"/>
+            <a:ext cx="381000" cy="381000"/>
+          </a:xfrm>
+          <a:prstGeom prst="foldedCorner">
+            <a:avLst/>
+          </a:prstGeom>
+          <a:solidFill>
+            <a:schemeClr val="bg1"/>
+          </a:solidFill>
+          <a:ln>
+            <a:solidFill>
+              <a:schemeClr val="tx1"/>
+            </a:solidFill>
+          </a:ln>
+        </p:spPr>
+        <p:style>
+          <a:lnRef idx="2">
+            <a:schemeClr val="accent1">
+              <a:shade val="50000"/>
+            </a:schemeClr>
+          </a:lnRef>
+          <a:fillRef idx="1">
+            <a:schemeClr val="accent1"/>
+          </a:fillRef>
+          <a:effectRef idx="0">
+            <a:schemeClr val="accent1"/>
+          </a:effectRef>
+          <a:fontRef idx="minor">
+            <a:schemeClr val="lt1"/>
+          </a:fontRef>
+        </p:style>
+        <p:txBody>
+          <a:bodyPr rtlCol="0" anchor="ctr"/>
+          <a:lstStyle/>
+          <a:p>
+            <a:pPr algn="ctr"/>
+            <a:endParaRPr lang="en-US"/>
+          </a:p>
+        </p:txBody>
+      </p:sp>
+      <p:sp>
+        <p:nvSpPr>
+          <p:cNvPr id="36" name="Folded Corner 35"/>
+          <p:cNvSpPr/>
+          <p:nvPr/>
+        </p:nvSpPr>
+        <p:spPr>
+          <a:xfrm>
+            <a:off x="7772400" y="2362200"/>
+            <a:ext cx="381000" cy="381000"/>
+          </a:xfrm>
+          <a:prstGeom prst="foldedCorner">
+            <a:avLst/>
+          </a:prstGeom>
+          <a:solidFill>
+            <a:schemeClr val="bg1"/>
+          </a:solidFill>
+          <a:ln>
+            <a:solidFill>
+              <a:schemeClr val="tx1"/>
+            </a:solidFill>
+          </a:ln>
+        </p:spPr>
+        <p:style>
+          <a:lnRef idx="2">
+            <a:schemeClr val="accent1">
+              <a:shade val="50000"/>
+            </a:schemeClr>
+          </a:lnRef>
+          <a:fillRef idx="1">
+            <a:schemeClr val="accent1"/>
+          </a:fillRef>
+          <a:effectRef idx="0">
+            <a:schemeClr val="accent1"/>
+          </a:effectRef>
+          <a:fontRef idx="minor">
+            <a:schemeClr val="lt1"/>
+          </a:fontRef>
+        </p:style>
+        <p:txBody>
+          <a:bodyPr rtlCol="0" anchor="ctr"/>
+          <a:lstStyle/>
+          <a:p>
+            <a:pPr algn="ctr"/>
+            <a:endParaRPr lang="en-US"/>
+          </a:p>
+        </p:txBody>
+      </p:sp>
+      <p:sp>
+        <p:nvSpPr>
+          <p:cNvPr id="23" name="Rectangle 62"/>
+          <p:cNvSpPr/>
+          <p:nvPr/>
+        </p:nvSpPr>
+        <p:spPr>
+          <a:xfrm flipH="1">
+            <a:off x="1964269" y="3959459"/>
+            <a:ext cx="778931" cy="570908"/>
+          </a:xfrm>
+          <a:prstGeom prst="roundRect">
             <a:avLst/>
           </a:prstGeom>
           <a:solidFill>
@@ -3570,73 +4212,14 @@
           <a:p>
             <a:pPr algn="ctr"/>
             <a:r>
-              <a:rPr lang="en-US" sz="1050" dirty="0" err="1">
-                <a:solidFill>
-                  <a:schemeClr val="bg1"/>
-                </a:solidFill>
-              </a:rPr>
-              <a:t>Gui</a:t>
-            </a:r>
-            <a:endParaRPr lang="en-SG" sz="1050" dirty="0">
-              <a:solidFill>
-                <a:schemeClr val="bg1"/>
-              </a:solidFill>
-            </a:endParaRPr>
-          </a:p>
-        </p:txBody>
-      </p:sp>
-      <p:sp>
-        <p:nvSpPr>
-          <p:cNvPr id="12" name="Rectangle 11"/>
-          <p:cNvSpPr/>
-          <p:nvPr/>
-        </p:nvSpPr>
-        <p:spPr>
-          <a:xfrm>
-            <a:off x="1143973" y="3913809"/>
-            <a:ext cx="581331" cy="346760"/>
-          </a:xfrm>
-          <a:prstGeom prst="rect">
-            <a:avLst/>
-          </a:prstGeom>
-          <a:solidFill>
-            <a:srgbClr val="C00000"/>
-          </a:solidFill>
-          <a:ln w="19050">
-            <a:solidFill>
-              <a:srgbClr val="C00000"/>
-            </a:solidFill>
-          </a:ln>
-          <a:effectLst/>
-        </p:spPr>
-        <p:style>
-          <a:lnRef idx="1">
-            <a:schemeClr val="accent2"/>
-          </a:lnRef>
-          <a:fillRef idx="2">
-            <a:schemeClr val="accent2"/>
-          </a:fillRef>
-          <a:effectRef idx="1">
-            <a:schemeClr val="accent2"/>
-          </a:effectRef>
-          <a:fontRef idx="minor">
-            <a:schemeClr val="dk1"/>
-          </a:fontRef>
-        </p:style>
-        <p:txBody>
-          <a:bodyPr rtlCol="0" anchor="ctr"/>
-          <a:lstStyle/>
-          <a:p>
-            <a:pPr algn="ctr"/>
-            <a:r>
-              <a:rPr lang="en-US" sz="1050" dirty="0">
+              <a:rPr lang="en-US" sz="1600" dirty="0">
                 <a:solidFill>
                   <a:schemeClr val="bg1"/>
                 </a:solidFill>
               </a:rPr>
               <a:t>Main</a:t>
             </a:r>
-            <a:endParaRPr lang="en-SG" sz="1050" dirty="0">
+            <a:endParaRPr lang="en-SG" sz="1600" dirty="0">
               <a:solidFill>
                 <a:schemeClr val="bg1"/>
               </a:solidFill>
@@ -3644,2888 +4227,240 @@
           </a:p>
         </p:txBody>
       </p:sp>
-      <p:sp>
-        <p:nvSpPr>
-          <p:cNvPr id="13" name="Rectangle 12"/>
-          <p:cNvSpPr/>
+      <p:cxnSp>
+        <p:nvCxnSpPr>
+          <p:cNvPr id="30" name="Straight Arrow Connector 29"/>
+          <p:cNvCxnSpPr/>
           <p:nvPr/>
-        </p:nvSpPr>
+        </p:nvCxnSpPr>
         <p:spPr>
           <a:xfrm>
-            <a:off x="3483098" y="3747060"/>
-            <a:ext cx="929296" cy="346760"/>
+            <a:off x="4945047" y="3750994"/>
+            <a:ext cx="0" cy="381000"/>
           </a:xfrm>
-          <a:prstGeom prst="rect">
+          <a:prstGeom prst="straightConnector1">
             <a:avLst/>
           </a:prstGeom>
-          <a:solidFill>
-            <a:schemeClr val="accent6"/>
-          </a:solidFill>
-          <a:ln w="19050"/>
-          <a:effectLst/>
-        </p:spPr>
-        <p:style>
-          <a:lnRef idx="1">
-            <a:schemeClr val="accent6"/>
-          </a:lnRef>
-          <a:fillRef idx="2">
-            <a:schemeClr val="accent6"/>
-          </a:fillRef>
-          <a:effectRef idx="1">
-            <a:schemeClr val="accent6"/>
-          </a:effectRef>
-          <a:fontRef idx="minor">
-            <a:schemeClr val="dk1"/>
-          </a:fontRef>
-        </p:style>
-        <p:txBody>
-          <a:bodyPr rtlCol="0" anchor="ctr"/>
-          <a:lstStyle/>
-          <a:p>
-            <a:pPr algn="ctr"/>
-            <a:r>
-              <a:rPr lang="en-US" sz="1050" dirty="0">
-                <a:solidFill>
-                  <a:schemeClr val="bg1"/>
-                </a:solidFill>
-              </a:rPr>
-              <a:t>Planner</a:t>
-            </a:r>
-            <a:endParaRPr lang="en-SG" sz="1050" dirty="0">
-              <a:solidFill>
-                <a:schemeClr val="bg1"/>
-              </a:solidFill>
-            </a:endParaRPr>
-          </a:p>
-        </p:txBody>
-      </p:sp>
-      <p:sp>
-        <p:nvSpPr>
-          <p:cNvPr id="14" name="Rectangle 13"/>
-          <p:cNvSpPr/>
-          <p:nvPr/>
-        </p:nvSpPr>
-        <p:spPr>
-          <a:xfrm>
-            <a:off x="2743200" y="3006040"/>
-            <a:ext cx="634723" cy="346760"/>
-          </a:xfrm>
-          <a:prstGeom prst="rect">
-            <a:avLst/>
-          </a:prstGeom>
-          <a:ln>
+          <a:ln w="28575">
             <a:solidFill>
-              <a:srgbClr val="0070C0"/>
+              <a:schemeClr val="accent5">
+                <a:lumMod val="75000"/>
+              </a:schemeClr>
             </a:solidFill>
+            <a:prstDash val="sysDot"/>
+            <a:tailEnd type="arrow"/>
           </a:ln>
-          <a:effectLst/>
         </p:spPr>
         <p:style>
           <a:lnRef idx="1">
             <a:schemeClr val="accent1"/>
           </a:lnRef>
-          <a:fillRef idx="2">
+          <a:fillRef idx="0">
             <a:schemeClr val="accent1"/>
           </a:fillRef>
-          <a:effectRef idx="1">
+          <a:effectRef idx="0">
             <a:schemeClr val="accent1"/>
           </a:effectRef>
           <a:fontRef idx="minor">
-            <a:schemeClr val="dk1"/>
-          </a:fontRef>
-        </p:style>
-        <p:txBody>
-          <a:bodyPr rtlCol="0" anchor="ctr"/>
-          <a:lstStyle/>
-          <a:p>
-            <a:pPr algn="ctr"/>
-            <a:r>
-              <a:rPr lang="en-US" sz="1050" dirty="0"/>
-              <a:t>Parser</a:t>
-            </a:r>
-            <a:endParaRPr lang="en-SG" sz="1050" dirty="0"/>
-          </a:p>
-        </p:txBody>
-      </p:sp>
-      <p:sp>
-        <p:nvSpPr>
-          <p:cNvPr id="16" name="Rectangle 15"/>
-          <p:cNvSpPr/>
-          <p:nvPr/>
-        </p:nvSpPr>
-        <p:spPr>
-          <a:xfrm>
-            <a:off x="5072919" y="4352685"/>
-            <a:ext cx="929296" cy="346760"/>
-          </a:xfrm>
-          <a:prstGeom prst="rect">
-            <a:avLst/>
-          </a:prstGeom>
-          <a:ln w="19050"/>
-          <a:effectLst/>
-        </p:spPr>
-        <p:style>
-          <a:lnRef idx="1">
-            <a:schemeClr val="accent6"/>
-          </a:lnRef>
-          <a:fillRef idx="2">
-            <a:schemeClr val="accent6"/>
-          </a:fillRef>
-          <a:effectRef idx="1">
-            <a:schemeClr val="accent6"/>
-          </a:effectRef>
-          <a:fontRef idx="minor">
-            <a:schemeClr val="dk1"/>
-          </a:fontRef>
-        </p:style>
-        <p:txBody>
-          <a:bodyPr rtlCol="0" anchor="ctr"/>
-          <a:lstStyle/>
-          <a:p>
-            <a:pPr algn="ctr"/>
-            <a:r>
-              <a:rPr lang="en-US" sz="1050" dirty="0"/>
-              <a:t>Semester</a:t>
-            </a:r>
-            <a:endParaRPr lang="en-SG" sz="1050" dirty="0"/>
-          </a:p>
-        </p:txBody>
-      </p:sp>
-      <p:sp>
-        <p:nvSpPr>
-          <p:cNvPr id="19" name="Rectangle 18"/>
-          <p:cNvSpPr/>
-          <p:nvPr/>
-        </p:nvSpPr>
-        <p:spPr>
-          <a:xfrm>
-            <a:off x="6637708" y="4352685"/>
-            <a:ext cx="929296" cy="346760"/>
-          </a:xfrm>
-          <a:prstGeom prst="rect">
-            <a:avLst/>
-          </a:prstGeom>
-          <a:solidFill>
-            <a:srgbClr val="7030A0"/>
-          </a:solidFill>
-          <a:ln w="19050">
-            <a:solidFill>
-              <a:srgbClr val="7030A0"/>
-            </a:solidFill>
-          </a:ln>
-          <a:effectLst/>
-        </p:spPr>
-        <p:style>
-          <a:lnRef idx="1">
-            <a:schemeClr val="accent6"/>
-          </a:lnRef>
-          <a:fillRef idx="2">
-            <a:schemeClr val="accent6"/>
-          </a:fillRef>
-          <a:effectRef idx="1">
-            <a:schemeClr val="accent6"/>
-          </a:effectRef>
-          <a:fontRef idx="minor">
-            <a:schemeClr val="dk1"/>
-          </a:fontRef>
-        </p:style>
-        <p:txBody>
-          <a:bodyPr rtlCol="0" anchor="ctr"/>
-          <a:lstStyle/>
-          <a:p>
-            <a:pPr algn="ctr"/>
-            <a:r>
-              <a:rPr lang="en-US" sz="1050" dirty="0">
-                <a:solidFill>
-                  <a:schemeClr val="bg1"/>
-                </a:solidFill>
-              </a:rPr>
-              <a:t>Slot</a:t>
-            </a:r>
-            <a:endParaRPr lang="en-SG" sz="1050" dirty="0">
-              <a:solidFill>
-                <a:schemeClr val="bg1"/>
-              </a:solidFill>
-            </a:endParaRPr>
-          </a:p>
-        </p:txBody>
-      </p:sp>
-      <p:sp>
-        <p:nvSpPr>
-          <p:cNvPr id="23" name="Rectangle 22"/>
-          <p:cNvSpPr/>
-          <p:nvPr/>
-        </p:nvSpPr>
-        <p:spPr>
-          <a:xfrm>
-            <a:off x="2410207" y="4460471"/>
-            <a:ext cx="790193" cy="346760"/>
-          </a:xfrm>
-          <a:prstGeom prst="rect">
-            <a:avLst/>
-          </a:prstGeom>
-          <a:solidFill>
-            <a:srgbClr val="00B050"/>
-          </a:solidFill>
-          <a:ln w="19050">
-            <a:solidFill>
-              <a:srgbClr val="00B050"/>
-            </a:solidFill>
-          </a:ln>
-          <a:effectLst/>
-        </p:spPr>
-        <p:style>
-          <a:lnRef idx="1">
-            <a:schemeClr val="accent2"/>
-          </a:lnRef>
-          <a:fillRef idx="2">
-            <a:schemeClr val="accent2"/>
-          </a:fillRef>
-          <a:effectRef idx="1">
-            <a:schemeClr val="accent2"/>
-          </a:effectRef>
-          <a:fontRef idx="minor">
-            <a:schemeClr val="dk1"/>
-          </a:fontRef>
-        </p:style>
-        <p:txBody>
-          <a:bodyPr rtlCol="0" anchor="ctr"/>
-          <a:lstStyle/>
-          <a:p>
-            <a:pPr algn="ctr"/>
-            <a:r>
-              <a:rPr lang="en-US" sz="1050" dirty="0" err="1">
-                <a:solidFill>
-                  <a:schemeClr val="bg1"/>
-                </a:solidFill>
-              </a:rPr>
-              <a:t>StorageFile</a:t>
-            </a:r>
-            <a:endParaRPr lang="en-SG" sz="1050" dirty="0">
-              <a:solidFill>
-                <a:schemeClr val="bg1"/>
-              </a:solidFill>
-            </a:endParaRPr>
-          </a:p>
-        </p:txBody>
-      </p:sp>
-      <p:cxnSp>
-        <p:nvCxnSpPr>
-          <p:cNvPr id="35" name="Elbow Connector 34"/>
-          <p:cNvCxnSpPr>
-            <a:stCxn id="12" idx="1"/>
-            <a:endCxn id="9" idx="3"/>
-          </p:cNvCxnSpPr>
-          <p:nvPr/>
-        </p:nvCxnSpPr>
-        <p:spPr>
-          <a:xfrm rot="10800000" flipV="1">
-            <a:off x="812799" y="4087188"/>
-            <a:ext cx="331174" cy="6631"/>
-          </a:xfrm>
-          <a:prstGeom prst="bentConnector3">
-            <a:avLst>
-              <a:gd name="adj1" fmla="val 50000"/>
-            </a:avLst>
-          </a:prstGeom>
-          <a:ln w="19050">
-            <a:solidFill>
-              <a:srgbClr val="C00000"/>
-            </a:solidFill>
-            <a:headEnd type="none" w="med" len="med"/>
-            <a:tailEnd type="arrow" w="med" len="med"/>
-          </a:ln>
-          <a:effectLst/>
-        </p:spPr>
-        <p:style>
-          <a:lnRef idx="1">
-            <a:schemeClr val="accent2"/>
-          </a:lnRef>
-          <a:fillRef idx="2">
-            <a:schemeClr val="accent2"/>
-          </a:fillRef>
-          <a:effectRef idx="1">
-            <a:schemeClr val="accent2"/>
-          </a:effectRef>
-          <a:fontRef idx="minor">
-            <a:schemeClr val="dk1"/>
+            <a:schemeClr val="tx1"/>
           </a:fontRef>
         </p:style>
       </p:cxnSp>
       <p:cxnSp>
         <p:nvCxnSpPr>
-          <p:cNvPr id="38" name="Elbow Connector 37"/>
+          <p:cNvPr id="31" name="Straight Arrow Connector 30"/>
           <p:cNvCxnSpPr/>
           <p:nvPr/>
         </p:nvCxnSpPr>
         <p:spPr>
-          <a:xfrm rot="5400000" flipH="1" flipV="1">
-            <a:off x="2793471" y="3541515"/>
-            <a:ext cx="342611" cy="12700"/>
+          <a:xfrm>
+            <a:off x="5097447" y="3761908"/>
+            <a:ext cx="0" cy="381000"/>
           </a:xfrm>
-          <a:prstGeom prst="bentConnector3">
-            <a:avLst>
-              <a:gd name="adj1" fmla="val 50000"/>
-            </a:avLst>
+          <a:prstGeom prst="straightConnector1">
+            <a:avLst/>
           </a:prstGeom>
-          <a:ln w="19050">
+          <a:ln w="28575">
             <a:solidFill>
-              <a:srgbClr val="0070C0"/>
+              <a:schemeClr val="accent5">
+                <a:lumMod val="75000"/>
+              </a:schemeClr>
             </a:solidFill>
-            <a:prstDash val="dash"/>
-            <a:headEnd type="none" w="med" len="med"/>
-            <a:tailEnd type="arrow" w="med" len="med"/>
+            <a:prstDash val="sysDot"/>
+            <a:tailEnd type="arrow"/>
           </a:ln>
-          <a:effectLst/>
         </p:spPr>
         <p:style>
           <a:lnRef idx="1">
-            <a:schemeClr val="accent2"/>
+            <a:schemeClr val="accent1"/>
           </a:lnRef>
-          <a:fillRef idx="2">
-            <a:schemeClr val="accent2"/>
+          <a:fillRef idx="0">
+            <a:schemeClr val="accent1"/>
           </a:fillRef>
-          <a:effectRef idx="1">
-            <a:schemeClr val="accent2"/>
+          <a:effectRef idx="0">
+            <a:schemeClr val="accent1"/>
           </a:effectRef>
           <a:fontRef idx="minor">
-            <a:schemeClr val="dk1"/>
+            <a:schemeClr val="tx1"/>
           </a:fontRef>
         </p:style>
       </p:cxnSp>
       <p:cxnSp>
         <p:nvCxnSpPr>
-          <p:cNvPr id="41" name="Elbow Connector 40"/>
-          <p:cNvCxnSpPr>
-            <a:stCxn id="66" idx="2"/>
-            <a:endCxn id="23" idx="0"/>
-          </p:cNvCxnSpPr>
+          <p:cNvPr id="33" name="Straight Arrow Connector 32"/>
+          <p:cNvCxnSpPr/>
           <p:nvPr/>
         </p:nvCxnSpPr>
         <p:spPr>
-          <a:xfrm rot="5400000">
-            <a:off x="2646817" y="4301983"/>
-            <a:ext cx="316975" cy="12700"/>
+          <a:xfrm>
+            <a:off x="5249847" y="3750994"/>
+            <a:ext cx="0" cy="381000"/>
           </a:xfrm>
-          <a:prstGeom prst="bentConnector3">
-            <a:avLst>
-              <a:gd name="adj1" fmla="val 50000"/>
-            </a:avLst>
+          <a:prstGeom prst="straightConnector1">
+            <a:avLst/>
           </a:prstGeom>
-          <a:ln w="19050">
+          <a:ln w="28575">
             <a:solidFill>
-              <a:srgbClr val="0070C0"/>
+              <a:schemeClr val="accent5">
+                <a:lumMod val="75000"/>
+              </a:schemeClr>
             </a:solidFill>
-            <a:headEnd type="none" w="med" len="med"/>
-            <a:tailEnd type="arrow" w="med" len="med"/>
+            <a:prstDash val="sysDot"/>
+            <a:tailEnd type="arrow"/>
           </a:ln>
-          <a:effectLst/>
         </p:spPr>
         <p:style>
           <a:lnRef idx="1">
-            <a:schemeClr val="accent2"/>
+            <a:schemeClr val="accent1"/>
           </a:lnRef>
-          <a:fillRef idx="2">
-            <a:schemeClr val="accent2"/>
+          <a:fillRef idx="0">
+            <a:schemeClr val="accent1"/>
           </a:fillRef>
-          <a:effectRef idx="1">
-            <a:schemeClr val="accent2"/>
+          <a:effectRef idx="0">
+            <a:schemeClr val="accent1"/>
           </a:effectRef>
           <a:fontRef idx="minor">
-            <a:schemeClr val="dk1"/>
+            <a:schemeClr val="tx1"/>
           </a:fontRef>
         </p:style>
       </p:cxnSp>
       <p:cxnSp>
         <p:nvCxnSpPr>
-          <p:cNvPr id="51" name="Elbow Connector 50"/>
+          <p:cNvPr id="37" name="Straight Arrow Connector 36"/>
           <p:cNvCxnSpPr>
-            <a:stCxn id="106" idx="3"/>
-            <a:endCxn id="16" idx="1"/>
+            <a:stCxn id="23" idx="1"/>
           </p:cNvCxnSpPr>
           <p:nvPr/>
         </p:nvCxnSpPr>
         <p:spPr>
           <a:xfrm>
-            <a:off x="4648442" y="3918486"/>
-            <a:ext cx="424477" cy="607579"/>
-          </a:xfrm>
-          <a:prstGeom prst="bentConnector3">
-            <a:avLst>
-              <a:gd name="adj1" fmla="val 52660"/>
-            </a:avLst>
-          </a:prstGeom>
-          <a:ln w="19050">
-            <a:headEnd type="none" w="med" len="med"/>
-            <a:tailEnd type="arrow" w="med" len="med"/>
-          </a:ln>
-          <a:effectLst/>
-        </p:spPr>
-        <p:style>
-          <a:lnRef idx="1">
-            <a:schemeClr val="accent6"/>
-          </a:lnRef>
-          <a:fillRef idx="2">
-            <a:schemeClr val="accent6"/>
-          </a:fillRef>
-          <a:effectRef idx="1">
-            <a:schemeClr val="accent6"/>
-          </a:effectRef>
-          <a:fontRef idx="minor">
-            <a:schemeClr val="dk1"/>
-          </a:fontRef>
-        </p:style>
-      </p:cxnSp>
-      <p:sp>
-        <p:nvSpPr>
-          <p:cNvPr id="100" name="Flowchart: Decision 99"/>
-          <p:cNvSpPr/>
-          <p:nvPr/>
-        </p:nvSpPr>
-        <p:spPr>
-          <a:xfrm>
-            <a:off x="6012352" y="4439375"/>
-            <a:ext cx="236048" cy="173380"/>
-          </a:xfrm>
-          <a:prstGeom prst="flowChartDecision">
-            <a:avLst/>
-          </a:prstGeom>
-          <a:noFill/>
-          <a:ln w="19050"/>
-          <a:effectLst/>
-        </p:spPr>
-        <p:style>
-          <a:lnRef idx="1">
-            <a:schemeClr val="accent6"/>
-          </a:lnRef>
-          <a:fillRef idx="2">
-            <a:schemeClr val="accent6"/>
-          </a:fillRef>
-          <a:effectRef idx="1">
-            <a:schemeClr val="accent6"/>
-          </a:effectRef>
-          <a:fontRef idx="minor">
-            <a:schemeClr val="dk1"/>
-          </a:fontRef>
-        </p:style>
-        <p:txBody>
-          <a:bodyPr rtlCol="0" anchor="ctr"/>
-          <a:lstStyle/>
-          <a:p>
-            <a:pPr algn="ctr"/>
-            <a:endParaRPr lang="en-US" sz="1050"/>
-          </a:p>
-        </p:txBody>
-      </p:sp>
-      <p:sp>
-        <p:nvSpPr>
-          <p:cNvPr id="106" name="Flowchart: Decision 105"/>
-          <p:cNvSpPr/>
-          <p:nvPr/>
-        </p:nvSpPr>
-        <p:spPr>
-          <a:xfrm>
-            <a:off x="4412394" y="3831796"/>
-            <a:ext cx="236048" cy="173380"/>
-          </a:xfrm>
-          <a:prstGeom prst="flowChartDecision">
-            <a:avLst/>
-          </a:prstGeom>
-          <a:solidFill>
-            <a:schemeClr val="accent6"/>
-          </a:solidFill>
-          <a:ln w="19050"/>
-          <a:effectLst/>
-        </p:spPr>
-        <p:style>
-          <a:lnRef idx="1">
-            <a:schemeClr val="accent6"/>
-          </a:lnRef>
-          <a:fillRef idx="2">
-            <a:schemeClr val="accent6"/>
-          </a:fillRef>
-          <a:effectRef idx="1">
-            <a:schemeClr val="accent6"/>
-          </a:effectRef>
-          <a:fontRef idx="minor">
-            <a:schemeClr val="dk1"/>
-          </a:fontRef>
-        </p:style>
-        <p:txBody>
-          <a:bodyPr rtlCol="0" anchor="ctr"/>
-          <a:lstStyle/>
-          <a:p>
-            <a:pPr algn="ctr"/>
-            <a:endParaRPr lang="en-US" sz="1050"/>
-          </a:p>
-        </p:txBody>
-      </p:sp>
-      <p:cxnSp>
-        <p:nvCxnSpPr>
-          <p:cNvPr id="115" name="Straight Arrow Connector 114"/>
-          <p:cNvCxnSpPr>
-            <a:stCxn id="100" idx="3"/>
-            <a:endCxn id="19" idx="1"/>
-          </p:cNvCxnSpPr>
-          <p:nvPr/>
-        </p:nvCxnSpPr>
-        <p:spPr>
-          <a:xfrm>
-            <a:off x="6248400" y="4526065"/>
-            <a:ext cx="389308" cy="0"/>
+            <a:off x="2743200" y="4244913"/>
+            <a:ext cx="249770" cy="0"/>
           </a:xfrm>
           <a:prstGeom prst="straightConnector1">
             <a:avLst/>
           </a:prstGeom>
-          <a:ln w="19050">
-            <a:headEnd type="none" w="med" len="med"/>
-            <a:tailEnd type="arrow" w="med" len="med"/>
+          <a:ln w="28575">
+            <a:solidFill>
+              <a:srgbClr val="C00000"/>
+            </a:solidFill>
+            <a:prstDash val="solid"/>
+            <a:tailEnd type="arrow"/>
           </a:ln>
-          <a:effectLst/>
         </p:spPr>
         <p:style>
           <a:lnRef idx="1">
-            <a:schemeClr val="accent6"/>
+            <a:schemeClr val="accent1"/>
           </a:lnRef>
-          <a:fillRef idx="2">
-            <a:schemeClr val="accent6"/>
+          <a:fillRef idx="0">
+            <a:schemeClr val="accent1"/>
           </a:fillRef>
-          <a:effectRef idx="1">
-            <a:schemeClr val="accent6"/>
+          <a:effectRef idx="0">
+            <a:schemeClr val="accent1"/>
           </a:effectRef>
           <a:fontRef idx="minor">
-            <a:schemeClr val="dk1"/>
-          </a:fontRef>
-        </p:style>
-      </p:cxnSp>
-      <p:sp>
-        <p:nvSpPr>
-          <p:cNvPr id="129" name="Rectangle 128"/>
-          <p:cNvSpPr/>
-          <p:nvPr/>
-        </p:nvSpPr>
-        <p:spPr>
-          <a:xfrm>
-            <a:off x="6363802" y="5140408"/>
-            <a:ext cx="1408598" cy="346760"/>
-          </a:xfrm>
-          <a:prstGeom prst="rect">
-            <a:avLst/>
-          </a:prstGeom>
-          <a:ln w="19050"/>
-          <a:effectLst/>
-        </p:spPr>
-        <p:style>
-          <a:lnRef idx="1">
-            <a:schemeClr val="accent4"/>
-          </a:lnRef>
-          <a:fillRef idx="2">
-            <a:schemeClr val="accent4"/>
-          </a:fillRef>
-          <a:effectRef idx="1">
-            <a:schemeClr val="accent4"/>
-          </a:effectRef>
-          <a:fontRef idx="minor">
-            <a:schemeClr val="dk1"/>
-          </a:fontRef>
-        </p:style>
-        <p:txBody>
-          <a:bodyPr rtlCol="0" anchor="ctr"/>
-          <a:lstStyle/>
-          <a:p>
-            <a:pPr algn="ctr"/>
-            <a:r>
-              <a:rPr lang="en-US" sz="1050" dirty="0"/>
-              <a:t>&lt;&lt;interface&gt;&gt;</a:t>
-            </a:r>
-          </a:p>
-          <a:p>
-            <a:pPr algn="ctr"/>
-            <a:r>
-              <a:rPr lang="en-US" sz="1050" dirty="0" err="1"/>
-              <a:t>ReadOnlySlot</a:t>
-            </a:r>
-            <a:endParaRPr lang="en-SG" sz="1050" dirty="0"/>
-          </a:p>
-        </p:txBody>
-      </p:sp>
-      <p:cxnSp>
-        <p:nvCxnSpPr>
-          <p:cNvPr id="132" name="Elbow Connector 131"/>
-          <p:cNvCxnSpPr>
-            <a:endCxn id="129" idx="1"/>
-          </p:cNvCxnSpPr>
-          <p:nvPr/>
-        </p:nvCxnSpPr>
-        <p:spPr>
-          <a:xfrm>
-            <a:off x="304800" y="3006041"/>
-            <a:ext cx="6059002" cy="2307747"/>
-          </a:xfrm>
-          <a:prstGeom prst="bentConnector3">
-            <a:avLst>
-              <a:gd name="adj1" fmla="val 0"/>
-            </a:avLst>
-          </a:prstGeom>
-          <a:ln w="19050">
-            <a:solidFill>
-              <a:srgbClr val="C00000"/>
-            </a:solidFill>
-            <a:prstDash val="dash"/>
-            <a:headEnd type="none" w="med" len="med"/>
-            <a:tailEnd type="arrow" w="med" len="med"/>
-          </a:ln>
-          <a:effectLst/>
-        </p:spPr>
-        <p:style>
-          <a:lnRef idx="1">
-            <a:schemeClr val="accent2"/>
-          </a:lnRef>
-          <a:fillRef idx="2">
-            <a:schemeClr val="accent2"/>
-          </a:fillRef>
-          <a:effectRef idx="1">
-            <a:schemeClr val="accent2"/>
-          </a:effectRef>
-          <a:fontRef idx="minor">
-            <a:schemeClr val="dk1"/>
-          </a:fontRef>
-        </p:style>
-      </p:cxnSp>
-      <p:sp>
-        <p:nvSpPr>
-          <p:cNvPr id="135" name="Isosceles Triangle 134"/>
-          <p:cNvSpPr/>
-          <p:nvPr/>
-        </p:nvSpPr>
-        <p:spPr>
-          <a:xfrm rot="10800000">
-            <a:off x="6964221" y="4953000"/>
-            <a:ext cx="270504" cy="175523"/>
-          </a:xfrm>
-          <a:prstGeom prst="triangle">
-            <a:avLst/>
-          </a:prstGeom>
-          <a:ln w="19050"/>
-          <a:effectLst/>
-        </p:spPr>
-        <p:style>
-          <a:lnRef idx="1">
-            <a:schemeClr val="accent4"/>
-          </a:lnRef>
-          <a:fillRef idx="2">
-            <a:schemeClr val="accent4"/>
-          </a:fillRef>
-          <a:effectRef idx="1">
-            <a:schemeClr val="accent4"/>
-          </a:effectRef>
-          <a:fontRef idx="minor">
-            <a:schemeClr val="dk1"/>
-          </a:fontRef>
-        </p:style>
-        <p:txBody>
-          <a:bodyPr rtlCol="0" anchor="ctr"/>
-          <a:lstStyle/>
-          <a:p>
-            <a:pPr algn="ctr"/>
-            <a:endParaRPr lang="en-SG" sz="1050"/>
-          </a:p>
-        </p:txBody>
-      </p:sp>
-      <p:cxnSp>
-        <p:nvCxnSpPr>
-          <p:cNvPr id="136" name="Elbow Connector 135"/>
-          <p:cNvCxnSpPr>
-            <a:stCxn id="19" idx="2"/>
-            <a:endCxn id="135" idx="3"/>
-          </p:cNvCxnSpPr>
-          <p:nvPr/>
-        </p:nvCxnSpPr>
-        <p:spPr>
-          <a:xfrm rot="5400000">
-            <a:off x="6974138" y="4824781"/>
-            <a:ext cx="253555" cy="2883"/>
-          </a:xfrm>
-          <a:prstGeom prst="bentConnector3">
-            <a:avLst>
-              <a:gd name="adj1" fmla="val 50000"/>
-            </a:avLst>
-          </a:prstGeom>
-          <a:ln w="19050">
-            <a:solidFill>
-              <a:srgbClr val="7030A0"/>
-            </a:solidFill>
-            <a:prstDash val="dash"/>
-            <a:headEnd type="none" w="med" len="med"/>
-            <a:tailEnd type="none" w="med" len="med"/>
-          </a:ln>
-          <a:effectLst/>
-        </p:spPr>
-        <p:style>
-          <a:lnRef idx="1">
-            <a:schemeClr val="accent6"/>
-          </a:lnRef>
-          <a:fillRef idx="2">
-            <a:schemeClr val="accent6"/>
-          </a:fillRef>
-          <a:effectRef idx="1">
-            <a:schemeClr val="accent6"/>
-          </a:effectRef>
-          <a:fontRef idx="minor">
-            <a:schemeClr val="dk1"/>
-          </a:fontRef>
-        </p:style>
-      </p:cxnSp>
-      <p:sp>
-        <p:nvSpPr>
-          <p:cNvPr id="46" name="Rectangle 45"/>
-          <p:cNvSpPr/>
-          <p:nvPr/>
-        </p:nvSpPr>
-        <p:spPr>
-          <a:xfrm>
-            <a:off x="3985078" y="1356188"/>
-            <a:ext cx="1611867" cy="444640"/>
-          </a:xfrm>
-          <a:prstGeom prst="rect">
-            <a:avLst/>
-          </a:prstGeom>
-          <a:solidFill>
-            <a:schemeClr val="accent5"/>
-          </a:solidFill>
-          <a:ln w="19050">
-            <a:solidFill>
-              <a:schemeClr val="accent5"/>
-            </a:solidFill>
-          </a:ln>
-          <a:effectLst/>
-        </p:spPr>
-        <p:style>
-          <a:lnRef idx="1">
-            <a:schemeClr val="accent5"/>
-          </a:lnRef>
-          <a:fillRef idx="2">
-            <a:schemeClr val="accent5"/>
-          </a:fillRef>
-          <a:effectRef idx="1">
-            <a:schemeClr val="accent5"/>
-          </a:effectRef>
-          <a:fontRef idx="minor">
-            <a:schemeClr val="dk1"/>
-          </a:fontRef>
-        </p:style>
-        <p:txBody>
-          <a:bodyPr rtlCol="0" anchor="ctr"/>
-          <a:lstStyle/>
-          <a:p>
-            <a:pPr algn="ctr"/>
-            <a:r>
-              <a:rPr lang="en-US" sz="1050" dirty="0">
-                <a:solidFill>
-                  <a:schemeClr val="bg1"/>
-                </a:solidFill>
-              </a:rPr>
-              <a:t>{abstract}</a:t>
-            </a:r>
-            <a:br>
-              <a:rPr lang="en-US" sz="1050" dirty="0">
-                <a:solidFill>
-                  <a:schemeClr val="bg1"/>
-                </a:solidFill>
-              </a:rPr>
-            </a:br>
-            <a:r>
-              <a:rPr lang="en-US" sz="1050" dirty="0">
-                <a:solidFill>
-                  <a:schemeClr val="bg1"/>
-                </a:solidFill>
-              </a:rPr>
-              <a:t>Command</a:t>
-            </a:r>
-            <a:endParaRPr lang="en-SG" sz="1050" dirty="0">
-              <a:solidFill>
-                <a:schemeClr val="bg1"/>
-              </a:solidFill>
-            </a:endParaRPr>
-          </a:p>
-        </p:txBody>
-      </p:sp>
-      <p:sp>
-        <p:nvSpPr>
-          <p:cNvPr id="50" name="Rectangle 49"/>
-          <p:cNvSpPr/>
-          <p:nvPr/>
-        </p:nvSpPr>
-        <p:spPr>
-          <a:xfrm flipH="1">
-            <a:off x="6142650" y="1059080"/>
-            <a:ext cx="1404109" cy="346760"/>
-          </a:xfrm>
-          <a:prstGeom prst="rect">
-            <a:avLst/>
-          </a:prstGeom>
-          <a:ln w="19050"/>
-          <a:effectLst/>
-        </p:spPr>
-        <p:style>
-          <a:lnRef idx="1">
-            <a:schemeClr val="accent5"/>
-          </a:lnRef>
-          <a:fillRef idx="2">
-            <a:schemeClr val="accent5"/>
-          </a:fillRef>
-          <a:effectRef idx="1">
-            <a:schemeClr val="accent5"/>
-          </a:effectRef>
-          <a:fontRef idx="minor">
-            <a:schemeClr val="dk1"/>
-          </a:fontRef>
-        </p:style>
-        <p:txBody>
-          <a:bodyPr rtlCol="0" anchor="ctr"/>
-          <a:lstStyle/>
-          <a:p>
-            <a:pPr algn="ctr"/>
-            <a:r>
-              <a:rPr lang="en-US" sz="1050" dirty="0" err="1"/>
-              <a:t>DeleteCommand</a:t>
-            </a:r>
-            <a:endParaRPr lang="en-SG" sz="1050" dirty="0"/>
-          </a:p>
-        </p:txBody>
-      </p:sp>
-      <p:sp>
-        <p:nvSpPr>
-          <p:cNvPr id="52" name="Rectangle 51"/>
-          <p:cNvSpPr/>
-          <p:nvPr/>
-        </p:nvSpPr>
-        <p:spPr>
-          <a:xfrm flipH="1">
-            <a:off x="6142650" y="1454067"/>
-            <a:ext cx="1404109" cy="346760"/>
-          </a:xfrm>
-          <a:prstGeom prst="rect">
-            <a:avLst/>
-          </a:prstGeom>
-          <a:ln w="19050"/>
-          <a:effectLst/>
-        </p:spPr>
-        <p:style>
-          <a:lnRef idx="1">
-            <a:schemeClr val="accent5"/>
-          </a:lnRef>
-          <a:fillRef idx="2">
-            <a:schemeClr val="accent5"/>
-          </a:fillRef>
-          <a:effectRef idx="1">
-            <a:schemeClr val="accent5"/>
-          </a:effectRef>
-          <a:fontRef idx="minor">
-            <a:schemeClr val="dk1"/>
-          </a:fontRef>
-        </p:style>
-        <p:txBody>
-          <a:bodyPr rtlCol="0" anchor="ctr"/>
-          <a:lstStyle/>
-          <a:p>
-            <a:pPr algn="ctr"/>
-            <a:r>
-              <a:rPr lang="en-US" sz="1050" dirty="0" err="1"/>
-              <a:t>ClearCommand</a:t>
-            </a:r>
-            <a:endParaRPr lang="en-SG" sz="1050" dirty="0"/>
-          </a:p>
-        </p:txBody>
-      </p:sp>
-      <p:sp>
-        <p:nvSpPr>
-          <p:cNvPr id="53" name="Rectangle 52"/>
-          <p:cNvSpPr/>
-          <p:nvPr/>
-        </p:nvSpPr>
-        <p:spPr>
-          <a:xfrm flipH="1">
-            <a:off x="6149690" y="3029424"/>
-            <a:ext cx="1404109" cy="346760"/>
-          </a:xfrm>
-          <a:prstGeom prst="rect">
-            <a:avLst/>
-          </a:prstGeom>
-          <a:ln w="19050"/>
-          <a:effectLst/>
-        </p:spPr>
-        <p:style>
-          <a:lnRef idx="1">
-            <a:schemeClr val="accent5"/>
-          </a:lnRef>
-          <a:fillRef idx="2">
-            <a:schemeClr val="accent5"/>
-          </a:fillRef>
-          <a:effectRef idx="1">
-            <a:schemeClr val="accent5"/>
-          </a:effectRef>
-          <a:fontRef idx="minor">
-            <a:schemeClr val="dk1"/>
-          </a:fontRef>
-        </p:style>
-        <p:txBody>
-          <a:bodyPr rtlCol="0" anchor="ctr"/>
-          <a:lstStyle/>
-          <a:p>
-            <a:pPr algn="ctr"/>
-            <a:r>
-              <a:rPr lang="en-US" sz="1050" dirty="0" err="1"/>
-              <a:t>IncorrectCommand</a:t>
-            </a:r>
-            <a:endParaRPr lang="en-SG" sz="1050" dirty="0"/>
-          </a:p>
-        </p:txBody>
-      </p:sp>
-      <p:sp>
-        <p:nvSpPr>
-          <p:cNvPr id="54" name="Isosceles Triangle 53"/>
-          <p:cNvSpPr/>
-          <p:nvPr/>
-        </p:nvSpPr>
-        <p:spPr>
-          <a:xfrm rot="16200000">
-            <a:off x="5549453" y="1571491"/>
-            <a:ext cx="270504" cy="175523"/>
-          </a:xfrm>
-          <a:prstGeom prst="triangle">
-            <a:avLst/>
-          </a:prstGeom>
-          <a:ln w="19050"/>
-          <a:effectLst/>
-        </p:spPr>
-        <p:style>
-          <a:lnRef idx="1">
-            <a:schemeClr val="accent5"/>
-          </a:lnRef>
-          <a:fillRef idx="2">
-            <a:schemeClr val="accent5"/>
-          </a:fillRef>
-          <a:effectRef idx="1">
-            <a:schemeClr val="accent5"/>
-          </a:effectRef>
-          <a:fontRef idx="minor">
-            <a:schemeClr val="dk1"/>
-          </a:fontRef>
-        </p:style>
-        <p:txBody>
-          <a:bodyPr rtlCol="0" anchor="ctr"/>
-          <a:lstStyle/>
-          <a:p>
-            <a:pPr algn="ctr"/>
-            <a:endParaRPr lang="en-SG" sz="1050"/>
-          </a:p>
-        </p:txBody>
-      </p:sp>
-      <p:cxnSp>
-        <p:nvCxnSpPr>
-          <p:cNvPr id="55" name="Elbow Connector 54"/>
-          <p:cNvCxnSpPr>
-            <a:stCxn id="54" idx="3"/>
-            <a:endCxn id="52" idx="3"/>
-          </p:cNvCxnSpPr>
-          <p:nvPr/>
-        </p:nvCxnSpPr>
-        <p:spPr>
-          <a:xfrm flipV="1">
-            <a:off x="5772467" y="1627447"/>
-            <a:ext cx="370183" cy="31806"/>
-          </a:xfrm>
-          <a:prstGeom prst="bentConnector3">
-            <a:avLst>
-              <a:gd name="adj1" fmla="val 50000"/>
-            </a:avLst>
-          </a:prstGeom>
-          <a:noFill/>
-          <a:ln w="19050"/>
-          <a:effectLst/>
-        </p:spPr>
-        <p:style>
-          <a:lnRef idx="1">
-            <a:schemeClr val="accent5"/>
-          </a:lnRef>
-          <a:fillRef idx="2">
-            <a:schemeClr val="accent5"/>
-          </a:fillRef>
-          <a:effectRef idx="1">
-            <a:schemeClr val="accent5"/>
-          </a:effectRef>
-          <a:fontRef idx="minor">
-            <a:schemeClr val="dk1"/>
+            <a:schemeClr val="tx1"/>
           </a:fontRef>
         </p:style>
       </p:cxnSp>
       <p:cxnSp>
         <p:nvCxnSpPr>
-          <p:cNvPr id="56" name="Elbow Connector 55"/>
-          <p:cNvCxnSpPr>
-            <a:stCxn id="54" idx="3"/>
-            <a:endCxn id="50" idx="3"/>
-          </p:cNvCxnSpPr>
+          <p:cNvPr id="38" name="Straight Arrow Connector 37"/>
+          <p:cNvCxnSpPr/>
           <p:nvPr/>
         </p:nvCxnSpPr>
         <p:spPr>
-          <a:xfrm flipV="1">
-            <a:off x="5772467" y="1232460"/>
-            <a:ext cx="370183" cy="426793"/>
+          <a:xfrm rot="13867188">
+            <a:off x="2743200" y="3755022"/>
+            <a:ext cx="0" cy="381000"/>
           </a:xfrm>
-          <a:prstGeom prst="bentConnector3">
-            <a:avLst>
-              <a:gd name="adj1" fmla="val 50000"/>
-            </a:avLst>
+          <a:prstGeom prst="straightConnector1">
+            <a:avLst/>
           </a:prstGeom>
-          <a:noFill/>
-          <a:ln w="19050"/>
-          <a:effectLst/>
+          <a:ln w="28575">
+            <a:solidFill>
+              <a:srgbClr val="C00000"/>
+            </a:solidFill>
+            <a:prstDash val="solid"/>
+            <a:tailEnd type="arrow"/>
+          </a:ln>
         </p:spPr>
         <p:style>
           <a:lnRef idx="1">
-            <a:schemeClr val="accent5"/>
+            <a:schemeClr val="accent1"/>
           </a:lnRef>
-          <a:fillRef idx="2">
-            <a:schemeClr val="accent5"/>
+          <a:fillRef idx="0">
+            <a:schemeClr val="accent1"/>
           </a:fillRef>
-          <a:effectRef idx="1">
-            <a:schemeClr val="accent5"/>
+          <a:effectRef idx="0">
+            <a:schemeClr val="accent1"/>
           </a:effectRef>
           <a:fontRef idx="minor">
-            <a:schemeClr val="dk1"/>
+            <a:schemeClr val="tx1"/>
           </a:fontRef>
         </p:style>
       </p:cxnSp>
       <p:cxnSp>
         <p:nvCxnSpPr>
-          <p:cNvPr id="57" name="Elbow Connector 56"/>
-          <p:cNvCxnSpPr>
-            <a:stCxn id="54" idx="3"/>
-            <a:endCxn id="53" idx="3"/>
-          </p:cNvCxnSpPr>
-          <p:nvPr/>
-        </p:nvCxnSpPr>
-        <p:spPr>
-          <a:xfrm>
-            <a:off x="5772467" y="1659253"/>
-            <a:ext cx="377223" cy="1543551"/>
-          </a:xfrm>
-          <a:prstGeom prst="bentConnector3">
-            <a:avLst>
-              <a:gd name="adj1" fmla="val 50000"/>
-            </a:avLst>
-          </a:prstGeom>
-          <a:noFill/>
-          <a:ln w="19050"/>
-          <a:effectLst/>
-        </p:spPr>
-        <p:style>
-          <a:lnRef idx="1">
-            <a:schemeClr val="accent5"/>
-          </a:lnRef>
-          <a:fillRef idx="2">
-            <a:schemeClr val="accent5"/>
-          </a:fillRef>
-          <a:effectRef idx="1">
-            <a:schemeClr val="accent5"/>
-          </a:effectRef>
-          <a:fontRef idx="minor">
-            <a:schemeClr val="dk1"/>
-          </a:fontRef>
-        </p:style>
-      </p:cxnSp>
-      <p:cxnSp>
-        <p:nvCxnSpPr>
-          <p:cNvPr id="60" name="Elbow Connector 59"/>
-          <p:cNvCxnSpPr>
-            <a:cxnSpLocks/>
-            <a:stCxn id="54" idx="3"/>
-            <a:endCxn id="78" idx="3"/>
-          </p:cNvCxnSpPr>
-          <p:nvPr/>
-        </p:nvCxnSpPr>
-        <p:spPr>
-          <a:xfrm>
-            <a:off x="5772467" y="1659253"/>
-            <a:ext cx="370182" cy="358247"/>
-          </a:xfrm>
-          <a:prstGeom prst="bentConnector3">
-            <a:avLst>
-              <a:gd name="adj1" fmla="val 50000"/>
-            </a:avLst>
-          </a:prstGeom>
-          <a:noFill/>
-          <a:ln w="19050"/>
-          <a:effectLst/>
-        </p:spPr>
-        <p:style>
-          <a:lnRef idx="1">
-            <a:schemeClr val="accent5"/>
-          </a:lnRef>
-          <a:fillRef idx="2">
-            <a:schemeClr val="accent5"/>
-          </a:fillRef>
-          <a:effectRef idx="1">
-            <a:schemeClr val="accent5"/>
-          </a:effectRef>
-          <a:fontRef idx="minor">
-            <a:schemeClr val="dk1"/>
-          </a:fontRef>
-        </p:style>
-      </p:cxnSp>
-      <p:cxnSp>
-        <p:nvCxnSpPr>
-          <p:cNvPr id="67" name="Elbow Connector 66"/>
-          <p:cNvCxnSpPr>
-            <a:endCxn id="46" idx="1"/>
-          </p:cNvCxnSpPr>
-          <p:nvPr/>
-        </p:nvCxnSpPr>
-        <p:spPr>
-          <a:xfrm rot="5400000" flipH="1" flipV="1">
-            <a:off x="2764336" y="1785299"/>
-            <a:ext cx="1427532" cy="1013951"/>
-          </a:xfrm>
-          <a:prstGeom prst="bentConnector2">
-            <a:avLst/>
-          </a:prstGeom>
-          <a:ln w="19050">
-            <a:solidFill>
-              <a:srgbClr val="0070C0"/>
-            </a:solidFill>
-            <a:prstDash val="dash"/>
-            <a:headEnd type="none" w="med" len="med"/>
-            <a:tailEnd type="arrow" w="med" len="med"/>
-          </a:ln>
-          <a:effectLst/>
-        </p:spPr>
-        <p:style>
-          <a:lnRef idx="1">
-            <a:schemeClr val="accent2"/>
-          </a:lnRef>
-          <a:fillRef idx="2">
-            <a:schemeClr val="accent2"/>
-          </a:fillRef>
-          <a:effectRef idx="1">
-            <a:schemeClr val="accent2"/>
-          </a:effectRef>
-          <a:fontRef idx="minor">
-            <a:schemeClr val="dk1"/>
-          </a:fontRef>
-        </p:style>
-      </p:cxnSp>
-      <p:cxnSp>
-        <p:nvCxnSpPr>
-          <p:cNvPr id="70" name="Elbow Connector 69"/>
-          <p:cNvCxnSpPr/>
-          <p:nvPr/>
-        </p:nvCxnSpPr>
-        <p:spPr>
-          <a:xfrm rot="5400000" flipH="1" flipV="1">
-            <a:off x="2182965" y="1908384"/>
-            <a:ext cx="2256600" cy="1347626"/>
-          </a:xfrm>
-          <a:prstGeom prst="bentConnector3">
-            <a:avLst>
-              <a:gd name="adj1" fmla="val 99901"/>
-            </a:avLst>
-          </a:prstGeom>
-          <a:ln w="19050">
-            <a:solidFill>
-              <a:srgbClr val="0070C0"/>
-            </a:solidFill>
-            <a:prstDash val="dash"/>
-            <a:headEnd type="none" w="med" len="med"/>
-            <a:tailEnd type="arrow" w="med" len="med"/>
-          </a:ln>
-          <a:effectLst/>
-        </p:spPr>
-        <p:style>
-          <a:lnRef idx="1">
-            <a:schemeClr val="accent2"/>
-          </a:lnRef>
-          <a:fillRef idx="2">
-            <a:schemeClr val="accent2"/>
-          </a:fillRef>
-          <a:effectRef idx="1">
-            <a:schemeClr val="accent2"/>
-          </a:effectRef>
-          <a:fontRef idx="minor">
-            <a:schemeClr val="dk1"/>
-          </a:fontRef>
-        </p:style>
-      </p:cxnSp>
-      <p:cxnSp>
-        <p:nvCxnSpPr>
-          <p:cNvPr id="73" name="Elbow Connector 72"/>
-          <p:cNvCxnSpPr/>
-          <p:nvPr/>
-        </p:nvCxnSpPr>
-        <p:spPr>
-          <a:xfrm rot="5400000">
-            <a:off x="3213414" y="2790743"/>
-            <a:ext cx="1889726" cy="6348"/>
-          </a:xfrm>
-          <a:prstGeom prst="bentConnector3">
-            <a:avLst>
-              <a:gd name="adj1" fmla="val 50000"/>
-            </a:avLst>
-          </a:prstGeom>
-          <a:ln w="19050">
-            <a:solidFill>
-              <a:schemeClr val="accent5"/>
-            </a:solidFill>
-            <a:prstDash val="dash"/>
-            <a:headEnd type="none" w="med" len="med"/>
-            <a:tailEnd type="arrow" w="med" len="med"/>
-          </a:ln>
-          <a:effectLst/>
-        </p:spPr>
-        <p:style>
-          <a:lnRef idx="1">
-            <a:schemeClr val="accent2"/>
-          </a:lnRef>
-          <a:fillRef idx="2">
-            <a:schemeClr val="accent2"/>
-          </a:fillRef>
-          <a:effectRef idx="1">
-            <a:schemeClr val="accent2"/>
-          </a:effectRef>
-          <a:fontRef idx="minor">
-            <a:schemeClr val="dk1"/>
-          </a:fontRef>
-        </p:style>
-      </p:cxnSp>
-      <p:sp>
-        <p:nvSpPr>
-          <p:cNvPr id="81" name="Rectangle 80"/>
-          <p:cNvSpPr/>
-          <p:nvPr/>
-        </p:nvSpPr>
-        <p:spPr>
-          <a:xfrm flipH="1">
-            <a:off x="2637450" y="720040"/>
-            <a:ext cx="1404109" cy="346760"/>
-          </a:xfrm>
-          <a:prstGeom prst="rect">
-            <a:avLst/>
-          </a:prstGeom>
-          <a:ln w="19050"/>
-          <a:effectLst/>
-        </p:spPr>
-        <p:style>
-          <a:lnRef idx="1">
-            <a:schemeClr val="accent5"/>
-          </a:lnRef>
-          <a:fillRef idx="2">
-            <a:schemeClr val="accent5"/>
-          </a:fillRef>
-          <a:effectRef idx="1">
-            <a:schemeClr val="accent5"/>
-          </a:effectRef>
-          <a:fontRef idx="minor">
-            <a:schemeClr val="dk1"/>
-          </a:fontRef>
-        </p:style>
-        <p:txBody>
-          <a:bodyPr rtlCol="0" anchor="ctr"/>
-          <a:lstStyle/>
-          <a:p>
-            <a:pPr algn="ctr"/>
-            <a:r>
-              <a:rPr lang="en-US" sz="1050" dirty="0" err="1"/>
-              <a:t>CommandResult</a:t>
-            </a:r>
-            <a:endParaRPr lang="en-SG" sz="1050" dirty="0"/>
-          </a:p>
-        </p:txBody>
-      </p:sp>
-      <p:cxnSp>
-        <p:nvCxnSpPr>
-          <p:cNvPr id="82" name="Elbow Connector 81"/>
-          <p:cNvCxnSpPr>
-            <a:stCxn id="46" idx="0"/>
-            <a:endCxn id="81" idx="1"/>
-          </p:cNvCxnSpPr>
-          <p:nvPr/>
-        </p:nvCxnSpPr>
-        <p:spPr>
-          <a:xfrm rot="16200000" flipV="1">
-            <a:off x="4184902" y="750077"/>
-            <a:ext cx="462768" cy="749453"/>
-          </a:xfrm>
-          <a:prstGeom prst="bentConnector2">
-            <a:avLst/>
-          </a:prstGeom>
-          <a:ln w="19050">
-            <a:solidFill>
-              <a:schemeClr val="accent5"/>
-            </a:solidFill>
-            <a:prstDash val="dash"/>
-            <a:headEnd type="none" w="med" len="med"/>
-            <a:tailEnd type="arrow" w="med" len="med"/>
-          </a:ln>
-          <a:effectLst/>
-        </p:spPr>
-        <p:style>
-          <a:lnRef idx="1">
-            <a:schemeClr val="accent2"/>
-          </a:lnRef>
-          <a:fillRef idx="2">
-            <a:schemeClr val="accent2"/>
-          </a:fillRef>
-          <a:effectRef idx="1">
-            <a:schemeClr val="accent2"/>
-          </a:effectRef>
-          <a:fontRef idx="minor">
-            <a:schemeClr val="dk1"/>
-          </a:fontRef>
-        </p:style>
-      </p:cxnSp>
-      <p:cxnSp>
-        <p:nvCxnSpPr>
-          <p:cNvPr id="84" name="Elbow Connector 83"/>
-          <p:cNvCxnSpPr>
-            <a:endCxn id="81" idx="3"/>
-          </p:cNvCxnSpPr>
-          <p:nvPr/>
-        </p:nvCxnSpPr>
-        <p:spPr>
-          <a:xfrm flipV="1">
-            <a:off x="304800" y="893420"/>
-            <a:ext cx="2332650" cy="1763378"/>
-          </a:xfrm>
-          <a:prstGeom prst="bentConnector3">
-            <a:avLst>
-              <a:gd name="adj1" fmla="val 109"/>
-            </a:avLst>
-          </a:prstGeom>
-          <a:ln w="19050">
-            <a:solidFill>
-              <a:srgbClr val="C00000"/>
-            </a:solidFill>
-            <a:prstDash val="dash"/>
-            <a:headEnd type="none" w="med" len="med"/>
-            <a:tailEnd type="arrow" w="med" len="med"/>
-          </a:ln>
-          <a:effectLst/>
-        </p:spPr>
-        <p:style>
-          <a:lnRef idx="1">
-            <a:schemeClr val="accent2"/>
-          </a:lnRef>
-          <a:fillRef idx="2">
-            <a:schemeClr val="accent2"/>
-          </a:fillRef>
-          <a:effectRef idx="1">
-            <a:schemeClr val="accent2"/>
-          </a:effectRef>
-          <a:fontRef idx="minor">
-            <a:schemeClr val="dk1"/>
-          </a:fontRef>
-        </p:style>
-      </p:cxnSp>
-      <p:sp>
-        <p:nvSpPr>
-          <p:cNvPr id="96" name="Rectangle 95"/>
-          <p:cNvSpPr/>
-          <p:nvPr/>
-        </p:nvSpPr>
-        <p:spPr>
-          <a:xfrm>
-            <a:off x="7803052" y="874142"/>
-            <a:ext cx="929296" cy="346760"/>
-          </a:xfrm>
-          <a:prstGeom prst="rect">
-            <a:avLst/>
-          </a:prstGeom>
-          <a:solidFill>
-            <a:schemeClr val="bg1"/>
-          </a:solidFill>
-          <a:ln w="19050">
-            <a:solidFill>
-              <a:schemeClr val="bg1">
-                <a:lumMod val="65000"/>
-              </a:schemeClr>
-            </a:solidFill>
-          </a:ln>
-          <a:effectLst/>
-        </p:spPr>
-        <p:style>
-          <a:lnRef idx="1">
-            <a:schemeClr val="accent3"/>
-          </a:lnRef>
-          <a:fillRef idx="2">
-            <a:schemeClr val="accent3"/>
-          </a:fillRef>
-          <a:effectRef idx="1">
-            <a:schemeClr val="accent3"/>
-          </a:effectRef>
-          <a:fontRef idx="minor">
-            <a:schemeClr val="dk1"/>
-          </a:fontRef>
-        </p:style>
-        <p:txBody>
-          <a:bodyPr rtlCol="0" anchor="ctr"/>
-          <a:lstStyle/>
-          <a:p>
-            <a:pPr algn="ctr"/>
-            <a:r>
-              <a:rPr lang="en-US" sz="1050" dirty="0">
-                <a:solidFill>
-                  <a:schemeClr val="bg1">
-                    <a:lumMod val="50000"/>
-                  </a:schemeClr>
-                </a:solidFill>
-              </a:rPr>
-              <a:t>Messages</a:t>
-            </a:r>
-            <a:endParaRPr lang="en-SG" sz="1050" dirty="0">
-              <a:solidFill>
-                <a:schemeClr val="bg1">
-                  <a:lumMod val="50000"/>
-                </a:schemeClr>
-              </a:solidFill>
-            </a:endParaRPr>
-          </a:p>
-        </p:txBody>
-      </p:sp>
-      <p:sp>
-        <p:nvSpPr>
-          <p:cNvPr id="98" name="Rectangle 97"/>
-          <p:cNvSpPr/>
-          <p:nvPr/>
-        </p:nvSpPr>
-        <p:spPr>
-          <a:xfrm>
-            <a:off x="7803052" y="1794505"/>
-            <a:ext cx="929296" cy="346760"/>
-          </a:xfrm>
-          <a:prstGeom prst="rect">
-            <a:avLst/>
-          </a:prstGeom>
-          <a:solidFill>
-            <a:schemeClr val="bg1"/>
-          </a:solidFill>
-          <a:ln w="19050">
-            <a:solidFill>
-              <a:schemeClr val="bg1">
-                <a:lumMod val="65000"/>
-              </a:schemeClr>
-            </a:solidFill>
-          </a:ln>
-          <a:effectLst/>
-        </p:spPr>
-        <p:style>
-          <a:lnRef idx="1">
-            <a:schemeClr val="accent3"/>
-          </a:lnRef>
-          <a:fillRef idx="2">
-            <a:schemeClr val="accent3"/>
-          </a:fillRef>
-          <a:effectRef idx="1">
-            <a:schemeClr val="accent3"/>
-          </a:effectRef>
-          <a:fontRef idx="minor">
-            <a:schemeClr val="dk1"/>
-          </a:fontRef>
-        </p:style>
-        <p:txBody>
-          <a:bodyPr rtlCol="0" anchor="ctr"/>
-          <a:lstStyle/>
-          <a:p>
-            <a:pPr algn="ctr"/>
-            <a:r>
-              <a:rPr lang="en-US" sz="1050" dirty="0" err="1">
-                <a:solidFill>
-                  <a:schemeClr val="bg1">
-                    <a:lumMod val="50000"/>
-                  </a:schemeClr>
-                </a:solidFill>
-              </a:rPr>
-              <a:t>Utils</a:t>
-            </a:r>
-            <a:endParaRPr lang="en-SG" sz="1050" dirty="0">
-              <a:solidFill>
-                <a:schemeClr val="bg1">
-                  <a:lumMod val="50000"/>
-                </a:schemeClr>
-              </a:solidFill>
-            </a:endParaRPr>
-          </a:p>
-        </p:txBody>
-      </p:sp>
-      <p:sp>
-        <p:nvSpPr>
-          <p:cNvPr id="99" name="Rectangle 98"/>
-          <p:cNvSpPr/>
-          <p:nvPr/>
-        </p:nvSpPr>
-        <p:spPr>
-          <a:xfrm>
-            <a:off x="5085126" y="3710497"/>
-            <a:ext cx="929296" cy="346760"/>
-          </a:xfrm>
-          <a:prstGeom prst="rect">
-            <a:avLst/>
-          </a:prstGeom>
-          <a:ln w="19050"/>
-          <a:effectLst/>
-        </p:spPr>
-        <p:style>
-          <a:lnRef idx="1">
-            <a:schemeClr val="accent6"/>
-          </a:lnRef>
-          <a:fillRef idx="2">
-            <a:schemeClr val="accent6"/>
-          </a:fillRef>
-          <a:effectRef idx="1">
-            <a:schemeClr val="accent6"/>
-          </a:effectRef>
-          <a:fontRef idx="minor">
-            <a:schemeClr val="dk1"/>
-          </a:fontRef>
-        </p:style>
-        <p:txBody>
-          <a:bodyPr rtlCol="0" anchor="ctr"/>
-          <a:lstStyle/>
-          <a:p>
-            <a:pPr algn="ctr"/>
-            <a:r>
-              <a:rPr lang="en-US" sz="1050" dirty="0"/>
-              <a:t>…Exception</a:t>
-            </a:r>
-            <a:endParaRPr lang="en-SG" sz="1050" dirty="0"/>
-          </a:p>
-        </p:txBody>
-      </p:sp>
-      <p:sp>
-        <p:nvSpPr>
-          <p:cNvPr id="101" name="Rectangle 100"/>
-          <p:cNvSpPr/>
-          <p:nvPr/>
-        </p:nvSpPr>
-        <p:spPr>
-          <a:xfrm>
-            <a:off x="3775013" y="4455640"/>
-            <a:ext cx="929296" cy="346760"/>
-          </a:xfrm>
-          <a:prstGeom prst="rect">
-            <a:avLst/>
-          </a:prstGeom>
-          <a:ln>
-            <a:solidFill>
-              <a:srgbClr val="00B050"/>
-            </a:solidFill>
-          </a:ln>
-          <a:effectLst/>
-        </p:spPr>
-        <p:style>
-          <a:lnRef idx="1">
-            <a:schemeClr val="accent3"/>
-          </a:lnRef>
-          <a:fillRef idx="2">
-            <a:schemeClr val="accent3"/>
-          </a:fillRef>
-          <a:effectRef idx="1">
-            <a:schemeClr val="accent3"/>
-          </a:effectRef>
-          <a:fontRef idx="minor">
-            <a:schemeClr val="dk1"/>
-          </a:fontRef>
-        </p:style>
-        <p:txBody>
-          <a:bodyPr rtlCol="0" anchor="ctr"/>
-          <a:lstStyle/>
-          <a:p>
-            <a:pPr algn="ctr"/>
-            <a:r>
-              <a:rPr lang="en-US" sz="1050" dirty="0"/>
-              <a:t>Adapted…</a:t>
-            </a:r>
-            <a:endParaRPr lang="en-SG" sz="1050" dirty="0"/>
-          </a:p>
-        </p:txBody>
-      </p:sp>
-      <p:cxnSp>
-        <p:nvCxnSpPr>
-          <p:cNvPr id="102" name="Elbow Connector 101"/>
-          <p:cNvCxnSpPr>
-            <a:stCxn id="23" idx="3"/>
-            <a:endCxn id="101" idx="1"/>
-          </p:cNvCxnSpPr>
-          <p:nvPr/>
-        </p:nvCxnSpPr>
-        <p:spPr>
-          <a:xfrm flipV="1">
-            <a:off x="3200400" y="4629020"/>
-            <a:ext cx="574613" cy="4831"/>
-          </a:xfrm>
-          <a:prstGeom prst="bentConnector3">
-            <a:avLst>
-              <a:gd name="adj1" fmla="val 50000"/>
-            </a:avLst>
-          </a:prstGeom>
-          <a:ln w="19050">
-            <a:solidFill>
-              <a:srgbClr val="00B050"/>
-            </a:solidFill>
-            <a:prstDash val="dash"/>
-            <a:headEnd type="none" w="med" len="med"/>
-            <a:tailEnd type="arrow" w="med" len="med"/>
-          </a:ln>
-          <a:effectLst/>
-        </p:spPr>
-        <p:style>
-          <a:lnRef idx="1">
-            <a:schemeClr val="accent2"/>
-          </a:lnRef>
-          <a:fillRef idx="2">
-            <a:schemeClr val="accent2"/>
-          </a:fillRef>
-          <a:effectRef idx="1">
-            <a:schemeClr val="accent2"/>
-          </a:effectRef>
-          <a:fontRef idx="minor">
-            <a:schemeClr val="dk1"/>
-          </a:fontRef>
-        </p:style>
-      </p:cxnSp>
-      <p:cxnSp>
-        <p:nvCxnSpPr>
-          <p:cNvPr id="87" name="Straight Arrow Connector 86"/>
+          <p:cNvPr id="39" name="Straight Arrow Connector 38"/>
           <p:cNvCxnSpPr/>
           <p:nvPr/>
         </p:nvCxnSpPr>
         <p:spPr>
           <a:xfrm flipV="1">
-            <a:off x="8107853" y="1199445"/>
-            <a:ext cx="0" cy="304800"/>
+            <a:off x="2353734" y="3697061"/>
+            <a:ext cx="0" cy="301859"/>
           </a:xfrm>
           <a:prstGeom prst="straightConnector1">
             <a:avLst/>
           </a:prstGeom>
-          <a:ln w="19050">
-            <a:solidFill>
-              <a:schemeClr val="bg1">
-                <a:lumMod val="65000"/>
-              </a:schemeClr>
-            </a:solidFill>
-            <a:prstDash val="dash"/>
-            <a:headEnd type="none" w="med" len="med"/>
-            <a:tailEnd type="arrow" w="med" len="med"/>
-          </a:ln>
-          <a:effectLst/>
-        </p:spPr>
-        <p:style>
-          <a:lnRef idx="1">
-            <a:schemeClr val="accent2"/>
-          </a:lnRef>
-          <a:fillRef idx="2">
-            <a:schemeClr val="accent2"/>
-          </a:fillRef>
-          <a:effectRef idx="1">
-            <a:schemeClr val="accent2"/>
-          </a:effectRef>
-          <a:fontRef idx="minor">
-            <a:schemeClr val="dk1"/>
-          </a:fontRef>
-        </p:style>
-      </p:cxnSp>
-      <p:cxnSp>
-        <p:nvCxnSpPr>
-          <p:cNvPr id="107" name="Straight Arrow Connector 106"/>
-          <p:cNvCxnSpPr/>
-          <p:nvPr/>
-        </p:nvCxnSpPr>
-        <p:spPr>
-          <a:xfrm flipV="1">
-            <a:off x="8260253" y="1199445"/>
-            <a:ext cx="0" cy="304800"/>
-          </a:xfrm>
-          <a:prstGeom prst="straightConnector1">
-            <a:avLst/>
-          </a:prstGeom>
-          <a:ln w="19050">
-            <a:solidFill>
-              <a:schemeClr val="bg1">
-                <a:lumMod val="65000"/>
-              </a:schemeClr>
-            </a:solidFill>
-            <a:prstDash val="dash"/>
-            <a:headEnd type="none" w="med" len="med"/>
-            <a:tailEnd type="arrow" w="med" len="med"/>
-          </a:ln>
-          <a:effectLst/>
-        </p:spPr>
-        <p:style>
-          <a:lnRef idx="1">
-            <a:schemeClr val="accent2"/>
-          </a:lnRef>
-          <a:fillRef idx="2">
-            <a:schemeClr val="accent2"/>
-          </a:fillRef>
-          <a:effectRef idx="1">
-            <a:schemeClr val="accent2"/>
-          </a:effectRef>
-          <a:fontRef idx="minor">
-            <a:schemeClr val="dk1"/>
-          </a:fontRef>
-        </p:style>
-      </p:cxnSp>
-      <p:cxnSp>
-        <p:nvCxnSpPr>
-          <p:cNvPr id="108" name="Straight Arrow Connector 107"/>
-          <p:cNvCxnSpPr/>
-          <p:nvPr/>
-        </p:nvCxnSpPr>
-        <p:spPr>
-          <a:xfrm flipV="1">
-            <a:off x="8412653" y="1199445"/>
-            <a:ext cx="0" cy="304800"/>
-          </a:xfrm>
-          <a:prstGeom prst="straightConnector1">
-            <a:avLst/>
-          </a:prstGeom>
-          <a:ln w="19050">
-            <a:solidFill>
-              <a:schemeClr val="bg1">
-                <a:lumMod val="65000"/>
-              </a:schemeClr>
-            </a:solidFill>
-            <a:prstDash val="dash"/>
-            <a:headEnd type="none" w="med" len="med"/>
-            <a:tailEnd type="arrow" w="med" len="med"/>
-          </a:ln>
-          <a:effectLst/>
-        </p:spPr>
-        <p:style>
-          <a:lnRef idx="1">
-            <a:schemeClr val="accent2"/>
-          </a:lnRef>
-          <a:fillRef idx="2">
-            <a:schemeClr val="accent2"/>
-          </a:fillRef>
-          <a:effectRef idx="1">
-            <a:schemeClr val="accent2"/>
-          </a:effectRef>
-          <a:fontRef idx="minor">
-            <a:schemeClr val="dk1"/>
-          </a:fontRef>
-        </p:style>
-      </p:cxnSp>
-      <p:cxnSp>
-        <p:nvCxnSpPr>
-          <p:cNvPr id="109" name="Straight Arrow Connector 108"/>
-          <p:cNvCxnSpPr/>
-          <p:nvPr/>
-        </p:nvCxnSpPr>
-        <p:spPr>
-          <a:xfrm flipV="1">
-            <a:off x="8074978" y="2119808"/>
-            <a:ext cx="0" cy="304800"/>
-          </a:xfrm>
-          <a:prstGeom prst="straightConnector1">
-            <a:avLst/>
-          </a:prstGeom>
-          <a:ln w="19050">
-            <a:solidFill>
-              <a:schemeClr val="bg1">
-                <a:lumMod val="65000"/>
-              </a:schemeClr>
-            </a:solidFill>
-            <a:prstDash val="dash"/>
-            <a:headEnd type="none" w="med" len="med"/>
-            <a:tailEnd type="arrow" w="med" len="med"/>
-          </a:ln>
-          <a:effectLst/>
-        </p:spPr>
-        <p:style>
-          <a:lnRef idx="1">
-            <a:schemeClr val="accent2"/>
-          </a:lnRef>
-          <a:fillRef idx="2">
-            <a:schemeClr val="accent2"/>
-          </a:fillRef>
-          <a:effectRef idx="1">
-            <a:schemeClr val="accent2"/>
-          </a:effectRef>
-          <a:fontRef idx="minor">
-            <a:schemeClr val="dk1"/>
-          </a:fontRef>
-        </p:style>
-      </p:cxnSp>
-      <p:cxnSp>
-        <p:nvCxnSpPr>
-          <p:cNvPr id="110" name="Straight Arrow Connector 109"/>
-          <p:cNvCxnSpPr/>
-          <p:nvPr/>
-        </p:nvCxnSpPr>
-        <p:spPr>
-          <a:xfrm flipV="1">
-            <a:off x="8227378" y="2119808"/>
-            <a:ext cx="0" cy="304800"/>
-          </a:xfrm>
-          <a:prstGeom prst="straightConnector1">
-            <a:avLst/>
-          </a:prstGeom>
-          <a:ln w="19050">
-            <a:solidFill>
-              <a:schemeClr val="bg1">
-                <a:lumMod val="65000"/>
-              </a:schemeClr>
-            </a:solidFill>
-            <a:prstDash val="dash"/>
-            <a:headEnd type="none" w="med" len="med"/>
-            <a:tailEnd type="arrow" w="med" len="med"/>
-          </a:ln>
-          <a:effectLst/>
-        </p:spPr>
-        <p:style>
-          <a:lnRef idx="1">
-            <a:schemeClr val="accent2"/>
-          </a:lnRef>
-          <a:fillRef idx="2">
-            <a:schemeClr val="accent2"/>
-          </a:fillRef>
-          <a:effectRef idx="1">
-            <a:schemeClr val="accent2"/>
-          </a:effectRef>
-          <a:fontRef idx="minor">
-            <a:schemeClr val="dk1"/>
-          </a:fontRef>
-        </p:style>
-      </p:cxnSp>
-      <p:cxnSp>
-        <p:nvCxnSpPr>
-          <p:cNvPr id="111" name="Straight Arrow Connector 110"/>
-          <p:cNvCxnSpPr/>
-          <p:nvPr/>
-        </p:nvCxnSpPr>
-        <p:spPr>
-          <a:xfrm flipV="1">
-            <a:off x="8379778" y="2119808"/>
-            <a:ext cx="0" cy="304800"/>
-          </a:xfrm>
-          <a:prstGeom prst="straightConnector1">
-            <a:avLst/>
-          </a:prstGeom>
-          <a:ln w="19050">
-            <a:solidFill>
-              <a:schemeClr val="bg1">
-                <a:lumMod val="65000"/>
-              </a:schemeClr>
-            </a:solidFill>
-            <a:prstDash val="dash"/>
-            <a:headEnd type="none" w="med" len="med"/>
-            <a:tailEnd type="arrow" w="med" len="med"/>
-          </a:ln>
-          <a:effectLst/>
-        </p:spPr>
-        <p:style>
-          <a:lnRef idx="1">
-            <a:schemeClr val="accent2"/>
-          </a:lnRef>
-          <a:fillRef idx="2">
-            <a:schemeClr val="accent2"/>
-          </a:fillRef>
-          <a:effectRef idx="1">
-            <a:schemeClr val="accent2"/>
-          </a:effectRef>
-          <a:fontRef idx="minor">
-            <a:schemeClr val="dk1"/>
-          </a:fontRef>
-        </p:style>
-      </p:cxnSp>
-      <p:sp>
-        <p:nvSpPr>
-          <p:cNvPr id="63" name="Rectangle 62"/>
-          <p:cNvSpPr/>
-          <p:nvPr/>
-        </p:nvSpPr>
-        <p:spPr>
-          <a:xfrm>
-            <a:off x="228600" y="2656798"/>
-            <a:ext cx="1746186" cy="346760"/>
-          </a:xfrm>
-          <a:prstGeom prst="rect">
-            <a:avLst/>
-          </a:prstGeom>
-          <a:solidFill>
-            <a:srgbClr val="C00000"/>
-          </a:solidFill>
-          <a:ln w="19050">
-            <a:solidFill>
-              <a:srgbClr val="C00000"/>
-            </a:solidFill>
-          </a:ln>
-          <a:effectLst/>
-        </p:spPr>
-        <p:style>
-          <a:lnRef idx="1">
-            <a:schemeClr val="accent2"/>
-          </a:lnRef>
-          <a:fillRef idx="2">
-            <a:schemeClr val="accent2"/>
-          </a:fillRef>
-          <a:effectRef idx="1">
-            <a:schemeClr val="accent2"/>
-          </a:effectRef>
-          <a:fontRef idx="minor">
-            <a:schemeClr val="dk1"/>
-          </a:fontRef>
-        </p:style>
-        <p:txBody>
-          <a:bodyPr rtlCol="0" anchor="ctr"/>
-          <a:lstStyle/>
-          <a:p>
-            <a:pPr algn="ctr"/>
-            <a:r>
-              <a:rPr lang="en-US" sz="1050" dirty="0" err="1">
-                <a:solidFill>
-                  <a:schemeClr val="bg1"/>
-                </a:solidFill>
-              </a:rPr>
-              <a:t>MainWindow</a:t>
-            </a:r>
-            <a:endParaRPr lang="en-SG" sz="1050" dirty="0">
-              <a:solidFill>
-                <a:schemeClr val="bg1"/>
-              </a:solidFill>
-            </a:endParaRPr>
-          </a:p>
-        </p:txBody>
-      </p:sp>
-      <p:cxnSp>
-        <p:nvCxnSpPr>
-          <p:cNvPr id="64" name="Elbow Connector 63"/>
-          <p:cNvCxnSpPr>
-            <a:stCxn id="9" idx="0"/>
-          </p:cNvCxnSpPr>
-          <p:nvPr/>
-        </p:nvCxnSpPr>
-        <p:spPr>
-          <a:xfrm rot="5400000" flipH="1" flipV="1">
-            <a:off x="161393" y="3469523"/>
-            <a:ext cx="901834" cy="1"/>
-          </a:xfrm>
-          <a:prstGeom prst="bentConnector3">
-            <a:avLst>
-              <a:gd name="adj1" fmla="val 50000"/>
-            </a:avLst>
-          </a:prstGeom>
-          <a:ln w="19050">
-            <a:solidFill>
-              <a:srgbClr val="C00000"/>
-            </a:solidFill>
-            <a:headEnd type="none" w="med" len="med"/>
-            <a:tailEnd type="arrow" w="med" len="med"/>
-          </a:ln>
-          <a:effectLst/>
-        </p:spPr>
-        <p:style>
-          <a:lnRef idx="1">
-            <a:schemeClr val="accent2"/>
-          </a:lnRef>
-          <a:fillRef idx="2">
-            <a:schemeClr val="accent2"/>
-          </a:fillRef>
-          <a:effectRef idx="1">
-            <a:schemeClr val="accent2"/>
-          </a:effectRef>
-          <a:fontRef idx="minor">
-            <a:schemeClr val="dk1"/>
-          </a:fontRef>
-        </p:style>
-      </p:cxnSp>
-      <p:sp>
-        <p:nvSpPr>
-          <p:cNvPr id="66" name="Rectangle 65"/>
-          <p:cNvSpPr/>
-          <p:nvPr/>
-        </p:nvSpPr>
-        <p:spPr>
-          <a:xfrm>
-            <a:off x="2410208" y="3700884"/>
-            <a:ext cx="790192" cy="442612"/>
-          </a:xfrm>
-          <a:prstGeom prst="rect">
-            <a:avLst/>
-          </a:prstGeom>
-          <a:solidFill>
-            <a:srgbClr val="0070C0"/>
-          </a:solidFill>
-          <a:ln w="19050">
-            <a:solidFill>
-              <a:srgbClr val="0070C0"/>
-            </a:solidFill>
-          </a:ln>
-          <a:effectLst/>
-        </p:spPr>
-        <p:style>
-          <a:lnRef idx="1">
-            <a:schemeClr val="accent2"/>
-          </a:lnRef>
-          <a:fillRef idx="2">
-            <a:schemeClr val="accent2"/>
-          </a:fillRef>
-          <a:effectRef idx="1">
-            <a:schemeClr val="accent2"/>
-          </a:effectRef>
-          <a:fontRef idx="minor">
-            <a:schemeClr val="dk1"/>
-          </a:fontRef>
-        </p:style>
-        <p:txBody>
-          <a:bodyPr rtlCol="0" anchor="ctr"/>
-          <a:lstStyle/>
-          <a:p>
-            <a:pPr algn="ctr"/>
-            <a:r>
-              <a:rPr lang="en-US" sz="1050" dirty="0">
-                <a:solidFill>
-                  <a:schemeClr val="bg1"/>
-                </a:solidFill>
-              </a:rPr>
-              <a:t>Logic</a:t>
-            </a:r>
-            <a:endParaRPr lang="en-SG" sz="1050" dirty="0">
-              <a:solidFill>
-                <a:schemeClr val="bg1"/>
-              </a:solidFill>
-            </a:endParaRPr>
-          </a:p>
-        </p:txBody>
-      </p:sp>
-      <p:cxnSp>
-        <p:nvCxnSpPr>
-          <p:cNvPr id="76" name="Straight Arrow Connector 75"/>
-          <p:cNvCxnSpPr>
-            <a:stCxn id="66" idx="3"/>
-            <a:endCxn id="13" idx="1"/>
-          </p:cNvCxnSpPr>
-          <p:nvPr/>
-        </p:nvCxnSpPr>
-        <p:spPr>
-          <a:xfrm flipV="1">
-            <a:off x="3200400" y="3920440"/>
-            <a:ext cx="282698" cy="1750"/>
-          </a:xfrm>
-          <a:prstGeom prst="straightConnector1">
-            <a:avLst/>
-          </a:prstGeom>
-          <a:ln w="19050">
-            <a:solidFill>
-              <a:srgbClr val="0070C0"/>
-            </a:solidFill>
-            <a:headEnd type="none" w="med" len="med"/>
-            <a:tailEnd type="arrow" w="med" len="med"/>
-          </a:ln>
-          <a:effectLst/>
-        </p:spPr>
-        <p:style>
-          <a:lnRef idx="1">
-            <a:schemeClr val="accent2"/>
-          </a:lnRef>
-          <a:fillRef idx="2">
-            <a:schemeClr val="accent2"/>
-          </a:fillRef>
-          <a:effectRef idx="1">
-            <a:schemeClr val="accent2"/>
-          </a:effectRef>
-          <a:fontRef idx="minor">
-            <a:schemeClr val="dk1"/>
-          </a:fontRef>
-        </p:style>
-      </p:cxnSp>
-      <p:sp>
-        <p:nvSpPr>
-          <p:cNvPr id="85" name="Rectangle 84"/>
-          <p:cNvSpPr/>
-          <p:nvPr/>
-        </p:nvSpPr>
-        <p:spPr>
-          <a:xfrm>
-            <a:off x="986679" y="1995549"/>
-            <a:ext cx="756639" cy="346760"/>
-          </a:xfrm>
-          <a:prstGeom prst="rect">
-            <a:avLst/>
-          </a:prstGeom>
-          <a:ln w="19050"/>
-          <a:effectLst/>
-        </p:spPr>
-        <p:style>
-          <a:lnRef idx="1">
-            <a:schemeClr val="accent2"/>
-          </a:lnRef>
-          <a:fillRef idx="2">
-            <a:schemeClr val="accent2"/>
-          </a:fillRef>
-          <a:effectRef idx="1">
-            <a:schemeClr val="accent2"/>
-          </a:effectRef>
-          <a:fontRef idx="minor">
-            <a:schemeClr val="dk1"/>
-          </a:fontRef>
-        </p:style>
-        <p:txBody>
-          <a:bodyPr rtlCol="0" anchor="ctr"/>
-          <a:lstStyle/>
-          <a:p>
-            <a:pPr algn="ctr"/>
-            <a:r>
-              <a:rPr lang="en-US" sz="1050" dirty="0"/>
-              <a:t>Formatter</a:t>
-            </a:r>
-            <a:endParaRPr lang="en-SG" sz="1050" dirty="0"/>
-          </a:p>
-        </p:txBody>
-      </p:sp>
-      <p:cxnSp>
-        <p:nvCxnSpPr>
-          <p:cNvPr id="86" name="Elbow Connector 85"/>
-          <p:cNvCxnSpPr>
-            <a:endCxn id="85" idx="2"/>
-          </p:cNvCxnSpPr>
-          <p:nvPr/>
-        </p:nvCxnSpPr>
-        <p:spPr>
-          <a:xfrm rot="16200000" flipV="1">
-            <a:off x="1201266" y="2506042"/>
-            <a:ext cx="336300" cy="8834"/>
-          </a:xfrm>
-          <a:prstGeom prst="bentConnector3">
-            <a:avLst>
-              <a:gd name="adj1" fmla="val 50000"/>
-            </a:avLst>
-          </a:prstGeom>
-          <a:ln w="19050">
-            <a:solidFill>
-              <a:srgbClr val="C00000"/>
-            </a:solidFill>
-            <a:prstDash val="dash"/>
-            <a:headEnd type="none" w="med" len="med"/>
-            <a:tailEnd type="arrow" w="med" len="med"/>
-          </a:ln>
-          <a:effectLst/>
-        </p:spPr>
-        <p:style>
-          <a:lnRef idx="1">
-            <a:schemeClr val="accent2"/>
-          </a:lnRef>
-          <a:fillRef idx="2">
-            <a:schemeClr val="accent2"/>
-          </a:fillRef>
-          <a:effectRef idx="1">
-            <a:schemeClr val="accent2"/>
-          </a:effectRef>
-          <a:fontRef idx="minor">
-            <a:schemeClr val="dk1"/>
-          </a:fontRef>
-        </p:style>
-      </p:cxnSp>
-      <p:sp>
-        <p:nvSpPr>
-          <p:cNvPr id="89" name="Rectangle 88"/>
-          <p:cNvSpPr/>
-          <p:nvPr/>
-        </p:nvSpPr>
-        <p:spPr>
-          <a:xfrm>
-            <a:off x="838200" y="3214749"/>
-            <a:ext cx="1071262" cy="346760"/>
-          </a:xfrm>
-          <a:prstGeom prst="rect">
-            <a:avLst/>
-          </a:prstGeom>
-          <a:ln w="19050"/>
-          <a:effectLst/>
-        </p:spPr>
-        <p:style>
-          <a:lnRef idx="1">
-            <a:schemeClr val="accent2"/>
-          </a:lnRef>
-          <a:fillRef idx="2">
-            <a:schemeClr val="accent2"/>
-          </a:fillRef>
-          <a:effectRef idx="1">
-            <a:schemeClr val="accent2"/>
-          </a:effectRef>
-          <a:fontRef idx="minor">
-            <a:schemeClr val="dk1"/>
-          </a:fontRef>
-        </p:style>
-        <p:txBody>
-          <a:bodyPr rtlCol="0" anchor="ctr"/>
-          <a:lstStyle/>
-          <a:p>
-            <a:pPr algn="ctr"/>
-            <a:r>
-              <a:rPr lang="en-US" sz="1050" dirty="0"/>
-              <a:t>&lt;&lt;interface&gt;&gt;</a:t>
-            </a:r>
-          </a:p>
-          <a:p>
-            <a:pPr algn="ctr"/>
-            <a:r>
-              <a:rPr lang="en-US" sz="1050" dirty="0"/>
-              <a:t>Stoppable</a:t>
-            </a:r>
-            <a:endParaRPr lang="en-SG" sz="1050" dirty="0"/>
-          </a:p>
-        </p:txBody>
-      </p:sp>
-      <p:cxnSp>
-        <p:nvCxnSpPr>
-          <p:cNvPr id="91" name="Elbow Connector 90"/>
-          <p:cNvCxnSpPr>
-            <a:stCxn id="89" idx="0"/>
-          </p:cNvCxnSpPr>
-          <p:nvPr/>
-        </p:nvCxnSpPr>
-        <p:spPr>
-          <a:xfrm rot="5400000" flipH="1" flipV="1">
-            <a:off x="1281047" y="3114967"/>
-            <a:ext cx="192567" cy="6999"/>
-          </a:xfrm>
-          <a:prstGeom prst="bentConnector3">
-            <a:avLst>
-              <a:gd name="adj1" fmla="val 50000"/>
-            </a:avLst>
-          </a:prstGeom>
-          <a:ln w="19050">
+          <a:ln w="28575">
             <a:solidFill>
               <a:srgbClr val="C00000"/>
             </a:solidFill>
             <a:prstDash val="solid"/>
-            <a:headEnd type="arrow" w="med" len="med"/>
-            <a:tailEnd type="none" w="med" len="med"/>
+            <a:tailEnd type="arrow"/>
           </a:ln>
-          <a:effectLst/>
         </p:spPr>
         <p:style>
           <a:lnRef idx="1">
-            <a:schemeClr val="accent2"/>
+            <a:schemeClr val="accent1"/>
           </a:lnRef>
-          <a:fillRef idx="2">
-            <a:schemeClr val="accent2"/>
+          <a:fillRef idx="0">
+            <a:schemeClr val="accent1"/>
           </a:fillRef>
-          <a:effectRef idx="1">
-            <a:schemeClr val="accent2"/>
+          <a:effectRef idx="0">
+            <a:schemeClr val="accent1"/>
           </a:effectRef>
           <a:fontRef idx="minor">
-            <a:schemeClr val="dk1"/>
-          </a:fontRef>
-        </p:style>
-      </p:cxnSp>
-      <p:sp>
-        <p:nvSpPr>
-          <p:cNvPr id="103" name="Isosceles Triangle 102"/>
-          <p:cNvSpPr/>
-          <p:nvPr/>
-        </p:nvSpPr>
-        <p:spPr>
-          <a:xfrm rot="10800000" flipV="1">
-            <a:off x="1296380" y="3561884"/>
-            <a:ext cx="270504" cy="175523"/>
-          </a:xfrm>
-          <a:prstGeom prst="triangle">
-            <a:avLst/>
-          </a:prstGeom>
-          <a:ln w="19050"/>
-          <a:effectLst/>
-        </p:spPr>
-        <p:style>
-          <a:lnRef idx="1">
-            <a:schemeClr val="accent2"/>
-          </a:lnRef>
-          <a:fillRef idx="2">
-            <a:schemeClr val="accent2"/>
-          </a:fillRef>
-          <a:effectRef idx="1">
-            <a:schemeClr val="accent2"/>
-          </a:effectRef>
-          <a:fontRef idx="minor">
-            <a:schemeClr val="dk1"/>
-          </a:fontRef>
-        </p:style>
-        <p:txBody>
-          <a:bodyPr rtlCol="0" anchor="ctr"/>
-          <a:lstStyle/>
-          <a:p>
-            <a:pPr algn="ctr"/>
-            <a:endParaRPr lang="en-SG" sz="1050"/>
-          </a:p>
-        </p:txBody>
-      </p:sp>
-      <p:cxnSp>
-        <p:nvCxnSpPr>
-          <p:cNvPr id="104" name="Elbow Connector 103"/>
-          <p:cNvCxnSpPr>
-            <a:stCxn id="103" idx="3"/>
-            <a:endCxn id="12" idx="0"/>
-          </p:cNvCxnSpPr>
-          <p:nvPr/>
-        </p:nvCxnSpPr>
-        <p:spPr>
-          <a:xfrm rot="16200000" flipH="1">
-            <a:off x="1344934" y="3824104"/>
-            <a:ext cx="176402" cy="3007"/>
-          </a:xfrm>
-          <a:prstGeom prst="bentConnector3">
-            <a:avLst>
-              <a:gd name="adj1" fmla="val 50000"/>
-            </a:avLst>
-          </a:prstGeom>
-          <a:ln w="19050">
-            <a:solidFill>
-              <a:srgbClr val="C00000"/>
-            </a:solidFill>
-            <a:prstDash val="dash"/>
-            <a:headEnd type="none" w="med" len="med"/>
-            <a:tailEnd type="none" w="med" len="med"/>
-          </a:ln>
-          <a:effectLst/>
-        </p:spPr>
-        <p:style>
-          <a:lnRef idx="1">
-            <a:schemeClr val="accent2"/>
-          </a:lnRef>
-          <a:fillRef idx="2">
-            <a:schemeClr val="accent2"/>
-          </a:fillRef>
-          <a:effectRef idx="1">
-            <a:schemeClr val="accent2"/>
-          </a:effectRef>
-          <a:fontRef idx="minor">
-            <a:schemeClr val="dk1"/>
-          </a:fontRef>
-        </p:style>
-      </p:cxnSp>
-      <p:cxnSp>
-        <p:nvCxnSpPr>
-          <p:cNvPr id="113" name="Elbow Connector 112"/>
-          <p:cNvCxnSpPr>
-            <a:stCxn id="63" idx="3"/>
-            <a:endCxn id="66" idx="1"/>
-          </p:cNvCxnSpPr>
-          <p:nvPr/>
-        </p:nvCxnSpPr>
-        <p:spPr>
-          <a:xfrm>
-            <a:off x="1974786" y="2830178"/>
-            <a:ext cx="435422" cy="1092012"/>
-          </a:xfrm>
-          <a:prstGeom prst="bentConnector3">
-            <a:avLst>
-              <a:gd name="adj1" fmla="val 50000"/>
-            </a:avLst>
-          </a:prstGeom>
-          <a:ln w="19050">
-            <a:solidFill>
-              <a:srgbClr val="C00000"/>
-            </a:solidFill>
-            <a:prstDash val="solid"/>
-            <a:headEnd type="none" w="med" len="med"/>
-            <a:tailEnd type="arrow" w="med" len="med"/>
-          </a:ln>
-          <a:effectLst/>
-        </p:spPr>
-        <p:style>
-          <a:lnRef idx="1">
-            <a:schemeClr val="accent2"/>
-          </a:lnRef>
-          <a:fillRef idx="2">
-            <a:schemeClr val="accent2"/>
-          </a:fillRef>
-          <a:effectRef idx="1">
-            <a:schemeClr val="accent2"/>
-          </a:effectRef>
-          <a:fontRef idx="minor">
-            <a:schemeClr val="dk1"/>
-          </a:fontRef>
-        </p:style>
-      </p:cxnSp>
-      <p:cxnSp>
-        <p:nvCxnSpPr>
-          <p:cNvPr id="123" name="Elbow Connector 122"/>
-          <p:cNvCxnSpPr>
-            <a:stCxn id="12" idx="3"/>
-          </p:cNvCxnSpPr>
-          <p:nvPr/>
-        </p:nvCxnSpPr>
-        <p:spPr>
-          <a:xfrm flipV="1">
-            <a:off x="1725304" y="4087188"/>
-            <a:ext cx="684904" cy="1"/>
-          </a:xfrm>
-          <a:prstGeom prst="bentConnector3">
-            <a:avLst>
-              <a:gd name="adj1" fmla="val 50000"/>
-            </a:avLst>
-          </a:prstGeom>
-          <a:ln w="19050">
-            <a:solidFill>
-              <a:srgbClr val="C00000"/>
-            </a:solidFill>
-            <a:prstDash val="dash"/>
-            <a:headEnd type="none" w="med" len="med"/>
-            <a:tailEnd type="arrow" w="med" len="med"/>
-          </a:ln>
-          <a:effectLst/>
-        </p:spPr>
-        <p:style>
-          <a:lnRef idx="1">
-            <a:schemeClr val="accent2"/>
-          </a:lnRef>
-          <a:fillRef idx="2">
-            <a:schemeClr val="accent2"/>
-          </a:fillRef>
-          <a:effectRef idx="1">
-            <a:schemeClr val="accent2"/>
-          </a:effectRef>
-          <a:fontRef idx="minor">
-            <a:schemeClr val="dk1"/>
-          </a:fontRef>
-        </p:style>
-      </p:cxnSp>
-      <p:sp>
-        <p:nvSpPr>
-          <p:cNvPr id="74" name="Rectangle 73">
-            <a:extLst>
-              <a:ext uri="{FF2B5EF4-FFF2-40B4-BE49-F238E27FC236}">
-                <a16:creationId xmlns:a16="http://schemas.microsoft.com/office/drawing/2014/main" id="{CE3FE38F-2A17-4540-BA33-EB5C057E66B3}"/>
-              </a:ext>
-            </a:extLst>
-          </p:cNvPr>
-          <p:cNvSpPr/>
-          <p:nvPr/>
-        </p:nvSpPr>
-        <p:spPr>
-          <a:xfrm flipH="1">
-            <a:off x="6142650" y="678080"/>
-            <a:ext cx="1404109" cy="346760"/>
-          </a:xfrm>
-          <a:prstGeom prst="rect">
-            <a:avLst/>
-          </a:prstGeom>
-          <a:ln w="19050"/>
-          <a:effectLst/>
-        </p:spPr>
-        <p:style>
-          <a:lnRef idx="1">
-            <a:schemeClr val="accent5"/>
-          </a:lnRef>
-          <a:fillRef idx="2">
-            <a:schemeClr val="accent5"/>
-          </a:fillRef>
-          <a:effectRef idx="1">
-            <a:schemeClr val="accent5"/>
-          </a:effectRef>
-          <a:fontRef idx="minor">
-            <a:schemeClr val="dk1"/>
-          </a:fontRef>
-        </p:style>
-        <p:txBody>
-          <a:bodyPr rtlCol="0" anchor="ctr"/>
-          <a:lstStyle/>
-          <a:p>
-            <a:pPr algn="ctr"/>
-            <a:r>
-              <a:rPr lang="en-US" sz="1050" dirty="0" err="1"/>
-              <a:t>EditCommand</a:t>
-            </a:r>
-            <a:endParaRPr lang="en-SG" sz="1050" dirty="0"/>
-          </a:p>
-        </p:txBody>
-      </p:sp>
-      <p:sp>
-        <p:nvSpPr>
-          <p:cNvPr id="75" name="Rectangle 74">
-            <a:extLst>
-              <a:ext uri="{FF2B5EF4-FFF2-40B4-BE49-F238E27FC236}">
-                <a16:creationId xmlns:a16="http://schemas.microsoft.com/office/drawing/2014/main" id="{3CC3EEA1-60E3-4356-BC6F-9C6CCD4D78E9}"/>
-              </a:ext>
-            </a:extLst>
-          </p:cNvPr>
-          <p:cNvSpPr/>
-          <p:nvPr/>
-        </p:nvSpPr>
-        <p:spPr>
-          <a:xfrm flipH="1">
-            <a:off x="6142650" y="282993"/>
-            <a:ext cx="1404109" cy="346760"/>
-          </a:xfrm>
-          <a:prstGeom prst="rect">
-            <a:avLst/>
-          </a:prstGeom>
-          <a:ln w="19050"/>
-          <a:effectLst/>
-        </p:spPr>
-        <p:style>
-          <a:lnRef idx="1">
-            <a:schemeClr val="accent5"/>
-          </a:lnRef>
-          <a:fillRef idx="2">
-            <a:schemeClr val="accent5"/>
-          </a:fillRef>
-          <a:effectRef idx="1">
-            <a:schemeClr val="accent5"/>
-          </a:effectRef>
-          <a:fontRef idx="minor">
-            <a:schemeClr val="dk1"/>
-          </a:fontRef>
-        </p:style>
-        <p:txBody>
-          <a:bodyPr rtlCol="0" anchor="ctr"/>
-          <a:lstStyle/>
-          <a:p>
-            <a:pPr algn="ctr"/>
-            <a:r>
-              <a:rPr lang="en-US" sz="1050" dirty="0" err="1"/>
-              <a:t>AddCommand</a:t>
-            </a:r>
-            <a:endParaRPr lang="en-SG" sz="1050" dirty="0"/>
-          </a:p>
-        </p:txBody>
-      </p:sp>
-      <p:sp>
-        <p:nvSpPr>
-          <p:cNvPr id="78" name="Rectangle 77">
-            <a:extLst>
-              <a:ext uri="{FF2B5EF4-FFF2-40B4-BE49-F238E27FC236}">
-                <a16:creationId xmlns:a16="http://schemas.microsoft.com/office/drawing/2014/main" id="{55EEA352-89B5-4B62-BE3B-0B6CB5B782EF}"/>
-              </a:ext>
-            </a:extLst>
-          </p:cNvPr>
-          <p:cNvSpPr/>
-          <p:nvPr/>
-        </p:nvSpPr>
-        <p:spPr>
-          <a:xfrm flipH="1">
-            <a:off x="6142649" y="1844120"/>
-            <a:ext cx="1404109" cy="346760"/>
-          </a:xfrm>
-          <a:prstGeom prst="rect">
-            <a:avLst/>
-          </a:prstGeom>
-          <a:ln w="19050"/>
-          <a:effectLst/>
-        </p:spPr>
-        <p:style>
-          <a:lnRef idx="1">
-            <a:schemeClr val="accent5"/>
-          </a:lnRef>
-          <a:fillRef idx="2">
-            <a:schemeClr val="accent5"/>
-          </a:fillRef>
-          <a:effectRef idx="1">
-            <a:schemeClr val="accent5"/>
-          </a:effectRef>
-          <a:fontRef idx="minor">
-            <a:schemeClr val="dk1"/>
-          </a:fontRef>
-        </p:style>
-        <p:txBody>
-          <a:bodyPr rtlCol="0" anchor="ctr"/>
-          <a:lstStyle/>
-          <a:p>
-            <a:pPr algn="ctr"/>
-            <a:r>
-              <a:rPr lang="en-US" sz="1050" dirty="0" err="1"/>
-              <a:t>ListCommand</a:t>
-            </a:r>
-            <a:endParaRPr lang="en-SG" sz="1050" dirty="0"/>
-          </a:p>
-        </p:txBody>
-      </p:sp>
-      <p:cxnSp>
-        <p:nvCxnSpPr>
-          <p:cNvPr id="79" name="Elbow Connector 55">
-            <a:extLst>
-              <a:ext uri="{FF2B5EF4-FFF2-40B4-BE49-F238E27FC236}">
-                <a16:creationId xmlns:a16="http://schemas.microsoft.com/office/drawing/2014/main" id="{30568C57-82E6-4BEE-98F8-A5A1CB257F62}"/>
-              </a:ext>
-            </a:extLst>
-          </p:cNvPr>
-          <p:cNvCxnSpPr>
-            <a:cxnSpLocks/>
-            <a:stCxn id="54" idx="3"/>
-            <a:endCxn id="74" idx="3"/>
-          </p:cNvCxnSpPr>
-          <p:nvPr/>
-        </p:nvCxnSpPr>
-        <p:spPr>
-          <a:xfrm flipV="1">
-            <a:off x="5772467" y="851460"/>
-            <a:ext cx="370183" cy="807793"/>
-          </a:xfrm>
-          <a:prstGeom prst="bentConnector3">
-            <a:avLst>
-              <a:gd name="adj1" fmla="val 50000"/>
-            </a:avLst>
-          </a:prstGeom>
-          <a:noFill/>
-          <a:ln w="19050"/>
-          <a:effectLst/>
-        </p:spPr>
-        <p:style>
-          <a:lnRef idx="1">
-            <a:schemeClr val="accent5"/>
-          </a:lnRef>
-          <a:fillRef idx="2">
-            <a:schemeClr val="accent5"/>
-          </a:fillRef>
-          <a:effectRef idx="1">
-            <a:schemeClr val="accent5"/>
-          </a:effectRef>
-          <a:fontRef idx="minor">
-            <a:schemeClr val="dk1"/>
-          </a:fontRef>
-        </p:style>
-      </p:cxnSp>
-      <p:cxnSp>
-        <p:nvCxnSpPr>
-          <p:cNvPr id="80" name="Elbow Connector 55">
-            <a:extLst>
-              <a:ext uri="{FF2B5EF4-FFF2-40B4-BE49-F238E27FC236}">
-                <a16:creationId xmlns:a16="http://schemas.microsoft.com/office/drawing/2014/main" id="{4A33D4FB-72AD-42FA-8F0B-43FE958785BB}"/>
-              </a:ext>
-            </a:extLst>
-          </p:cNvPr>
-          <p:cNvCxnSpPr>
-            <a:cxnSpLocks/>
-            <a:stCxn id="54" idx="3"/>
-            <a:endCxn id="75" idx="3"/>
-          </p:cNvCxnSpPr>
-          <p:nvPr/>
-        </p:nvCxnSpPr>
-        <p:spPr>
-          <a:xfrm flipV="1">
-            <a:off x="5772467" y="456373"/>
-            <a:ext cx="370183" cy="1202880"/>
-          </a:xfrm>
-          <a:prstGeom prst="bentConnector3">
-            <a:avLst>
-              <a:gd name="adj1" fmla="val 50000"/>
-            </a:avLst>
-          </a:prstGeom>
-          <a:noFill/>
-          <a:ln w="19050"/>
-          <a:effectLst/>
-        </p:spPr>
-        <p:style>
-          <a:lnRef idx="1">
-            <a:schemeClr val="accent5"/>
-          </a:lnRef>
-          <a:fillRef idx="2">
-            <a:schemeClr val="accent5"/>
-          </a:fillRef>
-          <a:effectRef idx="1">
-            <a:schemeClr val="accent5"/>
-          </a:effectRef>
-          <a:fontRef idx="minor">
-            <a:schemeClr val="dk1"/>
-          </a:fontRef>
-        </p:style>
-      </p:cxnSp>
-      <p:sp>
-        <p:nvSpPr>
-          <p:cNvPr id="83" name="Rectangle 82">
-            <a:extLst>
-              <a:ext uri="{FF2B5EF4-FFF2-40B4-BE49-F238E27FC236}">
-                <a16:creationId xmlns:a16="http://schemas.microsoft.com/office/drawing/2014/main" id="{6AC9AF50-9AEE-41A3-AF4F-7F806874369B}"/>
-              </a:ext>
-            </a:extLst>
-          </p:cNvPr>
-          <p:cNvSpPr/>
-          <p:nvPr/>
-        </p:nvSpPr>
-        <p:spPr>
-          <a:xfrm flipH="1">
-            <a:off x="6143337" y="2237981"/>
-            <a:ext cx="1404109" cy="346760"/>
-          </a:xfrm>
-          <a:prstGeom prst="rect">
-            <a:avLst/>
-          </a:prstGeom>
-          <a:ln w="19050"/>
-          <a:effectLst/>
-        </p:spPr>
-        <p:style>
-          <a:lnRef idx="1">
-            <a:schemeClr val="accent5"/>
-          </a:lnRef>
-          <a:fillRef idx="2">
-            <a:schemeClr val="accent5"/>
-          </a:fillRef>
-          <a:effectRef idx="1">
-            <a:schemeClr val="accent5"/>
-          </a:effectRef>
-          <a:fontRef idx="minor">
-            <a:schemeClr val="dk1"/>
-          </a:fontRef>
-        </p:style>
-        <p:txBody>
-          <a:bodyPr rtlCol="0" anchor="ctr"/>
-          <a:lstStyle/>
-          <a:p>
-            <a:pPr algn="ctr"/>
-            <a:r>
-              <a:rPr lang="en-US" sz="1050" dirty="0" err="1"/>
-              <a:t>FindCommand</a:t>
-            </a:r>
-            <a:endParaRPr lang="en-SG" sz="1050" dirty="0"/>
-          </a:p>
-        </p:txBody>
-      </p:sp>
-      <p:cxnSp>
-        <p:nvCxnSpPr>
-          <p:cNvPr id="88" name="Elbow Connector 59">
-            <a:extLst>
-              <a:ext uri="{FF2B5EF4-FFF2-40B4-BE49-F238E27FC236}">
-                <a16:creationId xmlns:a16="http://schemas.microsoft.com/office/drawing/2014/main" id="{F406DF39-D11B-4E09-AE50-7CDB04CEC5BE}"/>
-              </a:ext>
-            </a:extLst>
-          </p:cNvPr>
-          <p:cNvCxnSpPr>
-            <a:cxnSpLocks/>
-            <a:stCxn id="54" idx="3"/>
-            <a:endCxn id="83" idx="3"/>
-          </p:cNvCxnSpPr>
-          <p:nvPr/>
-        </p:nvCxnSpPr>
-        <p:spPr>
-          <a:xfrm>
-            <a:off x="5772467" y="1659253"/>
-            <a:ext cx="370870" cy="752108"/>
-          </a:xfrm>
-          <a:prstGeom prst="bentConnector3">
-            <a:avLst>
-              <a:gd name="adj1" fmla="val 50000"/>
-            </a:avLst>
-          </a:prstGeom>
-          <a:noFill/>
-          <a:ln w="19050"/>
-          <a:effectLst/>
-        </p:spPr>
-        <p:style>
-          <a:lnRef idx="1">
-            <a:schemeClr val="accent5"/>
-          </a:lnRef>
-          <a:fillRef idx="2">
-            <a:schemeClr val="accent5"/>
-          </a:fillRef>
-          <a:effectRef idx="1">
-            <a:schemeClr val="accent5"/>
-          </a:effectRef>
-          <a:fontRef idx="minor">
-            <a:schemeClr val="dk1"/>
-          </a:fontRef>
-        </p:style>
-      </p:cxnSp>
-      <p:sp>
-        <p:nvSpPr>
-          <p:cNvPr id="94" name="Rectangle 93">
-            <a:extLst>
-              <a:ext uri="{FF2B5EF4-FFF2-40B4-BE49-F238E27FC236}">
-                <a16:creationId xmlns:a16="http://schemas.microsoft.com/office/drawing/2014/main" id="{0E99FF09-3C47-4229-B339-B02A69C3EB2A}"/>
-              </a:ext>
-            </a:extLst>
-          </p:cNvPr>
-          <p:cNvSpPr/>
-          <p:nvPr/>
-        </p:nvSpPr>
-        <p:spPr>
-          <a:xfrm flipH="1">
-            <a:off x="6147597" y="2638851"/>
-            <a:ext cx="1404109" cy="346760"/>
-          </a:xfrm>
-          <a:prstGeom prst="rect">
-            <a:avLst/>
-          </a:prstGeom>
-          <a:ln w="19050"/>
-          <a:effectLst/>
-        </p:spPr>
-        <p:style>
-          <a:lnRef idx="1">
-            <a:schemeClr val="accent5"/>
-          </a:lnRef>
-          <a:fillRef idx="2">
-            <a:schemeClr val="accent5"/>
-          </a:fillRef>
-          <a:effectRef idx="1">
-            <a:schemeClr val="accent5"/>
-          </a:effectRef>
-          <a:fontRef idx="minor">
-            <a:schemeClr val="dk1"/>
-          </a:fontRef>
-        </p:style>
-        <p:txBody>
-          <a:bodyPr rtlCol="0" anchor="ctr"/>
-          <a:lstStyle/>
-          <a:p>
-            <a:pPr algn="ctr"/>
-            <a:r>
-              <a:rPr lang="en-US" sz="1050" dirty="0" err="1"/>
-              <a:t>ViewCommand</a:t>
-            </a:r>
-            <a:endParaRPr lang="en-SG" sz="1050" dirty="0"/>
-          </a:p>
-        </p:txBody>
-      </p:sp>
-      <p:cxnSp>
-        <p:nvCxnSpPr>
-          <p:cNvPr id="95" name="Elbow Connector 59">
-            <a:extLst>
-              <a:ext uri="{FF2B5EF4-FFF2-40B4-BE49-F238E27FC236}">
-                <a16:creationId xmlns:a16="http://schemas.microsoft.com/office/drawing/2014/main" id="{90564F19-9038-492F-AA85-CF7DF92E69C9}"/>
-              </a:ext>
-            </a:extLst>
-          </p:cNvPr>
-          <p:cNvCxnSpPr>
-            <a:cxnSpLocks/>
-            <a:stCxn id="54" idx="3"/>
-            <a:endCxn id="94" idx="3"/>
-          </p:cNvCxnSpPr>
-          <p:nvPr/>
-        </p:nvCxnSpPr>
-        <p:spPr>
-          <a:xfrm>
-            <a:off x="5772467" y="1659253"/>
-            <a:ext cx="375130" cy="1152978"/>
-          </a:xfrm>
-          <a:prstGeom prst="bentConnector3">
-            <a:avLst>
-              <a:gd name="adj1" fmla="val 50000"/>
-            </a:avLst>
-          </a:prstGeom>
-          <a:noFill/>
-          <a:ln w="19050"/>
-          <a:effectLst/>
-        </p:spPr>
-        <p:style>
-          <a:lnRef idx="1">
-            <a:schemeClr val="accent5"/>
-          </a:lnRef>
-          <a:fillRef idx="2">
-            <a:schemeClr val="accent5"/>
-          </a:fillRef>
-          <a:effectRef idx="1">
-            <a:schemeClr val="accent5"/>
-          </a:effectRef>
-          <a:fontRef idx="minor">
-            <a:schemeClr val="dk1"/>
+            <a:schemeClr val="tx1"/>
           </a:fontRef>
         </p:style>
       </p:cxnSp>
     </p:spTree>
     <p:extLst>
       <p:ext uri="{BB962C8B-B14F-4D97-AF65-F5344CB8AC3E}">
-        <p14:creationId xmlns:p14="http://schemas.microsoft.com/office/powerpoint/2010/main" val="3376861716"/>
+        <p14:creationId xmlns:p14="http://schemas.microsoft.com/office/powerpoint/2010/main" val="1981432603"/>
       </p:ext>
     </p:extLst>
   </p:cSld>

</xml_diff>

<commit_message>
Update DeveloperGuide.adoc with tips from TA  (#185)
</commit_message>
<xml_diff>
--- a/docs/diagrams/ArchitectureDiagram.pptx
+++ b/docs/diagrams/ArchitectureDiagram.pptx
@@ -8,7 +8,7 @@
     <p:notesMasterId r:id="rId3"/>
   </p:notesMasterIdLst>
   <p:sldIdLst>
-    <p:sldId id="257" r:id="rId2"/>
+    <p:sldId id="259" r:id="rId2"/>
   </p:sldIdLst>
   <p:sldSz cx="9144000" cy="6858000" type="screen4x3"/>
   <p:notesSz cx="6858000" cy="9144000"/>
@@ -110,7 +110,7 @@
   <p:extLst>
     <p:ext uri="{EFAFB233-063F-42B5-8137-9DF3F51BA10A}">
       <p15:sldGuideLst xmlns:p15="http://schemas.microsoft.com/office/powerpoint/2012/main">
-        <p15:guide id="1" orient="horz" pos="2160">
+        <p15:guide id="1" orient="horz" pos="1488">
           <p15:clr>
             <a:srgbClr val="A4A3A4"/>
           </p15:clr>
@@ -208,7 +208,7 @@
           <a:p>
             <a:fld id="{F5CC4B3F-88C1-4FFA-B1B6-F41C21DC6924}" type="datetimeFigureOut">
               <a:rPr lang="en-US" smtClean="0"/>
-              <a:t>3/25/2019</a:t>
+              <a:t>4/10/2019</a:t>
             </a:fld>
             <a:endParaRPr lang="en-US"/>
           </a:p>
@@ -475,90 +475,6 @@
 </p:notesMaster>
 </file>
 
-<file path=ppt/notesSlides/notesSlide1.xml><?xml version="1.0" encoding="utf-8"?>
-<p:notes xmlns:a="http://schemas.openxmlformats.org/drawingml/2006/main" xmlns:r="http://schemas.openxmlformats.org/officeDocument/2006/relationships" xmlns:p="http://schemas.openxmlformats.org/presentationml/2006/main">
-  <p:cSld>
-    <p:spTree>
-      <p:nvGrpSpPr>
-        <p:cNvPr id="1" name=""/>
-        <p:cNvGrpSpPr/>
-        <p:nvPr/>
-      </p:nvGrpSpPr>
-      <p:grpSpPr>
-        <a:xfrm>
-          <a:off x="0" y="0"/>
-          <a:ext cx="0" cy="0"/>
-          <a:chOff x="0" y="0"/>
-          <a:chExt cx="0" cy="0"/>
-        </a:xfrm>
-      </p:grpSpPr>
-      <p:sp>
-        <p:nvSpPr>
-          <p:cNvPr id="2" name="Slide Image Placeholder 1"/>
-          <p:cNvSpPr>
-            <a:spLocks noGrp="1" noRot="1" noChangeAspect="1"/>
-          </p:cNvSpPr>
-          <p:nvPr>
-            <p:ph type="sldImg"/>
-          </p:nvPr>
-        </p:nvSpPr>
-        <p:spPr/>
-      </p:sp>
-      <p:sp>
-        <p:nvSpPr>
-          <p:cNvPr id="3" name="Notes Placeholder 2"/>
-          <p:cNvSpPr>
-            <a:spLocks noGrp="1"/>
-          </p:cNvSpPr>
-          <p:nvPr>
-            <p:ph type="body" idx="1"/>
-          </p:nvPr>
-        </p:nvSpPr>
-        <p:spPr/>
-        <p:txBody>
-          <a:bodyPr/>
-          <a:lstStyle/>
-          <a:p>
-            <a:endParaRPr lang="en-US" dirty="0"/>
-          </a:p>
-        </p:txBody>
-      </p:sp>
-      <p:sp>
-        <p:nvSpPr>
-          <p:cNvPr id="4" name="Slide Number Placeholder 3"/>
-          <p:cNvSpPr>
-            <a:spLocks noGrp="1"/>
-          </p:cNvSpPr>
-          <p:nvPr>
-            <p:ph type="sldNum" sz="quarter" idx="10"/>
-          </p:nvPr>
-        </p:nvSpPr>
-        <p:spPr/>
-        <p:txBody>
-          <a:bodyPr/>
-          <a:lstStyle/>
-          <a:p>
-            <a:fld id="{5A7AB025-77E3-4BD1-A2FD-B3183DBA47A3}" type="slidenum">
-              <a:rPr lang="en-US" smtClean="0"/>
-              <a:t>1</a:t>
-            </a:fld>
-            <a:endParaRPr lang="en-US"/>
-          </a:p>
-        </p:txBody>
-      </p:sp>
-    </p:spTree>
-    <p:extLst>
-      <p:ext uri="{BB962C8B-B14F-4D97-AF65-F5344CB8AC3E}">
-        <p14:creationId xmlns:p14="http://schemas.microsoft.com/office/powerpoint/2010/main" val="3075080205"/>
-      </p:ext>
-    </p:extLst>
-  </p:cSld>
-  <p:clrMapOvr>
-    <a:masterClrMapping/>
-  </p:clrMapOvr>
-</p:notes>
-</file>
-
 <file path=ppt/slideLayouts/slideLayout1.xml><?xml version="1.0" encoding="utf-8"?>
 <p:sldLayout xmlns:a="http://schemas.openxmlformats.org/drawingml/2006/main" xmlns:r="http://schemas.openxmlformats.org/officeDocument/2006/relationships" xmlns:p="http://schemas.openxmlformats.org/presentationml/2006/main" type="title" preserve="1">
   <p:cSld name="Title Slide">
@@ -738,7 +654,7 @@
           <a:p>
             <a:fld id="{78C97017-6FC3-485B-9764-EAC9E56C1D49}" type="datetimeFigureOut">
               <a:rPr lang="en-US" smtClean="0"/>
-              <a:t>3/25/2019</a:t>
+              <a:t>4/10/2019</a:t>
             </a:fld>
             <a:endParaRPr lang="en-US"/>
           </a:p>
@@ -906,7 +822,7 @@
           <a:p>
             <a:fld id="{78C97017-6FC3-485B-9764-EAC9E56C1D49}" type="datetimeFigureOut">
               <a:rPr lang="en-US" smtClean="0"/>
-              <a:t>3/25/2019</a:t>
+              <a:t>4/10/2019</a:t>
             </a:fld>
             <a:endParaRPr lang="en-US"/>
           </a:p>
@@ -1084,7 +1000,7 @@
           <a:p>
             <a:fld id="{78C97017-6FC3-485B-9764-EAC9E56C1D49}" type="datetimeFigureOut">
               <a:rPr lang="en-US" smtClean="0"/>
-              <a:t>3/25/2019</a:t>
+              <a:t>4/10/2019</a:t>
             </a:fld>
             <a:endParaRPr lang="en-US"/>
           </a:p>
@@ -1252,7 +1168,7 @@
           <a:p>
             <a:fld id="{78C97017-6FC3-485B-9764-EAC9E56C1D49}" type="datetimeFigureOut">
               <a:rPr lang="en-US" smtClean="0"/>
-              <a:t>3/25/2019</a:t>
+              <a:t>4/10/2019</a:t>
             </a:fld>
             <a:endParaRPr lang="en-US"/>
           </a:p>
@@ -1497,7 +1413,7 @@
           <a:p>
             <a:fld id="{78C97017-6FC3-485B-9764-EAC9E56C1D49}" type="datetimeFigureOut">
               <a:rPr lang="en-US" smtClean="0"/>
-              <a:t>3/25/2019</a:t>
+              <a:t>4/10/2019</a:t>
             </a:fld>
             <a:endParaRPr lang="en-US"/>
           </a:p>
@@ -1782,7 +1698,7 @@
           <a:p>
             <a:fld id="{78C97017-6FC3-485B-9764-EAC9E56C1D49}" type="datetimeFigureOut">
               <a:rPr lang="en-US" smtClean="0"/>
-              <a:t>3/25/2019</a:t>
+              <a:t>4/10/2019</a:t>
             </a:fld>
             <a:endParaRPr lang="en-US"/>
           </a:p>
@@ -2201,7 +2117,7 @@
           <a:p>
             <a:fld id="{78C97017-6FC3-485B-9764-EAC9E56C1D49}" type="datetimeFigureOut">
               <a:rPr lang="en-US" smtClean="0"/>
-              <a:t>3/25/2019</a:t>
+              <a:t>4/10/2019</a:t>
             </a:fld>
             <a:endParaRPr lang="en-US"/>
           </a:p>
@@ -2318,7 +2234,7 @@
           <a:p>
             <a:fld id="{78C97017-6FC3-485B-9764-EAC9E56C1D49}" type="datetimeFigureOut">
               <a:rPr lang="en-US" smtClean="0"/>
-              <a:t>3/25/2019</a:t>
+              <a:t>4/10/2019</a:t>
             </a:fld>
             <a:endParaRPr lang="en-US"/>
           </a:p>
@@ -2413,7 +2329,7 @@
           <a:p>
             <a:fld id="{78C97017-6FC3-485B-9764-EAC9E56C1D49}" type="datetimeFigureOut">
               <a:rPr lang="en-US" smtClean="0"/>
-              <a:t>3/25/2019</a:t>
+              <a:t>4/10/2019</a:t>
             </a:fld>
             <a:endParaRPr lang="en-US"/>
           </a:p>
@@ -2688,7 +2604,7 @@
           <a:p>
             <a:fld id="{78C97017-6FC3-485B-9764-EAC9E56C1D49}" type="datetimeFigureOut">
               <a:rPr lang="en-US" smtClean="0"/>
-              <a:t>3/25/2019</a:t>
+              <a:t>4/10/2019</a:t>
             </a:fld>
             <a:endParaRPr lang="en-US"/>
           </a:p>
@@ -2940,7 +2856,7 @@
           <a:p>
             <a:fld id="{78C97017-6FC3-485B-9764-EAC9E56C1D49}" type="datetimeFigureOut">
               <a:rPr lang="en-US" smtClean="0"/>
-              <a:t>3/25/2019</a:t>
+              <a:t>4/10/2019</a:t>
             </a:fld>
             <a:endParaRPr lang="en-US"/>
           </a:p>
@@ -3151,7 +3067,7 @@
           <a:p>
             <a:fld id="{78C97017-6FC3-485B-9764-EAC9E56C1D49}" type="datetimeFigureOut">
               <a:rPr lang="en-US" smtClean="0"/>
-              <a:t>3/25/2019</a:t>
+              <a:t>4/10/2019</a:t>
             </a:fld>
             <a:endParaRPr lang="en-US"/>
           </a:p>
@@ -3528,16 +3444,742 @@
       </p:grpSpPr>
       <p:sp>
         <p:nvSpPr>
-          <p:cNvPr id="9" name="Rectangle 8"/>
+          <p:cNvPr id="15" name="Rounded Rectangle 14"/>
           <p:cNvSpPr/>
           <p:nvPr/>
         </p:nvSpPr>
         <p:spPr>
           <a:xfrm>
-            <a:off x="411820" y="3920440"/>
-            <a:ext cx="400979" cy="346760"/>
+            <a:off x="1636188" y="2057400"/>
+            <a:ext cx="5700181" cy="2667000"/>
           </a:xfrm>
-          <a:prstGeom prst="rect">
+          <a:prstGeom prst="roundRect">
+            <a:avLst>
+              <a:gd name="adj" fmla="val 5768"/>
+            </a:avLst>
+          </a:prstGeom>
+          <a:solidFill>
+            <a:schemeClr val="bg1">
+              <a:lumMod val="95000"/>
+            </a:schemeClr>
+          </a:solidFill>
+          <a:ln>
+            <a:solidFill>
+              <a:schemeClr val="bg1">
+                <a:lumMod val="85000"/>
+              </a:schemeClr>
+            </a:solidFill>
+          </a:ln>
+        </p:spPr>
+        <p:style>
+          <a:lnRef idx="2">
+            <a:schemeClr val="accent1">
+              <a:shade val="50000"/>
+            </a:schemeClr>
+          </a:lnRef>
+          <a:fillRef idx="1">
+            <a:schemeClr val="accent1"/>
+          </a:fillRef>
+          <a:effectRef idx="0">
+            <a:schemeClr val="accent1"/>
+          </a:effectRef>
+          <a:fontRef idx="minor">
+            <a:schemeClr val="lt1"/>
+          </a:fontRef>
+        </p:style>
+        <p:txBody>
+          <a:bodyPr rtlCol="0" anchor="ctr"/>
+          <a:lstStyle/>
+          <a:p>
+            <a:pPr algn="ctr"/>
+            <a:endParaRPr lang="en-US"/>
+          </a:p>
+        </p:txBody>
+      </p:sp>
+      <p:sp>
+        <p:nvSpPr>
+          <p:cNvPr id="2" name="Rectangle 62"/>
+          <p:cNvSpPr/>
+          <p:nvPr/>
+        </p:nvSpPr>
+        <p:spPr>
+          <a:xfrm flipH="1">
+            <a:off x="1964269" y="2191178"/>
+            <a:ext cx="609602" cy="1294917"/>
+          </a:xfrm>
+          <a:prstGeom prst="roundRect">
+            <a:avLst/>
+          </a:prstGeom>
+          <a:solidFill>
+            <a:srgbClr val="00B050"/>
+          </a:solidFill>
+          <a:ln w="19050">
+            <a:solidFill>
+              <a:srgbClr val="00B050"/>
+            </a:solidFill>
+          </a:ln>
+          <a:effectLst/>
+        </p:spPr>
+        <p:style>
+          <a:lnRef idx="1">
+            <a:schemeClr val="accent2"/>
+          </a:lnRef>
+          <a:fillRef idx="2">
+            <a:schemeClr val="accent2"/>
+          </a:fillRef>
+          <a:effectRef idx="1">
+            <a:schemeClr val="accent2"/>
+          </a:effectRef>
+          <a:fontRef idx="minor">
+            <a:schemeClr val="dk1"/>
+          </a:fontRef>
+        </p:style>
+        <p:txBody>
+          <a:bodyPr rtlCol="0" anchor="ctr"/>
+          <a:lstStyle/>
+          <a:p>
+            <a:pPr algn="ctr"/>
+            <a:r>
+              <a:rPr lang="en-US" sz="1600" dirty="0">
+                <a:solidFill>
+                  <a:schemeClr val="bg1"/>
+                </a:solidFill>
+              </a:rPr>
+              <a:t>UI</a:t>
+            </a:r>
+            <a:endParaRPr lang="en-SG" sz="1600" dirty="0">
+              <a:solidFill>
+                <a:schemeClr val="bg1"/>
+              </a:solidFill>
+            </a:endParaRPr>
+          </a:p>
+        </p:txBody>
+      </p:sp>
+      <p:sp>
+        <p:nvSpPr>
+          <p:cNvPr id="3" name="Rectangle 45"/>
+          <p:cNvSpPr/>
+          <p:nvPr/>
+        </p:nvSpPr>
+        <p:spPr>
+          <a:xfrm>
+            <a:off x="3412069" y="2191178"/>
+            <a:ext cx="1295400" cy="552022"/>
+          </a:xfrm>
+          <a:prstGeom prst="roundRect">
+            <a:avLst/>
+          </a:prstGeom>
+          <a:solidFill>
+            <a:srgbClr val="0070C0"/>
+          </a:solidFill>
+          <a:ln w="19050">
+            <a:solidFill>
+              <a:srgbClr val="0070C0"/>
+            </a:solidFill>
+          </a:ln>
+          <a:effectLst/>
+        </p:spPr>
+        <p:style>
+          <a:lnRef idx="1">
+            <a:schemeClr val="accent5"/>
+          </a:lnRef>
+          <a:fillRef idx="2">
+            <a:schemeClr val="accent5"/>
+          </a:fillRef>
+          <a:effectRef idx="1">
+            <a:schemeClr val="accent5"/>
+          </a:effectRef>
+          <a:fontRef idx="minor">
+            <a:schemeClr val="dk1"/>
+          </a:fontRef>
+        </p:style>
+        <p:txBody>
+          <a:bodyPr rtlCol="0" anchor="ctr"/>
+          <a:lstStyle/>
+          <a:p>
+            <a:pPr algn="ctr"/>
+            <a:r>
+              <a:rPr lang="en-US" sz="1600" dirty="0">
+                <a:solidFill>
+                  <a:schemeClr val="bg1"/>
+                </a:solidFill>
+              </a:rPr>
+              <a:t>Logic</a:t>
+            </a:r>
+            <a:endParaRPr lang="en-SG" sz="1600" dirty="0">
+              <a:solidFill>
+                <a:schemeClr val="bg1"/>
+              </a:solidFill>
+            </a:endParaRPr>
+          </a:p>
+        </p:txBody>
+      </p:sp>
+      <p:sp>
+        <p:nvSpPr>
+          <p:cNvPr id="4" name="Rectangle 45"/>
+          <p:cNvSpPr/>
+          <p:nvPr/>
+        </p:nvSpPr>
+        <p:spPr>
+          <a:xfrm>
+            <a:off x="5164669" y="2191179"/>
+            <a:ext cx="1447800" cy="552022"/>
+          </a:xfrm>
+          <a:prstGeom prst="roundRect">
+            <a:avLst/>
+          </a:prstGeom>
+          <a:solidFill>
+            <a:schemeClr val="accent6">
+              <a:lumMod val="75000"/>
+            </a:schemeClr>
+          </a:solidFill>
+          <a:ln w="19050">
+            <a:solidFill>
+              <a:schemeClr val="accent6">
+                <a:lumMod val="75000"/>
+              </a:schemeClr>
+            </a:solidFill>
+          </a:ln>
+          <a:effectLst/>
+        </p:spPr>
+        <p:style>
+          <a:lnRef idx="1">
+            <a:schemeClr val="accent5"/>
+          </a:lnRef>
+          <a:fillRef idx="2">
+            <a:schemeClr val="accent5"/>
+          </a:fillRef>
+          <a:effectRef idx="1">
+            <a:schemeClr val="accent5"/>
+          </a:effectRef>
+          <a:fontRef idx="minor">
+            <a:schemeClr val="dk1"/>
+          </a:fontRef>
+        </p:style>
+        <p:txBody>
+          <a:bodyPr rtlCol="0" anchor="ctr"/>
+          <a:lstStyle/>
+          <a:p>
+            <a:pPr algn="ctr"/>
+            <a:r>
+              <a:rPr lang="en-US" sz="1600" dirty="0">
+                <a:solidFill>
+                  <a:schemeClr val="bg1"/>
+                </a:solidFill>
+              </a:rPr>
+              <a:t>Storage</a:t>
+            </a:r>
+            <a:endParaRPr lang="en-SG" sz="1600" dirty="0">
+              <a:solidFill>
+                <a:schemeClr val="bg1"/>
+              </a:solidFill>
+            </a:endParaRPr>
+          </a:p>
+        </p:txBody>
+      </p:sp>
+      <p:sp>
+        <p:nvSpPr>
+          <p:cNvPr id="5" name="Rectangle 45"/>
+          <p:cNvSpPr/>
+          <p:nvPr/>
+        </p:nvSpPr>
+        <p:spPr>
+          <a:xfrm>
+            <a:off x="3412069" y="3124200"/>
+            <a:ext cx="1295400" cy="723791"/>
+          </a:xfrm>
+          <a:prstGeom prst="roundRect">
+            <a:avLst/>
+          </a:prstGeom>
+          <a:solidFill>
+            <a:srgbClr val="7030A0"/>
+          </a:solidFill>
+          <a:ln w="19050">
+            <a:solidFill>
+              <a:srgbClr val="7030A0"/>
+            </a:solidFill>
+          </a:ln>
+          <a:effectLst/>
+        </p:spPr>
+        <p:style>
+          <a:lnRef idx="1">
+            <a:schemeClr val="accent5"/>
+          </a:lnRef>
+          <a:fillRef idx="2">
+            <a:schemeClr val="accent5"/>
+          </a:fillRef>
+          <a:effectRef idx="1">
+            <a:schemeClr val="accent5"/>
+          </a:effectRef>
+          <a:fontRef idx="minor">
+            <a:schemeClr val="dk1"/>
+          </a:fontRef>
+        </p:style>
+        <p:txBody>
+          <a:bodyPr rtlCol="0" anchor="ctr"/>
+          <a:lstStyle/>
+          <a:p>
+            <a:pPr algn="ctr"/>
+            <a:r>
+              <a:rPr lang="en-US" sz="1600" dirty="0">
+                <a:solidFill>
+                  <a:schemeClr val="bg1"/>
+                </a:solidFill>
+              </a:rPr>
+              <a:t>Model</a:t>
+            </a:r>
+            <a:endParaRPr lang="en-SG" sz="1600" dirty="0">
+              <a:solidFill>
+                <a:schemeClr val="bg1"/>
+              </a:solidFill>
+            </a:endParaRPr>
+          </a:p>
+        </p:txBody>
+      </p:sp>
+      <p:sp>
+        <p:nvSpPr>
+          <p:cNvPr id="8" name="Rectangle 45"/>
+          <p:cNvSpPr/>
+          <p:nvPr/>
+        </p:nvSpPr>
+        <p:spPr>
+          <a:xfrm>
+            <a:off x="3217846" y="4131994"/>
+            <a:ext cx="2658531" cy="444640"/>
+          </a:xfrm>
+          <a:prstGeom prst="roundRect">
+            <a:avLst/>
+          </a:prstGeom>
+          <a:solidFill>
+            <a:schemeClr val="accent5">
+              <a:lumMod val="75000"/>
+            </a:schemeClr>
+          </a:solidFill>
+          <a:ln w="19050">
+            <a:solidFill>
+              <a:schemeClr val="accent5">
+                <a:lumMod val="75000"/>
+              </a:schemeClr>
+            </a:solidFill>
+          </a:ln>
+          <a:effectLst/>
+        </p:spPr>
+        <p:style>
+          <a:lnRef idx="1">
+            <a:schemeClr val="accent5"/>
+          </a:lnRef>
+          <a:fillRef idx="2">
+            <a:schemeClr val="accent5"/>
+          </a:fillRef>
+          <a:effectRef idx="1">
+            <a:schemeClr val="accent5"/>
+          </a:effectRef>
+          <a:fontRef idx="minor">
+            <a:schemeClr val="dk1"/>
+          </a:fontRef>
+        </p:style>
+        <p:txBody>
+          <a:bodyPr rtlCol="0" anchor="ctr"/>
+          <a:lstStyle/>
+          <a:p>
+            <a:pPr algn="ctr"/>
+            <a:r>
+              <a:rPr lang="en-US" sz="1400" dirty="0">
+                <a:solidFill>
+                  <a:schemeClr val="bg1"/>
+                </a:solidFill>
+              </a:rPr>
+              <a:t>Commons</a:t>
+            </a:r>
+            <a:endParaRPr lang="en-SG" sz="1400" dirty="0">
+              <a:solidFill>
+                <a:schemeClr val="bg1"/>
+              </a:solidFill>
+            </a:endParaRPr>
+          </a:p>
+        </p:txBody>
+      </p:sp>
+      <p:cxnSp>
+        <p:nvCxnSpPr>
+          <p:cNvPr id="10" name="Straight Arrow Connector 9"/>
+          <p:cNvCxnSpPr>
+            <a:endCxn id="3" idx="1"/>
+          </p:cNvCxnSpPr>
+          <p:nvPr/>
+        </p:nvCxnSpPr>
+        <p:spPr>
+          <a:xfrm>
+            <a:off x="2573871" y="2467189"/>
+            <a:ext cx="838198" cy="0"/>
+          </a:xfrm>
+          <a:prstGeom prst="straightConnector1">
+            <a:avLst/>
+          </a:prstGeom>
+          <a:ln w="28575">
+            <a:solidFill>
+              <a:srgbClr val="00B050"/>
+            </a:solidFill>
+            <a:tailEnd type="arrow"/>
+          </a:ln>
+        </p:spPr>
+        <p:style>
+          <a:lnRef idx="1">
+            <a:schemeClr val="accent1"/>
+          </a:lnRef>
+          <a:fillRef idx="0">
+            <a:schemeClr val="accent1"/>
+          </a:fillRef>
+          <a:effectRef idx="0">
+            <a:schemeClr val="accent1"/>
+          </a:effectRef>
+          <a:fontRef idx="minor">
+            <a:schemeClr val="tx1"/>
+          </a:fontRef>
+        </p:style>
+      </p:cxnSp>
+      <p:cxnSp>
+        <p:nvCxnSpPr>
+          <p:cNvPr id="12" name="Straight Arrow Connector 11"/>
+          <p:cNvCxnSpPr/>
+          <p:nvPr/>
+        </p:nvCxnSpPr>
+        <p:spPr>
+          <a:xfrm>
+            <a:off x="2569639" y="3276600"/>
+            <a:ext cx="838198" cy="0"/>
+          </a:xfrm>
+          <a:prstGeom prst="straightConnector1">
+            <a:avLst/>
+          </a:prstGeom>
+          <a:ln w="28575">
+            <a:solidFill>
+              <a:srgbClr val="00B050"/>
+            </a:solidFill>
+            <a:tailEnd type="arrow"/>
+          </a:ln>
+        </p:spPr>
+        <p:style>
+          <a:lnRef idx="1">
+            <a:schemeClr val="accent1"/>
+          </a:lnRef>
+          <a:fillRef idx="0">
+            <a:schemeClr val="accent1"/>
+          </a:fillRef>
+          <a:effectRef idx="0">
+            <a:schemeClr val="accent1"/>
+          </a:effectRef>
+          <a:fontRef idx="minor">
+            <a:schemeClr val="tx1"/>
+          </a:fontRef>
+        </p:style>
+      </p:cxnSp>
+      <p:cxnSp>
+        <p:nvCxnSpPr>
+          <p:cNvPr id="13" name="Straight Arrow Connector 12"/>
+          <p:cNvCxnSpPr>
+            <a:stCxn id="3" idx="2"/>
+            <a:endCxn id="5" idx="0"/>
+          </p:cNvCxnSpPr>
+          <p:nvPr/>
+        </p:nvCxnSpPr>
+        <p:spPr>
+          <a:xfrm>
+            <a:off x="4059769" y="2743200"/>
+            <a:ext cx="0" cy="381000"/>
+          </a:xfrm>
+          <a:prstGeom prst="straightConnector1">
+            <a:avLst/>
+          </a:prstGeom>
+          <a:ln w="28575">
+            <a:solidFill>
+              <a:srgbClr val="0070C0"/>
+            </a:solidFill>
+            <a:tailEnd type="arrow"/>
+          </a:ln>
+        </p:spPr>
+        <p:style>
+          <a:lnRef idx="1">
+            <a:schemeClr val="accent1"/>
+          </a:lnRef>
+          <a:fillRef idx="0">
+            <a:schemeClr val="accent1"/>
+          </a:fillRef>
+          <a:effectRef idx="0">
+            <a:schemeClr val="accent1"/>
+          </a:effectRef>
+          <a:fontRef idx="minor">
+            <a:schemeClr val="tx1"/>
+          </a:fontRef>
+        </p:style>
+      </p:cxnSp>
+      <p:cxnSp>
+        <p:nvCxnSpPr>
+          <p:cNvPr id="16" name="Straight Arrow Connector 15"/>
+          <p:cNvCxnSpPr/>
+          <p:nvPr/>
+        </p:nvCxnSpPr>
+        <p:spPr>
+          <a:xfrm>
+            <a:off x="4707469" y="2467189"/>
+            <a:ext cx="457200" cy="0"/>
+          </a:xfrm>
+          <a:prstGeom prst="straightConnector1">
+            <a:avLst/>
+          </a:prstGeom>
+          <a:ln w="28575">
+            <a:solidFill>
+              <a:srgbClr val="0070C0"/>
+            </a:solidFill>
+            <a:tailEnd type="arrow"/>
+          </a:ln>
+        </p:spPr>
+        <p:style>
+          <a:lnRef idx="1">
+            <a:schemeClr val="accent1"/>
+          </a:lnRef>
+          <a:fillRef idx="0">
+            <a:schemeClr val="accent1"/>
+          </a:fillRef>
+          <a:effectRef idx="0">
+            <a:schemeClr val="accent1"/>
+          </a:effectRef>
+          <a:fontRef idx="minor">
+            <a:schemeClr val="tx1"/>
+          </a:fontRef>
+        </p:style>
+      </p:cxnSp>
+      <p:sp>
+        <p:nvSpPr>
+          <p:cNvPr id="29" name="Smiley Face 28"/>
+          <p:cNvSpPr/>
+          <p:nvPr/>
+        </p:nvSpPr>
+        <p:spPr>
+          <a:xfrm>
+            <a:off x="1202269" y="2743200"/>
+            <a:ext cx="381000" cy="381000"/>
+          </a:xfrm>
+          <a:prstGeom prst="smileyFace">
+            <a:avLst/>
+          </a:prstGeom>
+          <a:solidFill>
+            <a:schemeClr val="bg1"/>
+          </a:solidFill>
+          <a:ln>
+            <a:solidFill>
+              <a:schemeClr val="tx1"/>
+            </a:solidFill>
+          </a:ln>
+        </p:spPr>
+        <p:style>
+          <a:lnRef idx="2">
+            <a:schemeClr val="accent1">
+              <a:shade val="50000"/>
+            </a:schemeClr>
+          </a:lnRef>
+          <a:fillRef idx="1">
+            <a:schemeClr val="accent1"/>
+          </a:fillRef>
+          <a:effectRef idx="0">
+            <a:schemeClr val="accent1"/>
+          </a:effectRef>
+          <a:fontRef idx="minor">
+            <a:schemeClr val="lt1"/>
+          </a:fontRef>
+        </p:style>
+        <p:txBody>
+          <a:bodyPr rtlCol="0" anchor="ctr"/>
+          <a:lstStyle/>
+          <a:p>
+            <a:pPr algn="ctr"/>
+            <a:endParaRPr lang="en-US"/>
+          </a:p>
+        </p:txBody>
+      </p:sp>
+      <p:cxnSp>
+        <p:nvCxnSpPr>
+          <p:cNvPr id="32" name="Straight Arrow Connector 31"/>
+          <p:cNvCxnSpPr/>
+          <p:nvPr/>
+        </p:nvCxnSpPr>
+        <p:spPr>
+          <a:xfrm flipV="1">
+            <a:off x="1636188" y="2939996"/>
+            <a:ext cx="273050" cy="1"/>
+          </a:xfrm>
+          <a:prstGeom prst="straightConnector1">
+            <a:avLst/>
+          </a:prstGeom>
+          <a:ln w="28575">
+            <a:solidFill>
+              <a:schemeClr val="tx1"/>
+            </a:solidFill>
+            <a:prstDash val="sysDot"/>
+            <a:tailEnd type="arrow"/>
+          </a:ln>
+        </p:spPr>
+        <p:style>
+          <a:lnRef idx="1">
+            <a:schemeClr val="accent1"/>
+          </a:lnRef>
+          <a:fillRef idx="0">
+            <a:schemeClr val="accent1"/>
+          </a:fillRef>
+          <a:effectRef idx="0">
+            <a:schemeClr val="accent1"/>
+          </a:effectRef>
+          <a:fontRef idx="minor">
+            <a:schemeClr val="tx1"/>
+          </a:fontRef>
+        </p:style>
+      </p:cxnSp>
+      <p:cxnSp>
+        <p:nvCxnSpPr>
+          <p:cNvPr id="34" name="Straight Arrow Connector 33"/>
+          <p:cNvCxnSpPr/>
+          <p:nvPr/>
+        </p:nvCxnSpPr>
+        <p:spPr>
+          <a:xfrm flipV="1">
+            <a:off x="6680199" y="2467190"/>
+            <a:ext cx="939801" cy="1"/>
+          </a:xfrm>
+          <a:prstGeom prst="straightConnector1">
+            <a:avLst/>
+          </a:prstGeom>
+          <a:ln w="28575">
+            <a:solidFill>
+              <a:schemeClr val="accent6">
+                <a:lumMod val="75000"/>
+              </a:schemeClr>
+            </a:solidFill>
+            <a:prstDash val="sysDot"/>
+            <a:tailEnd type="arrow"/>
+          </a:ln>
+        </p:spPr>
+        <p:style>
+          <a:lnRef idx="1">
+            <a:schemeClr val="accent1"/>
+          </a:lnRef>
+          <a:fillRef idx="0">
+            <a:schemeClr val="accent1"/>
+          </a:fillRef>
+          <a:effectRef idx="0">
+            <a:schemeClr val="accent1"/>
+          </a:effectRef>
+          <a:fontRef idx="minor">
+            <a:schemeClr val="tx1"/>
+          </a:fontRef>
+        </p:style>
+      </p:cxnSp>
+      <p:sp>
+        <p:nvSpPr>
+          <p:cNvPr id="35" name="Folded Corner 34"/>
+          <p:cNvSpPr/>
+          <p:nvPr/>
+        </p:nvSpPr>
+        <p:spPr>
+          <a:xfrm>
+            <a:off x="7679269" y="2286000"/>
+            <a:ext cx="381000" cy="381000"/>
+          </a:xfrm>
+          <a:prstGeom prst="foldedCorner">
+            <a:avLst/>
+          </a:prstGeom>
+          <a:solidFill>
+            <a:schemeClr val="bg1"/>
+          </a:solidFill>
+          <a:ln>
+            <a:solidFill>
+              <a:schemeClr val="tx1"/>
+            </a:solidFill>
+          </a:ln>
+        </p:spPr>
+        <p:style>
+          <a:lnRef idx="2">
+            <a:schemeClr val="accent1">
+              <a:shade val="50000"/>
+            </a:schemeClr>
+          </a:lnRef>
+          <a:fillRef idx="1">
+            <a:schemeClr val="accent1"/>
+          </a:fillRef>
+          <a:effectRef idx="0">
+            <a:schemeClr val="accent1"/>
+          </a:effectRef>
+          <a:fontRef idx="minor">
+            <a:schemeClr val="lt1"/>
+          </a:fontRef>
+        </p:style>
+        <p:txBody>
+          <a:bodyPr rtlCol="0" anchor="ctr"/>
+          <a:lstStyle/>
+          <a:p>
+            <a:pPr algn="ctr"/>
+            <a:endParaRPr lang="en-US"/>
+          </a:p>
+        </p:txBody>
+      </p:sp>
+      <p:sp>
+        <p:nvSpPr>
+          <p:cNvPr id="36" name="Folded Corner 35"/>
+          <p:cNvSpPr/>
+          <p:nvPr/>
+        </p:nvSpPr>
+        <p:spPr>
+          <a:xfrm>
+            <a:off x="7772400" y="2362200"/>
+            <a:ext cx="381000" cy="381000"/>
+          </a:xfrm>
+          <a:prstGeom prst="foldedCorner">
+            <a:avLst/>
+          </a:prstGeom>
+          <a:solidFill>
+            <a:schemeClr val="bg1"/>
+          </a:solidFill>
+          <a:ln>
+            <a:solidFill>
+              <a:schemeClr val="tx1"/>
+            </a:solidFill>
+          </a:ln>
+        </p:spPr>
+        <p:style>
+          <a:lnRef idx="2">
+            <a:schemeClr val="accent1">
+              <a:shade val="50000"/>
+            </a:schemeClr>
+          </a:lnRef>
+          <a:fillRef idx="1">
+            <a:schemeClr val="accent1"/>
+          </a:fillRef>
+          <a:effectRef idx="0">
+            <a:schemeClr val="accent1"/>
+          </a:effectRef>
+          <a:fontRef idx="minor">
+            <a:schemeClr val="lt1"/>
+          </a:fontRef>
+        </p:style>
+        <p:txBody>
+          <a:bodyPr rtlCol="0" anchor="ctr"/>
+          <a:lstStyle/>
+          <a:p>
+            <a:pPr algn="ctr"/>
+            <a:endParaRPr lang="en-US"/>
+          </a:p>
+        </p:txBody>
+      </p:sp>
+      <p:sp>
+        <p:nvSpPr>
+          <p:cNvPr id="23" name="Rectangle 62"/>
+          <p:cNvSpPr/>
+          <p:nvPr/>
+        </p:nvSpPr>
+        <p:spPr>
+          <a:xfrm flipH="1">
+            <a:off x="1964269" y="3959459"/>
+            <a:ext cx="778931" cy="570908"/>
+          </a:xfrm>
+          <a:prstGeom prst="roundRect">
             <a:avLst/>
           </a:prstGeom>
           <a:solidFill>
@@ -3570,73 +4212,14 @@
           <a:p>
             <a:pPr algn="ctr"/>
             <a:r>
-              <a:rPr lang="en-US" sz="1050" dirty="0" err="1">
-                <a:solidFill>
-                  <a:schemeClr val="bg1"/>
-                </a:solidFill>
-              </a:rPr>
-              <a:t>Gui</a:t>
-            </a:r>
-            <a:endParaRPr lang="en-SG" sz="1050" dirty="0">
-              <a:solidFill>
-                <a:schemeClr val="bg1"/>
-              </a:solidFill>
-            </a:endParaRPr>
-          </a:p>
-        </p:txBody>
-      </p:sp>
-      <p:sp>
-        <p:nvSpPr>
-          <p:cNvPr id="12" name="Rectangle 11"/>
-          <p:cNvSpPr/>
-          <p:nvPr/>
-        </p:nvSpPr>
-        <p:spPr>
-          <a:xfrm>
-            <a:off x="1143973" y="3913809"/>
-            <a:ext cx="581331" cy="346760"/>
-          </a:xfrm>
-          <a:prstGeom prst="rect">
-            <a:avLst/>
-          </a:prstGeom>
-          <a:solidFill>
-            <a:srgbClr val="C00000"/>
-          </a:solidFill>
-          <a:ln w="19050">
-            <a:solidFill>
-              <a:srgbClr val="C00000"/>
-            </a:solidFill>
-          </a:ln>
-          <a:effectLst/>
-        </p:spPr>
-        <p:style>
-          <a:lnRef idx="1">
-            <a:schemeClr val="accent2"/>
-          </a:lnRef>
-          <a:fillRef idx="2">
-            <a:schemeClr val="accent2"/>
-          </a:fillRef>
-          <a:effectRef idx="1">
-            <a:schemeClr val="accent2"/>
-          </a:effectRef>
-          <a:fontRef idx="minor">
-            <a:schemeClr val="dk1"/>
-          </a:fontRef>
-        </p:style>
-        <p:txBody>
-          <a:bodyPr rtlCol="0" anchor="ctr"/>
-          <a:lstStyle/>
-          <a:p>
-            <a:pPr algn="ctr"/>
-            <a:r>
-              <a:rPr lang="en-US" sz="1050" dirty="0">
+              <a:rPr lang="en-US" sz="1600" dirty="0">
                 <a:solidFill>
                   <a:schemeClr val="bg1"/>
                 </a:solidFill>
               </a:rPr>
               <a:t>Main</a:t>
             </a:r>
-            <a:endParaRPr lang="en-SG" sz="1050" dirty="0">
+            <a:endParaRPr lang="en-SG" sz="1600" dirty="0">
               <a:solidFill>
                 <a:schemeClr val="bg1"/>
               </a:solidFill>
@@ -3644,2888 +4227,240 @@
           </a:p>
         </p:txBody>
       </p:sp>
-      <p:sp>
-        <p:nvSpPr>
-          <p:cNvPr id="13" name="Rectangle 12"/>
-          <p:cNvSpPr/>
+      <p:cxnSp>
+        <p:nvCxnSpPr>
+          <p:cNvPr id="30" name="Straight Arrow Connector 29"/>
+          <p:cNvCxnSpPr/>
           <p:nvPr/>
-        </p:nvSpPr>
+        </p:nvCxnSpPr>
         <p:spPr>
           <a:xfrm>
-            <a:off x="3483098" y="3747060"/>
-            <a:ext cx="929296" cy="346760"/>
+            <a:off x="4945047" y="3750994"/>
+            <a:ext cx="0" cy="381000"/>
           </a:xfrm>
-          <a:prstGeom prst="rect">
+          <a:prstGeom prst="straightConnector1">
             <a:avLst/>
           </a:prstGeom>
-          <a:solidFill>
-            <a:schemeClr val="accent6"/>
-          </a:solidFill>
-          <a:ln w="19050"/>
-          <a:effectLst/>
-        </p:spPr>
-        <p:style>
-          <a:lnRef idx="1">
-            <a:schemeClr val="accent6"/>
-          </a:lnRef>
-          <a:fillRef idx="2">
-            <a:schemeClr val="accent6"/>
-          </a:fillRef>
-          <a:effectRef idx="1">
-            <a:schemeClr val="accent6"/>
-          </a:effectRef>
-          <a:fontRef idx="minor">
-            <a:schemeClr val="dk1"/>
-          </a:fontRef>
-        </p:style>
-        <p:txBody>
-          <a:bodyPr rtlCol="0" anchor="ctr"/>
-          <a:lstStyle/>
-          <a:p>
-            <a:pPr algn="ctr"/>
-            <a:r>
-              <a:rPr lang="en-US" sz="1050" dirty="0">
-                <a:solidFill>
-                  <a:schemeClr val="bg1"/>
-                </a:solidFill>
-              </a:rPr>
-              <a:t>Planner</a:t>
-            </a:r>
-            <a:endParaRPr lang="en-SG" sz="1050" dirty="0">
-              <a:solidFill>
-                <a:schemeClr val="bg1"/>
-              </a:solidFill>
-            </a:endParaRPr>
-          </a:p>
-        </p:txBody>
-      </p:sp>
-      <p:sp>
-        <p:nvSpPr>
-          <p:cNvPr id="14" name="Rectangle 13"/>
-          <p:cNvSpPr/>
-          <p:nvPr/>
-        </p:nvSpPr>
-        <p:spPr>
-          <a:xfrm>
-            <a:off x="2743200" y="3006040"/>
-            <a:ext cx="634723" cy="346760"/>
-          </a:xfrm>
-          <a:prstGeom prst="rect">
-            <a:avLst/>
-          </a:prstGeom>
-          <a:ln>
+          <a:ln w="28575">
             <a:solidFill>
-              <a:srgbClr val="0070C0"/>
+              <a:schemeClr val="accent5">
+                <a:lumMod val="75000"/>
+              </a:schemeClr>
             </a:solidFill>
+            <a:prstDash val="sysDot"/>
+            <a:tailEnd type="arrow"/>
           </a:ln>
-          <a:effectLst/>
         </p:spPr>
         <p:style>
           <a:lnRef idx="1">
             <a:schemeClr val="accent1"/>
           </a:lnRef>
-          <a:fillRef idx="2">
+          <a:fillRef idx="0">
             <a:schemeClr val="accent1"/>
           </a:fillRef>
-          <a:effectRef idx="1">
+          <a:effectRef idx="0">
             <a:schemeClr val="accent1"/>
           </a:effectRef>
           <a:fontRef idx="minor">
-            <a:schemeClr val="dk1"/>
-          </a:fontRef>
-        </p:style>
-        <p:txBody>
-          <a:bodyPr rtlCol="0" anchor="ctr"/>
-          <a:lstStyle/>
-          <a:p>
-            <a:pPr algn="ctr"/>
-            <a:r>
-              <a:rPr lang="en-US" sz="1050" dirty="0"/>
-              <a:t>Parser</a:t>
-            </a:r>
-            <a:endParaRPr lang="en-SG" sz="1050" dirty="0"/>
-          </a:p>
-        </p:txBody>
-      </p:sp>
-      <p:sp>
-        <p:nvSpPr>
-          <p:cNvPr id="16" name="Rectangle 15"/>
-          <p:cNvSpPr/>
-          <p:nvPr/>
-        </p:nvSpPr>
-        <p:spPr>
-          <a:xfrm>
-            <a:off x="5072919" y="4352685"/>
-            <a:ext cx="929296" cy="346760"/>
-          </a:xfrm>
-          <a:prstGeom prst="rect">
-            <a:avLst/>
-          </a:prstGeom>
-          <a:ln w="19050"/>
-          <a:effectLst/>
-        </p:spPr>
-        <p:style>
-          <a:lnRef idx="1">
-            <a:schemeClr val="accent6"/>
-          </a:lnRef>
-          <a:fillRef idx="2">
-            <a:schemeClr val="accent6"/>
-          </a:fillRef>
-          <a:effectRef idx="1">
-            <a:schemeClr val="accent6"/>
-          </a:effectRef>
-          <a:fontRef idx="minor">
-            <a:schemeClr val="dk1"/>
-          </a:fontRef>
-        </p:style>
-        <p:txBody>
-          <a:bodyPr rtlCol="0" anchor="ctr"/>
-          <a:lstStyle/>
-          <a:p>
-            <a:pPr algn="ctr"/>
-            <a:r>
-              <a:rPr lang="en-US" sz="1050" dirty="0"/>
-              <a:t>Semester</a:t>
-            </a:r>
-            <a:endParaRPr lang="en-SG" sz="1050" dirty="0"/>
-          </a:p>
-        </p:txBody>
-      </p:sp>
-      <p:sp>
-        <p:nvSpPr>
-          <p:cNvPr id="19" name="Rectangle 18"/>
-          <p:cNvSpPr/>
-          <p:nvPr/>
-        </p:nvSpPr>
-        <p:spPr>
-          <a:xfrm>
-            <a:off x="6637708" y="4352685"/>
-            <a:ext cx="929296" cy="346760"/>
-          </a:xfrm>
-          <a:prstGeom prst="rect">
-            <a:avLst/>
-          </a:prstGeom>
-          <a:solidFill>
-            <a:srgbClr val="7030A0"/>
-          </a:solidFill>
-          <a:ln w="19050">
-            <a:solidFill>
-              <a:srgbClr val="7030A0"/>
-            </a:solidFill>
-          </a:ln>
-          <a:effectLst/>
-        </p:spPr>
-        <p:style>
-          <a:lnRef idx="1">
-            <a:schemeClr val="accent6"/>
-          </a:lnRef>
-          <a:fillRef idx="2">
-            <a:schemeClr val="accent6"/>
-          </a:fillRef>
-          <a:effectRef idx="1">
-            <a:schemeClr val="accent6"/>
-          </a:effectRef>
-          <a:fontRef idx="minor">
-            <a:schemeClr val="dk1"/>
-          </a:fontRef>
-        </p:style>
-        <p:txBody>
-          <a:bodyPr rtlCol="0" anchor="ctr"/>
-          <a:lstStyle/>
-          <a:p>
-            <a:pPr algn="ctr"/>
-            <a:r>
-              <a:rPr lang="en-US" sz="1050" dirty="0">
-                <a:solidFill>
-                  <a:schemeClr val="bg1"/>
-                </a:solidFill>
-              </a:rPr>
-              <a:t>Slot</a:t>
-            </a:r>
-            <a:endParaRPr lang="en-SG" sz="1050" dirty="0">
-              <a:solidFill>
-                <a:schemeClr val="bg1"/>
-              </a:solidFill>
-            </a:endParaRPr>
-          </a:p>
-        </p:txBody>
-      </p:sp>
-      <p:sp>
-        <p:nvSpPr>
-          <p:cNvPr id="23" name="Rectangle 22"/>
-          <p:cNvSpPr/>
-          <p:nvPr/>
-        </p:nvSpPr>
-        <p:spPr>
-          <a:xfrm>
-            <a:off x="2410207" y="4460471"/>
-            <a:ext cx="790193" cy="346760"/>
-          </a:xfrm>
-          <a:prstGeom prst="rect">
-            <a:avLst/>
-          </a:prstGeom>
-          <a:solidFill>
-            <a:srgbClr val="00B050"/>
-          </a:solidFill>
-          <a:ln w="19050">
-            <a:solidFill>
-              <a:srgbClr val="00B050"/>
-            </a:solidFill>
-          </a:ln>
-          <a:effectLst/>
-        </p:spPr>
-        <p:style>
-          <a:lnRef idx="1">
-            <a:schemeClr val="accent2"/>
-          </a:lnRef>
-          <a:fillRef idx="2">
-            <a:schemeClr val="accent2"/>
-          </a:fillRef>
-          <a:effectRef idx="1">
-            <a:schemeClr val="accent2"/>
-          </a:effectRef>
-          <a:fontRef idx="minor">
-            <a:schemeClr val="dk1"/>
-          </a:fontRef>
-        </p:style>
-        <p:txBody>
-          <a:bodyPr rtlCol="0" anchor="ctr"/>
-          <a:lstStyle/>
-          <a:p>
-            <a:pPr algn="ctr"/>
-            <a:r>
-              <a:rPr lang="en-US" sz="1050" dirty="0" err="1">
-                <a:solidFill>
-                  <a:schemeClr val="bg1"/>
-                </a:solidFill>
-              </a:rPr>
-              <a:t>StorageFile</a:t>
-            </a:r>
-            <a:endParaRPr lang="en-SG" sz="1050" dirty="0">
-              <a:solidFill>
-                <a:schemeClr val="bg1"/>
-              </a:solidFill>
-            </a:endParaRPr>
-          </a:p>
-        </p:txBody>
-      </p:sp>
-      <p:cxnSp>
-        <p:nvCxnSpPr>
-          <p:cNvPr id="35" name="Elbow Connector 34"/>
-          <p:cNvCxnSpPr>
-            <a:stCxn id="12" idx="1"/>
-            <a:endCxn id="9" idx="3"/>
-          </p:cNvCxnSpPr>
-          <p:nvPr/>
-        </p:nvCxnSpPr>
-        <p:spPr>
-          <a:xfrm rot="10800000" flipV="1">
-            <a:off x="812799" y="4087188"/>
-            <a:ext cx="331174" cy="6631"/>
-          </a:xfrm>
-          <a:prstGeom prst="bentConnector3">
-            <a:avLst>
-              <a:gd name="adj1" fmla="val 50000"/>
-            </a:avLst>
-          </a:prstGeom>
-          <a:ln w="19050">
-            <a:solidFill>
-              <a:srgbClr val="C00000"/>
-            </a:solidFill>
-            <a:headEnd type="none" w="med" len="med"/>
-            <a:tailEnd type="arrow" w="med" len="med"/>
-          </a:ln>
-          <a:effectLst/>
-        </p:spPr>
-        <p:style>
-          <a:lnRef idx="1">
-            <a:schemeClr val="accent2"/>
-          </a:lnRef>
-          <a:fillRef idx="2">
-            <a:schemeClr val="accent2"/>
-          </a:fillRef>
-          <a:effectRef idx="1">
-            <a:schemeClr val="accent2"/>
-          </a:effectRef>
-          <a:fontRef idx="minor">
-            <a:schemeClr val="dk1"/>
+            <a:schemeClr val="tx1"/>
           </a:fontRef>
         </p:style>
       </p:cxnSp>
       <p:cxnSp>
         <p:nvCxnSpPr>
-          <p:cNvPr id="38" name="Elbow Connector 37"/>
+          <p:cNvPr id="31" name="Straight Arrow Connector 30"/>
           <p:cNvCxnSpPr/>
           <p:nvPr/>
         </p:nvCxnSpPr>
         <p:spPr>
-          <a:xfrm rot="5400000" flipH="1" flipV="1">
-            <a:off x="2793471" y="3541515"/>
-            <a:ext cx="342611" cy="12700"/>
+          <a:xfrm>
+            <a:off x="5097447" y="3761908"/>
+            <a:ext cx="0" cy="381000"/>
           </a:xfrm>
-          <a:prstGeom prst="bentConnector3">
-            <a:avLst>
-              <a:gd name="adj1" fmla="val 50000"/>
-            </a:avLst>
+          <a:prstGeom prst="straightConnector1">
+            <a:avLst/>
           </a:prstGeom>
-          <a:ln w="19050">
+          <a:ln w="28575">
             <a:solidFill>
-              <a:srgbClr val="0070C0"/>
+              <a:schemeClr val="accent5">
+                <a:lumMod val="75000"/>
+              </a:schemeClr>
             </a:solidFill>
-            <a:prstDash val="dash"/>
-            <a:headEnd type="none" w="med" len="med"/>
-            <a:tailEnd type="arrow" w="med" len="med"/>
+            <a:prstDash val="sysDot"/>
+            <a:tailEnd type="arrow"/>
           </a:ln>
-          <a:effectLst/>
         </p:spPr>
         <p:style>
           <a:lnRef idx="1">
-            <a:schemeClr val="accent2"/>
+            <a:schemeClr val="accent1"/>
           </a:lnRef>
-          <a:fillRef idx="2">
-            <a:schemeClr val="accent2"/>
+          <a:fillRef idx="0">
+            <a:schemeClr val="accent1"/>
           </a:fillRef>
-          <a:effectRef idx="1">
-            <a:schemeClr val="accent2"/>
+          <a:effectRef idx="0">
+            <a:schemeClr val="accent1"/>
           </a:effectRef>
           <a:fontRef idx="minor">
-            <a:schemeClr val="dk1"/>
+            <a:schemeClr val="tx1"/>
           </a:fontRef>
         </p:style>
       </p:cxnSp>
       <p:cxnSp>
         <p:nvCxnSpPr>
-          <p:cNvPr id="41" name="Elbow Connector 40"/>
-          <p:cNvCxnSpPr>
-            <a:stCxn id="66" idx="2"/>
-            <a:endCxn id="23" idx="0"/>
-          </p:cNvCxnSpPr>
+          <p:cNvPr id="33" name="Straight Arrow Connector 32"/>
+          <p:cNvCxnSpPr/>
           <p:nvPr/>
         </p:nvCxnSpPr>
         <p:spPr>
-          <a:xfrm rot="5400000">
-            <a:off x="2646817" y="4301983"/>
-            <a:ext cx="316975" cy="12700"/>
+          <a:xfrm>
+            <a:off x="5249847" y="3750994"/>
+            <a:ext cx="0" cy="381000"/>
           </a:xfrm>
-          <a:prstGeom prst="bentConnector3">
-            <a:avLst>
-              <a:gd name="adj1" fmla="val 50000"/>
-            </a:avLst>
+          <a:prstGeom prst="straightConnector1">
+            <a:avLst/>
           </a:prstGeom>
-          <a:ln w="19050">
+          <a:ln w="28575">
             <a:solidFill>
-              <a:srgbClr val="0070C0"/>
+              <a:schemeClr val="accent5">
+                <a:lumMod val="75000"/>
+              </a:schemeClr>
             </a:solidFill>
-            <a:headEnd type="none" w="med" len="med"/>
-            <a:tailEnd type="arrow" w="med" len="med"/>
+            <a:prstDash val="sysDot"/>
+            <a:tailEnd type="arrow"/>
           </a:ln>
-          <a:effectLst/>
         </p:spPr>
         <p:style>
           <a:lnRef idx="1">
-            <a:schemeClr val="accent2"/>
+            <a:schemeClr val="accent1"/>
           </a:lnRef>
-          <a:fillRef idx="2">
-            <a:schemeClr val="accent2"/>
+          <a:fillRef idx="0">
+            <a:schemeClr val="accent1"/>
           </a:fillRef>
-          <a:effectRef idx="1">
-            <a:schemeClr val="accent2"/>
+          <a:effectRef idx="0">
+            <a:schemeClr val="accent1"/>
           </a:effectRef>
           <a:fontRef idx="minor">
-            <a:schemeClr val="dk1"/>
+            <a:schemeClr val="tx1"/>
           </a:fontRef>
         </p:style>
       </p:cxnSp>
       <p:cxnSp>
         <p:nvCxnSpPr>
-          <p:cNvPr id="51" name="Elbow Connector 50"/>
+          <p:cNvPr id="37" name="Straight Arrow Connector 36"/>
           <p:cNvCxnSpPr>
-            <a:stCxn id="106" idx="3"/>
-            <a:endCxn id="16" idx="1"/>
+            <a:stCxn id="23" idx="1"/>
           </p:cNvCxnSpPr>
           <p:nvPr/>
         </p:nvCxnSpPr>
         <p:spPr>
           <a:xfrm>
-            <a:off x="4648442" y="3918486"/>
-            <a:ext cx="424477" cy="607579"/>
-          </a:xfrm>
-          <a:prstGeom prst="bentConnector3">
-            <a:avLst>
-              <a:gd name="adj1" fmla="val 52660"/>
-            </a:avLst>
-          </a:prstGeom>
-          <a:ln w="19050">
-            <a:headEnd type="none" w="med" len="med"/>
-            <a:tailEnd type="arrow" w="med" len="med"/>
-          </a:ln>
-          <a:effectLst/>
-        </p:spPr>
-        <p:style>
-          <a:lnRef idx="1">
-            <a:schemeClr val="accent6"/>
-          </a:lnRef>
-          <a:fillRef idx="2">
-            <a:schemeClr val="accent6"/>
-          </a:fillRef>
-          <a:effectRef idx="1">
-            <a:schemeClr val="accent6"/>
-          </a:effectRef>
-          <a:fontRef idx="minor">
-            <a:schemeClr val="dk1"/>
-          </a:fontRef>
-        </p:style>
-      </p:cxnSp>
-      <p:sp>
-        <p:nvSpPr>
-          <p:cNvPr id="100" name="Flowchart: Decision 99"/>
-          <p:cNvSpPr/>
-          <p:nvPr/>
-        </p:nvSpPr>
-        <p:spPr>
-          <a:xfrm>
-            <a:off x="6012352" y="4439375"/>
-            <a:ext cx="236048" cy="173380"/>
-          </a:xfrm>
-          <a:prstGeom prst="flowChartDecision">
-            <a:avLst/>
-          </a:prstGeom>
-          <a:noFill/>
-          <a:ln w="19050"/>
-          <a:effectLst/>
-        </p:spPr>
-        <p:style>
-          <a:lnRef idx="1">
-            <a:schemeClr val="accent6"/>
-          </a:lnRef>
-          <a:fillRef idx="2">
-            <a:schemeClr val="accent6"/>
-          </a:fillRef>
-          <a:effectRef idx="1">
-            <a:schemeClr val="accent6"/>
-          </a:effectRef>
-          <a:fontRef idx="minor">
-            <a:schemeClr val="dk1"/>
-          </a:fontRef>
-        </p:style>
-        <p:txBody>
-          <a:bodyPr rtlCol="0" anchor="ctr"/>
-          <a:lstStyle/>
-          <a:p>
-            <a:pPr algn="ctr"/>
-            <a:endParaRPr lang="en-US" sz="1050"/>
-          </a:p>
-        </p:txBody>
-      </p:sp>
-      <p:sp>
-        <p:nvSpPr>
-          <p:cNvPr id="106" name="Flowchart: Decision 105"/>
-          <p:cNvSpPr/>
-          <p:nvPr/>
-        </p:nvSpPr>
-        <p:spPr>
-          <a:xfrm>
-            <a:off x="4412394" y="3831796"/>
-            <a:ext cx="236048" cy="173380"/>
-          </a:xfrm>
-          <a:prstGeom prst="flowChartDecision">
-            <a:avLst/>
-          </a:prstGeom>
-          <a:solidFill>
-            <a:schemeClr val="accent6"/>
-          </a:solidFill>
-          <a:ln w="19050"/>
-          <a:effectLst/>
-        </p:spPr>
-        <p:style>
-          <a:lnRef idx="1">
-            <a:schemeClr val="accent6"/>
-          </a:lnRef>
-          <a:fillRef idx="2">
-            <a:schemeClr val="accent6"/>
-          </a:fillRef>
-          <a:effectRef idx="1">
-            <a:schemeClr val="accent6"/>
-          </a:effectRef>
-          <a:fontRef idx="minor">
-            <a:schemeClr val="dk1"/>
-          </a:fontRef>
-        </p:style>
-        <p:txBody>
-          <a:bodyPr rtlCol="0" anchor="ctr"/>
-          <a:lstStyle/>
-          <a:p>
-            <a:pPr algn="ctr"/>
-            <a:endParaRPr lang="en-US" sz="1050"/>
-          </a:p>
-        </p:txBody>
-      </p:sp>
-      <p:cxnSp>
-        <p:nvCxnSpPr>
-          <p:cNvPr id="115" name="Straight Arrow Connector 114"/>
-          <p:cNvCxnSpPr>
-            <a:stCxn id="100" idx="3"/>
-            <a:endCxn id="19" idx="1"/>
-          </p:cNvCxnSpPr>
-          <p:nvPr/>
-        </p:nvCxnSpPr>
-        <p:spPr>
-          <a:xfrm>
-            <a:off x="6248400" y="4526065"/>
-            <a:ext cx="389308" cy="0"/>
+            <a:off x="2743200" y="4244913"/>
+            <a:ext cx="249770" cy="0"/>
           </a:xfrm>
           <a:prstGeom prst="straightConnector1">
             <a:avLst/>
           </a:prstGeom>
-          <a:ln w="19050">
-            <a:headEnd type="none" w="med" len="med"/>
-            <a:tailEnd type="arrow" w="med" len="med"/>
+          <a:ln w="28575">
+            <a:solidFill>
+              <a:srgbClr val="C00000"/>
+            </a:solidFill>
+            <a:prstDash val="solid"/>
+            <a:tailEnd type="arrow"/>
           </a:ln>
-          <a:effectLst/>
         </p:spPr>
         <p:style>
           <a:lnRef idx="1">
-            <a:schemeClr val="accent6"/>
+            <a:schemeClr val="accent1"/>
           </a:lnRef>
-          <a:fillRef idx="2">
-            <a:schemeClr val="accent6"/>
+          <a:fillRef idx="0">
+            <a:schemeClr val="accent1"/>
           </a:fillRef>
-          <a:effectRef idx="1">
-            <a:schemeClr val="accent6"/>
+          <a:effectRef idx="0">
+            <a:schemeClr val="accent1"/>
           </a:effectRef>
           <a:fontRef idx="minor">
-            <a:schemeClr val="dk1"/>
-          </a:fontRef>
-        </p:style>
-      </p:cxnSp>
-      <p:sp>
-        <p:nvSpPr>
-          <p:cNvPr id="129" name="Rectangle 128"/>
-          <p:cNvSpPr/>
-          <p:nvPr/>
-        </p:nvSpPr>
-        <p:spPr>
-          <a:xfrm>
-            <a:off x="6363802" y="5140408"/>
-            <a:ext cx="1408598" cy="346760"/>
-          </a:xfrm>
-          <a:prstGeom prst="rect">
-            <a:avLst/>
-          </a:prstGeom>
-          <a:ln w="19050"/>
-          <a:effectLst/>
-        </p:spPr>
-        <p:style>
-          <a:lnRef idx="1">
-            <a:schemeClr val="accent4"/>
-          </a:lnRef>
-          <a:fillRef idx="2">
-            <a:schemeClr val="accent4"/>
-          </a:fillRef>
-          <a:effectRef idx="1">
-            <a:schemeClr val="accent4"/>
-          </a:effectRef>
-          <a:fontRef idx="minor">
-            <a:schemeClr val="dk1"/>
-          </a:fontRef>
-        </p:style>
-        <p:txBody>
-          <a:bodyPr rtlCol="0" anchor="ctr"/>
-          <a:lstStyle/>
-          <a:p>
-            <a:pPr algn="ctr"/>
-            <a:r>
-              <a:rPr lang="en-US" sz="1050" dirty="0"/>
-              <a:t>&lt;&lt;interface&gt;&gt;</a:t>
-            </a:r>
-          </a:p>
-          <a:p>
-            <a:pPr algn="ctr"/>
-            <a:r>
-              <a:rPr lang="en-US" sz="1050" dirty="0" err="1"/>
-              <a:t>ReadOnlySlot</a:t>
-            </a:r>
-            <a:endParaRPr lang="en-SG" sz="1050" dirty="0"/>
-          </a:p>
-        </p:txBody>
-      </p:sp>
-      <p:cxnSp>
-        <p:nvCxnSpPr>
-          <p:cNvPr id="132" name="Elbow Connector 131"/>
-          <p:cNvCxnSpPr>
-            <a:endCxn id="129" idx="1"/>
-          </p:cNvCxnSpPr>
-          <p:nvPr/>
-        </p:nvCxnSpPr>
-        <p:spPr>
-          <a:xfrm>
-            <a:off x="304800" y="3006041"/>
-            <a:ext cx="6059002" cy="2307747"/>
-          </a:xfrm>
-          <a:prstGeom prst="bentConnector3">
-            <a:avLst>
-              <a:gd name="adj1" fmla="val 0"/>
-            </a:avLst>
-          </a:prstGeom>
-          <a:ln w="19050">
-            <a:solidFill>
-              <a:srgbClr val="C00000"/>
-            </a:solidFill>
-            <a:prstDash val="dash"/>
-            <a:headEnd type="none" w="med" len="med"/>
-            <a:tailEnd type="arrow" w="med" len="med"/>
-          </a:ln>
-          <a:effectLst/>
-        </p:spPr>
-        <p:style>
-          <a:lnRef idx="1">
-            <a:schemeClr val="accent2"/>
-          </a:lnRef>
-          <a:fillRef idx="2">
-            <a:schemeClr val="accent2"/>
-          </a:fillRef>
-          <a:effectRef idx="1">
-            <a:schemeClr val="accent2"/>
-          </a:effectRef>
-          <a:fontRef idx="minor">
-            <a:schemeClr val="dk1"/>
-          </a:fontRef>
-        </p:style>
-      </p:cxnSp>
-      <p:sp>
-        <p:nvSpPr>
-          <p:cNvPr id="135" name="Isosceles Triangle 134"/>
-          <p:cNvSpPr/>
-          <p:nvPr/>
-        </p:nvSpPr>
-        <p:spPr>
-          <a:xfrm rot="10800000">
-            <a:off x="6964221" y="4953000"/>
-            <a:ext cx="270504" cy="175523"/>
-          </a:xfrm>
-          <a:prstGeom prst="triangle">
-            <a:avLst/>
-          </a:prstGeom>
-          <a:ln w="19050"/>
-          <a:effectLst/>
-        </p:spPr>
-        <p:style>
-          <a:lnRef idx="1">
-            <a:schemeClr val="accent4"/>
-          </a:lnRef>
-          <a:fillRef idx="2">
-            <a:schemeClr val="accent4"/>
-          </a:fillRef>
-          <a:effectRef idx="1">
-            <a:schemeClr val="accent4"/>
-          </a:effectRef>
-          <a:fontRef idx="minor">
-            <a:schemeClr val="dk1"/>
-          </a:fontRef>
-        </p:style>
-        <p:txBody>
-          <a:bodyPr rtlCol="0" anchor="ctr"/>
-          <a:lstStyle/>
-          <a:p>
-            <a:pPr algn="ctr"/>
-            <a:endParaRPr lang="en-SG" sz="1050"/>
-          </a:p>
-        </p:txBody>
-      </p:sp>
-      <p:cxnSp>
-        <p:nvCxnSpPr>
-          <p:cNvPr id="136" name="Elbow Connector 135"/>
-          <p:cNvCxnSpPr>
-            <a:stCxn id="19" idx="2"/>
-            <a:endCxn id="135" idx="3"/>
-          </p:cNvCxnSpPr>
-          <p:nvPr/>
-        </p:nvCxnSpPr>
-        <p:spPr>
-          <a:xfrm rot="5400000">
-            <a:off x="6974138" y="4824781"/>
-            <a:ext cx="253555" cy="2883"/>
-          </a:xfrm>
-          <a:prstGeom prst="bentConnector3">
-            <a:avLst>
-              <a:gd name="adj1" fmla="val 50000"/>
-            </a:avLst>
-          </a:prstGeom>
-          <a:ln w="19050">
-            <a:solidFill>
-              <a:srgbClr val="7030A0"/>
-            </a:solidFill>
-            <a:prstDash val="dash"/>
-            <a:headEnd type="none" w="med" len="med"/>
-            <a:tailEnd type="none" w="med" len="med"/>
-          </a:ln>
-          <a:effectLst/>
-        </p:spPr>
-        <p:style>
-          <a:lnRef idx="1">
-            <a:schemeClr val="accent6"/>
-          </a:lnRef>
-          <a:fillRef idx="2">
-            <a:schemeClr val="accent6"/>
-          </a:fillRef>
-          <a:effectRef idx="1">
-            <a:schemeClr val="accent6"/>
-          </a:effectRef>
-          <a:fontRef idx="minor">
-            <a:schemeClr val="dk1"/>
-          </a:fontRef>
-        </p:style>
-      </p:cxnSp>
-      <p:sp>
-        <p:nvSpPr>
-          <p:cNvPr id="46" name="Rectangle 45"/>
-          <p:cNvSpPr/>
-          <p:nvPr/>
-        </p:nvSpPr>
-        <p:spPr>
-          <a:xfrm>
-            <a:off x="3985078" y="1356188"/>
-            <a:ext cx="1611867" cy="444640"/>
-          </a:xfrm>
-          <a:prstGeom prst="rect">
-            <a:avLst/>
-          </a:prstGeom>
-          <a:solidFill>
-            <a:schemeClr val="accent5"/>
-          </a:solidFill>
-          <a:ln w="19050">
-            <a:solidFill>
-              <a:schemeClr val="accent5"/>
-            </a:solidFill>
-          </a:ln>
-          <a:effectLst/>
-        </p:spPr>
-        <p:style>
-          <a:lnRef idx="1">
-            <a:schemeClr val="accent5"/>
-          </a:lnRef>
-          <a:fillRef idx="2">
-            <a:schemeClr val="accent5"/>
-          </a:fillRef>
-          <a:effectRef idx="1">
-            <a:schemeClr val="accent5"/>
-          </a:effectRef>
-          <a:fontRef idx="minor">
-            <a:schemeClr val="dk1"/>
-          </a:fontRef>
-        </p:style>
-        <p:txBody>
-          <a:bodyPr rtlCol="0" anchor="ctr"/>
-          <a:lstStyle/>
-          <a:p>
-            <a:pPr algn="ctr"/>
-            <a:r>
-              <a:rPr lang="en-US" sz="1050" dirty="0">
-                <a:solidFill>
-                  <a:schemeClr val="bg1"/>
-                </a:solidFill>
-              </a:rPr>
-              <a:t>{abstract}</a:t>
-            </a:r>
-            <a:br>
-              <a:rPr lang="en-US" sz="1050" dirty="0">
-                <a:solidFill>
-                  <a:schemeClr val="bg1"/>
-                </a:solidFill>
-              </a:rPr>
-            </a:br>
-            <a:r>
-              <a:rPr lang="en-US" sz="1050" dirty="0">
-                <a:solidFill>
-                  <a:schemeClr val="bg1"/>
-                </a:solidFill>
-              </a:rPr>
-              <a:t>Command</a:t>
-            </a:r>
-            <a:endParaRPr lang="en-SG" sz="1050" dirty="0">
-              <a:solidFill>
-                <a:schemeClr val="bg1"/>
-              </a:solidFill>
-            </a:endParaRPr>
-          </a:p>
-        </p:txBody>
-      </p:sp>
-      <p:sp>
-        <p:nvSpPr>
-          <p:cNvPr id="50" name="Rectangle 49"/>
-          <p:cNvSpPr/>
-          <p:nvPr/>
-        </p:nvSpPr>
-        <p:spPr>
-          <a:xfrm flipH="1">
-            <a:off x="6142650" y="1059080"/>
-            <a:ext cx="1404109" cy="346760"/>
-          </a:xfrm>
-          <a:prstGeom prst="rect">
-            <a:avLst/>
-          </a:prstGeom>
-          <a:ln w="19050"/>
-          <a:effectLst/>
-        </p:spPr>
-        <p:style>
-          <a:lnRef idx="1">
-            <a:schemeClr val="accent5"/>
-          </a:lnRef>
-          <a:fillRef idx="2">
-            <a:schemeClr val="accent5"/>
-          </a:fillRef>
-          <a:effectRef idx="1">
-            <a:schemeClr val="accent5"/>
-          </a:effectRef>
-          <a:fontRef idx="minor">
-            <a:schemeClr val="dk1"/>
-          </a:fontRef>
-        </p:style>
-        <p:txBody>
-          <a:bodyPr rtlCol="0" anchor="ctr"/>
-          <a:lstStyle/>
-          <a:p>
-            <a:pPr algn="ctr"/>
-            <a:r>
-              <a:rPr lang="en-US" sz="1050" dirty="0" err="1"/>
-              <a:t>DeleteCommand</a:t>
-            </a:r>
-            <a:endParaRPr lang="en-SG" sz="1050" dirty="0"/>
-          </a:p>
-        </p:txBody>
-      </p:sp>
-      <p:sp>
-        <p:nvSpPr>
-          <p:cNvPr id="52" name="Rectangle 51"/>
-          <p:cNvSpPr/>
-          <p:nvPr/>
-        </p:nvSpPr>
-        <p:spPr>
-          <a:xfrm flipH="1">
-            <a:off x="6142650" y="1454067"/>
-            <a:ext cx="1404109" cy="346760"/>
-          </a:xfrm>
-          <a:prstGeom prst="rect">
-            <a:avLst/>
-          </a:prstGeom>
-          <a:ln w="19050"/>
-          <a:effectLst/>
-        </p:spPr>
-        <p:style>
-          <a:lnRef idx="1">
-            <a:schemeClr val="accent5"/>
-          </a:lnRef>
-          <a:fillRef idx="2">
-            <a:schemeClr val="accent5"/>
-          </a:fillRef>
-          <a:effectRef idx="1">
-            <a:schemeClr val="accent5"/>
-          </a:effectRef>
-          <a:fontRef idx="minor">
-            <a:schemeClr val="dk1"/>
-          </a:fontRef>
-        </p:style>
-        <p:txBody>
-          <a:bodyPr rtlCol="0" anchor="ctr"/>
-          <a:lstStyle/>
-          <a:p>
-            <a:pPr algn="ctr"/>
-            <a:r>
-              <a:rPr lang="en-US" sz="1050" dirty="0" err="1"/>
-              <a:t>ClearCommand</a:t>
-            </a:r>
-            <a:endParaRPr lang="en-SG" sz="1050" dirty="0"/>
-          </a:p>
-        </p:txBody>
-      </p:sp>
-      <p:sp>
-        <p:nvSpPr>
-          <p:cNvPr id="53" name="Rectangle 52"/>
-          <p:cNvSpPr/>
-          <p:nvPr/>
-        </p:nvSpPr>
-        <p:spPr>
-          <a:xfrm flipH="1">
-            <a:off x="6149690" y="3029424"/>
-            <a:ext cx="1404109" cy="346760"/>
-          </a:xfrm>
-          <a:prstGeom prst="rect">
-            <a:avLst/>
-          </a:prstGeom>
-          <a:ln w="19050"/>
-          <a:effectLst/>
-        </p:spPr>
-        <p:style>
-          <a:lnRef idx="1">
-            <a:schemeClr val="accent5"/>
-          </a:lnRef>
-          <a:fillRef idx="2">
-            <a:schemeClr val="accent5"/>
-          </a:fillRef>
-          <a:effectRef idx="1">
-            <a:schemeClr val="accent5"/>
-          </a:effectRef>
-          <a:fontRef idx="minor">
-            <a:schemeClr val="dk1"/>
-          </a:fontRef>
-        </p:style>
-        <p:txBody>
-          <a:bodyPr rtlCol="0" anchor="ctr"/>
-          <a:lstStyle/>
-          <a:p>
-            <a:pPr algn="ctr"/>
-            <a:r>
-              <a:rPr lang="en-US" sz="1050" dirty="0" err="1"/>
-              <a:t>IncorrectCommand</a:t>
-            </a:r>
-            <a:endParaRPr lang="en-SG" sz="1050" dirty="0"/>
-          </a:p>
-        </p:txBody>
-      </p:sp>
-      <p:sp>
-        <p:nvSpPr>
-          <p:cNvPr id="54" name="Isosceles Triangle 53"/>
-          <p:cNvSpPr/>
-          <p:nvPr/>
-        </p:nvSpPr>
-        <p:spPr>
-          <a:xfrm rot="16200000">
-            <a:off x="5549453" y="1571491"/>
-            <a:ext cx="270504" cy="175523"/>
-          </a:xfrm>
-          <a:prstGeom prst="triangle">
-            <a:avLst/>
-          </a:prstGeom>
-          <a:ln w="19050"/>
-          <a:effectLst/>
-        </p:spPr>
-        <p:style>
-          <a:lnRef idx="1">
-            <a:schemeClr val="accent5"/>
-          </a:lnRef>
-          <a:fillRef idx="2">
-            <a:schemeClr val="accent5"/>
-          </a:fillRef>
-          <a:effectRef idx="1">
-            <a:schemeClr val="accent5"/>
-          </a:effectRef>
-          <a:fontRef idx="minor">
-            <a:schemeClr val="dk1"/>
-          </a:fontRef>
-        </p:style>
-        <p:txBody>
-          <a:bodyPr rtlCol="0" anchor="ctr"/>
-          <a:lstStyle/>
-          <a:p>
-            <a:pPr algn="ctr"/>
-            <a:endParaRPr lang="en-SG" sz="1050"/>
-          </a:p>
-        </p:txBody>
-      </p:sp>
-      <p:cxnSp>
-        <p:nvCxnSpPr>
-          <p:cNvPr id="55" name="Elbow Connector 54"/>
-          <p:cNvCxnSpPr>
-            <a:stCxn id="54" idx="3"/>
-            <a:endCxn id="52" idx="3"/>
-          </p:cNvCxnSpPr>
-          <p:nvPr/>
-        </p:nvCxnSpPr>
-        <p:spPr>
-          <a:xfrm flipV="1">
-            <a:off x="5772467" y="1627447"/>
-            <a:ext cx="370183" cy="31806"/>
-          </a:xfrm>
-          <a:prstGeom prst="bentConnector3">
-            <a:avLst>
-              <a:gd name="adj1" fmla="val 50000"/>
-            </a:avLst>
-          </a:prstGeom>
-          <a:noFill/>
-          <a:ln w="19050"/>
-          <a:effectLst/>
-        </p:spPr>
-        <p:style>
-          <a:lnRef idx="1">
-            <a:schemeClr val="accent5"/>
-          </a:lnRef>
-          <a:fillRef idx="2">
-            <a:schemeClr val="accent5"/>
-          </a:fillRef>
-          <a:effectRef idx="1">
-            <a:schemeClr val="accent5"/>
-          </a:effectRef>
-          <a:fontRef idx="minor">
-            <a:schemeClr val="dk1"/>
+            <a:schemeClr val="tx1"/>
           </a:fontRef>
         </p:style>
       </p:cxnSp>
       <p:cxnSp>
         <p:nvCxnSpPr>
-          <p:cNvPr id="56" name="Elbow Connector 55"/>
-          <p:cNvCxnSpPr>
-            <a:stCxn id="54" idx="3"/>
-            <a:endCxn id="50" idx="3"/>
-          </p:cNvCxnSpPr>
+          <p:cNvPr id="38" name="Straight Arrow Connector 37"/>
+          <p:cNvCxnSpPr/>
           <p:nvPr/>
         </p:nvCxnSpPr>
         <p:spPr>
-          <a:xfrm flipV="1">
-            <a:off x="5772467" y="1232460"/>
-            <a:ext cx="370183" cy="426793"/>
+          <a:xfrm rot="13867188">
+            <a:off x="2743200" y="3755022"/>
+            <a:ext cx="0" cy="381000"/>
           </a:xfrm>
-          <a:prstGeom prst="bentConnector3">
-            <a:avLst>
-              <a:gd name="adj1" fmla="val 50000"/>
-            </a:avLst>
+          <a:prstGeom prst="straightConnector1">
+            <a:avLst/>
           </a:prstGeom>
-          <a:noFill/>
-          <a:ln w="19050"/>
-          <a:effectLst/>
+          <a:ln w="28575">
+            <a:solidFill>
+              <a:srgbClr val="C00000"/>
+            </a:solidFill>
+            <a:prstDash val="solid"/>
+            <a:tailEnd type="arrow"/>
+          </a:ln>
         </p:spPr>
         <p:style>
           <a:lnRef idx="1">
-            <a:schemeClr val="accent5"/>
+            <a:schemeClr val="accent1"/>
           </a:lnRef>
-          <a:fillRef idx="2">
-            <a:schemeClr val="accent5"/>
+          <a:fillRef idx="0">
+            <a:schemeClr val="accent1"/>
           </a:fillRef>
-          <a:effectRef idx="1">
-            <a:schemeClr val="accent5"/>
+          <a:effectRef idx="0">
+            <a:schemeClr val="accent1"/>
           </a:effectRef>
           <a:fontRef idx="minor">
-            <a:schemeClr val="dk1"/>
+            <a:schemeClr val="tx1"/>
           </a:fontRef>
         </p:style>
       </p:cxnSp>
       <p:cxnSp>
         <p:nvCxnSpPr>
-          <p:cNvPr id="57" name="Elbow Connector 56"/>
-          <p:cNvCxnSpPr>
-            <a:stCxn id="54" idx="3"/>
-            <a:endCxn id="53" idx="3"/>
-          </p:cNvCxnSpPr>
-          <p:nvPr/>
-        </p:nvCxnSpPr>
-        <p:spPr>
-          <a:xfrm>
-            <a:off x="5772467" y="1659253"/>
-            <a:ext cx="377223" cy="1543551"/>
-          </a:xfrm>
-          <a:prstGeom prst="bentConnector3">
-            <a:avLst>
-              <a:gd name="adj1" fmla="val 50000"/>
-            </a:avLst>
-          </a:prstGeom>
-          <a:noFill/>
-          <a:ln w="19050"/>
-          <a:effectLst/>
-        </p:spPr>
-        <p:style>
-          <a:lnRef idx="1">
-            <a:schemeClr val="accent5"/>
-          </a:lnRef>
-          <a:fillRef idx="2">
-            <a:schemeClr val="accent5"/>
-          </a:fillRef>
-          <a:effectRef idx="1">
-            <a:schemeClr val="accent5"/>
-          </a:effectRef>
-          <a:fontRef idx="minor">
-            <a:schemeClr val="dk1"/>
-          </a:fontRef>
-        </p:style>
-      </p:cxnSp>
-      <p:cxnSp>
-        <p:nvCxnSpPr>
-          <p:cNvPr id="60" name="Elbow Connector 59"/>
-          <p:cNvCxnSpPr>
-            <a:cxnSpLocks/>
-            <a:stCxn id="54" idx="3"/>
-            <a:endCxn id="78" idx="3"/>
-          </p:cNvCxnSpPr>
-          <p:nvPr/>
-        </p:nvCxnSpPr>
-        <p:spPr>
-          <a:xfrm>
-            <a:off x="5772467" y="1659253"/>
-            <a:ext cx="370182" cy="358247"/>
-          </a:xfrm>
-          <a:prstGeom prst="bentConnector3">
-            <a:avLst>
-              <a:gd name="adj1" fmla="val 50000"/>
-            </a:avLst>
-          </a:prstGeom>
-          <a:noFill/>
-          <a:ln w="19050"/>
-          <a:effectLst/>
-        </p:spPr>
-        <p:style>
-          <a:lnRef idx="1">
-            <a:schemeClr val="accent5"/>
-          </a:lnRef>
-          <a:fillRef idx="2">
-            <a:schemeClr val="accent5"/>
-          </a:fillRef>
-          <a:effectRef idx="1">
-            <a:schemeClr val="accent5"/>
-          </a:effectRef>
-          <a:fontRef idx="minor">
-            <a:schemeClr val="dk1"/>
-          </a:fontRef>
-        </p:style>
-      </p:cxnSp>
-      <p:cxnSp>
-        <p:nvCxnSpPr>
-          <p:cNvPr id="67" name="Elbow Connector 66"/>
-          <p:cNvCxnSpPr>
-            <a:endCxn id="46" idx="1"/>
-          </p:cNvCxnSpPr>
-          <p:nvPr/>
-        </p:nvCxnSpPr>
-        <p:spPr>
-          <a:xfrm rot="5400000" flipH="1" flipV="1">
-            <a:off x="2764336" y="1785299"/>
-            <a:ext cx="1427532" cy="1013951"/>
-          </a:xfrm>
-          <a:prstGeom prst="bentConnector2">
-            <a:avLst/>
-          </a:prstGeom>
-          <a:ln w="19050">
-            <a:solidFill>
-              <a:srgbClr val="0070C0"/>
-            </a:solidFill>
-            <a:prstDash val="dash"/>
-            <a:headEnd type="none" w="med" len="med"/>
-            <a:tailEnd type="arrow" w="med" len="med"/>
-          </a:ln>
-          <a:effectLst/>
-        </p:spPr>
-        <p:style>
-          <a:lnRef idx="1">
-            <a:schemeClr val="accent2"/>
-          </a:lnRef>
-          <a:fillRef idx="2">
-            <a:schemeClr val="accent2"/>
-          </a:fillRef>
-          <a:effectRef idx="1">
-            <a:schemeClr val="accent2"/>
-          </a:effectRef>
-          <a:fontRef idx="minor">
-            <a:schemeClr val="dk1"/>
-          </a:fontRef>
-        </p:style>
-      </p:cxnSp>
-      <p:cxnSp>
-        <p:nvCxnSpPr>
-          <p:cNvPr id="70" name="Elbow Connector 69"/>
-          <p:cNvCxnSpPr/>
-          <p:nvPr/>
-        </p:nvCxnSpPr>
-        <p:spPr>
-          <a:xfrm rot="5400000" flipH="1" flipV="1">
-            <a:off x="2182965" y="1908384"/>
-            <a:ext cx="2256600" cy="1347626"/>
-          </a:xfrm>
-          <a:prstGeom prst="bentConnector3">
-            <a:avLst>
-              <a:gd name="adj1" fmla="val 99901"/>
-            </a:avLst>
-          </a:prstGeom>
-          <a:ln w="19050">
-            <a:solidFill>
-              <a:srgbClr val="0070C0"/>
-            </a:solidFill>
-            <a:prstDash val="dash"/>
-            <a:headEnd type="none" w="med" len="med"/>
-            <a:tailEnd type="arrow" w="med" len="med"/>
-          </a:ln>
-          <a:effectLst/>
-        </p:spPr>
-        <p:style>
-          <a:lnRef idx="1">
-            <a:schemeClr val="accent2"/>
-          </a:lnRef>
-          <a:fillRef idx="2">
-            <a:schemeClr val="accent2"/>
-          </a:fillRef>
-          <a:effectRef idx="1">
-            <a:schemeClr val="accent2"/>
-          </a:effectRef>
-          <a:fontRef idx="minor">
-            <a:schemeClr val="dk1"/>
-          </a:fontRef>
-        </p:style>
-      </p:cxnSp>
-      <p:cxnSp>
-        <p:nvCxnSpPr>
-          <p:cNvPr id="73" name="Elbow Connector 72"/>
-          <p:cNvCxnSpPr/>
-          <p:nvPr/>
-        </p:nvCxnSpPr>
-        <p:spPr>
-          <a:xfrm rot="5400000">
-            <a:off x="3213414" y="2790743"/>
-            <a:ext cx="1889726" cy="6348"/>
-          </a:xfrm>
-          <a:prstGeom prst="bentConnector3">
-            <a:avLst>
-              <a:gd name="adj1" fmla="val 50000"/>
-            </a:avLst>
-          </a:prstGeom>
-          <a:ln w="19050">
-            <a:solidFill>
-              <a:schemeClr val="accent5"/>
-            </a:solidFill>
-            <a:prstDash val="dash"/>
-            <a:headEnd type="none" w="med" len="med"/>
-            <a:tailEnd type="arrow" w="med" len="med"/>
-          </a:ln>
-          <a:effectLst/>
-        </p:spPr>
-        <p:style>
-          <a:lnRef idx="1">
-            <a:schemeClr val="accent2"/>
-          </a:lnRef>
-          <a:fillRef idx="2">
-            <a:schemeClr val="accent2"/>
-          </a:fillRef>
-          <a:effectRef idx="1">
-            <a:schemeClr val="accent2"/>
-          </a:effectRef>
-          <a:fontRef idx="minor">
-            <a:schemeClr val="dk1"/>
-          </a:fontRef>
-        </p:style>
-      </p:cxnSp>
-      <p:sp>
-        <p:nvSpPr>
-          <p:cNvPr id="81" name="Rectangle 80"/>
-          <p:cNvSpPr/>
-          <p:nvPr/>
-        </p:nvSpPr>
-        <p:spPr>
-          <a:xfrm flipH="1">
-            <a:off x="2637450" y="720040"/>
-            <a:ext cx="1404109" cy="346760"/>
-          </a:xfrm>
-          <a:prstGeom prst="rect">
-            <a:avLst/>
-          </a:prstGeom>
-          <a:ln w="19050"/>
-          <a:effectLst/>
-        </p:spPr>
-        <p:style>
-          <a:lnRef idx="1">
-            <a:schemeClr val="accent5"/>
-          </a:lnRef>
-          <a:fillRef idx="2">
-            <a:schemeClr val="accent5"/>
-          </a:fillRef>
-          <a:effectRef idx="1">
-            <a:schemeClr val="accent5"/>
-          </a:effectRef>
-          <a:fontRef idx="minor">
-            <a:schemeClr val="dk1"/>
-          </a:fontRef>
-        </p:style>
-        <p:txBody>
-          <a:bodyPr rtlCol="0" anchor="ctr"/>
-          <a:lstStyle/>
-          <a:p>
-            <a:pPr algn="ctr"/>
-            <a:r>
-              <a:rPr lang="en-US" sz="1050" dirty="0" err="1"/>
-              <a:t>CommandResult</a:t>
-            </a:r>
-            <a:endParaRPr lang="en-SG" sz="1050" dirty="0"/>
-          </a:p>
-        </p:txBody>
-      </p:sp>
-      <p:cxnSp>
-        <p:nvCxnSpPr>
-          <p:cNvPr id="82" name="Elbow Connector 81"/>
-          <p:cNvCxnSpPr>
-            <a:stCxn id="46" idx="0"/>
-            <a:endCxn id="81" idx="1"/>
-          </p:cNvCxnSpPr>
-          <p:nvPr/>
-        </p:nvCxnSpPr>
-        <p:spPr>
-          <a:xfrm rot="16200000" flipV="1">
-            <a:off x="4184902" y="750077"/>
-            <a:ext cx="462768" cy="749453"/>
-          </a:xfrm>
-          <a:prstGeom prst="bentConnector2">
-            <a:avLst/>
-          </a:prstGeom>
-          <a:ln w="19050">
-            <a:solidFill>
-              <a:schemeClr val="accent5"/>
-            </a:solidFill>
-            <a:prstDash val="dash"/>
-            <a:headEnd type="none" w="med" len="med"/>
-            <a:tailEnd type="arrow" w="med" len="med"/>
-          </a:ln>
-          <a:effectLst/>
-        </p:spPr>
-        <p:style>
-          <a:lnRef idx="1">
-            <a:schemeClr val="accent2"/>
-          </a:lnRef>
-          <a:fillRef idx="2">
-            <a:schemeClr val="accent2"/>
-          </a:fillRef>
-          <a:effectRef idx="1">
-            <a:schemeClr val="accent2"/>
-          </a:effectRef>
-          <a:fontRef idx="minor">
-            <a:schemeClr val="dk1"/>
-          </a:fontRef>
-        </p:style>
-      </p:cxnSp>
-      <p:cxnSp>
-        <p:nvCxnSpPr>
-          <p:cNvPr id="84" name="Elbow Connector 83"/>
-          <p:cNvCxnSpPr>
-            <a:endCxn id="81" idx="3"/>
-          </p:cNvCxnSpPr>
-          <p:nvPr/>
-        </p:nvCxnSpPr>
-        <p:spPr>
-          <a:xfrm flipV="1">
-            <a:off x="304800" y="893420"/>
-            <a:ext cx="2332650" cy="1763378"/>
-          </a:xfrm>
-          <a:prstGeom prst="bentConnector3">
-            <a:avLst>
-              <a:gd name="adj1" fmla="val 109"/>
-            </a:avLst>
-          </a:prstGeom>
-          <a:ln w="19050">
-            <a:solidFill>
-              <a:srgbClr val="C00000"/>
-            </a:solidFill>
-            <a:prstDash val="dash"/>
-            <a:headEnd type="none" w="med" len="med"/>
-            <a:tailEnd type="arrow" w="med" len="med"/>
-          </a:ln>
-          <a:effectLst/>
-        </p:spPr>
-        <p:style>
-          <a:lnRef idx="1">
-            <a:schemeClr val="accent2"/>
-          </a:lnRef>
-          <a:fillRef idx="2">
-            <a:schemeClr val="accent2"/>
-          </a:fillRef>
-          <a:effectRef idx="1">
-            <a:schemeClr val="accent2"/>
-          </a:effectRef>
-          <a:fontRef idx="minor">
-            <a:schemeClr val="dk1"/>
-          </a:fontRef>
-        </p:style>
-      </p:cxnSp>
-      <p:sp>
-        <p:nvSpPr>
-          <p:cNvPr id="96" name="Rectangle 95"/>
-          <p:cNvSpPr/>
-          <p:nvPr/>
-        </p:nvSpPr>
-        <p:spPr>
-          <a:xfrm>
-            <a:off x="7803052" y="874142"/>
-            <a:ext cx="929296" cy="346760"/>
-          </a:xfrm>
-          <a:prstGeom prst="rect">
-            <a:avLst/>
-          </a:prstGeom>
-          <a:solidFill>
-            <a:schemeClr val="bg1"/>
-          </a:solidFill>
-          <a:ln w="19050">
-            <a:solidFill>
-              <a:schemeClr val="bg1">
-                <a:lumMod val="65000"/>
-              </a:schemeClr>
-            </a:solidFill>
-          </a:ln>
-          <a:effectLst/>
-        </p:spPr>
-        <p:style>
-          <a:lnRef idx="1">
-            <a:schemeClr val="accent3"/>
-          </a:lnRef>
-          <a:fillRef idx="2">
-            <a:schemeClr val="accent3"/>
-          </a:fillRef>
-          <a:effectRef idx="1">
-            <a:schemeClr val="accent3"/>
-          </a:effectRef>
-          <a:fontRef idx="minor">
-            <a:schemeClr val="dk1"/>
-          </a:fontRef>
-        </p:style>
-        <p:txBody>
-          <a:bodyPr rtlCol="0" anchor="ctr"/>
-          <a:lstStyle/>
-          <a:p>
-            <a:pPr algn="ctr"/>
-            <a:r>
-              <a:rPr lang="en-US" sz="1050" dirty="0">
-                <a:solidFill>
-                  <a:schemeClr val="bg1">
-                    <a:lumMod val="50000"/>
-                  </a:schemeClr>
-                </a:solidFill>
-              </a:rPr>
-              <a:t>Messages</a:t>
-            </a:r>
-            <a:endParaRPr lang="en-SG" sz="1050" dirty="0">
-              <a:solidFill>
-                <a:schemeClr val="bg1">
-                  <a:lumMod val="50000"/>
-                </a:schemeClr>
-              </a:solidFill>
-            </a:endParaRPr>
-          </a:p>
-        </p:txBody>
-      </p:sp>
-      <p:sp>
-        <p:nvSpPr>
-          <p:cNvPr id="98" name="Rectangle 97"/>
-          <p:cNvSpPr/>
-          <p:nvPr/>
-        </p:nvSpPr>
-        <p:spPr>
-          <a:xfrm>
-            <a:off x="7803052" y="1794505"/>
-            <a:ext cx="929296" cy="346760"/>
-          </a:xfrm>
-          <a:prstGeom prst="rect">
-            <a:avLst/>
-          </a:prstGeom>
-          <a:solidFill>
-            <a:schemeClr val="bg1"/>
-          </a:solidFill>
-          <a:ln w="19050">
-            <a:solidFill>
-              <a:schemeClr val="bg1">
-                <a:lumMod val="65000"/>
-              </a:schemeClr>
-            </a:solidFill>
-          </a:ln>
-          <a:effectLst/>
-        </p:spPr>
-        <p:style>
-          <a:lnRef idx="1">
-            <a:schemeClr val="accent3"/>
-          </a:lnRef>
-          <a:fillRef idx="2">
-            <a:schemeClr val="accent3"/>
-          </a:fillRef>
-          <a:effectRef idx="1">
-            <a:schemeClr val="accent3"/>
-          </a:effectRef>
-          <a:fontRef idx="minor">
-            <a:schemeClr val="dk1"/>
-          </a:fontRef>
-        </p:style>
-        <p:txBody>
-          <a:bodyPr rtlCol="0" anchor="ctr"/>
-          <a:lstStyle/>
-          <a:p>
-            <a:pPr algn="ctr"/>
-            <a:r>
-              <a:rPr lang="en-US" sz="1050" dirty="0" err="1">
-                <a:solidFill>
-                  <a:schemeClr val="bg1">
-                    <a:lumMod val="50000"/>
-                  </a:schemeClr>
-                </a:solidFill>
-              </a:rPr>
-              <a:t>Utils</a:t>
-            </a:r>
-            <a:endParaRPr lang="en-SG" sz="1050" dirty="0">
-              <a:solidFill>
-                <a:schemeClr val="bg1">
-                  <a:lumMod val="50000"/>
-                </a:schemeClr>
-              </a:solidFill>
-            </a:endParaRPr>
-          </a:p>
-        </p:txBody>
-      </p:sp>
-      <p:sp>
-        <p:nvSpPr>
-          <p:cNvPr id="99" name="Rectangle 98"/>
-          <p:cNvSpPr/>
-          <p:nvPr/>
-        </p:nvSpPr>
-        <p:spPr>
-          <a:xfrm>
-            <a:off x="5085126" y="3710497"/>
-            <a:ext cx="929296" cy="346760"/>
-          </a:xfrm>
-          <a:prstGeom prst="rect">
-            <a:avLst/>
-          </a:prstGeom>
-          <a:ln w="19050"/>
-          <a:effectLst/>
-        </p:spPr>
-        <p:style>
-          <a:lnRef idx="1">
-            <a:schemeClr val="accent6"/>
-          </a:lnRef>
-          <a:fillRef idx="2">
-            <a:schemeClr val="accent6"/>
-          </a:fillRef>
-          <a:effectRef idx="1">
-            <a:schemeClr val="accent6"/>
-          </a:effectRef>
-          <a:fontRef idx="minor">
-            <a:schemeClr val="dk1"/>
-          </a:fontRef>
-        </p:style>
-        <p:txBody>
-          <a:bodyPr rtlCol="0" anchor="ctr"/>
-          <a:lstStyle/>
-          <a:p>
-            <a:pPr algn="ctr"/>
-            <a:r>
-              <a:rPr lang="en-US" sz="1050" dirty="0"/>
-              <a:t>…Exception</a:t>
-            </a:r>
-            <a:endParaRPr lang="en-SG" sz="1050" dirty="0"/>
-          </a:p>
-        </p:txBody>
-      </p:sp>
-      <p:sp>
-        <p:nvSpPr>
-          <p:cNvPr id="101" name="Rectangle 100"/>
-          <p:cNvSpPr/>
-          <p:nvPr/>
-        </p:nvSpPr>
-        <p:spPr>
-          <a:xfrm>
-            <a:off x="3775013" y="4455640"/>
-            <a:ext cx="929296" cy="346760"/>
-          </a:xfrm>
-          <a:prstGeom prst="rect">
-            <a:avLst/>
-          </a:prstGeom>
-          <a:ln>
-            <a:solidFill>
-              <a:srgbClr val="00B050"/>
-            </a:solidFill>
-          </a:ln>
-          <a:effectLst/>
-        </p:spPr>
-        <p:style>
-          <a:lnRef idx="1">
-            <a:schemeClr val="accent3"/>
-          </a:lnRef>
-          <a:fillRef idx="2">
-            <a:schemeClr val="accent3"/>
-          </a:fillRef>
-          <a:effectRef idx="1">
-            <a:schemeClr val="accent3"/>
-          </a:effectRef>
-          <a:fontRef idx="minor">
-            <a:schemeClr val="dk1"/>
-          </a:fontRef>
-        </p:style>
-        <p:txBody>
-          <a:bodyPr rtlCol="0" anchor="ctr"/>
-          <a:lstStyle/>
-          <a:p>
-            <a:pPr algn="ctr"/>
-            <a:r>
-              <a:rPr lang="en-US" sz="1050" dirty="0"/>
-              <a:t>Adapted…</a:t>
-            </a:r>
-            <a:endParaRPr lang="en-SG" sz="1050" dirty="0"/>
-          </a:p>
-        </p:txBody>
-      </p:sp>
-      <p:cxnSp>
-        <p:nvCxnSpPr>
-          <p:cNvPr id="102" name="Elbow Connector 101"/>
-          <p:cNvCxnSpPr>
-            <a:stCxn id="23" idx="3"/>
-            <a:endCxn id="101" idx="1"/>
-          </p:cNvCxnSpPr>
-          <p:nvPr/>
-        </p:nvCxnSpPr>
-        <p:spPr>
-          <a:xfrm flipV="1">
-            <a:off x="3200400" y="4629020"/>
-            <a:ext cx="574613" cy="4831"/>
-          </a:xfrm>
-          <a:prstGeom prst="bentConnector3">
-            <a:avLst>
-              <a:gd name="adj1" fmla="val 50000"/>
-            </a:avLst>
-          </a:prstGeom>
-          <a:ln w="19050">
-            <a:solidFill>
-              <a:srgbClr val="00B050"/>
-            </a:solidFill>
-            <a:prstDash val="dash"/>
-            <a:headEnd type="none" w="med" len="med"/>
-            <a:tailEnd type="arrow" w="med" len="med"/>
-          </a:ln>
-          <a:effectLst/>
-        </p:spPr>
-        <p:style>
-          <a:lnRef idx="1">
-            <a:schemeClr val="accent2"/>
-          </a:lnRef>
-          <a:fillRef idx="2">
-            <a:schemeClr val="accent2"/>
-          </a:fillRef>
-          <a:effectRef idx="1">
-            <a:schemeClr val="accent2"/>
-          </a:effectRef>
-          <a:fontRef idx="minor">
-            <a:schemeClr val="dk1"/>
-          </a:fontRef>
-        </p:style>
-      </p:cxnSp>
-      <p:cxnSp>
-        <p:nvCxnSpPr>
-          <p:cNvPr id="87" name="Straight Arrow Connector 86"/>
+          <p:cNvPr id="39" name="Straight Arrow Connector 38"/>
           <p:cNvCxnSpPr/>
           <p:nvPr/>
         </p:nvCxnSpPr>
         <p:spPr>
           <a:xfrm flipV="1">
-            <a:off x="8107853" y="1199445"/>
-            <a:ext cx="0" cy="304800"/>
+            <a:off x="2353734" y="3697061"/>
+            <a:ext cx="0" cy="301859"/>
           </a:xfrm>
           <a:prstGeom prst="straightConnector1">
             <a:avLst/>
           </a:prstGeom>
-          <a:ln w="19050">
-            <a:solidFill>
-              <a:schemeClr val="bg1">
-                <a:lumMod val="65000"/>
-              </a:schemeClr>
-            </a:solidFill>
-            <a:prstDash val="dash"/>
-            <a:headEnd type="none" w="med" len="med"/>
-            <a:tailEnd type="arrow" w="med" len="med"/>
-          </a:ln>
-          <a:effectLst/>
-        </p:spPr>
-        <p:style>
-          <a:lnRef idx="1">
-            <a:schemeClr val="accent2"/>
-          </a:lnRef>
-          <a:fillRef idx="2">
-            <a:schemeClr val="accent2"/>
-          </a:fillRef>
-          <a:effectRef idx="1">
-            <a:schemeClr val="accent2"/>
-          </a:effectRef>
-          <a:fontRef idx="minor">
-            <a:schemeClr val="dk1"/>
-          </a:fontRef>
-        </p:style>
-      </p:cxnSp>
-      <p:cxnSp>
-        <p:nvCxnSpPr>
-          <p:cNvPr id="107" name="Straight Arrow Connector 106"/>
-          <p:cNvCxnSpPr/>
-          <p:nvPr/>
-        </p:nvCxnSpPr>
-        <p:spPr>
-          <a:xfrm flipV="1">
-            <a:off x="8260253" y="1199445"/>
-            <a:ext cx="0" cy="304800"/>
-          </a:xfrm>
-          <a:prstGeom prst="straightConnector1">
-            <a:avLst/>
-          </a:prstGeom>
-          <a:ln w="19050">
-            <a:solidFill>
-              <a:schemeClr val="bg1">
-                <a:lumMod val="65000"/>
-              </a:schemeClr>
-            </a:solidFill>
-            <a:prstDash val="dash"/>
-            <a:headEnd type="none" w="med" len="med"/>
-            <a:tailEnd type="arrow" w="med" len="med"/>
-          </a:ln>
-          <a:effectLst/>
-        </p:spPr>
-        <p:style>
-          <a:lnRef idx="1">
-            <a:schemeClr val="accent2"/>
-          </a:lnRef>
-          <a:fillRef idx="2">
-            <a:schemeClr val="accent2"/>
-          </a:fillRef>
-          <a:effectRef idx="1">
-            <a:schemeClr val="accent2"/>
-          </a:effectRef>
-          <a:fontRef idx="minor">
-            <a:schemeClr val="dk1"/>
-          </a:fontRef>
-        </p:style>
-      </p:cxnSp>
-      <p:cxnSp>
-        <p:nvCxnSpPr>
-          <p:cNvPr id="108" name="Straight Arrow Connector 107"/>
-          <p:cNvCxnSpPr/>
-          <p:nvPr/>
-        </p:nvCxnSpPr>
-        <p:spPr>
-          <a:xfrm flipV="1">
-            <a:off x="8412653" y="1199445"/>
-            <a:ext cx="0" cy="304800"/>
-          </a:xfrm>
-          <a:prstGeom prst="straightConnector1">
-            <a:avLst/>
-          </a:prstGeom>
-          <a:ln w="19050">
-            <a:solidFill>
-              <a:schemeClr val="bg1">
-                <a:lumMod val="65000"/>
-              </a:schemeClr>
-            </a:solidFill>
-            <a:prstDash val="dash"/>
-            <a:headEnd type="none" w="med" len="med"/>
-            <a:tailEnd type="arrow" w="med" len="med"/>
-          </a:ln>
-          <a:effectLst/>
-        </p:spPr>
-        <p:style>
-          <a:lnRef idx="1">
-            <a:schemeClr val="accent2"/>
-          </a:lnRef>
-          <a:fillRef idx="2">
-            <a:schemeClr val="accent2"/>
-          </a:fillRef>
-          <a:effectRef idx="1">
-            <a:schemeClr val="accent2"/>
-          </a:effectRef>
-          <a:fontRef idx="minor">
-            <a:schemeClr val="dk1"/>
-          </a:fontRef>
-        </p:style>
-      </p:cxnSp>
-      <p:cxnSp>
-        <p:nvCxnSpPr>
-          <p:cNvPr id="109" name="Straight Arrow Connector 108"/>
-          <p:cNvCxnSpPr/>
-          <p:nvPr/>
-        </p:nvCxnSpPr>
-        <p:spPr>
-          <a:xfrm flipV="1">
-            <a:off x="8074978" y="2119808"/>
-            <a:ext cx="0" cy="304800"/>
-          </a:xfrm>
-          <a:prstGeom prst="straightConnector1">
-            <a:avLst/>
-          </a:prstGeom>
-          <a:ln w="19050">
-            <a:solidFill>
-              <a:schemeClr val="bg1">
-                <a:lumMod val="65000"/>
-              </a:schemeClr>
-            </a:solidFill>
-            <a:prstDash val="dash"/>
-            <a:headEnd type="none" w="med" len="med"/>
-            <a:tailEnd type="arrow" w="med" len="med"/>
-          </a:ln>
-          <a:effectLst/>
-        </p:spPr>
-        <p:style>
-          <a:lnRef idx="1">
-            <a:schemeClr val="accent2"/>
-          </a:lnRef>
-          <a:fillRef idx="2">
-            <a:schemeClr val="accent2"/>
-          </a:fillRef>
-          <a:effectRef idx="1">
-            <a:schemeClr val="accent2"/>
-          </a:effectRef>
-          <a:fontRef idx="minor">
-            <a:schemeClr val="dk1"/>
-          </a:fontRef>
-        </p:style>
-      </p:cxnSp>
-      <p:cxnSp>
-        <p:nvCxnSpPr>
-          <p:cNvPr id="110" name="Straight Arrow Connector 109"/>
-          <p:cNvCxnSpPr/>
-          <p:nvPr/>
-        </p:nvCxnSpPr>
-        <p:spPr>
-          <a:xfrm flipV="1">
-            <a:off x="8227378" y="2119808"/>
-            <a:ext cx="0" cy="304800"/>
-          </a:xfrm>
-          <a:prstGeom prst="straightConnector1">
-            <a:avLst/>
-          </a:prstGeom>
-          <a:ln w="19050">
-            <a:solidFill>
-              <a:schemeClr val="bg1">
-                <a:lumMod val="65000"/>
-              </a:schemeClr>
-            </a:solidFill>
-            <a:prstDash val="dash"/>
-            <a:headEnd type="none" w="med" len="med"/>
-            <a:tailEnd type="arrow" w="med" len="med"/>
-          </a:ln>
-          <a:effectLst/>
-        </p:spPr>
-        <p:style>
-          <a:lnRef idx="1">
-            <a:schemeClr val="accent2"/>
-          </a:lnRef>
-          <a:fillRef idx="2">
-            <a:schemeClr val="accent2"/>
-          </a:fillRef>
-          <a:effectRef idx="1">
-            <a:schemeClr val="accent2"/>
-          </a:effectRef>
-          <a:fontRef idx="minor">
-            <a:schemeClr val="dk1"/>
-          </a:fontRef>
-        </p:style>
-      </p:cxnSp>
-      <p:cxnSp>
-        <p:nvCxnSpPr>
-          <p:cNvPr id="111" name="Straight Arrow Connector 110"/>
-          <p:cNvCxnSpPr/>
-          <p:nvPr/>
-        </p:nvCxnSpPr>
-        <p:spPr>
-          <a:xfrm flipV="1">
-            <a:off x="8379778" y="2119808"/>
-            <a:ext cx="0" cy="304800"/>
-          </a:xfrm>
-          <a:prstGeom prst="straightConnector1">
-            <a:avLst/>
-          </a:prstGeom>
-          <a:ln w="19050">
-            <a:solidFill>
-              <a:schemeClr val="bg1">
-                <a:lumMod val="65000"/>
-              </a:schemeClr>
-            </a:solidFill>
-            <a:prstDash val="dash"/>
-            <a:headEnd type="none" w="med" len="med"/>
-            <a:tailEnd type="arrow" w="med" len="med"/>
-          </a:ln>
-          <a:effectLst/>
-        </p:spPr>
-        <p:style>
-          <a:lnRef idx="1">
-            <a:schemeClr val="accent2"/>
-          </a:lnRef>
-          <a:fillRef idx="2">
-            <a:schemeClr val="accent2"/>
-          </a:fillRef>
-          <a:effectRef idx="1">
-            <a:schemeClr val="accent2"/>
-          </a:effectRef>
-          <a:fontRef idx="minor">
-            <a:schemeClr val="dk1"/>
-          </a:fontRef>
-        </p:style>
-      </p:cxnSp>
-      <p:sp>
-        <p:nvSpPr>
-          <p:cNvPr id="63" name="Rectangle 62"/>
-          <p:cNvSpPr/>
-          <p:nvPr/>
-        </p:nvSpPr>
-        <p:spPr>
-          <a:xfrm>
-            <a:off x="228600" y="2656798"/>
-            <a:ext cx="1746186" cy="346760"/>
-          </a:xfrm>
-          <a:prstGeom prst="rect">
-            <a:avLst/>
-          </a:prstGeom>
-          <a:solidFill>
-            <a:srgbClr val="C00000"/>
-          </a:solidFill>
-          <a:ln w="19050">
-            <a:solidFill>
-              <a:srgbClr val="C00000"/>
-            </a:solidFill>
-          </a:ln>
-          <a:effectLst/>
-        </p:spPr>
-        <p:style>
-          <a:lnRef idx="1">
-            <a:schemeClr val="accent2"/>
-          </a:lnRef>
-          <a:fillRef idx="2">
-            <a:schemeClr val="accent2"/>
-          </a:fillRef>
-          <a:effectRef idx="1">
-            <a:schemeClr val="accent2"/>
-          </a:effectRef>
-          <a:fontRef idx="minor">
-            <a:schemeClr val="dk1"/>
-          </a:fontRef>
-        </p:style>
-        <p:txBody>
-          <a:bodyPr rtlCol="0" anchor="ctr"/>
-          <a:lstStyle/>
-          <a:p>
-            <a:pPr algn="ctr"/>
-            <a:r>
-              <a:rPr lang="en-US" sz="1050" dirty="0" err="1">
-                <a:solidFill>
-                  <a:schemeClr val="bg1"/>
-                </a:solidFill>
-              </a:rPr>
-              <a:t>MainWindow</a:t>
-            </a:r>
-            <a:endParaRPr lang="en-SG" sz="1050" dirty="0">
-              <a:solidFill>
-                <a:schemeClr val="bg1"/>
-              </a:solidFill>
-            </a:endParaRPr>
-          </a:p>
-        </p:txBody>
-      </p:sp>
-      <p:cxnSp>
-        <p:nvCxnSpPr>
-          <p:cNvPr id="64" name="Elbow Connector 63"/>
-          <p:cNvCxnSpPr>
-            <a:stCxn id="9" idx="0"/>
-          </p:cNvCxnSpPr>
-          <p:nvPr/>
-        </p:nvCxnSpPr>
-        <p:spPr>
-          <a:xfrm rot="5400000" flipH="1" flipV="1">
-            <a:off x="161393" y="3469523"/>
-            <a:ext cx="901834" cy="1"/>
-          </a:xfrm>
-          <a:prstGeom prst="bentConnector3">
-            <a:avLst>
-              <a:gd name="adj1" fmla="val 50000"/>
-            </a:avLst>
-          </a:prstGeom>
-          <a:ln w="19050">
-            <a:solidFill>
-              <a:srgbClr val="C00000"/>
-            </a:solidFill>
-            <a:headEnd type="none" w="med" len="med"/>
-            <a:tailEnd type="arrow" w="med" len="med"/>
-          </a:ln>
-          <a:effectLst/>
-        </p:spPr>
-        <p:style>
-          <a:lnRef idx="1">
-            <a:schemeClr val="accent2"/>
-          </a:lnRef>
-          <a:fillRef idx="2">
-            <a:schemeClr val="accent2"/>
-          </a:fillRef>
-          <a:effectRef idx="1">
-            <a:schemeClr val="accent2"/>
-          </a:effectRef>
-          <a:fontRef idx="minor">
-            <a:schemeClr val="dk1"/>
-          </a:fontRef>
-        </p:style>
-      </p:cxnSp>
-      <p:sp>
-        <p:nvSpPr>
-          <p:cNvPr id="66" name="Rectangle 65"/>
-          <p:cNvSpPr/>
-          <p:nvPr/>
-        </p:nvSpPr>
-        <p:spPr>
-          <a:xfrm>
-            <a:off x="2410208" y="3700884"/>
-            <a:ext cx="790192" cy="442612"/>
-          </a:xfrm>
-          <a:prstGeom prst="rect">
-            <a:avLst/>
-          </a:prstGeom>
-          <a:solidFill>
-            <a:srgbClr val="0070C0"/>
-          </a:solidFill>
-          <a:ln w="19050">
-            <a:solidFill>
-              <a:srgbClr val="0070C0"/>
-            </a:solidFill>
-          </a:ln>
-          <a:effectLst/>
-        </p:spPr>
-        <p:style>
-          <a:lnRef idx="1">
-            <a:schemeClr val="accent2"/>
-          </a:lnRef>
-          <a:fillRef idx="2">
-            <a:schemeClr val="accent2"/>
-          </a:fillRef>
-          <a:effectRef idx="1">
-            <a:schemeClr val="accent2"/>
-          </a:effectRef>
-          <a:fontRef idx="minor">
-            <a:schemeClr val="dk1"/>
-          </a:fontRef>
-        </p:style>
-        <p:txBody>
-          <a:bodyPr rtlCol="0" anchor="ctr"/>
-          <a:lstStyle/>
-          <a:p>
-            <a:pPr algn="ctr"/>
-            <a:r>
-              <a:rPr lang="en-US" sz="1050" dirty="0">
-                <a:solidFill>
-                  <a:schemeClr val="bg1"/>
-                </a:solidFill>
-              </a:rPr>
-              <a:t>Logic</a:t>
-            </a:r>
-            <a:endParaRPr lang="en-SG" sz="1050" dirty="0">
-              <a:solidFill>
-                <a:schemeClr val="bg1"/>
-              </a:solidFill>
-            </a:endParaRPr>
-          </a:p>
-        </p:txBody>
-      </p:sp>
-      <p:cxnSp>
-        <p:nvCxnSpPr>
-          <p:cNvPr id="76" name="Straight Arrow Connector 75"/>
-          <p:cNvCxnSpPr>
-            <a:stCxn id="66" idx="3"/>
-            <a:endCxn id="13" idx="1"/>
-          </p:cNvCxnSpPr>
-          <p:nvPr/>
-        </p:nvCxnSpPr>
-        <p:spPr>
-          <a:xfrm flipV="1">
-            <a:off x="3200400" y="3920440"/>
-            <a:ext cx="282698" cy="1750"/>
-          </a:xfrm>
-          <a:prstGeom prst="straightConnector1">
-            <a:avLst/>
-          </a:prstGeom>
-          <a:ln w="19050">
-            <a:solidFill>
-              <a:srgbClr val="0070C0"/>
-            </a:solidFill>
-            <a:headEnd type="none" w="med" len="med"/>
-            <a:tailEnd type="arrow" w="med" len="med"/>
-          </a:ln>
-          <a:effectLst/>
-        </p:spPr>
-        <p:style>
-          <a:lnRef idx="1">
-            <a:schemeClr val="accent2"/>
-          </a:lnRef>
-          <a:fillRef idx="2">
-            <a:schemeClr val="accent2"/>
-          </a:fillRef>
-          <a:effectRef idx="1">
-            <a:schemeClr val="accent2"/>
-          </a:effectRef>
-          <a:fontRef idx="minor">
-            <a:schemeClr val="dk1"/>
-          </a:fontRef>
-        </p:style>
-      </p:cxnSp>
-      <p:sp>
-        <p:nvSpPr>
-          <p:cNvPr id="85" name="Rectangle 84"/>
-          <p:cNvSpPr/>
-          <p:nvPr/>
-        </p:nvSpPr>
-        <p:spPr>
-          <a:xfrm>
-            <a:off x="986679" y="1995549"/>
-            <a:ext cx="756639" cy="346760"/>
-          </a:xfrm>
-          <a:prstGeom prst="rect">
-            <a:avLst/>
-          </a:prstGeom>
-          <a:ln w="19050"/>
-          <a:effectLst/>
-        </p:spPr>
-        <p:style>
-          <a:lnRef idx="1">
-            <a:schemeClr val="accent2"/>
-          </a:lnRef>
-          <a:fillRef idx="2">
-            <a:schemeClr val="accent2"/>
-          </a:fillRef>
-          <a:effectRef idx="1">
-            <a:schemeClr val="accent2"/>
-          </a:effectRef>
-          <a:fontRef idx="minor">
-            <a:schemeClr val="dk1"/>
-          </a:fontRef>
-        </p:style>
-        <p:txBody>
-          <a:bodyPr rtlCol="0" anchor="ctr"/>
-          <a:lstStyle/>
-          <a:p>
-            <a:pPr algn="ctr"/>
-            <a:r>
-              <a:rPr lang="en-US" sz="1050" dirty="0"/>
-              <a:t>Formatter</a:t>
-            </a:r>
-            <a:endParaRPr lang="en-SG" sz="1050" dirty="0"/>
-          </a:p>
-        </p:txBody>
-      </p:sp>
-      <p:cxnSp>
-        <p:nvCxnSpPr>
-          <p:cNvPr id="86" name="Elbow Connector 85"/>
-          <p:cNvCxnSpPr>
-            <a:endCxn id="85" idx="2"/>
-          </p:cNvCxnSpPr>
-          <p:nvPr/>
-        </p:nvCxnSpPr>
-        <p:spPr>
-          <a:xfrm rot="16200000" flipV="1">
-            <a:off x="1201266" y="2506042"/>
-            <a:ext cx="336300" cy="8834"/>
-          </a:xfrm>
-          <a:prstGeom prst="bentConnector3">
-            <a:avLst>
-              <a:gd name="adj1" fmla="val 50000"/>
-            </a:avLst>
-          </a:prstGeom>
-          <a:ln w="19050">
-            <a:solidFill>
-              <a:srgbClr val="C00000"/>
-            </a:solidFill>
-            <a:prstDash val="dash"/>
-            <a:headEnd type="none" w="med" len="med"/>
-            <a:tailEnd type="arrow" w="med" len="med"/>
-          </a:ln>
-          <a:effectLst/>
-        </p:spPr>
-        <p:style>
-          <a:lnRef idx="1">
-            <a:schemeClr val="accent2"/>
-          </a:lnRef>
-          <a:fillRef idx="2">
-            <a:schemeClr val="accent2"/>
-          </a:fillRef>
-          <a:effectRef idx="1">
-            <a:schemeClr val="accent2"/>
-          </a:effectRef>
-          <a:fontRef idx="minor">
-            <a:schemeClr val="dk1"/>
-          </a:fontRef>
-        </p:style>
-      </p:cxnSp>
-      <p:sp>
-        <p:nvSpPr>
-          <p:cNvPr id="89" name="Rectangle 88"/>
-          <p:cNvSpPr/>
-          <p:nvPr/>
-        </p:nvSpPr>
-        <p:spPr>
-          <a:xfrm>
-            <a:off x="838200" y="3214749"/>
-            <a:ext cx="1071262" cy="346760"/>
-          </a:xfrm>
-          <a:prstGeom prst="rect">
-            <a:avLst/>
-          </a:prstGeom>
-          <a:ln w="19050"/>
-          <a:effectLst/>
-        </p:spPr>
-        <p:style>
-          <a:lnRef idx="1">
-            <a:schemeClr val="accent2"/>
-          </a:lnRef>
-          <a:fillRef idx="2">
-            <a:schemeClr val="accent2"/>
-          </a:fillRef>
-          <a:effectRef idx="1">
-            <a:schemeClr val="accent2"/>
-          </a:effectRef>
-          <a:fontRef idx="minor">
-            <a:schemeClr val="dk1"/>
-          </a:fontRef>
-        </p:style>
-        <p:txBody>
-          <a:bodyPr rtlCol="0" anchor="ctr"/>
-          <a:lstStyle/>
-          <a:p>
-            <a:pPr algn="ctr"/>
-            <a:r>
-              <a:rPr lang="en-US" sz="1050" dirty="0"/>
-              <a:t>&lt;&lt;interface&gt;&gt;</a:t>
-            </a:r>
-          </a:p>
-          <a:p>
-            <a:pPr algn="ctr"/>
-            <a:r>
-              <a:rPr lang="en-US" sz="1050" dirty="0"/>
-              <a:t>Stoppable</a:t>
-            </a:r>
-            <a:endParaRPr lang="en-SG" sz="1050" dirty="0"/>
-          </a:p>
-        </p:txBody>
-      </p:sp>
-      <p:cxnSp>
-        <p:nvCxnSpPr>
-          <p:cNvPr id="91" name="Elbow Connector 90"/>
-          <p:cNvCxnSpPr>
-            <a:stCxn id="89" idx="0"/>
-          </p:cNvCxnSpPr>
-          <p:nvPr/>
-        </p:nvCxnSpPr>
-        <p:spPr>
-          <a:xfrm rot="5400000" flipH="1" flipV="1">
-            <a:off x="1281047" y="3114967"/>
-            <a:ext cx="192567" cy="6999"/>
-          </a:xfrm>
-          <a:prstGeom prst="bentConnector3">
-            <a:avLst>
-              <a:gd name="adj1" fmla="val 50000"/>
-            </a:avLst>
-          </a:prstGeom>
-          <a:ln w="19050">
+          <a:ln w="28575">
             <a:solidFill>
               <a:srgbClr val="C00000"/>
             </a:solidFill>
             <a:prstDash val="solid"/>
-            <a:headEnd type="arrow" w="med" len="med"/>
-            <a:tailEnd type="none" w="med" len="med"/>
+            <a:tailEnd type="arrow"/>
           </a:ln>
-          <a:effectLst/>
         </p:spPr>
         <p:style>
           <a:lnRef idx="1">
-            <a:schemeClr val="accent2"/>
+            <a:schemeClr val="accent1"/>
           </a:lnRef>
-          <a:fillRef idx="2">
-            <a:schemeClr val="accent2"/>
+          <a:fillRef idx="0">
+            <a:schemeClr val="accent1"/>
           </a:fillRef>
-          <a:effectRef idx="1">
-            <a:schemeClr val="accent2"/>
+          <a:effectRef idx="0">
+            <a:schemeClr val="accent1"/>
           </a:effectRef>
           <a:fontRef idx="minor">
-            <a:schemeClr val="dk1"/>
-          </a:fontRef>
-        </p:style>
-      </p:cxnSp>
-      <p:sp>
-        <p:nvSpPr>
-          <p:cNvPr id="103" name="Isosceles Triangle 102"/>
-          <p:cNvSpPr/>
-          <p:nvPr/>
-        </p:nvSpPr>
-        <p:spPr>
-          <a:xfrm rot="10800000" flipV="1">
-            <a:off x="1296380" y="3561884"/>
-            <a:ext cx="270504" cy="175523"/>
-          </a:xfrm>
-          <a:prstGeom prst="triangle">
-            <a:avLst/>
-          </a:prstGeom>
-          <a:ln w="19050"/>
-          <a:effectLst/>
-        </p:spPr>
-        <p:style>
-          <a:lnRef idx="1">
-            <a:schemeClr val="accent2"/>
-          </a:lnRef>
-          <a:fillRef idx="2">
-            <a:schemeClr val="accent2"/>
-          </a:fillRef>
-          <a:effectRef idx="1">
-            <a:schemeClr val="accent2"/>
-          </a:effectRef>
-          <a:fontRef idx="minor">
-            <a:schemeClr val="dk1"/>
-          </a:fontRef>
-        </p:style>
-        <p:txBody>
-          <a:bodyPr rtlCol="0" anchor="ctr"/>
-          <a:lstStyle/>
-          <a:p>
-            <a:pPr algn="ctr"/>
-            <a:endParaRPr lang="en-SG" sz="1050"/>
-          </a:p>
-        </p:txBody>
-      </p:sp>
-      <p:cxnSp>
-        <p:nvCxnSpPr>
-          <p:cNvPr id="104" name="Elbow Connector 103"/>
-          <p:cNvCxnSpPr>
-            <a:stCxn id="103" idx="3"/>
-            <a:endCxn id="12" idx="0"/>
-          </p:cNvCxnSpPr>
-          <p:nvPr/>
-        </p:nvCxnSpPr>
-        <p:spPr>
-          <a:xfrm rot="16200000" flipH="1">
-            <a:off x="1344934" y="3824104"/>
-            <a:ext cx="176402" cy="3007"/>
-          </a:xfrm>
-          <a:prstGeom prst="bentConnector3">
-            <a:avLst>
-              <a:gd name="adj1" fmla="val 50000"/>
-            </a:avLst>
-          </a:prstGeom>
-          <a:ln w="19050">
-            <a:solidFill>
-              <a:srgbClr val="C00000"/>
-            </a:solidFill>
-            <a:prstDash val="dash"/>
-            <a:headEnd type="none" w="med" len="med"/>
-            <a:tailEnd type="none" w="med" len="med"/>
-          </a:ln>
-          <a:effectLst/>
-        </p:spPr>
-        <p:style>
-          <a:lnRef idx="1">
-            <a:schemeClr val="accent2"/>
-          </a:lnRef>
-          <a:fillRef idx="2">
-            <a:schemeClr val="accent2"/>
-          </a:fillRef>
-          <a:effectRef idx="1">
-            <a:schemeClr val="accent2"/>
-          </a:effectRef>
-          <a:fontRef idx="minor">
-            <a:schemeClr val="dk1"/>
-          </a:fontRef>
-        </p:style>
-      </p:cxnSp>
-      <p:cxnSp>
-        <p:nvCxnSpPr>
-          <p:cNvPr id="113" name="Elbow Connector 112"/>
-          <p:cNvCxnSpPr>
-            <a:stCxn id="63" idx="3"/>
-            <a:endCxn id="66" idx="1"/>
-          </p:cNvCxnSpPr>
-          <p:nvPr/>
-        </p:nvCxnSpPr>
-        <p:spPr>
-          <a:xfrm>
-            <a:off x="1974786" y="2830178"/>
-            <a:ext cx="435422" cy="1092012"/>
-          </a:xfrm>
-          <a:prstGeom prst="bentConnector3">
-            <a:avLst>
-              <a:gd name="adj1" fmla="val 50000"/>
-            </a:avLst>
-          </a:prstGeom>
-          <a:ln w="19050">
-            <a:solidFill>
-              <a:srgbClr val="C00000"/>
-            </a:solidFill>
-            <a:prstDash val="solid"/>
-            <a:headEnd type="none" w="med" len="med"/>
-            <a:tailEnd type="arrow" w="med" len="med"/>
-          </a:ln>
-          <a:effectLst/>
-        </p:spPr>
-        <p:style>
-          <a:lnRef idx="1">
-            <a:schemeClr val="accent2"/>
-          </a:lnRef>
-          <a:fillRef idx="2">
-            <a:schemeClr val="accent2"/>
-          </a:fillRef>
-          <a:effectRef idx="1">
-            <a:schemeClr val="accent2"/>
-          </a:effectRef>
-          <a:fontRef idx="minor">
-            <a:schemeClr val="dk1"/>
-          </a:fontRef>
-        </p:style>
-      </p:cxnSp>
-      <p:cxnSp>
-        <p:nvCxnSpPr>
-          <p:cNvPr id="123" name="Elbow Connector 122"/>
-          <p:cNvCxnSpPr>
-            <a:stCxn id="12" idx="3"/>
-          </p:cNvCxnSpPr>
-          <p:nvPr/>
-        </p:nvCxnSpPr>
-        <p:spPr>
-          <a:xfrm flipV="1">
-            <a:off x="1725304" y="4087188"/>
-            <a:ext cx="684904" cy="1"/>
-          </a:xfrm>
-          <a:prstGeom prst="bentConnector3">
-            <a:avLst>
-              <a:gd name="adj1" fmla="val 50000"/>
-            </a:avLst>
-          </a:prstGeom>
-          <a:ln w="19050">
-            <a:solidFill>
-              <a:srgbClr val="C00000"/>
-            </a:solidFill>
-            <a:prstDash val="dash"/>
-            <a:headEnd type="none" w="med" len="med"/>
-            <a:tailEnd type="arrow" w="med" len="med"/>
-          </a:ln>
-          <a:effectLst/>
-        </p:spPr>
-        <p:style>
-          <a:lnRef idx="1">
-            <a:schemeClr val="accent2"/>
-          </a:lnRef>
-          <a:fillRef idx="2">
-            <a:schemeClr val="accent2"/>
-          </a:fillRef>
-          <a:effectRef idx="1">
-            <a:schemeClr val="accent2"/>
-          </a:effectRef>
-          <a:fontRef idx="minor">
-            <a:schemeClr val="dk1"/>
-          </a:fontRef>
-        </p:style>
-      </p:cxnSp>
-      <p:sp>
-        <p:nvSpPr>
-          <p:cNvPr id="74" name="Rectangle 73">
-            <a:extLst>
-              <a:ext uri="{FF2B5EF4-FFF2-40B4-BE49-F238E27FC236}">
-                <a16:creationId xmlns:a16="http://schemas.microsoft.com/office/drawing/2014/main" id="{CE3FE38F-2A17-4540-BA33-EB5C057E66B3}"/>
-              </a:ext>
-            </a:extLst>
-          </p:cNvPr>
-          <p:cNvSpPr/>
-          <p:nvPr/>
-        </p:nvSpPr>
-        <p:spPr>
-          <a:xfrm flipH="1">
-            <a:off x="6142650" y="678080"/>
-            <a:ext cx="1404109" cy="346760"/>
-          </a:xfrm>
-          <a:prstGeom prst="rect">
-            <a:avLst/>
-          </a:prstGeom>
-          <a:ln w="19050"/>
-          <a:effectLst/>
-        </p:spPr>
-        <p:style>
-          <a:lnRef idx="1">
-            <a:schemeClr val="accent5"/>
-          </a:lnRef>
-          <a:fillRef idx="2">
-            <a:schemeClr val="accent5"/>
-          </a:fillRef>
-          <a:effectRef idx="1">
-            <a:schemeClr val="accent5"/>
-          </a:effectRef>
-          <a:fontRef idx="minor">
-            <a:schemeClr val="dk1"/>
-          </a:fontRef>
-        </p:style>
-        <p:txBody>
-          <a:bodyPr rtlCol="0" anchor="ctr"/>
-          <a:lstStyle/>
-          <a:p>
-            <a:pPr algn="ctr"/>
-            <a:r>
-              <a:rPr lang="en-US" sz="1050" dirty="0" err="1"/>
-              <a:t>EditCommand</a:t>
-            </a:r>
-            <a:endParaRPr lang="en-SG" sz="1050" dirty="0"/>
-          </a:p>
-        </p:txBody>
-      </p:sp>
-      <p:sp>
-        <p:nvSpPr>
-          <p:cNvPr id="75" name="Rectangle 74">
-            <a:extLst>
-              <a:ext uri="{FF2B5EF4-FFF2-40B4-BE49-F238E27FC236}">
-                <a16:creationId xmlns:a16="http://schemas.microsoft.com/office/drawing/2014/main" id="{3CC3EEA1-60E3-4356-BC6F-9C6CCD4D78E9}"/>
-              </a:ext>
-            </a:extLst>
-          </p:cNvPr>
-          <p:cNvSpPr/>
-          <p:nvPr/>
-        </p:nvSpPr>
-        <p:spPr>
-          <a:xfrm flipH="1">
-            <a:off x="6142650" y="282993"/>
-            <a:ext cx="1404109" cy="346760"/>
-          </a:xfrm>
-          <a:prstGeom prst="rect">
-            <a:avLst/>
-          </a:prstGeom>
-          <a:ln w="19050"/>
-          <a:effectLst/>
-        </p:spPr>
-        <p:style>
-          <a:lnRef idx="1">
-            <a:schemeClr val="accent5"/>
-          </a:lnRef>
-          <a:fillRef idx="2">
-            <a:schemeClr val="accent5"/>
-          </a:fillRef>
-          <a:effectRef idx="1">
-            <a:schemeClr val="accent5"/>
-          </a:effectRef>
-          <a:fontRef idx="minor">
-            <a:schemeClr val="dk1"/>
-          </a:fontRef>
-        </p:style>
-        <p:txBody>
-          <a:bodyPr rtlCol="0" anchor="ctr"/>
-          <a:lstStyle/>
-          <a:p>
-            <a:pPr algn="ctr"/>
-            <a:r>
-              <a:rPr lang="en-US" sz="1050" dirty="0" err="1"/>
-              <a:t>AddCommand</a:t>
-            </a:r>
-            <a:endParaRPr lang="en-SG" sz="1050" dirty="0"/>
-          </a:p>
-        </p:txBody>
-      </p:sp>
-      <p:sp>
-        <p:nvSpPr>
-          <p:cNvPr id="78" name="Rectangle 77">
-            <a:extLst>
-              <a:ext uri="{FF2B5EF4-FFF2-40B4-BE49-F238E27FC236}">
-                <a16:creationId xmlns:a16="http://schemas.microsoft.com/office/drawing/2014/main" id="{55EEA352-89B5-4B62-BE3B-0B6CB5B782EF}"/>
-              </a:ext>
-            </a:extLst>
-          </p:cNvPr>
-          <p:cNvSpPr/>
-          <p:nvPr/>
-        </p:nvSpPr>
-        <p:spPr>
-          <a:xfrm flipH="1">
-            <a:off x="6142649" y="1844120"/>
-            <a:ext cx="1404109" cy="346760"/>
-          </a:xfrm>
-          <a:prstGeom prst="rect">
-            <a:avLst/>
-          </a:prstGeom>
-          <a:ln w="19050"/>
-          <a:effectLst/>
-        </p:spPr>
-        <p:style>
-          <a:lnRef idx="1">
-            <a:schemeClr val="accent5"/>
-          </a:lnRef>
-          <a:fillRef idx="2">
-            <a:schemeClr val="accent5"/>
-          </a:fillRef>
-          <a:effectRef idx="1">
-            <a:schemeClr val="accent5"/>
-          </a:effectRef>
-          <a:fontRef idx="minor">
-            <a:schemeClr val="dk1"/>
-          </a:fontRef>
-        </p:style>
-        <p:txBody>
-          <a:bodyPr rtlCol="0" anchor="ctr"/>
-          <a:lstStyle/>
-          <a:p>
-            <a:pPr algn="ctr"/>
-            <a:r>
-              <a:rPr lang="en-US" sz="1050" dirty="0" err="1"/>
-              <a:t>ListCommand</a:t>
-            </a:r>
-            <a:endParaRPr lang="en-SG" sz="1050" dirty="0"/>
-          </a:p>
-        </p:txBody>
-      </p:sp>
-      <p:cxnSp>
-        <p:nvCxnSpPr>
-          <p:cNvPr id="79" name="Elbow Connector 55">
-            <a:extLst>
-              <a:ext uri="{FF2B5EF4-FFF2-40B4-BE49-F238E27FC236}">
-                <a16:creationId xmlns:a16="http://schemas.microsoft.com/office/drawing/2014/main" id="{30568C57-82E6-4BEE-98F8-A5A1CB257F62}"/>
-              </a:ext>
-            </a:extLst>
-          </p:cNvPr>
-          <p:cNvCxnSpPr>
-            <a:cxnSpLocks/>
-            <a:stCxn id="54" idx="3"/>
-            <a:endCxn id="74" idx="3"/>
-          </p:cNvCxnSpPr>
-          <p:nvPr/>
-        </p:nvCxnSpPr>
-        <p:spPr>
-          <a:xfrm flipV="1">
-            <a:off x="5772467" y="851460"/>
-            <a:ext cx="370183" cy="807793"/>
-          </a:xfrm>
-          <a:prstGeom prst="bentConnector3">
-            <a:avLst>
-              <a:gd name="adj1" fmla="val 50000"/>
-            </a:avLst>
-          </a:prstGeom>
-          <a:noFill/>
-          <a:ln w="19050"/>
-          <a:effectLst/>
-        </p:spPr>
-        <p:style>
-          <a:lnRef idx="1">
-            <a:schemeClr val="accent5"/>
-          </a:lnRef>
-          <a:fillRef idx="2">
-            <a:schemeClr val="accent5"/>
-          </a:fillRef>
-          <a:effectRef idx="1">
-            <a:schemeClr val="accent5"/>
-          </a:effectRef>
-          <a:fontRef idx="minor">
-            <a:schemeClr val="dk1"/>
-          </a:fontRef>
-        </p:style>
-      </p:cxnSp>
-      <p:cxnSp>
-        <p:nvCxnSpPr>
-          <p:cNvPr id="80" name="Elbow Connector 55">
-            <a:extLst>
-              <a:ext uri="{FF2B5EF4-FFF2-40B4-BE49-F238E27FC236}">
-                <a16:creationId xmlns:a16="http://schemas.microsoft.com/office/drawing/2014/main" id="{4A33D4FB-72AD-42FA-8F0B-43FE958785BB}"/>
-              </a:ext>
-            </a:extLst>
-          </p:cNvPr>
-          <p:cNvCxnSpPr>
-            <a:cxnSpLocks/>
-            <a:stCxn id="54" idx="3"/>
-            <a:endCxn id="75" idx="3"/>
-          </p:cNvCxnSpPr>
-          <p:nvPr/>
-        </p:nvCxnSpPr>
-        <p:spPr>
-          <a:xfrm flipV="1">
-            <a:off x="5772467" y="456373"/>
-            <a:ext cx="370183" cy="1202880"/>
-          </a:xfrm>
-          <a:prstGeom prst="bentConnector3">
-            <a:avLst>
-              <a:gd name="adj1" fmla="val 50000"/>
-            </a:avLst>
-          </a:prstGeom>
-          <a:noFill/>
-          <a:ln w="19050"/>
-          <a:effectLst/>
-        </p:spPr>
-        <p:style>
-          <a:lnRef idx="1">
-            <a:schemeClr val="accent5"/>
-          </a:lnRef>
-          <a:fillRef idx="2">
-            <a:schemeClr val="accent5"/>
-          </a:fillRef>
-          <a:effectRef idx="1">
-            <a:schemeClr val="accent5"/>
-          </a:effectRef>
-          <a:fontRef idx="minor">
-            <a:schemeClr val="dk1"/>
-          </a:fontRef>
-        </p:style>
-      </p:cxnSp>
-      <p:sp>
-        <p:nvSpPr>
-          <p:cNvPr id="83" name="Rectangle 82">
-            <a:extLst>
-              <a:ext uri="{FF2B5EF4-FFF2-40B4-BE49-F238E27FC236}">
-                <a16:creationId xmlns:a16="http://schemas.microsoft.com/office/drawing/2014/main" id="{6AC9AF50-9AEE-41A3-AF4F-7F806874369B}"/>
-              </a:ext>
-            </a:extLst>
-          </p:cNvPr>
-          <p:cNvSpPr/>
-          <p:nvPr/>
-        </p:nvSpPr>
-        <p:spPr>
-          <a:xfrm flipH="1">
-            <a:off x="6143337" y="2237981"/>
-            <a:ext cx="1404109" cy="346760"/>
-          </a:xfrm>
-          <a:prstGeom prst="rect">
-            <a:avLst/>
-          </a:prstGeom>
-          <a:ln w="19050"/>
-          <a:effectLst/>
-        </p:spPr>
-        <p:style>
-          <a:lnRef idx="1">
-            <a:schemeClr val="accent5"/>
-          </a:lnRef>
-          <a:fillRef idx="2">
-            <a:schemeClr val="accent5"/>
-          </a:fillRef>
-          <a:effectRef idx="1">
-            <a:schemeClr val="accent5"/>
-          </a:effectRef>
-          <a:fontRef idx="minor">
-            <a:schemeClr val="dk1"/>
-          </a:fontRef>
-        </p:style>
-        <p:txBody>
-          <a:bodyPr rtlCol="0" anchor="ctr"/>
-          <a:lstStyle/>
-          <a:p>
-            <a:pPr algn="ctr"/>
-            <a:r>
-              <a:rPr lang="en-US" sz="1050" dirty="0" err="1"/>
-              <a:t>FindCommand</a:t>
-            </a:r>
-            <a:endParaRPr lang="en-SG" sz="1050" dirty="0"/>
-          </a:p>
-        </p:txBody>
-      </p:sp>
-      <p:cxnSp>
-        <p:nvCxnSpPr>
-          <p:cNvPr id="88" name="Elbow Connector 59">
-            <a:extLst>
-              <a:ext uri="{FF2B5EF4-FFF2-40B4-BE49-F238E27FC236}">
-                <a16:creationId xmlns:a16="http://schemas.microsoft.com/office/drawing/2014/main" id="{F406DF39-D11B-4E09-AE50-7CDB04CEC5BE}"/>
-              </a:ext>
-            </a:extLst>
-          </p:cNvPr>
-          <p:cNvCxnSpPr>
-            <a:cxnSpLocks/>
-            <a:stCxn id="54" idx="3"/>
-            <a:endCxn id="83" idx="3"/>
-          </p:cNvCxnSpPr>
-          <p:nvPr/>
-        </p:nvCxnSpPr>
-        <p:spPr>
-          <a:xfrm>
-            <a:off x="5772467" y="1659253"/>
-            <a:ext cx="370870" cy="752108"/>
-          </a:xfrm>
-          <a:prstGeom prst="bentConnector3">
-            <a:avLst>
-              <a:gd name="adj1" fmla="val 50000"/>
-            </a:avLst>
-          </a:prstGeom>
-          <a:noFill/>
-          <a:ln w="19050"/>
-          <a:effectLst/>
-        </p:spPr>
-        <p:style>
-          <a:lnRef idx="1">
-            <a:schemeClr val="accent5"/>
-          </a:lnRef>
-          <a:fillRef idx="2">
-            <a:schemeClr val="accent5"/>
-          </a:fillRef>
-          <a:effectRef idx="1">
-            <a:schemeClr val="accent5"/>
-          </a:effectRef>
-          <a:fontRef idx="minor">
-            <a:schemeClr val="dk1"/>
-          </a:fontRef>
-        </p:style>
-      </p:cxnSp>
-      <p:sp>
-        <p:nvSpPr>
-          <p:cNvPr id="94" name="Rectangle 93">
-            <a:extLst>
-              <a:ext uri="{FF2B5EF4-FFF2-40B4-BE49-F238E27FC236}">
-                <a16:creationId xmlns:a16="http://schemas.microsoft.com/office/drawing/2014/main" id="{0E99FF09-3C47-4229-B339-B02A69C3EB2A}"/>
-              </a:ext>
-            </a:extLst>
-          </p:cNvPr>
-          <p:cNvSpPr/>
-          <p:nvPr/>
-        </p:nvSpPr>
-        <p:spPr>
-          <a:xfrm flipH="1">
-            <a:off x="6147597" y="2638851"/>
-            <a:ext cx="1404109" cy="346760"/>
-          </a:xfrm>
-          <a:prstGeom prst="rect">
-            <a:avLst/>
-          </a:prstGeom>
-          <a:ln w="19050"/>
-          <a:effectLst/>
-        </p:spPr>
-        <p:style>
-          <a:lnRef idx="1">
-            <a:schemeClr val="accent5"/>
-          </a:lnRef>
-          <a:fillRef idx="2">
-            <a:schemeClr val="accent5"/>
-          </a:fillRef>
-          <a:effectRef idx="1">
-            <a:schemeClr val="accent5"/>
-          </a:effectRef>
-          <a:fontRef idx="minor">
-            <a:schemeClr val="dk1"/>
-          </a:fontRef>
-        </p:style>
-        <p:txBody>
-          <a:bodyPr rtlCol="0" anchor="ctr"/>
-          <a:lstStyle/>
-          <a:p>
-            <a:pPr algn="ctr"/>
-            <a:r>
-              <a:rPr lang="en-US" sz="1050" dirty="0" err="1"/>
-              <a:t>ViewCommand</a:t>
-            </a:r>
-            <a:endParaRPr lang="en-SG" sz="1050" dirty="0"/>
-          </a:p>
-        </p:txBody>
-      </p:sp>
-      <p:cxnSp>
-        <p:nvCxnSpPr>
-          <p:cNvPr id="95" name="Elbow Connector 59">
-            <a:extLst>
-              <a:ext uri="{FF2B5EF4-FFF2-40B4-BE49-F238E27FC236}">
-                <a16:creationId xmlns:a16="http://schemas.microsoft.com/office/drawing/2014/main" id="{90564F19-9038-492F-AA85-CF7DF92E69C9}"/>
-              </a:ext>
-            </a:extLst>
-          </p:cNvPr>
-          <p:cNvCxnSpPr>
-            <a:cxnSpLocks/>
-            <a:stCxn id="54" idx="3"/>
-            <a:endCxn id="94" idx="3"/>
-          </p:cNvCxnSpPr>
-          <p:nvPr/>
-        </p:nvCxnSpPr>
-        <p:spPr>
-          <a:xfrm>
-            <a:off x="5772467" y="1659253"/>
-            <a:ext cx="375130" cy="1152978"/>
-          </a:xfrm>
-          <a:prstGeom prst="bentConnector3">
-            <a:avLst>
-              <a:gd name="adj1" fmla="val 50000"/>
-            </a:avLst>
-          </a:prstGeom>
-          <a:noFill/>
-          <a:ln w="19050"/>
-          <a:effectLst/>
-        </p:spPr>
-        <p:style>
-          <a:lnRef idx="1">
-            <a:schemeClr val="accent5"/>
-          </a:lnRef>
-          <a:fillRef idx="2">
-            <a:schemeClr val="accent5"/>
-          </a:fillRef>
-          <a:effectRef idx="1">
-            <a:schemeClr val="accent5"/>
-          </a:effectRef>
-          <a:fontRef idx="minor">
-            <a:schemeClr val="dk1"/>
+            <a:schemeClr val="tx1"/>
           </a:fontRef>
         </p:style>
       </p:cxnSp>
     </p:spTree>
     <p:extLst>
       <p:ext uri="{BB962C8B-B14F-4D97-AF65-F5344CB8AC3E}">
-        <p14:creationId xmlns:p14="http://schemas.microsoft.com/office/powerpoint/2010/main" val="3376861716"/>
+        <p14:creationId xmlns:p14="http://schemas.microsoft.com/office/powerpoint/2010/main" val="1981432603"/>
       </p:ext>
     </p:extLst>
   </p:cSld>

</xml_diff>